<commit_message>
Atualização Modulos controle de acesso/financeiro
</commit_message>
<xml_diff>
--- a/TCC/5º Encontro/2017-Apresentacao Psystem.pptx
+++ b/TCC/5º Encontro/2017-Apresentacao Psystem.pptx
@@ -26,22 +26,22 @@
     <p:sldId id="311" r:id="rId17"/>
     <p:sldId id="309" r:id="rId18"/>
     <p:sldId id="310" r:id="rId19"/>
-    <p:sldId id="290" r:id="rId20"/>
-    <p:sldId id="312" r:id="rId21"/>
-    <p:sldId id="319" r:id="rId22"/>
-    <p:sldId id="314" r:id="rId23"/>
-    <p:sldId id="315" r:id="rId24"/>
-    <p:sldId id="316" r:id="rId25"/>
-    <p:sldId id="317" r:id="rId26"/>
-    <p:sldId id="322" r:id="rId27"/>
-    <p:sldId id="291" r:id="rId28"/>
-    <p:sldId id="299" r:id="rId29"/>
-    <p:sldId id="318" r:id="rId30"/>
-    <p:sldId id="300" r:id="rId31"/>
-    <p:sldId id="301" r:id="rId32"/>
-    <p:sldId id="302" r:id="rId33"/>
-    <p:sldId id="303" r:id="rId34"/>
-    <p:sldId id="304" r:id="rId35"/>
+    <p:sldId id="326" r:id="rId20"/>
+    <p:sldId id="327" r:id="rId21"/>
+    <p:sldId id="290" r:id="rId22"/>
+    <p:sldId id="312" r:id="rId23"/>
+    <p:sldId id="319" r:id="rId24"/>
+    <p:sldId id="314" r:id="rId25"/>
+    <p:sldId id="325" r:id="rId26"/>
+    <p:sldId id="315" r:id="rId27"/>
+    <p:sldId id="316" r:id="rId28"/>
+    <p:sldId id="291" r:id="rId29"/>
+    <p:sldId id="299" r:id="rId30"/>
+    <p:sldId id="318" r:id="rId31"/>
+    <p:sldId id="300" r:id="rId32"/>
+    <p:sldId id="301" r:id="rId33"/>
+    <p:sldId id="302" r:id="rId34"/>
+    <p:sldId id="303" r:id="rId35"/>
     <p:sldId id="278" r:id="rId36"/>
     <p:sldId id="321" r:id="rId37"/>
     <p:sldId id="276" r:id="rId38"/>
@@ -286,7 +286,7 @@
             <a:fld id="{C0D5B206-56B5-433E-8333-9415E6A460B9}" type="datetimeFigureOut">
               <a:rPr lang="pt-BR" smtClean="0"/>
               <a:pPr/>
-              <a:t>04/09/2017</a:t>
+              <a:t>06/09/2017</a:t>
             </a:fld>
             <a:endParaRPr lang="pt-BR"/>
           </a:p>
@@ -4354,7 +4354,7 @@
         </p:nvSpPr>
         <p:spPr>
           <a:xfrm>
-            <a:off x="150267" y="1182688"/>
+            <a:off x="150267" y="1341909"/>
             <a:ext cx="8785225" cy="4751387"/>
           </a:xfrm>
         </p:spPr>
@@ -4396,19 +4396,6 @@
             </a:r>
           </a:p>
           <a:p>
-            <a:pPr marL="457200" lvl="1" indent="0" algn="just" eaLnBrk="1" hangingPunct="1">
-              <a:buNone/>
-              <a:defRPr/>
-            </a:pPr>
-            <a:endParaRPr lang="pt-BR" sz="1850" dirty="0">
-              <a:solidFill>
-                <a:schemeClr val="tx2">
-                  <a:lumMod val="75000"/>
-                </a:schemeClr>
-              </a:solidFill>
-            </a:endParaRPr>
-          </a:p>
-          <a:p>
             <a:pPr algn="just" eaLnBrk="1" hangingPunct="1">
               <a:buFont typeface="Arial" panose="020B0604020202020204" pitchFamily="34" charset="0"/>
               <a:buChar char="•"/>
@@ -4443,19 +4430,6 @@
             </a:r>
           </a:p>
           <a:p>
-            <a:pPr marL="457200" lvl="1" indent="0" algn="just" eaLnBrk="1" hangingPunct="1">
-              <a:buNone/>
-              <a:defRPr/>
-            </a:pPr>
-            <a:endParaRPr lang="pt-BR" sz="1850" dirty="0">
-              <a:solidFill>
-                <a:schemeClr val="tx2">
-                  <a:lumMod val="75000"/>
-                </a:schemeClr>
-              </a:solidFill>
-            </a:endParaRPr>
-          </a:p>
-          <a:p>
             <a:pPr algn="just" eaLnBrk="1" hangingPunct="1">
               <a:buFont typeface="Arial" panose="020B0604020202020204" pitchFamily="34" charset="0"/>
               <a:buChar char="•"/>
@@ -4469,7 +4443,7 @@
                   </a:schemeClr>
                 </a:solidFill>
               </a:rPr>
-              <a:t>Gerar log</a:t>
+              <a:t>Alterar Senha</a:t>
             </a:r>
           </a:p>
           <a:p>
@@ -4486,21 +4460,8 @@
                   </a:schemeClr>
                 </a:solidFill>
               </a:rPr>
-              <a:t>Recebe informações dos demais MÓDULO s para gerar log.</a:t>
-            </a:r>
-          </a:p>
-          <a:p>
-            <a:pPr marL="457200" lvl="1" indent="0" algn="just" eaLnBrk="1" hangingPunct="1">
-              <a:buNone/>
-              <a:defRPr/>
-            </a:pPr>
-            <a:endParaRPr lang="pt-BR" sz="1850" dirty="0">
-              <a:solidFill>
-                <a:schemeClr val="tx2">
-                  <a:lumMod val="75000"/>
-                </a:schemeClr>
-              </a:solidFill>
-            </a:endParaRPr>
+              <a:t>Permite que qualquer usuário altere sua própria senha.</a:t>
+            </a:r>
           </a:p>
           <a:p>
             <a:pPr algn="just" eaLnBrk="1" hangingPunct="1">
@@ -4537,19 +4498,6 @@
             </a:r>
           </a:p>
           <a:p>
-            <a:pPr marL="457200" lvl="1" indent="0" algn="just" eaLnBrk="1" hangingPunct="1">
-              <a:buNone/>
-              <a:defRPr/>
-            </a:pPr>
-            <a:endParaRPr lang="pt-BR" sz="1850" dirty="0">
-              <a:solidFill>
-                <a:schemeClr val="tx2">
-                  <a:lumMod val="75000"/>
-                </a:schemeClr>
-              </a:solidFill>
-            </a:endParaRPr>
-          </a:p>
-          <a:p>
             <a:pPr algn="just" eaLnBrk="1" hangingPunct="1">
               <a:buFont typeface="Arial" panose="020B0604020202020204" pitchFamily="34" charset="0"/>
               <a:buChar char="•"/>
@@ -4563,7 +4511,7 @@
                   </a:schemeClr>
                 </a:solidFill>
               </a:rPr>
-              <a:t>Alterar Perfil de Acesso</a:t>
+              <a:t>Configurar Perfil</a:t>
             </a:r>
           </a:p>
           <a:p>
@@ -4580,7 +4528,39 @@
                   </a:schemeClr>
                 </a:solidFill>
               </a:rPr>
-              <a:t>Permite disponibilizar funcionalidades para um grupo de usuários garantindo confidencialidade de dados de acesso restrito.</a:t>
+              <a:t>Permite disponibilizar ou excluir acesso à funcionalidades para um perfil de usuário.</a:t>
+            </a:r>
+          </a:p>
+          <a:p>
+            <a:pPr algn="just" eaLnBrk="1" hangingPunct="1">
+              <a:defRPr/>
+            </a:pPr>
+            <a:r>
+              <a:rPr lang="pt-BR" sz="2600" dirty="0">
+                <a:solidFill>
+                  <a:schemeClr val="tx2">
+                    <a:lumMod val="75000"/>
+                  </a:schemeClr>
+                </a:solidFill>
+              </a:rPr>
+              <a:t>Manter Funcionário</a:t>
+            </a:r>
+          </a:p>
+          <a:p>
+            <a:pPr lvl="1" algn="just" eaLnBrk="1" hangingPunct="1">
+              <a:buFont typeface="Arial" panose="020B0604020202020204" pitchFamily="34" charset="0"/>
+              <a:buChar char="•"/>
+              <a:defRPr/>
+            </a:pPr>
+            <a:r>
+              <a:rPr lang="pt-BR" sz="1850" dirty="0">
+                <a:solidFill>
+                  <a:schemeClr val="tx2">
+                    <a:lumMod val="75000"/>
+                  </a:schemeClr>
+                </a:solidFill>
+              </a:rPr>
+              <a:t>Permite a manutenção de funcionários da clínica.</a:t>
             </a:r>
           </a:p>
           <a:p>
@@ -4618,36 +4598,6 @@
           <a:chExt cx="0" cy="0"/>
         </a:xfrm>
       </p:grpSpPr>
-      <p:pic>
-        <p:nvPicPr>
-          <p:cNvPr id="8" name="Imagem 7"/>
-          <p:cNvPicPr>
-            <a:picLocks noChangeAspect="1"/>
-          </p:cNvPicPr>
-          <p:nvPr/>
-        </p:nvPicPr>
-        <p:blipFill>
-          <a:blip r:embed="rId2">
-            <a:extLst>
-              <a:ext uri="{28A0092B-C50C-407E-A947-70E740481C1C}">
-                <a14:useLocalDpi xmlns:a14="http://schemas.microsoft.com/office/drawing/2010/main" val="0"/>
-              </a:ext>
-            </a:extLst>
-          </a:blip>
-          <a:stretch>
-            <a:fillRect/>
-          </a:stretch>
-        </p:blipFill>
-        <p:spPr>
-          <a:xfrm>
-            <a:off x="2195736" y="1196752"/>
-            <a:ext cx="4680520" cy="5642371"/>
-          </a:xfrm>
-          <a:prstGeom prst="rect">
-            <a:avLst/>
-          </a:prstGeom>
-        </p:spPr>
-      </p:pic>
       <p:sp>
         <p:nvSpPr>
           <p:cNvPr id="5" name="Título 1">
@@ -4837,6 +4787,42 @@
           </a:p>
         </p:txBody>
       </p:sp>
+      <p:pic>
+        <p:nvPicPr>
+          <p:cNvPr id="3" name="Picture 2">
+            <a:extLst>
+              <a:ext uri="{FF2B5EF4-FFF2-40B4-BE49-F238E27FC236}">
+                <a16:creationId xmlns:a16="http://schemas.microsoft.com/office/drawing/2014/main" id="{8F573B82-A720-4E7D-88E3-7ABD98571312}"/>
+              </a:ext>
+            </a:extLst>
+          </p:cNvPr>
+          <p:cNvPicPr>
+            <a:picLocks noChangeAspect="1"/>
+          </p:cNvPicPr>
+          <p:nvPr/>
+        </p:nvPicPr>
+        <p:blipFill>
+          <a:blip r:embed="rId2">
+            <a:extLst>
+              <a:ext uri="{28A0092B-C50C-407E-A947-70E740481C1C}">
+                <a14:useLocalDpi xmlns:a14="http://schemas.microsoft.com/office/drawing/2010/main" val="0"/>
+              </a:ext>
+            </a:extLst>
+          </a:blip>
+          <a:stretch>
+            <a:fillRect/>
+          </a:stretch>
+        </p:blipFill>
+        <p:spPr>
+          <a:xfrm>
+            <a:off x="2503387" y="1268761"/>
+            <a:ext cx="4228853" cy="5532254"/>
+          </a:xfrm>
+          <a:prstGeom prst="rect">
+            <a:avLst/>
+          </a:prstGeom>
+        </p:spPr>
+      </p:pic>
     </p:spTree>
     <p:extLst>
       <p:ext uri="{BB962C8B-B14F-4D97-AF65-F5344CB8AC3E}">
@@ -4867,41 +4853,6 @@
           <a:chExt cx="0" cy="0"/>
         </a:xfrm>
       </p:grpSpPr>
-      <p:pic>
-        <p:nvPicPr>
-          <p:cNvPr id="5" name="Espaço Reservado para Conteúdo 4">
-            <a:extLst>
-              <a:ext uri="{FF2B5EF4-FFF2-40B4-BE49-F238E27FC236}">
-                <a16:creationId xmlns:a16="http://schemas.microsoft.com/office/drawing/2014/main" id="{0EB6ED7E-6CFB-4E85-B7ED-4873840A1BE0}"/>
-              </a:ext>
-            </a:extLst>
-          </p:cNvPr>
-          <p:cNvPicPr>
-            <a:picLocks noGrp="1" noChangeAspect="1"/>
-          </p:cNvPicPr>
-          <p:nvPr>
-            <p:ph idx="1"/>
-          </p:nvPr>
-        </p:nvPicPr>
-        <p:blipFill>
-          <a:blip r:embed="rId2" cstate="print">
-            <a:extLst>
-              <a:ext uri="{28A0092B-C50C-407E-A947-70E740481C1C}">
-                <a14:useLocalDpi xmlns:a14="http://schemas.microsoft.com/office/drawing/2010/main" val="0"/>
-              </a:ext>
-            </a:extLst>
-          </a:blip>
-          <a:stretch>
-            <a:fillRect/>
-          </a:stretch>
-        </p:blipFill>
-        <p:spPr>
-          <a:xfrm>
-            <a:off x="2119313" y="2126456"/>
-            <a:ext cx="4905375" cy="3181350"/>
-          </a:xfrm>
-        </p:spPr>
-      </p:pic>
       <p:sp>
         <p:nvSpPr>
           <p:cNvPr id="6" name="Título 1">
@@ -4942,6 +4893,36 @@
           </a:p>
         </p:txBody>
       </p:sp>
+      <p:pic>
+        <p:nvPicPr>
+          <p:cNvPr id="8" name="Picture 7">
+            <a:extLst>
+              <a:ext uri="{FF2B5EF4-FFF2-40B4-BE49-F238E27FC236}">
+                <a16:creationId xmlns:a16="http://schemas.microsoft.com/office/drawing/2014/main" id="{AC1CFE5D-EA64-4455-B011-2E471DBEC948}"/>
+              </a:ext>
+            </a:extLst>
+          </p:cNvPr>
+          <p:cNvPicPr>
+            <a:picLocks noChangeAspect="1"/>
+          </p:cNvPicPr>
+          <p:nvPr/>
+        </p:nvPicPr>
+        <p:blipFill>
+          <a:blip r:embed="rId2"/>
+          <a:stretch>
+            <a:fillRect/>
+          </a:stretch>
+        </p:blipFill>
+        <p:spPr>
+          <a:xfrm>
+            <a:off x="0" y="1844824"/>
+            <a:ext cx="9144000" cy="3697386"/>
+          </a:xfrm>
+          <a:prstGeom prst="rect">
+            <a:avLst/>
+          </a:prstGeom>
+        </p:spPr>
+      </p:pic>
     </p:spTree>
     <p:extLst>
       <p:ext uri="{BB962C8B-B14F-4D97-AF65-F5344CB8AC3E}">
@@ -4972,41 +4953,6 @@
           <a:chExt cx="0" cy="0"/>
         </a:xfrm>
       </p:grpSpPr>
-      <p:pic>
-        <p:nvPicPr>
-          <p:cNvPr id="5" name="Espaço Reservado para Conteúdo 4">
-            <a:extLst>
-              <a:ext uri="{FF2B5EF4-FFF2-40B4-BE49-F238E27FC236}">
-                <a16:creationId xmlns:a16="http://schemas.microsoft.com/office/drawing/2014/main" id="{B614B2BC-1672-4B4C-B1D9-8F6906444D11}"/>
-              </a:ext>
-            </a:extLst>
-          </p:cNvPr>
-          <p:cNvPicPr>
-            <a:picLocks noGrp="1" noChangeAspect="1"/>
-          </p:cNvPicPr>
-          <p:nvPr>
-            <p:ph idx="1"/>
-          </p:nvPr>
-        </p:nvPicPr>
-        <p:blipFill>
-          <a:blip r:embed="rId2" cstate="print">
-            <a:extLst>
-              <a:ext uri="{28A0092B-C50C-407E-A947-70E740481C1C}">
-                <a14:useLocalDpi xmlns:a14="http://schemas.microsoft.com/office/drawing/2010/main" val="0"/>
-              </a:ext>
-            </a:extLst>
-          </a:blip>
-          <a:stretch>
-            <a:fillRect/>
-          </a:stretch>
-        </p:blipFill>
-        <p:spPr>
-          <a:xfrm>
-            <a:off x="179388" y="1919420"/>
-            <a:ext cx="8785225" cy="3595422"/>
-          </a:xfrm>
-        </p:spPr>
-      </p:pic>
       <p:sp>
         <p:nvSpPr>
           <p:cNvPr id="6" name="Título 1">
@@ -5047,6 +4993,96 @@
           </a:p>
         </p:txBody>
       </p:sp>
+      <p:sp>
+        <p:nvSpPr>
+          <p:cNvPr id="8" name="Rectangle 7">
+            <a:extLst>
+              <a:ext uri="{FF2B5EF4-FFF2-40B4-BE49-F238E27FC236}">
+                <a16:creationId xmlns:a16="http://schemas.microsoft.com/office/drawing/2014/main" id="{F316C0A6-AC98-4AAE-B87A-547E57B86D5F}"/>
+              </a:ext>
+            </a:extLst>
+          </p:cNvPr>
+          <p:cNvSpPr/>
+          <p:nvPr/>
+        </p:nvSpPr>
+        <p:spPr>
+          <a:xfrm>
+            <a:off x="0" y="1340768"/>
+            <a:ext cx="9144000" cy="5517232"/>
+          </a:xfrm>
+          <a:prstGeom prst="rect">
+            <a:avLst/>
+          </a:prstGeom>
+          <a:solidFill>
+            <a:schemeClr val="bg1"/>
+          </a:solidFill>
+          <a:ln>
+            <a:solidFill>
+              <a:schemeClr val="bg1"/>
+            </a:solidFill>
+          </a:ln>
+        </p:spPr>
+        <p:style>
+          <a:lnRef idx="2">
+            <a:schemeClr val="accent1">
+              <a:shade val="50000"/>
+            </a:schemeClr>
+          </a:lnRef>
+          <a:fillRef idx="1">
+            <a:schemeClr val="accent1"/>
+          </a:fillRef>
+          <a:effectRef idx="0">
+            <a:schemeClr val="accent1"/>
+          </a:effectRef>
+          <a:fontRef idx="minor">
+            <a:schemeClr val="lt1"/>
+          </a:fontRef>
+        </p:style>
+        <p:txBody>
+          <a:bodyPr rtlCol="0" anchor="ctr"/>
+          <a:lstStyle/>
+          <a:p>
+            <a:pPr algn="ctr"/>
+            <a:endParaRPr lang="pt-BR"/>
+          </a:p>
+        </p:txBody>
+      </p:sp>
+      <p:pic>
+        <p:nvPicPr>
+          <p:cNvPr id="9" name="Picture 8">
+            <a:extLst>
+              <a:ext uri="{FF2B5EF4-FFF2-40B4-BE49-F238E27FC236}">
+                <a16:creationId xmlns:a16="http://schemas.microsoft.com/office/drawing/2014/main" id="{F5F42E5F-1DEC-47B5-8651-247D9AF6FADE}"/>
+              </a:ext>
+            </a:extLst>
+          </p:cNvPr>
+          <p:cNvPicPr>
+            <a:picLocks noChangeAspect="1"/>
+          </p:cNvPicPr>
+          <p:nvPr/>
+        </p:nvPicPr>
+        <p:blipFill>
+          <a:blip r:embed="rId2">
+            <a:extLst>
+              <a:ext uri="{28A0092B-C50C-407E-A947-70E740481C1C}">
+                <a14:useLocalDpi xmlns:a14="http://schemas.microsoft.com/office/drawing/2010/main" val="0"/>
+              </a:ext>
+            </a:extLst>
+          </a:blip>
+          <a:stretch>
+            <a:fillRect/>
+          </a:stretch>
+        </p:blipFill>
+        <p:spPr>
+          <a:xfrm>
+            <a:off x="0" y="1340768"/>
+            <a:ext cx="9033417" cy="5112568"/>
+          </a:xfrm>
+          <a:prstGeom prst="rect">
+            <a:avLst/>
+          </a:prstGeom>
+        </p:spPr>
+      </p:pic>
     </p:spTree>
     <p:extLst>
       <p:ext uri="{BB962C8B-B14F-4D97-AF65-F5344CB8AC3E}">
@@ -5077,41 +5113,6 @@
           <a:chExt cx="0" cy="0"/>
         </a:xfrm>
       </p:grpSpPr>
-      <p:pic>
-        <p:nvPicPr>
-          <p:cNvPr id="5" name="Espaço Reservado para Conteúdo 4">
-            <a:extLst>
-              <a:ext uri="{FF2B5EF4-FFF2-40B4-BE49-F238E27FC236}">
-                <a16:creationId xmlns:a16="http://schemas.microsoft.com/office/drawing/2014/main" id="{D0E0BD5E-9A99-41F6-AEAA-D122187C4B06}"/>
-              </a:ext>
-            </a:extLst>
-          </p:cNvPr>
-          <p:cNvPicPr>
-            <a:picLocks noGrp="1" noChangeAspect="1"/>
-          </p:cNvPicPr>
-          <p:nvPr>
-            <p:ph idx="1"/>
-          </p:nvPr>
-        </p:nvPicPr>
-        <p:blipFill>
-          <a:blip r:embed="rId2" cstate="print">
-            <a:extLst>
-              <a:ext uri="{28A0092B-C50C-407E-A947-70E740481C1C}">
-                <a14:useLocalDpi xmlns:a14="http://schemas.microsoft.com/office/drawing/2010/main" val="0"/>
-              </a:ext>
-            </a:extLst>
-          </a:blip>
-          <a:stretch>
-            <a:fillRect/>
-          </a:stretch>
-        </p:blipFill>
-        <p:spPr>
-          <a:xfrm>
-            <a:off x="308968" y="1754707"/>
-            <a:ext cx="8526065" cy="3924848"/>
-          </a:xfrm>
-        </p:spPr>
-      </p:pic>
       <p:sp>
         <p:nvSpPr>
           <p:cNvPr id="6" name="Título 1">
@@ -5152,6 +5153,96 @@
           </a:p>
         </p:txBody>
       </p:sp>
+      <p:sp>
+        <p:nvSpPr>
+          <p:cNvPr id="8" name="Rectangle 7">
+            <a:extLst>
+              <a:ext uri="{FF2B5EF4-FFF2-40B4-BE49-F238E27FC236}">
+                <a16:creationId xmlns:a16="http://schemas.microsoft.com/office/drawing/2014/main" id="{EF4C9CB5-998F-4DAB-AD54-72FA9E925DA9}"/>
+              </a:ext>
+            </a:extLst>
+          </p:cNvPr>
+          <p:cNvSpPr/>
+          <p:nvPr/>
+        </p:nvSpPr>
+        <p:spPr>
+          <a:xfrm>
+            <a:off x="0" y="1340768"/>
+            <a:ext cx="9144000" cy="5517232"/>
+          </a:xfrm>
+          <a:prstGeom prst="rect">
+            <a:avLst/>
+          </a:prstGeom>
+          <a:solidFill>
+            <a:schemeClr val="bg1"/>
+          </a:solidFill>
+          <a:ln>
+            <a:solidFill>
+              <a:schemeClr val="bg1"/>
+            </a:solidFill>
+          </a:ln>
+        </p:spPr>
+        <p:style>
+          <a:lnRef idx="2">
+            <a:schemeClr val="accent1">
+              <a:shade val="50000"/>
+            </a:schemeClr>
+          </a:lnRef>
+          <a:fillRef idx="1">
+            <a:schemeClr val="accent1"/>
+          </a:fillRef>
+          <a:effectRef idx="0">
+            <a:schemeClr val="accent1"/>
+          </a:effectRef>
+          <a:fontRef idx="minor">
+            <a:schemeClr val="lt1"/>
+          </a:fontRef>
+        </p:style>
+        <p:txBody>
+          <a:bodyPr rtlCol="0" anchor="ctr"/>
+          <a:lstStyle/>
+          <a:p>
+            <a:pPr algn="ctr"/>
+            <a:endParaRPr lang="pt-BR"/>
+          </a:p>
+        </p:txBody>
+      </p:sp>
+      <p:pic>
+        <p:nvPicPr>
+          <p:cNvPr id="10" name="Picture 9">
+            <a:extLst>
+              <a:ext uri="{FF2B5EF4-FFF2-40B4-BE49-F238E27FC236}">
+                <a16:creationId xmlns:a16="http://schemas.microsoft.com/office/drawing/2014/main" id="{86E4D953-118F-46F7-809C-802C59C8CF9B}"/>
+              </a:ext>
+            </a:extLst>
+          </p:cNvPr>
+          <p:cNvPicPr>
+            <a:picLocks noChangeAspect="1"/>
+          </p:cNvPicPr>
+          <p:nvPr/>
+        </p:nvPicPr>
+        <p:blipFill>
+          <a:blip r:embed="rId2">
+            <a:extLst>
+              <a:ext uri="{28A0092B-C50C-407E-A947-70E740481C1C}">
+                <a14:useLocalDpi xmlns:a14="http://schemas.microsoft.com/office/drawing/2010/main" val="0"/>
+              </a:ext>
+            </a:extLst>
+          </a:blip>
+          <a:stretch>
+            <a:fillRect/>
+          </a:stretch>
+        </p:blipFill>
+        <p:spPr>
+          <a:xfrm>
+            <a:off x="-1" y="1358546"/>
+            <a:ext cx="9144001" cy="5054473"/>
+          </a:xfrm>
+          <a:prstGeom prst="rect">
+            <a:avLst/>
+          </a:prstGeom>
+        </p:spPr>
+      </p:pic>
     </p:spTree>
     <p:extLst>
       <p:ext uri="{BB962C8B-B14F-4D97-AF65-F5344CB8AC3E}">
@@ -5184,515 +5275,143 @@
       </p:grpSpPr>
       <p:sp>
         <p:nvSpPr>
-          <p:cNvPr id="7170" name="Rectangle 2"/>
+          <p:cNvPr id="6" name="Título 1">
+            <a:extLst>
+              <a:ext uri="{FF2B5EF4-FFF2-40B4-BE49-F238E27FC236}">
+                <a16:creationId xmlns:a16="http://schemas.microsoft.com/office/drawing/2014/main" id="{4420E5F6-C592-489E-8742-39113C67F28C}"/>
+              </a:ext>
+            </a:extLst>
+          </p:cNvPr>
           <p:cNvSpPr>
-            <a:spLocks noGrp="1" noChangeArrowheads="1"/>
+            <a:spLocks noGrp="1"/>
           </p:cNvSpPr>
           <p:nvPr>
-            <p:ph type="ctrTitle"/>
+            <p:ph type="title"/>
           </p:nvPr>
         </p:nvSpPr>
         <p:spPr>
           <a:xfrm>
-            <a:off x="611560" y="1484784"/>
-            <a:ext cx="7815263" cy="2088232"/>
+            <a:off x="323750" y="0"/>
+            <a:ext cx="8797925" cy="922338"/>
           </a:xfrm>
         </p:spPr>
         <p:txBody>
           <a:bodyPr/>
           <a:lstStyle/>
           <a:p>
-            <a:pPr eaLnBrk="1" fontAlgn="auto" hangingPunct="1">
-              <a:spcAft>
-                <a:spcPts val="0"/>
-              </a:spcAft>
-              <a:defRPr/>
-            </a:pPr>
-            <a:r>
-              <a:rPr lang="pt-BR" dirty="0">
-                <a:ea typeface="ＭＳ Ｐゴシック" pitchFamily="-106" charset="-128"/>
-              </a:rPr>
-              <a:t>MÓDULO EMPRESA</a:t>
+            <a:r>
+              <a:rPr lang="pt-BR" dirty="0"/>
+              <a:t>MÓDULO CONTROLE </a:t>
+            </a:r>
+            <a:br>
+              <a:rPr lang="pt-BR" dirty="0"/>
+            </a:br>
+            <a:r>
+              <a:rPr lang="pt-BR" dirty="0"/>
+              <a:t>DE ACESSO</a:t>
             </a:r>
           </a:p>
         </p:txBody>
       </p:sp>
-      <p:grpSp>
-        <p:nvGrpSpPr>
-          <p:cNvPr id="2" name="Group 11"/>
-          <p:cNvGrpSpPr>
-            <a:grpSpLocks/>
-          </p:cNvGrpSpPr>
-          <p:nvPr/>
-        </p:nvGrpSpPr>
-        <p:grpSpPr bwMode="auto">
-          <a:xfrm>
-            <a:off x="755650" y="3213100"/>
-            <a:ext cx="184150" cy="711200"/>
-            <a:chOff x="476" y="2078"/>
-            <a:chExt cx="116" cy="448"/>
-          </a:xfrm>
-        </p:grpSpPr>
-        <p:sp>
-          <p:nvSpPr>
-            <p:cNvPr id="4101" name="Text Box 4"/>
-            <p:cNvSpPr txBox="1">
-              <a:spLocks noChangeArrowheads="1"/>
-            </p:cNvSpPr>
-            <p:nvPr/>
-          </p:nvSpPr>
-          <p:spPr bwMode="auto">
-            <a:xfrm>
-              <a:off x="476" y="2078"/>
-              <a:ext cx="116" cy="233"/>
-            </a:xfrm>
-            <a:prstGeom prst="rect">
-              <a:avLst/>
-            </a:prstGeom>
-            <a:noFill/>
-            <a:ln>
-              <a:noFill/>
-            </a:ln>
+      <p:sp>
+        <p:nvSpPr>
+          <p:cNvPr id="8" name="Rectangle 7">
             <a:extLst>
-              <a:ext uri="{909E8E84-426E-40DD-AFC4-6F175D3DCCD1}">
-                <a14:hiddenFill xmlns:a14="http://schemas.microsoft.com/office/drawing/2010/main">
-                  <a:solidFill>
-                    <a:srgbClr val="FFFFFF"/>
-                  </a:solidFill>
-                </a14:hiddenFill>
-              </a:ext>
-              <a:ext uri="{91240B29-F687-4F45-9708-019B960494DF}">
-                <a14:hiddenLine xmlns:a14="http://schemas.microsoft.com/office/drawing/2010/main" w="9525">
-                  <a:solidFill>
-                    <a:srgbClr val="000000"/>
-                  </a:solidFill>
-                  <a:miter lim="800000"/>
-                  <a:headEnd/>
-                  <a:tailEnd/>
-                </a14:hiddenLine>
+              <a:ext uri="{FF2B5EF4-FFF2-40B4-BE49-F238E27FC236}">
+                <a16:creationId xmlns:a16="http://schemas.microsoft.com/office/drawing/2014/main" id="{EF4C9CB5-998F-4DAB-AD54-72FA9E925DA9}"/>
               </a:ext>
             </a:extLst>
-          </p:spPr>
-          <p:txBody>
-            <a:bodyPr wrap="none">
-              <a:spAutoFit/>
-            </a:bodyPr>
-            <a:lstStyle>
-              <a:lvl1pPr>
-                <a:defRPr>
-                  <a:solidFill>
-                    <a:schemeClr val="tx1"/>
-                  </a:solidFill>
-                  <a:latin typeface="Arial" charset="0"/>
-                  <a:ea typeface="ＭＳ Ｐゴシック" pitchFamily="34" charset="-128"/>
-                </a:defRPr>
-              </a:lvl1pPr>
-              <a:lvl2pPr marL="742950" indent="-285750">
-                <a:defRPr>
-                  <a:solidFill>
-                    <a:schemeClr val="tx1"/>
-                  </a:solidFill>
-                  <a:latin typeface="Arial" charset="0"/>
-                  <a:ea typeface="ＭＳ Ｐゴシック" pitchFamily="34" charset="-128"/>
-                </a:defRPr>
-              </a:lvl2pPr>
-              <a:lvl3pPr marL="1143000" indent="-228600">
-                <a:defRPr>
-                  <a:solidFill>
-                    <a:schemeClr val="tx1"/>
-                  </a:solidFill>
-                  <a:latin typeface="Arial" charset="0"/>
-                  <a:ea typeface="ＭＳ Ｐゴシック" pitchFamily="34" charset="-128"/>
-                </a:defRPr>
-              </a:lvl3pPr>
-              <a:lvl4pPr marL="1600200" indent="-228600">
-                <a:defRPr>
-                  <a:solidFill>
-                    <a:schemeClr val="tx1"/>
-                  </a:solidFill>
-                  <a:latin typeface="Arial" charset="0"/>
-                  <a:ea typeface="ＭＳ Ｐゴシック" pitchFamily="34" charset="-128"/>
-                </a:defRPr>
-              </a:lvl4pPr>
-              <a:lvl5pPr marL="2057400" indent="-228600">
-                <a:defRPr>
-                  <a:solidFill>
-                    <a:schemeClr val="tx1"/>
-                  </a:solidFill>
-                  <a:latin typeface="Arial" charset="0"/>
-                  <a:ea typeface="ＭＳ Ｐゴシック" pitchFamily="34" charset="-128"/>
-                </a:defRPr>
-              </a:lvl5pPr>
-              <a:lvl6pPr marL="2514600" indent="-228600" eaLnBrk="0" fontAlgn="base" hangingPunct="0">
-                <a:spcBef>
-                  <a:spcPct val="0"/>
-                </a:spcBef>
-                <a:spcAft>
-                  <a:spcPct val="0"/>
-                </a:spcAft>
-                <a:defRPr>
-                  <a:solidFill>
-                    <a:schemeClr val="tx1"/>
-                  </a:solidFill>
-                  <a:latin typeface="Arial" charset="0"/>
-                  <a:ea typeface="ＭＳ Ｐゴシック" pitchFamily="34" charset="-128"/>
-                </a:defRPr>
-              </a:lvl6pPr>
-              <a:lvl7pPr marL="2971800" indent="-228600" eaLnBrk="0" fontAlgn="base" hangingPunct="0">
-                <a:spcBef>
-                  <a:spcPct val="0"/>
-                </a:spcBef>
-                <a:spcAft>
-                  <a:spcPct val="0"/>
-                </a:spcAft>
-                <a:defRPr>
-                  <a:solidFill>
-                    <a:schemeClr val="tx1"/>
-                  </a:solidFill>
-                  <a:latin typeface="Arial" charset="0"/>
-                  <a:ea typeface="ＭＳ Ｐゴシック" pitchFamily="34" charset="-128"/>
-                </a:defRPr>
-              </a:lvl7pPr>
-              <a:lvl8pPr marL="3429000" indent="-228600" eaLnBrk="0" fontAlgn="base" hangingPunct="0">
-                <a:spcBef>
-                  <a:spcPct val="0"/>
-                </a:spcBef>
-                <a:spcAft>
-                  <a:spcPct val="0"/>
-                </a:spcAft>
-                <a:defRPr>
-                  <a:solidFill>
-                    <a:schemeClr val="tx1"/>
-                  </a:solidFill>
-                  <a:latin typeface="Arial" charset="0"/>
-                  <a:ea typeface="ＭＳ Ｐゴシック" pitchFamily="34" charset="-128"/>
-                </a:defRPr>
-              </a:lvl8pPr>
-              <a:lvl9pPr marL="3886200" indent="-228600" eaLnBrk="0" fontAlgn="base" hangingPunct="0">
-                <a:spcBef>
-                  <a:spcPct val="0"/>
-                </a:spcBef>
-                <a:spcAft>
-                  <a:spcPct val="0"/>
-                </a:spcAft>
-                <a:defRPr>
-                  <a:solidFill>
-                    <a:schemeClr val="tx1"/>
-                  </a:solidFill>
-                  <a:latin typeface="Arial" charset="0"/>
-                  <a:ea typeface="ＭＳ Ｐゴシック" pitchFamily="34" charset="-128"/>
-                </a:defRPr>
-              </a:lvl9pPr>
-            </a:lstStyle>
-            <a:p>
-              <a:pPr eaLnBrk="1" hangingPunct="1"/>
-              <a:endParaRPr lang="en-US"/>
-            </a:p>
-          </p:txBody>
-        </p:sp>
-        <p:sp>
-          <p:nvSpPr>
-            <p:cNvPr id="4102" name="Text Box 5"/>
-            <p:cNvSpPr txBox="1">
-              <a:spLocks noChangeArrowheads="1"/>
-            </p:cNvSpPr>
-            <p:nvPr/>
-          </p:nvSpPr>
-          <p:spPr bwMode="auto">
-            <a:xfrm>
-              <a:off x="476" y="2235"/>
-              <a:ext cx="116" cy="291"/>
-            </a:xfrm>
-            <a:prstGeom prst="rect">
-              <a:avLst/>
-            </a:prstGeom>
-            <a:noFill/>
-            <a:ln>
-              <a:noFill/>
-            </a:ln>
-            <a:extLst>
-              <a:ext uri="{909E8E84-426E-40DD-AFC4-6F175D3DCCD1}">
-                <a14:hiddenFill xmlns:a14="http://schemas.microsoft.com/office/drawing/2010/main">
-                  <a:solidFill>
-                    <a:srgbClr val="FFFFFF"/>
-                  </a:solidFill>
-                </a14:hiddenFill>
-              </a:ext>
-              <a:ext uri="{91240B29-F687-4F45-9708-019B960494DF}">
-                <a14:hiddenLine xmlns:a14="http://schemas.microsoft.com/office/drawing/2010/main" w="9525">
-                  <a:solidFill>
-                    <a:srgbClr val="000000"/>
-                  </a:solidFill>
-                  <a:miter lim="800000"/>
-                  <a:headEnd/>
-                  <a:tailEnd/>
-                </a14:hiddenLine>
-              </a:ext>
-            </a:extLst>
-          </p:spPr>
-          <p:txBody>
-            <a:bodyPr wrap="none">
-              <a:spAutoFit/>
-            </a:bodyPr>
-            <a:lstStyle>
-              <a:lvl1pPr>
-                <a:defRPr>
-                  <a:solidFill>
-                    <a:schemeClr val="tx1"/>
-                  </a:solidFill>
-                  <a:latin typeface="Arial" charset="0"/>
-                  <a:ea typeface="ＭＳ Ｐゴシック" pitchFamily="34" charset="-128"/>
-                </a:defRPr>
-              </a:lvl1pPr>
-              <a:lvl2pPr marL="742950" indent="-285750">
-                <a:defRPr>
-                  <a:solidFill>
-                    <a:schemeClr val="tx1"/>
-                  </a:solidFill>
-                  <a:latin typeface="Arial" charset="0"/>
-                  <a:ea typeface="ＭＳ Ｐゴシック" pitchFamily="34" charset="-128"/>
-                </a:defRPr>
-              </a:lvl2pPr>
-              <a:lvl3pPr marL="1143000" indent="-228600">
-                <a:defRPr>
-                  <a:solidFill>
-                    <a:schemeClr val="tx1"/>
-                  </a:solidFill>
-                  <a:latin typeface="Arial" charset="0"/>
-                  <a:ea typeface="ＭＳ Ｐゴシック" pitchFamily="34" charset="-128"/>
-                </a:defRPr>
-              </a:lvl3pPr>
-              <a:lvl4pPr marL="1600200" indent="-228600">
-                <a:defRPr>
-                  <a:solidFill>
-                    <a:schemeClr val="tx1"/>
-                  </a:solidFill>
-                  <a:latin typeface="Arial" charset="0"/>
-                  <a:ea typeface="ＭＳ Ｐゴシック" pitchFamily="34" charset="-128"/>
-                </a:defRPr>
-              </a:lvl4pPr>
-              <a:lvl5pPr marL="2057400" indent="-228600">
-                <a:defRPr>
-                  <a:solidFill>
-                    <a:schemeClr val="tx1"/>
-                  </a:solidFill>
-                  <a:latin typeface="Arial" charset="0"/>
-                  <a:ea typeface="ＭＳ Ｐゴシック" pitchFamily="34" charset="-128"/>
-                </a:defRPr>
-              </a:lvl5pPr>
-              <a:lvl6pPr marL="2514600" indent="-228600" eaLnBrk="0" fontAlgn="base" hangingPunct="0">
-                <a:spcBef>
-                  <a:spcPct val="0"/>
-                </a:spcBef>
-                <a:spcAft>
-                  <a:spcPct val="0"/>
-                </a:spcAft>
-                <a:defRPr>
-                  <a:solidFill>
-                    <a:schemeClr val="tx1"/>
-                  </a:solidFill>
-                  <a:latin typeface="Arial" charset="0"/>
-                  <a:ea typeface="ＭＳ Ｐゴシック" pitchFamily="34" charset="-128"/>
-                </a:defRPr>
-              </a:lvl6pPr>
-              <a:lvl7pPr marL="2971800" indent="-228600" eaLnBrk="0" fontAlgn="base" hangingPunct="0">
-                <a:spcBef>
-                  <a:spcPct val="0"/>
-                </a:spcBef>
-                <a:spcAft>
-                  <a:spcPct val="0"/>
-                </a:spcAft>
-                <a:defRPr>
-                  <a:solidFill>
-                    <a:schemeClr val="tx1"/>
-                  </a:solidFill>
-                  <a:latin typeface="Arial" charset="0"/>
-                  <a:ea typeface="ＭＳ Ｐゴシック" pitchFamily="34" charset="-128"/>
-                </a:defRPr>
-              </a:lvl7pPr>
-              <a:lvl8pPr marL="3429000" indent="-228600" eaLnBrk="0" fontAlgn="base" hangingPunct="0">
-                <a:spcBef>
-                  <a:spcPct val="0"/>
-                </a:spcBef>
-                <a:spcAft>
-                  <a:spcPct val="0"/>
-                </a:spcAft>
-                <a:defRPr>
-                  <a:solidFill>
-                    <a:schemeClr val="tx1"/>
-                  </a:solidFill>
-                  <a:latin typeface="Arial" charset="0"/>
-                  <a:ea typeface="ＭＳ Ｐゴシック" pitchFamily="34" charset="-128"/>
-                </a:defRPr>
-              </a:lvl8pPr>
-              <a:lvl9pPr marL="3886200" indent="-228600" eaLnBrk="0" fontAlgn="base" hangingPunct="0">
-                <a:spcBef>
-                  <a:spcPct val="0"/>
-                </a:spcBef>
-                <a:spcAft>
-                  <a:spcPct val="0"/>
-                </a:spcAft>
-                <a:defRPr>
-                  <a:solidFill>
-                    <a:schemeClr val="tx1"/>
-                  </a:solidFill>
-                  <a:latin typeface="Arial" charset="0"/>
-                  <a:ea typeface="ＭＳ Ｐゴシック" pitchFamily="34" charset="-128"/>
-                </a:defRPr>
-              </a:lvl9pPr>
-            </a:lstStyle>
-            <a:p>
-              <a:pPr eaLnBrk="1" hangingPunct="1"/>
-              <a:endParaRPr lang="pt-BR" sz="2400" b="1">
-                <a:solidFill>
-                  <a:srgbClr val="5F5F5F"/>
-                </a:solidFill>
-              </a:endParaRPr>
-            </a:p>
-          </p:txBody>
-        </p:sp>
-      </p:grpSp>
-      <p:sp>
-        <p:nvSpPr>
-          <p:cNvPr id="7" name="Rectangle 13"/>
-          <p:cNvSpPr txBox="1">
-            <a:spLocks noChangeArrowheads="1"/>
-          </p:cNvSpPr>
+          </p:cNvPr>
+          <p:cNvSpPr/>
           <p:nvPr/>
         </p:nvSpPr>
         <p:spPr>
           <a:xfrm>
-            <a:off x="866775" y="2652713"/>
-            <a:ext cx="7786688" cy="2008808"/>
+            <a:off x="0" y="1340768"/>
+            <a:ext cx="9144000" cy="5517232"/>
+          </a:xfrm>
+          <a:prstGeom prst="rect">
+            <a:avLst/>
+          </a:prstGeom>
+          <a:solidFill>
+            <a:schemeClr val="bg1"/>
+          </a:solidFill>
+          <a:ln>
+            <a:solidFill>
+              <a:schemeClr val="bg1"/>
+            </a:solidFill>
+          </a:ln>
+        </p:spPr>
+        <p:style>
+          <a:lnRef idx="2">
+            <a:schemeClr val="accent1">
+              <a:shade val="50000"/>
+            </a:schemeClr>
+          </a:lnRef>
+          <a:fillRef idx="1">
+            <a:schemeClr val="accent1"/>
+          </a:fillRef>
+          <a:effectRef idx="0">
+            <a:schemeClr val="accent1"/>
+          </a:effectRef>
+          <a:fontRef idx="minor">
+            <a:schemeClr val="lt1"/>
+          </a:fontRef>
+        </p:style>
+        <p:txBody>
+          <a:bodyPr rtlCol="0" anchor="ctr"/>
+          <a:lstStyle/>
+          <a:p>
+            <a:pPr algn="ctr"/>
+            <a:endParaRPr lang="pt-BR"/>
+          </a:p>
+        </p:txBody>
+      </p:sp>
+      <p:pic>
+        <p:nvPicPr>
+          <p:cNvPr id="3" name="Picture 2">
+            <a:extLst>
+              <a:ext uri="{FF2B5EF4-FFF2-40B4-BE49-F238E27FC236}">
+                <a16:creationId xmlns:a16="http://schemas.microsoft.com/office/drawing/2014/main" id="{F1FA4B04-B183-46B7-8891-15526F3F8963}"/>
+              </a:ext>
+            </a:extLst>
+          </p:cNvPr>
+          <p:cNvPicPr>
+            <a:picLocks noChangeAspect="1"/>
+          </p:cNvPicPr>
+          <p:nvPr/>
+        </p:nvPicPr>
+        <p:blipFill rotWithShape="1">
+          <a:blip r:embed="rId2">
+            <a:extLst>
+              <a:ext uri="{28A0092B-C50C-407E-A947-70E740481C1C}">
+                <a14:useLocalDpi xmlns:a14="http://schemas.microsoft.com/office/drawing/2010/main" val="0"/>
+              </a:ext>
+            </a:extLst>
+          </a:blip>
+          <a:srcRect t="2667"/>
+          <a:stretch/>
+        </p:blipFill>
+        <p:spPr>
+          <a:xfrm>
+            <a:off x="-20786" y="1312606"/>
+            <a:ext cx="9142462" cy="5116955"/>
           </a:xfrm>
           <a:prstGeom prst="rect">
             <a:avLst/>
           </a:prstGeom>
         </p:spPr>
-        <p:txBody>
-          <a:bodyPr/>
-          <a:lstStyle/>
-          <a:p>
-            <a:pPr marL="342900" marR="0" lvl="0" indent="-342900" algn="ctr" defTabSz="914400" rtl="0" eaLnBrk="1" fontAlgn="auto" latinLnBrk="0" hangingPunct="1">
-              <a:lnSpc>
-                <a:spcPct val="100000"/>
-              </a:lnSpc>
-              <a:spcBef>
-                <a:spcPct val="20000"/>
-              </a:spcBef>
-              <a:spcAft>
-                <a:spcPts val="0"/>
-              </a:spcAft>
-              <a:buClrTx/>
-              <a:buSzTx/>
-              <a:buFont typeface="Arial" panose="020B0604020202020204" pitchFamily="34" charset="0"/>
-              <a:buNone/>
-              <a:tabLst/>
-              <a:defRPr/>
-            </a:pPr>
-            <a:endParaRPr kumimoji="0" lang="pt-BR" sz="4000" b="0" i="0" u="none" strike="noStrike" kern="1200" cap="none" spc="0" normalizeH="0" baseline="0" noProof="0" dirty="0">
-              <a:ln>
-                <a:noFill/>
-              </a:ln>
-              <a:solidFill>
-                <a:schemeClr val="tx2">
-                  <a:lumMod val="75000"/>
-                </a:schemeClr>
-              </a:solidFill>
-              <a:effectLst/>
-              <a:uLnTx/>
-              <a:uFillTx/>
-              <a:latin typeface="Verdana" pitchFamily="34" charset="0"/>
-              <a:ea typeface="ＭＳ Ｐゴシック" pitchFamily="-106" charset="-128"/>
-              <a:cs typeface="Verdana" pitchFamily="34" charset="0"/>
-            </a:endParaRPr>
-          </a:p>
-          <a:p>
-            <a:pPr marL="342900" marR="0" lvl="0" indent="-342900" algn="ctr" defTabSz="914400" rtl="0" eaLnBrk="1" fontAlgn="auto" latinLnBrk="0" hangingPunct="1">
-              <a:lnSpc>
-                <a:spcPct val="100000"/>
-              </a:lnSpc>
-              <a:spcBef>
-                <a:spcPct val="20000"/>
-              </a:spcBef>
-              <a:spcAft>
-                <a:spcPts val="0"/>
-              </a:spcAft>
-              <a:buClrTx/>
-              <a:buSzTx/>
-              <a:buFont typeface="Arial" panose="020B0604020202020204" pitchFamily="34" charset="0"/>
-              <a:buNone/>
-              <a:tabLst/>
-              <a:defRPr/>
-            </a:pPr>
-            <a:r>
-              <a:rPr kumimoji="0" lang="pt-BR" sz="4000" b="0" i="0" u="none" strike="noStrike" kern="1200" cap="none" spc="0" normalizeH="0" baseline="0" noProof="0" dirty="0" err="1">
-                <a:ln>
-                  <a:noFill/>
-                </a:ln>
-                <a:solidFill>
-                  <a:schemeClr val="tx2">
-                    <a:lumMod val="75000"/>
-                  </a:schemeClr>
-                </a:solidFill>
-                <a:effectLst/>
-                <a:uLnTx/>
-                <a:uFillTx/>
-                <a:latin typeface="Verdana" pitchFamily="34" charset="0"/>
-                <a:ea typeface="ＭＳ Ｐゴシック" pitchFamily="-106" charset="-128"/>
-                <a:cs typeface="Verdana" pitchFamily="34" charset="0"/>
-              </a:rPr>
-              <a:t>Wender</a:t>
-            </a:r>
-            <a:r>
-              <a:rPr kumimoji="0" lang="pt-BR" sz="4000" b="0" i="0" u="none" strike="noStrike" kern="1200" cap="none" spc="0" normalizeH="0" baseline="0" noProof="0" dirty="0">
-                <a:ln>
-                  <a:noFill/>
-                </a:ln>
-                <a:solidFill>
-                  <a:schemeClr val="tx2">
-                    <a:lumMod val="75000"/>
-                  </a:schemeClr>
-                </a:solidFill>
-                <a:effectLst/>
-                <a:uLnTx/>
-                <a:uFillTx/>
-                <a:latin typeface="Verdana" pitchFamily="34" charset="0"/>
-                <a:ea typeface="ＭＳ Ｐゴシック" pitchFamily="-106" charset="-128"/>
-                <a:cs typeface="Verdana" pitchFamily="34" charset="0"/>
-              </a:rPr>
-              <a:t> Dantas</a:t>
-            </a:r>
-            <a:endParaRPr kumimoji="0" lang="pt-BR" sz="2000" b="1" i="0" u="none" strike="noStrike" kern="1200" cap="none" spc="0" normalizeH="0" baseline="0" noProof="0" dirty="0">
-              <a:ln>
-                <a:noFill/>
-              </a:ln>
-              <a:solidFill>
-                <a:srgbClr val="5F5F5F"/>
-              </a:solidFill>
-              <a:effectLst/>
-              <a:uLnTx/>
-              <a:uFillTx/>
-              <a:latin typeface="Verdana" pitchFamily="34" charset="0"/>
-              <a:ea typeface="Verdana" pitchFamily="34" charset="0"/>
-              <a:cs typeface="Verdana" pitchFamily="34" charset="0"/>
-            </a:endParaRPr>
-          </a:p>
-        </p:txBody>
-      </p:sp>
+      </p:pic>
     </p:spTree>
     <p:extLst>
       <p:ext uri="{BB962C8B-B14F-4D97-AF65-F5344CB8AC3E}">
-        <p14:creationId xmlns:p14="http://schemas.microsoft.com/office/powerpoint/2010/main" val="2461302196"/>
+        <p14:creationId xmlns:p14="http://schemas.microsoft.com/office/powerpoint/2010/main" val="398228404"/>
       </p:ext>
     </p:extLst>
   </p:cSld>
   <p:clrMapOvr>
     <a:masterClrMapping/>
   </p:clrMapOvr>
-  <p:transition spd="med">
-    <p:fade/>
-  </p:transition>
 </p:sld>
 </file>
 
@@ -5836,6 +5555,690 @@
       </p:grpSpPr>
       <p:sp>
         <p:nvSpPr>
+          <p:cNvPr id="6" name="Título 1">
+            <a:extLst>
+              <a:ext uri="{FF2B5EF4-FFF2-40B4-BE49-F238E27FC236}">
+                <a16:creationId xmlns:a16="http://schemas.microsoft.com/office/drawing/2014/main" id="{4420E5F6-C592-489E-8742-39113C67F28C}"/>
+              </a:ext>
+            </a:extLst>
+          </p:cNvPr>
+          <p:cNvSpPr>
+            <a:spLocks noGrp="1"/>
+          </p:cNvSpPr>
+          <p:nvPr>
+            <p:ph type="title"/>
+          </p:nvPr>
+        </p:nvSpPr>
+        <p:spPr>
+          <a:xfrm>
+            <a:off x="323750" y="0"/>
+            <a:ext cx="8797925" cy="922338"/>
+          </a:xfrm>
+        </p:spPr>
+        <p:txBody>
+          <a:bodyPr/>
+          <a:lstStyle/>
+          <a:p>
+            <a:r>
+              <a:rPr lang="pt-BR" dirty="0"/>
+              <a:t>MÓDULO CONTROLE </a:t>
+            </a:r>
+            <a:br>
+              <a:rPr lang="pt-BR" dirty="0"/>
+            </a:br>
+            <a:r>
+              <a:rPr lang="pt-BR" dirty="0"/>
+              <a:t>DE ACESSO</a:t>
+            </a:r>
+          </a:p>
+        </p:txBody>
+      </p:sp>
+      <p:sp>
+        <p:nvSpPr>
+          <p:cNvPr id="8" name="Rectangle 7">
+            <a:extLst>
+              <a:ext uri="{FF2B5EF4-FFF2-40B4-BE49-F238E27FC236}">
+                <a16:creationId xmlns:a16="http://schemas.microsoft.com/office/drawing/2014/main" id="{EF4C9CB5-998F-4DAB-AD54-72FA9E925DA9}"/>
+              </a:ext>
+            </a:extLst>
+          </p:cNvPr>
+          <p:cNvSpPr/>
+          <p:nvPr/>
+        </p:nvSpPr>
+        <p:spPr>
+          <a:xfrm>
+            <a:off x="0" y="1340768"/>
+            <a:ext cx="9144000" cy="5517232"/>
+          </a:xfrm>
+          <a:prstGeom prst="rect">
+            <a:avLst/>
+          </a:prstGeom>
+          <a:solidFill>
+            <a:schemeClr val="bg1"/>
+          </a:solidFill>
+          <a:ln>
+            <a:solidFill>
+              <a:schemeClr val="bg1"/>
+            </a:solidFill>
+          </a:ln>
+        </p:spPr>
+        <p:style>
+          <a:lnRef idx="2">
+            <a:schemeClr val="accent1">
+              <a:shade val="50000"/>
+            </a:schemeClr>
+          </a:lnRef>
+          <a:fillRef idx="1">
+            <a:schemeClr val="accent1"/>
+          </a:fillRef>
+          <a:effectRef idx="0">
+            <a:schemeClr val="accent1"/>
+          </a:effectRef>
+          <a:fontRef idx="minor">
+            <a:schemeClr val="lt1"/>
+          </a:fontRef>
+        </p:style>
+        <p:txBody>
+          <a:bodyPr rtlCol="0" anchor="ctr"/>
+          <a:lstStyle/>
+          <a:p>
+            <a:pPr algn="ctr"/>
+            <a:endParaRPr lang="pt-BR"/>
+          </a:p>
+        </p:txBody>
+      </p:sp>
+      <p:pic>
+        <p:nvPicPr>
+          <p:cNvPr id="4" name="Picture 3">
+            <a:extLst>
+              <a:ext uri="{FF2B5EF4-FFF2-40B4-BE49-F238E27FC236}">
+                <a16:creationId xmlns:a16="http://schemas.microsoft.com/office/drawing/2014/main" id="{9E45BBDA-7E5F-49C6-9ACE-8F5A7A5E8FAA}"/>
+              </a:ext>
+            </a:extLst>
+          </p:cNvPr>
+          <p:cNvPicPr>
+            <a:picLocks noChangeAspect="1"/>
+          </p:cNvPicPr>
+          <p:nvPr/>
+        </p:nvPicPr>
+        <p:blipFill rotWithShape="1">
+          <a:blip r:embed="rId2"/>
+          <a:srcRect l="-968" t="12350" r="968" b="154"/>
+          <a:stretch/>
+        </p:blipFill>
+        <p:spPr>
+          <a:xfrm>
+            <a:off x="-72010" y="1285618"/>
+            <a:ext cx="9324530" cy="5455750"/>
+          </a:xfrm>
+          <a:prstGeom prst="rect">
+            <a:avLst/>
+          </a:prstGeom>
+        </p:spPr>
+      </p:pic>
+    </p:spTree>
+    <p:extLst>
+      <p:ext uri="{BB962C8B-B14F-4D97-AF65-F5344CB8AC3E}">
+        <p14:creationId xmlns:p14="http://schemas.microsoft.com/office/powerpoint/2010/main" val="3663591352"/>
+      </p:ext>
+    </p:extLst>
+  </p:cSld>
+  <p:clrMapOvr>
+    <a:masterClrMapping/>
+  </p:clrMapOvr>
+</p:sld>
+</file>
+
+<file path=ppt/slides/slide21.xml><?xml version="1.0" encoding="utf-8"?>
+<p:sld xmlns:a="http://schemas.openxmlformats.org/drawingml/2006/main" xmlns:r="http://schemas.openxmlformats.org/officeDocument/2006/relationships" xmlns:p="http://schemas.openxmlformats.org/presentationml/2006/main">
+  <p:cSld>
+    <p:spTree>
+      <p:nvGrpSpPr>
+        <p:cNvPr id="1" name=""/>
+        <p:cNvGrpSpPr/>
+        <p:nvPr/>
+      </p:nvGrpSpPr>
+      <p:grpSpPr>
+        <a:xfrm>
+          <a:off x="0" y="0"/>
+          <a:ext cx="0" cy="0"/>
+          <a:chOff x="0" y="0"/>
+          <a:chExt cx="0" cy="0"/>
+        </a:xfrm>
+      </p:grpSpPr>
+      <p:sp>
+        <p:nvSpPr>
+          <p:cNvPr id="7170" name="Rectangle 2"/>
+          <p:cNvSpPr>
+            <a:spLocks noGrp="1" noChangeArrowheads="1"/>
+          </p:cNvSpPr>
+          <p:nvPr>
+            <p:ph type="ctrTitle"/>
+          </p:nvPr>
+        </p:nvSpPr>
+        <p:spPr>
+          <a:xfrm>
+            <a:off x="611560" y="1484784"/>
+            <a:ext cx="7815263" cy="2088232"/>
+          </a:xfrm>
+        </p:spPr>
+        <p:txBody>
+          <a:bodyPr/>
+          <a:lstStyle/>
+          <a:p>
+            <a:pPr eaLnBrk="1" fontAlgn="auto" hangingPunct="1">
+              <a:spcAft>
+                <a:spcPts val="0"/>
+              </a:spcAft>
+              <a:defRPr/>
+            </a:pPr>
+            <a:r>
+              <a:rPr lang="pt-BR" dirty="0">
+                <a:ea typeface="ＭＳ Ｐゴシック" pitchFamily="-106" charset="-128"/>
+              </a:rPr>
+              <a:t>MÓDULO EMPRESA</a:t>
+            </a:r>
+          </a:p>
+        </p:txBody>
+      </p:sp>
+      <p:grpSp>
+        <p:nvGrpSpPr>
+          <p:cNvPr id="2" name="Group 11"/>
+          <p:cNvGrpSpPr>
+            <a:grpSpLocks/>
+          </p:cNvGrpSpPr>
+          <p:nvPr/>
+        </p:nvGrpSpPr>
+        <p:grpSpPr bwMode="auto">
+          <a:xfrm>
+            <a:off x="755650" y="3213100"/>
+            <a:ext cx="184150" cy="711200"/>
+            <a:chOff x="476" y="2078"/>
+            <a:chExt cx="116" cy="448"/>
+          </a:xfrm>
+        </p:grpSpPr>
+        <p:sp>
+          <p:nvSpPr>
+            <p:cNvPr id="4101" name="Text Box 4"/>
+            <p:cNvSpPr txBox="1">
+              <a:spLocks noChangeArrowheads="1"/>
+            </p:cNvSpPr>
+            <p:nvPr/>
+          </p:nvSpPr>
+          <p:spPr bwMode="auto">
+            <a:xfrm>
+              <a:off x="476" y="2078"/>
+              <a:ext cx="116" cy="233"/>
+            </a:xfrm>
+            <a:prstGeom prst="rect">
+              <a:avLst/>
+            </a:prstGeom>
+            <a:noFill/>
+            <a:ln>
+              <a:noFill/>
+            </a:ln>
+            <a:extLst>
+              <a:ext uri="{909E8E84-426E-40DD-AFC4-6F175D3DCCD1}">
+                <a14:hiddenFill xmlns:a14="http://schemas.microsoft.com/office/drawing/2010/main">
+                  <a:solidFill>
+                    <a:srgbClr val="FFFFFF"/>
+                  </a:solidFill>
+                </a14:hiddenFill>
+              </a:ext>
+              <a:ext uri="{91240B29-F687-4F45-9708-019B960494DF}">
+                <a14:hiddenLine xmlns:a14="http://schemas.microsoft.com/office/drawing/2010/main" w="9525">
+                  <a:solidFill>
+                    <a:srgbClr val="000000"/>
+                  </a:solidFill>
+                  <a:miter lim="800000"/>
+                  <a:headEnd/>
+                  <a:tailEnd/>
+                </a14:hiddenLine>
+              </a:ext>
+            </a:extLst>
+          </p:spPr>
+          <p:txBody>
+            <a:bodyPr wrap="none">
+              <a:spAutoFit/>
+            </a:bodyPr>
+            <a:lstStyle>
+              <a:lvl1pPr>
+                <a:defRPr>
+                  <a:solidFill>
+                    <a:schemeClr val="tx1"/>
+                  </a:solidFill>
+                  <a:latin typeface="Arial" charset="0"/>
+                  <a:ea typeface="ＭＳ Ｐゴシック" pitchFamily="34" charset="-128"/>
+                </a:defRPr>
+              </a:lvl1pPr>
+              <a:lvl2pPr marL="742950" indent="-285750">
+                <a:defRPr>
+                  <a:solidFill>
+                    <a:schemeClr val="tx1"/>
+                  </a:solidFill>
+                  <a:latin typeface="Arial" charset="0"/>
+                  <a:ea typeface="ＭＳ Ｐゴシック" pitchFamily="34" charset="-128"/>
+                </a:defRPr>
+              </a:lvl2pPr>
+              <a:lvl3pPr marL="1143000" indent="-228600">
+                <a:defRPr>
+                  <a:solidFill>
+                    <a:schemeClr val="tx1"/>
+                  </a:solidFill>
+                  <a:latin typeface="Arial" charset="0"/>
+                  <a:ea typeface="ＭＳ Ｐゴシック" pitchFamily="34" charset="-128"/>
+                </a:defRPr>
+              </a:lvl3pPr>
+              <a:lvl4pPr marL="1600200" indent="-228600">
+                <a:defRPr>
+                  <a:solidFill>
+                    <a:schemeClr val="tx1"/>
+                  </a:solidFill>
+                  <a:latin typeface="Arial" charset="0"/>
+                  <a:ea typeface="ＭＳ Ｐゴシック" pitchFamily="34" charset="-128"/>
+                </a:defRPr>
+              </a:lvl4pPr>
+              <a:lvl5pPr marL="2057400" indent="-228600">
+                <a:defRPr>
+                  <a:solidFill>
+                    <a:schemeClr val="tx1"/>
+                  </a:solidFill>
+                  <a:latin typeface="Arial" charset="0"/>
+                  <a:ea typeface="ＭＳ Ｐゴシック" pitchFamily="34" charset="-128"/>
+                </a:defRPr>
+              </a:lvl5pPr>
+              <a:lvl6pPr marL="2514600" indent="-228600" eaLnBrk="0" fontAlgn="base" hangingPunct="0">
+                <a:spcBef>
+                  <a:spcPct val="0"/>
+                </a:spcBef>
+                <a:spcAft>
+                  <a:spcPct val="0"/>
+                </a:spcAft>
+                <a:defRPr>
+                  <a:solidFill>
+                    <a:schemeClr val="tx1"/>
+                  </a:solidFill>
+                  <a:latin typeface="Arial" charset="0"/>
+                  <a:ea typeface="ＭＳ Ｐゴシック" pitchFamily="34" charset="-128"/>
+                </a:defRPr>
+              </a:lvl6pPr>
+              <a:lvl7pPr marL="2971800" indent="-228600" eaLnBrk="0" fontAlgn="base" hangingPunct="0">
+                <a:spcBef>
+                  <a:spcPct val="0"/>
+                </a:spcBef>
+                <a:spcAft>
+                  <a:spcPct val="0"/>
+                </a:spcAft>
+                <a:defRPr>
+                  <a:solidFill>
+                    <a:schemeClr val="tx1"/>
+                  </a:solidFill>
+                  <a:latin typeface="Arial" charset="0"/>
+                  <a:ea typeface="ＭＳ Ｐゴシック" pitchFamily="34" charset="-128"/>
+                </a:defRPr>
+              </a:lvl7pPr>
+              <a:lvl8pPr marL="3429000" indent="-228600" eaLnBrk="0" fontAlgn="base" hangingPunct="0">
+                <a:spcBef>
+                  <a:spcPct val="0"/>
+                </a:spcBef>
+                <a:spcAft>
+                  <a:spcPct val="0"/>
+                </a:spcAft>
+                <a:defRPr>
+                  <a:solidFill>
+                    <a:schemeClr val="tx1"/>
+                  </a:solidFill>
+                  <a:latin typeface="Arial" charset="0"/>
+                  <a:ea typeface="ＭＳ Ｐゴシック" pitchFamily="34" charset="-128"/>
+                </a:defRPr>
+              </a:lvl8pPr>
+              <a:lvl9pPr marL="3886200" indent="-228600" eaLnBrk="0" fontAlgn="base" hangingPunct="0">
+                <a:spcBef>
+                  <a:spcPct val="0"/>
+                </a:spcBef>
+                <a:spcAft>
+                  <a:spcPct val="0"/>
+                </a:spcAft>
+                <a:defRPr>
+                  <a:solidFill>
+                    <a:schemeClr val="tx1"/>
+                  </a:solidFill>
+                  <a:latin typeface="Arial" charset="0"/>
+                  <a:ea typeface="ＭＳ Ｐゴシック" pitchFamily="34" charset="-128"/>
+                </a:defRPr>
+              </a:lvl9pPr>
+            </a:lstStyle>
+            <a:p>
+              <a:pPr eaLnBrk="1" hangingPunct="1"/>
+              <a:endParaRPr lang="en-US"/>
+            </a:p>
+          </p:txBody>
+        </p:sp>
+        <p:sp>
+          <p:nvSpPr>
+            <p:cNvPr id="4102" name="Text Box 5"/>
+            <p:cNvSpPr txBox="1">
+              <a:spLocks noChangeArrowheads="1"/>
+            </p:cNvSpPr>
+            <p:nvPr/>
+          </p:nvSpPr>
+          <p:spPr bwMode="auto">
+            <a:xfrm>
+              <a:off x="476" y="2235"/>
+              <a:ext cx="116" cy="291"/>
+            </a:xfrm>
+            <a:prstGeom prst="rect">
+              <a:avLst/>
+            </a:prstGeom>
+            <a:noFill/>
+            <a:ln>
+              <a:noFill/>
+            </a:ln>
+            <a:extLst>
+              <a:ext uri="{909E8E84-426E-40DD-AFC4-6F175D3DCCD1}">
+                <a14:hiddenFill xmlns:a14="http://schemas.microsoft.com/office/drawing/2010/main">
+                  <a:solidFill>
+                    <a:srgbClr val="FFFFFF"/>
+                  </a:solidFill>
+                </a14:hiddenFill>
+              </a:ext>
+              <a:ext uri="{91240B29-F687-4F45-9708-019B960494DF}">
+                <a14:hiddenLine xmlns:a14="http://schemas.microsoft.com/office/drawing/2010/main" w="9525">
+                  <a:solidFill>
+                    <a:srgbClr val="000000"/>
+                  </a:solidFill>
+                  <a:miter lim="800000"/>
+                  <a:headEnd/>
+                  <a:tailEnd/>
+                </a14:hiddenLine>
+              </a:ext>
+            </a:extLst>
+          </p:spPr>
+          <p:txBody>
+            <a:bodyPr wrap="none">
+              <a:spAutoFit/>
+            </a:bodyPr>
+            <a:lstStyle>
+              <a:lvl1pPr>
+                <a:defRPr>
+                  <a:solidFill>
+                    <a:schemeClr val="tx1"/>
+                  </a:solidFill>
+                  <a:latin typeface="Arial" charset="0"/>
+                  <a:ea typeface="ＭＳ Ｐゴシック" pitchFamily="34" charset="-128"/>
+                </a:defRPr>
+              </a:lvl1pPr>
+              <a:lvl2pPr marL="742950" indent="-285750">
+                <a:defRPr>
+                  <a:solidFill>
+                    <a:schemeClr val="tx1"/>
+                  </a:solidFill>
+                  <a:latin typeface="Arial" charset="0"/>
+                  <a:ea typeface="ＭＳ Ｐゴシック" pitchFamily="34" charset="-128"/>
+                </a:defRPr>
+              </a:lvl2pPr>
+              <a:lvl3pPr marL="1143000" indent="-228600">
+                <a:defRPr>
+                  <a:solidFill>
+                    <a:schemeClr val="tx1"/>
+                  </a:solidFill>
+                  <a:latin typeface="Arial" charset="0"/>
+                  <a:ea typeface="ＭＳ Ｐゴシック" pitchFamily="34" charset="-128"/>
+                </a:defRPr>
+              </a:lvl3pPr>
+              <a:lvl4pPr marL="1600200" indent="-228600">
+                <a:defRPr>
+                  <a:solidFill>
+                    <a:schemeClr val="tx1"/>
+                  </a:solidFill>
+                  <a:latin typeface="Arial" charset="0"/>
+                  <a:ea typeface="ＭＳ Ｐゴシック" pitchFamily="34" charset="-128"/>
+                </a:defRPr>
+              </a:lvl4pPr>
+              <a:lvl5pPr marL="2057400" indent="-228600">
+                <a:defRPr>
+                  <a:solidFill>
+                    <a:schemeClr val="tx1"/>
+                  </a:solidFill>
+                  <a:latin typeface="Arial" charset="0"/>
+                  <a:ea typeface="ＭＳ Ｐゴシック" pitchFamily="34" charset="-128"/>
+                </a:defRPr>
+              </a:lvl5pPr>
+              <a:lvl6pPr marL="2514600" indent="-228600" eaLnBrk="0" fontAlgn="base" hangingPunct="0">
+                <a:spcBef>
+                  <a:spcPct val="0"/>
+                </a:spcBef>
+                <a:spcAft>
+                  <a:spcPct val="0"/>
+                </a:spcAft>
+                <a:defRPr>
+                  <a:solidFill>
+                    <a:schemeClr val="tx1"/>
+                  </a:solidFill>
+                  <a:latin typeface="Arial" charset="0"/>
+                  <a:ea typeface="ＭＳ Ｐゴシック" pitchFamily="34" charset="-128"/>
+                </a:defRPr>
+              </a:lvl6pPr>
+              <a:lvl7pPr marL="2971800" indent="-228600" eaLnBrk="0" fontAlgn="base" hangingPunct="0">
+                <a:spcBef>
+                  <a:spcPct val="0"/>
+                </a:spcBef>
+                <a:spcAft>
+                  <a:spcPct val="0"/>
+                </a:spcAft>
+                <a:defRPr>
+                  <a:solidFill>
+                    <a:schemeClr val="tx1"/>
+                  </a:solidFill>
+                  <a:latin typeface="Arial" charset="0"/>
+                  <a:ea typeface="ＭＳ Ｐゴシック" pitchFamily="34" charset="-128"/>
+                </a:defRPr>
+              </a:lvl7pPr>
+              <a:lvl8pPr marL="3429000" indent="-228600" eaLnBrk="0" fontAlgn="base" hangingPunct="0">
+                <a:spcBef>
+                  <a:spcPct val="0"/>
+                </a:spcBef>
+                <a:spcAft>
+                  <a:spcPct val="0"/>
+                </a:spcAft>
+                <a:defRPr>
+                  <a:solidFill>
+                    <a:schemeClr val="tx1"/>
+                  </a:solidFill>
+                  <a:latin typeface="Arial" charset="0"/>
+                  <a:ea typeface="ＭＳ Ｐゴシック" pitchFamily="34" charset="-128"/>
+                </a:defRPr>
+              </a:lvl8pPr>
+              <a:lvl9pPr marL="3886200" indent="-228600" eaLnBrk="0" fontAlgn="base" hangingPunct="0">
+                <a:spcBef>
+                  <a:spcPct val="0"/>
+                </a:spcBef>
+                <a:spcAft>
+                  <a:spcPct val="0"/>
+                </a:spcAft>
+                <a:defRPr>
+                  <a:solidFill>
+                    <a:schemeClr val="tx1"/>
+                  </a:solidFill>
+                  <a:latin typeface="Arial" charset="0"/>
+                  <a:ea typeface="ＭＳ Ｐゴシック" pitchFamily="34" charset="-128"/>
+                </a:defRPr>
+              </a:lvl9pPr>
+            </a:lstStyle>
+            <a:p>
+              <a:pPr eaLnBrk="1" hangingPunct="1"/>
+              <a:endParaRPr lang="pt-BR" sz="2400" b="1">
+                <a:solidFill>
+                  <a:srgbClr val="5F5F5F"/>
+                </a:solidFill>
+              </a:endParaRPr>
+            </a:p>
+          </p:txBody>
+        </p:sp>
+      </p:grpSp>
+      <p:sp>
+        <p:nvSpPr>
+          <p:cNvPr id="7" name="Rectangle 13"/>
+          <p:cNvSpPr txBox="1">
+            <a:spLocks noChangeArrowheads="1"/>
+          </p:cNvSpPr>
+          <p:nvPr/>
+        </p:nvSpPr>
+        <p:spPr>
+          <a:xfrm>
+            <a:off x="866775" y="2652713"/>
+            <a:ext cx="7786688" cy="2008808"/>
+          </a:xfrm>
+          <a:prstGeom prst="rect">
+            <a:avLst/>
+          </a:prstGeom>
+        </p:spPr>
+        <p:txBody>
+          <a:bodyPr/>
+          <a:lstStyle/>
+          <a:p>
+            <a:pPr marL="342900" marR="0" lvl="0" indent="-342900" algn="ctr" defTabSz="914400" rtl="0" eaLnBrk="1" fontAlgn="auto" latinLnBrk="0" hangingPunct="1">
+              <a:lnSpc>
+                <a:spcPct val="100000"/>
+              </a:lnSpc>
+              <a:spcBef>
+                <a:spcPct val="20000"/>
+              </a:spcBef>
+              <a:spcAft>
+                <a:spcPts val="0"/>
+              </a:spcAft>
+              <a:buClrTx/>
+              <a:buSzTx/>
+              <a:buFont typeface="Arial" panose="020B0604020202020204" pitchFamily="34" charset="0"/>
+              <a:buNone/>
+              <a:tabLst/>
+              <a:defRPr/>
+            </a:pPr>
+            <a:endParaRPr kumimoji="0" lang="pt-BR" sz="4000" b="0" i="0" u="none" strike="noStrike" kern="1200" cap="none" spc="0" normalizeH="0" baseline="0" noProof="0" dirty="0">
+              <a:ln>
+                <a:noFill/>
+              </a:ln>
+              <a:solidFill>
+                <a:schemeClr val="tx2">
+                  <a:lumMod val="75000"/>
+                </a:schemeClr>
+              </a:solidFill>
+              <a:effectLst/>
+              <a:uLnTx/>
+              <a:uFillTx/>
+              <a:latin typeface="Verdana" pitchFamily="34" charset="0"/>
+              <a:ea typeface="ＭＳ Ｐゴシック" pitchFamily="-106" charset="-128"/>
+              <a:cs typeface="Verdana" pitchFamily="34" charset="0"/>
+            </a:endParaRPr>
+          </a:p>
+          <a:p>
+            <a:pPr marL="342900" marR="0" lvl="0" indent="-342900" algn="ctr" defTabSz="914400" rtl="0" eaLnBrk="1" fontAlgn="auto" latinLnBrk="0" hangingPunct="1">
+              <a:lnSpc>
+                <a:spcPct val="100000"/>
+              </a:lnSpc>
+              <a:spcBef>
+                <a:spcPct val="20000"/>
+              </a:spcBef>
+              <a:spcAft>
+                <a:spcPts val="0"/>
+              </a:spcAft>
+              <a:buClrTx/>
+              <a:buSzTx/>
+              <a:buFont typeface="Arial" panose="020B0604020202020204" pitchFamily="34" charset="0"/>
+              <a:buNone/>
+              <a:tabLst/>
+              <a:defRPr/>
+            </a:pPr>
+            <a:r>
+              <a:rPr kumimoji="0" lang="pt-BR" sz="4000" b="0" i="0" u="none" strike="noStrike" kern="1200" cap="none" spc="0" normalizeH="0" baseline="0" noProof="0" dirty="0" err="1">
+                <a:ln>
+                  <a:noFill/>
+                </a:ln>
+                <a:solidFill>
+                  <a:schemeClr val="tx2">
+                    <a:lumMod val="75000"/>
+                  </a:schemeClr>
+                </a:solidFill>
+                <a:effectLst/>
+                <a:uLnTx/>
+                <a:uFillTx/>
+                <a:latin typeface="Verdana" pitchFamily="34" charset="0"/>
+                <a:ea typeface="ＭＳ Ｐゴシック" pitchFamily="-106" charset="-128"/>
+                <a:cs typeface="Verdana" pitchFamily="34" charset="0"/>
+              </a:rPr>
+              <a:t>Wender</a:t>
+            </a:r>
+            <a:r>
+              <a:rPr kumimoji="0" lang="pt-BR" sz="4000" b="0" i="0" u="none" strike="noStrike" kern="1200" cap="none" spc="0" normalizeH="0" baseline="0" noProof="0" dirty="0">
+                <a:ln>
+                  <a:noFill/>
+                </a:ln>
+                <a:solidFill>
+                  <a:schemeClr val="tx2">
+                    <a:lumMod val="75000"/>
+                  </a:schemeClr>
+                </a:solidFill>
+                <a:effectLst/>
+                <a:uLnTx/>
+                <a:uFillTx/>
+                <a:latin typeface="Verdana" pitchFamily="34" charset="0"/>
+                <a:ea typeface="ＭＳ Ｐゴシック" pitchFamily="-106" charset="-128"/>
+                <a:cs typeface="Verdana" pitchFamily="34" charset="0"/>
+              </a:rPr>
+              <a:t> Dantas</a:t>
+            </a:r>
+            <a:endParaRPr kumimoji="0" lang="pt-BR" sz="2000" b="1" i="0" u="none" strike="noStrike" kern="1200" cap="none" spc="0" normalizeH="0" baseline="0" noProof="0" dirty="0">
+              <a:ln>
+                <a:noFill/>
+              </a:ln>
+              <a:solidFill>
+                <a:srgbClr val="5F5F5F"/>
+              </a:solidFill>
+              <a:effectLst/>
+              <a:uLnTx/>
+              <a:uFillTx/>
+              <a:latin typeface="Verdana" pitchFamily="34" charset="0"/>
+              <a:ea typeface="Verdana" pitchFamily="34" charset="0"/>
+              <a:cs typeface="Verdana" pitchFamily="34" charset="0"/>
+            </a:endParaRPr>
+          </a:p>
+        </p:txBody>
+      </p:sp>
+    </p:spTree>
+    <p:extLst>
+      <p:ext uri="{BB962C8B-B14F-4D97-AF65-F5344CB8AC3E}">
+        <p14:creationId xmlns:p14="http://schemas.microsoft.com/office/powerpoint/2010/main" val="2461302196"/>
+      </p:ext>
+    </p:extLst>
+  </p:cSld>
+  <p:clrMapOvr>
+    <a:masterClrMapping/>
+  </p:clrMapOvr>
+  <p:transition spd="med">
+    <p:fade/>
+  </p:transition>
+</p:sld>
+</file>
+
+<file path=ppt/slides/slide22.xml><?xml version="1.0" encoding="utf-8"?>
+<p:sld xmlns:a="http://schemas.openxmlformats.org/drawingml/2006/main" xmlns:r="http://schemas.openxmlformats.org/officeDocument/2006/relationships" xmlns:p="http://schemas.openxmlformats.org/presentationml/2006/main">
+  <p:cSld>
+    <p:spTree>
+      <p:nvGrpSpPr>
+        <p:cNvPr id="1" name=""/>
+        <p:cNvGrpSpPr/>
+        <p:nvPr/>
+      </p:nvGrpSpPr>
+      <p:grpSpPr>
+        <a:xfrm>
+          <a:off x="0" y="0"/>
+          <a:ext cx="0" cy="0"/>
+          <a:chOff x="0" y="0"/>
+          <a:chExt cx="0" cy="0"/>
+        </a:xfrm>
+      </p:grpSpPr>
+      <p:sp>
+        <p:nvSpPr>
           <p:cNvPr id="4" name="Título 3"/>
           <p:cNvSpPr>
             <a:spLocks noGrp="1"/>
@@ -6063,7 +6466,7 @@
 </p:sld>
 </file>
 
-<file path=ppt/slides/slide21.xml><?xml version="1.0" encoding="utf-8"?>
+<file path=ppt/slides/slide23.xml><?xml version="1.0" encoding="utf-8"?>
 <p:sld xmlns:a="http://schemas.openxmlformats.org/drawingml/2006/main" xmlns:r="http://schemas.openxmlformats.org/officeDocument/2006/relationships" xmlns:p="http://schemas.openxmlformats.org/presentationml/2006/main">
   <p:cSld>
     <p:spTree>
@@ -6145,296 +6548,6 @@
 </p:sld>
 </file>
 
-<file path=ppt/slides/slide22.xml><?xml version="1.0" encoding="utf-8"?>
-<p:sld xmlns:a="http://schemas.openxmlformats.org/drawingml/2006/main" xmlns:r="http://schemas.openxmlformats.org/officeDocument/2006/relationships" xmlns:p="http://schemas.openxmlformats.org/presentationml/2006/main">
-  <p:cSld>
-    <p:spTree>
-      <p:nvGrpSpPr>
-        <p:cNvPr id="1" name=""/>
-        <p:cNvGrpSpPr/>
-        <p:nvPr/>
-      </p:nvGrpSpPr>
-      <p:grpSpPr>
-        <a:xfrm>
-          <a:off x="0" y="0"/>
-          <a:ext cx="0" cy="0"/>
-          <a:chOff x="0" y="0"/>
-          <a:chExt cx="0" cy="0"/>
-        </a:xfrm>
-      </p:grpSpPr>
-      <p:sp>
-        <p:nvSpPr>
-          <p:cNvPr id="4" name="Título 3"/>
-          <p:cNvSpPr>
-            <a:spLocks noGrp="1"/>
-          </p:cNvSpPr>
-          <p:nvPr>
-            <p:ph type="title"/>
-          </p:nvPr>
-        </p:nvSpPr>
-        <p:spPr/>
-        <p:txBody>
-          <a:bodyPr/>
-          <a:lstStyle/>
-          <a:p>
-            <a:pPr eaLnBrk="1" hangingPunct="1">
-              <a:defRPr/>
-            </a:pPr>
-            <a:r>
-              <a:rPr lang="pt-BR" dirty="0"/>
-              <a:t>MÓDULO EMPRESA</a:t>
-            </a:r>
-          </a:p>
-        </p:txBody>
-      </p:sp>
-      <p:sp>
-        <p:nvSpPr>
-          <p:cNvPr id="21507" name="Espaço Reservado para Conteúdo 4"/>
-          <p:cNvSpPr>
-            <a:spLocks noGrp="1"/>
-          </p:cNvSpPr>
-          <p:nvPr>
-            <p:ph idx="1"/>
-          </p:nvPr>
-        </p:nvSpPr>
-        <p:spPr bwMode="auto">
-          <a:xfrm>
-            <a:off x="179512" y="1340768"/>
-            <a:ext cx="8785225" cy="5328592"/>
-          </a:xfrm>
-          <a:extLst>
-            <a:ext uri="{909E8E84-426E-40DD-AFC4-6F175D3DCCD1}">
-              <a14:hiddenFill xmlns:a14="http://schemas.microsoft.com/office/drawing/2010/main">
-                <a:solidFill>
-                  <a:srgbClr val="FFFFFF"/>
-                </a:solidFill>
-              </a14:hiddenFill>
-            </a:ext>
-            <a:ext uri="{91240B29-F687-4F45-9708-019B960494DF}">
-              <a14:hiddenLine xmlns:a14="http://schemas.microsoft.com/office/drawing/2010/main" w="9525">
-                <a:solidFill>
-                  <a:srgbClr val="000000"/>
-                </a:solidFill>
-                <a:miter lim="800000"/>
-                <a:headEnd/>
-                <a:tailEnd/>
-              </a14:hiddenLine>
-            </a:ext>
-          </a:extLst>
-        </p:spPr>
-        <p:txBody>
-          <a:bodyPr vert="horz" wrap="square" lIns="91440" tIns="45720" rIns="91440" bIns="45720" numCol="1" anchor="t" anchorCtr="0" compatLnSpc="1">
-            <a:prstTxWarp prst="textNoShape">
-              <a:avLst/>
-            </a:prstTxWarp>
-          </a:bodyPr>
-          <a:lstStyle/>
-          <a:p>
-            <a:pPr marL="0" indent="0" algn="ctr" eaLnBrk="1" hangingPunct="1">
-              <a:buFont typeface="Arial" panose="020B0604020202020204" pitchFamily="34" charset="0"/>
-              <a:buNone/>
-              <a:defRPr/>
-            </a:pPr>
-            <a:endParaRPr lang="pt-BR" sz="2000" dirty="0"/>
-          </a:p>
-          <a:p>
-            <a:pPr algn="just" eaLnBrk="1" hangingPunct="1">
-              <a:buFont typeface="Arial" panose="020B0604020202020204" pitchFamily="34" charset="0"/>
-              <a:buChar char="•"/>
-              <a:defRPr/>
-            </a:pPr>
-            <a:endParaRPr lang="pt-BR" sz="2000" dirty="0"/>
-          </a:p>
-        </p:txBody>
-      </p:sp>
-      <p:pic>
-        <p:nvPicPr>
-          <p:cNvPr id="3" name="Picture 2">
-            <a:extLst>
-              <a:ext uri="{FF2B5EF4-FFF2-40B4-BE49-F238E27FC236}">
-                <a16:creationId xmlns:a16="http://schemas.microsoft.com/office/drawing/2014/main" id="{2B1A4BC2-7DE1-4299-98E4-7ED739A14DCC}"/>
-              </a:ext>
-            </a:extLst>
-          </p:cNvPr>
-          <p:cNvPicPr>
-            <a:picLocks noChangeAspect="1"/>
-          </p:cNvPicPr>
-          <p:nvPr/>
-        </p:nvPicPr>
-        <p:blipFill>
-          <a:blip r:embed="rId2"/>
-          <a:stretch>
-            <a:fillRect/>
-          </a:stretch>
-        </p:blipFill>
-        <p:spPr>
-          <a:xfrm>
-            <a:off x="0" y="1772816"/>
-            <a:ext cx="9146478" cy="4104456"/>
-          </a:xfrm>
-          <a:prstGeom prst="rect">
-            <a:avLst/>
-          </a:prstGeom>
-        </p:spPr>
-      </p:pic>
-    </p:spTree>
-    <p:extLst>
-      <p:ext uri="{BB962C8B-B14F-4D97-AF65-F5344CB8AC3E}">
-        <p14:creationId xmlns:p14="http://schemas.microsoft.com/office/powerpoint/2010/main" val="4234705847"/>
-      </p:ext>
-    </p:extLst>
-  </p:cSld>
-  <p:clrMapOvr>
-    <a:masterClrMapping/>
-  </p:clrMapOvr>
-  <p:transition spd="med">
-    <p:fade/>
-  </p:transition>
-</p:sld>
-</file>
-
-<file path=ppt/slides/slide23.xml><?xml version="1.0" encoding="utf-8"?>
-<p:sld xmlns:a="http://schemas.openxmlformats.org/drawingml/2006/main" xmlns:r="http://schemas.openxmlformats.org/officeDocument/2006/relationships" xmlns:p="http://schemas.openxmlformats.org/presentationml/2006/main">
-  <p:cSld>
-    <p:spTree>
-      <p:nvGrpSpPr>
-        <p:cNvPr id="1" name=""/>
-        <p:cNvGrpSpPr/>
-        <p:nvPr/>
-      </p:nvGrpSpPr>
-      <p:grpSpPr>
-        <a:xfrm>
-          <a:off x="0" y="0"/>
-          <a:ext cx="0" cy="0"/>
-          <a:chOff x="0" y="0"/>
-          <a:chExt cx="0" cy="0"/>
-        </a:xfrm>
-      </p:grpSpPr>
-      <p:sp>
-        <p:nvSpPr>
-          <p:cNvPr id="4" name="Título 3"/>
-          <p:cNvSpPr>
-            <a:spLocks noGrp="1"/>
-          </p:cNvSpPr>
-          <p:nvPr>
-            <p:ph type="title"/>
-          </p:nvPr>
-        </p:nvSpPr>
-        <p:spPr/>
-        <p:txBody>
-          <a:bodyPr/>
-          <a:lstStyle/>
-          <a:p>
-            <a:pPr eaLnBrk="1" hangingPunct="1">
-              <a:defRPr/>
-            </a:pPr>
-            <a:r>
-              <a:rPr lang="pt-BR" dirty="0"/>
-              <a:t>MÓDULO EMPRESA</a:t>
-            </a:r>
-          </a:p>
-        </p:txBody>
-      </p:sp>
-      <p:sp>
-        <p:nvSpPr>
-          <p:cNvPr id="21507" name="Espaço Reservado para Conteúdo 4"/>
-          <p:cNvSpPr>
-            <a:spLocks noGrp="1"/>
-          </p:cNvSpPr>
-          <p:nvPr>
-            <p:ph idx="1"/>
-          </p:nvPr>
-        </p:nvSpPr>
-        <p:spPr bwMode="auto">
-          <a:xfrm>
-            <a:off x="179512" y="1340768"/>
-            <a:ext cx="8785225" cy="5328592"/>
-          </a:xfrm>
-          <a:extLst>
-            <a:ext uri="{909E8E84-426E-40DD-AFC4-6F175D3DCCD1}">
-              <a14:hiddenFill xmlns:a14="http://schemas.microsoft.com/office/drawing/2010/main">
-                <a:solidFill>
-                  <a:srgbClr val="FFFFFF"/>
-                </a:solidFill>
-              </a14:hiddenFill>
-            </a:ext>
-            <a:ext uri="{91240B29-F687-4F45-9708-019B960494DF}">
-              <a14:hiddenLine xmlns:a14="http://schemas.microsoft.com/office/drawing/2010/main" w="9525">
-                <a:solidFill>
-                  <a:srgbClr val="000000"/>
-                </a:solidFill>
-                <a:miter lim="800000"/>
-                <a:headEnd/>
-                <a:tailEnd/>
-              </a14:hiddenLine>
-            </a:ext>
-          </a:extLst>
-        </p:spPr>
-        <p:txBody>
-          <a:bodyPr vert="horz" wrap="square" lIns="91440" tIns="45720" rIns="91440" bIns="45720" numCol="1" anchor="t" anchorCtr="0" compatLnSpc="1">
-            <a:prstTxWarp prst="textNoShape">
-              <a:avLst/>
-            </a:prstTxWarp>
-          </a:bodyPr>
-          <a:lstStyle/>
-          <a:p>
-            <a:pPr marL="0" indent="0" algn="ctr" eaLnBrk="1" hangingPunct="1">
-              <a:buFont typeface="Arial" panose="020B0604020202020204" pitchFamily="34" charset="0"/>
-              <a:buNone/>
-              <a:defRPr/>
-            </a:pPr>
-            <a:endParaRPr lang="pt-BR" sz="2000" dirty="0"/>
-          </a:p>
-          <a:p>
-            <a:pPr algn="just" eaLnBrk="1" hangingPunct="1">
-              <a:buFont typeface="Arial" panose="020B0604020202020204" pitchFamily="34" charset="0"/>
-              <a:buChar char="•"/>
-              <a:defRPr/>
-            </a:pPr>
-            <a:endParaRPr lang="pt-BR" sz="2000" dirty="0"/>
-          </a:p>
-        </p:txBody>
-      </p:sp>
-      <p:pic>
-        <p:nvPicPr>
-          <p:cNvPr id="5" name="Imagem 4"/>
-          <p:cNvPicPr>
-            <a:picLocks noChangeAspect="1"/>
-          </p:cNvPicPr>
-          <p:nvPr/>
-        </p:nvPicPr>
-        <p:blipFill>
-          <a:blip r:embed="rId2"/>
-          <a:stretch>
-            <a:fillRect/>
-          </a:stretch>
-        </p:blipFill>
-        <p:spPr>
-          <a:xfrm>
-            <a:off x="23961" y="1320155"/>
-            <a:ext cx="9080331" cy="5184576"/>
-          </a:xfrm>
-          <a:prstGeom prst="rect">
-            <a:avLst/>
-          </a:prstGeom>
-        </p:spPr>
-      </p:pic>
-    </p:spTree>
-    <p:extLst>
-      <p:ext uri="{BB962C8B-B14F-4D97-AF65-F5344CB8AC3E}">
-        <p14:creationId xmlns:p14="http://schemas.microsoft.com/office/powerpoint/2010/main" val="3523015254"/>
-      </p:ext>
-    </p:extLst>
-  </p:cSld>
-  <p:clrMapOvr>
-    <a:masterClrMapping/>
-  </p:clrMapOvr>
-  <p:transition spd="med">
-    <p:fade/>
-  </p:transition>
-</p:sld>
-</file>
-
 <file path=ppt/slides/slide24.xml><?xml version="1.0" encoding="utf-8"?>
 <p:sld xmlns:a="http://schemas.openxmlformats.org/drawingml/2006/main" xmlns:r="http://schemas.openxmlformats.org/officeDocument/2006/relationships" xmlns:p="http://schemas.openxmlformats.org/presentationml/2006/main">
   <p:cSld>
@@ -6539,22 +6652,27 @@
       </p:sp>
       <p:pic>
         <p:nvPicPr>
-          <p:cNvPr id="5" name="Imagem 4"/>
+          <p:cNvPr id="2" name="Picture 1">
+            <a:extLst>
+              <a:ext uri="{FF2B5EF4-FFF2-40B4-BE49-F238E27FC236}">
+                <a16:creationId xmlns:a16="http://schemas.microsoft.com/office/drawing/2014/main" id="{F5A00150-EB0A-4F28-911C-141811EBFBD4}"/>
+              </a:ext>
+            </a:extLst>
+          </p:cNvPr>
           <p:cNvPicPr>
             <a:picLocks noChangeAspect="1"/>
           </p:cNvPicPr>
           <p:nvPr/>
         </p:nvPicPr>
-        <p:blipFill>
+        <p:blipFill rotWithShape="1">
           <a:blip r:embed="rId2"/>
-          <a:stretch>
-            <a:fillRect/>
-          </a:stretch>
+          <a:srcRect b="5494"/>
+          <a:stretch/>
         </p:blipFill>
         <p:spPr>
           <a:xfrm>
-            <a:off x="35496" y="1310059"/>
-            <a:ext cx="9079200" cy="5215285"/>
+            <a:off x="-6350" y="1820855"/>
+            <a:ext cx="9144000" cy="4128425"/>
           </a:xfrm>
           <a:prstGeom prst="rect">
             <a:avLst/>
@@ -6564,7 +6682,7 @@
     </p:spTree>
     <p:extLst>
       <p:ext uri="{BB962C8B-B14F-4D97-AF65-F5344CB8AC3E}">
-        <p14:creationId xmlns:p14="http://schemas.microsoft.com/office/powerpoint/2010/main" val="3817239344"/>
+        <p14:creationId xmlns:p14="http://schemas.microsoft.com/office/powerpoint/2010/main" val="4234705847"/>
       </p:ext>
     </p:extLst>
   </p:cSld>
@@ -6681,28 +6799,28 @@
       </p:sp>
       <p:pic>
         <p:nvPicPr>
-          <p:cNvPr id="3" name="Imagem 2"/>
+          <p:cNvPr id="3" name="Picture 2">
+            <a:extLst>
+              <a:ext uri="{FF2B5EF4-FFF2-40B4-BE49-F238E27FC236}">
+                <a16:creationId xmlns:a16="http://schemas.microsoft.com/office/drawing/2014/main" id="{2B1A4BC2-7DE1-4299-98E4-7ED739A14DCC}"/>
+              </a:ext>
+            </a:extLst>
+          </p:cNvPr>
           <p:cNvPicPr>
             <a:picLocks noChangeAspect="1"/>
           </p:cNvPicPr>
           <p:nvPr/>
         </p:nvPicPr>
         <p:blipFill>
-          <a:blip r:embed="rId2">
-            <a:extLst>
-              <a:ext uri="{28A0092B-C50C-407E-A947-70E740481C1C}">
-                <a14:useLocalDpi xmlns:a14="http://schemas.microsoft.com/office/drawing/2010/main" val="0"/>
-              </a:ext>
-            </a:extLst>
-          </a:blip>
+          <a:blip r:embed="rId2"/>
           <a:stretch>
             <a:fillRect/>
           </a:stretch>
         </p:blipFill>
         <p:spPr>
           <a:xfrm>
-            <a:off x="0" y="1484784"/>
-            <a:ext cx="9144000" cy="4392488"/>
+            <a:off x="0" y="1772816"/>
+            <a:ext cx="9146478" cy="4104456"/>
           </a:xfrm>
           <a:prstGeom prst="rect">
             <a:avLst/>
@@ -6712,7 +6830,7 @@
     </p:spTree>
     <p:extLst>
       <p:ext uri="{BB962C8B-B14F-4D97-AF65-F5344CB8AC3E}">
-        <p14:creationId xmlns:p14="http://schemas.microsoft.com/office/powerpoint/2010/main" val="1220430636"/>
+        <p14:creationId xmlns:p14="http://schemas.microsoft.com/office/powerpoint/2010/main" val="324456396"/>
       </p:ext>
     </p:extLst>
   </p:cSld>
@@ -6829,28 +6947,22 @@
       </p:sp>
       <p:pic>
         <p:nvPicPr>
-          <p:cNvPr id="2" name="Imagem 1"/>
+          <p:cNvPr id="5" name="Imagem 4"/>
           <p:cNvPicPr>
             <a:picLocks noChangeAspect="1"/>
           </p:cNvPicPr>
           <p:nvPr/>
         </p:nvPicPr>
         <p:blipFill>
-          <a:blip r:embed="rId2">
-            <a:extLst>
-              <a:ext uri="{28A0092B-C50C-407E-A947-70E740481C1C}">
-                <a14:useLocalDpi xmlns:a14="http://schemas.microsoft.com/office/drawing/2010/main" val="0"/>
-              </a:ext>
-            </a:extLst>
-          </a:blip>
+          <a:blip r:embed="rId2"/>
           <a:stretch>
             <a:fillRect/>
           </a:stretch>
         </p:blipFill>
         <p:spPr>
           <a:xfrm>
-            <a:off x="-6350" y="1484784"/>
-            <a:ext cx="9144000" cy="4392488"/>
+            <a:off x="23961" y="1320155"/>
+            <a:ext cx="9080331" cy="5184576"/>
           </a:xfrm>
           <a:prstGeom prst="rect">
             <a:avLst/>
@@ -6860,7 +6972,7 @@
     </p:spTree>
     <p:extLst>
       <p:ext uri="{BB962C8B-B14F-4D97-AF65-F5344CB8AC3E}">
-        <p14:creationId xmlns:p14="http://schemas.microsoft.com/office/powerpoint/2010/main" val="2229094826"/>
+        <p14:creationId xmlns:p14="http://schemas.microsoft.com/office/powerpoint/2010/main" val="3523015254"/>
       </p:ext>
     </p:extLst>
   </p:cSld>
@@ -6874,6 +6986,148 @@
 </file>
 
 <file path=ppt/slides/slide27.xml><?xml version="1.0" encoding="utf-8"?>
+<p:sld xmlns:a="http://schemas.openxmlformats.org/drawingml/2006/main" xmlns:r="http://schemas.openxmlformats.org/officeDocument/2006/relationships" xmlns:p="http://schemas.openxmlformats.org/presentationml/2006/main">
+  <p:cSld>
+    <p:spTree>
+      <p:nvGrpSpPr>
+        <p:cNvPr id="1" name=""/>
+        <p:cNvGrpSpPr/>
+        <p:nvPr/>
+      </p:nvGrpSpPr>
+      <p:grpSpPr>
+        <a:xfrm>
+          <a:off x="0" y="0"/>
+          <a:ext cx="0" cy="0"/>
+          <a:chOff x="0" y="0"/>
+          <a:chExt cx="0" cy="0"/>
+        </a:xfrm>
+      </p:grpSpPr>
+      <p:sp>
+        <p:nvSpPr>
+          <p:cNvPr id="4" name="Título 3"/>
+          <p:cNvSpPr>
+            <a:spLocks noGrp="1"/>
+          </p:cNvSpPr>
+          <p:nvPr>
+            <p:ph type="title"/>
+          </p:nvPr>
+        </p:nvSpPr>
+        <p:spPr/>
+        <p:txBody>
+          <a:bodyPr/>
+          <a:lstStyle/>
+          <a:p>
+            <a:pPr eaLnBrk="1" hangingPunct="1">
+              <a:defRPr/>
+            </a:pPr>
+            <a:r>
+              <a:rPr lang="pt-BR" dirty="0"/>
+              <a:t>MÓDULO EMPRESA</a:t>
+            </a:r>
+          </a:p>
+        </p:txBody>
+      </p:sp>
+      <p:sp>
+        <p:nvSpPr>
+          <p:cNvPr id="21507" name="Espaço Reservado para Conteúdo 4"/>
+          <p:cNvSpPr>
+            <a:spLocks noGrp="1"/>
+          </p:cNvSpPr>
+          <p:nvPr>
+            <p:ph idx="1"/>
+          </p:nvPr>
+        </p:nvSpPr>
+        <p:spPr bwMode="auto">
+          <a:xfrm>
+            <a:off x="179512" y="1340768"/>
+            <a:ext cx="8785225" cy="5328592"/>
+          </a:xfrm>
+          <a:extLst>
+            <a:ext uri="{909E8E84-426E-40DD-AFC4-6F175D3DCCD1}">
+              <a14:hiddenFill xmlns:a14="http://schemas.microsoft.com/office/drawing/2010/main">
+                <a:solidFill>
+                  <a:srgbClr val="FFFFFF"/>
+                </a:solidFill>
+              </a14:hiddenFill>
+            </a:ext>
+            <a:ext uri="{91240B29-F687-4F45-9708-019B960494DF}">
+              <a14:hiddenLine xmlns:a14="http://schemas.microsoft.com/office/drawing/2010/main" w="9525">
+                <a:solidFill>
+                  <a:srgbClr val="000000"/>
+                </a:solidFill>
+                <a:miter lim="800000"/>
+                <a:headEnd/>
+                <a:tailEnd/>
+              </a14:hiddenLine>
+            </a:ext>
+          </a:extLst>
+        </p:spPr>
+        <p:txBody>
+          <a:bodyPr vert="horz" wrap="square" lIns="91440" tIns="45720" rIns="91440" bIns="45720" numCol="1" anchor="t" anchorCtr="0" compatLnSpc="1">
+            <a:prstTxWarp prst="textNoShape">
+              <a:avLst/>
+            </a:prstTxWarp>
+          </a:bodyPr>
+          <a:lstStyle/>
+          <a:p>
+            <a:pPr marL="0" indent="0" algn="ctr" eaLnBrk="1" hangingPunct="1">
+              <a:buFont typeface="Arial" panose="020B0604020202020204" pitchFamily="34" charset="0"/>
+              <a:buNone/>
+              <a:defRPr/>
+            </a:pPr>
+            <a:endParaRPr lang="pt-BR" sz="2000" dirty="0"/>
+          </a:p>
+          <a:p>
+            <a:pPr algn="just" eaLnBrk="1" hangingPunct="1">
+              <a:buFont typeface="Arial" panose="020B0604020202020204" pitchFamily="34" charset="0"/>
+              <a:buChar char="•"/>
+              <a:defRPr/>
+            </a:pPr>
+            <a:endParaRPr lang="pt-BR" sz="2000" dirty="0"/>
+          </a:p>
+        </p:txBody>
+      </p:sp>
+      <p:pic>
+        <p:nvPicPr>
+          <p:cNvPr id="5" name="Imagem 4"/>
+          <p:cNvPicPr>
+            <a:picLocks noChangeAspect="1"/>
+          </p:cNvPicPr>
+          <p:nvPr/>
+        </p:nvPicPr>
+        <p:blipFill>
+          <a:blip r:embed="rId2"/>
+          <a:stretch>
+            <a:fillRect/>
+          </a:stretch>
+        </p:blipFill>
+        <p:spPr>
+          <a:xfrm>
+            <a:off x="35496" y="1310059"/>
+            <a:ext cx="9079200" cy="5215285"/>
+          </a:xfrm>
+          <a:prstGeom prst="rect">
+            <a:avLst/>
+          </a:prstGeom>
+        </p:spPr>
+      </p:pic>
+    </p:spTree>
+    <p:extLst>
+      <p:ext uri="{BB962C8B-B14F-4D97-AF65-F5344CB8AC3E}">
+        <p14:creationId xmlns:p14="http://schemas.microsoft.com/office/powerpoint/2010/main" val="3817239344"/>
+      </p:ext>
+    </p:extLst>
+  </p:cSld>
+  <p:clrMapOvr>
+    <a:masterClrMapping/>
+  </p:clrMapOvr>
+  <p:transition spd="med">
+    <p:fade/>
+  </p:transition>
+</p:sld>
+</file>
+
+<file path=ppt/slides/slide28.xml><?xml version="1.0" encoding="utf-8"?>
 <p:sld xmlns:a="http://schemas.openxmlformats.org/drawingml/2006/main" xmlns:r="http://schemas.openxmlformats.org/officeDocument/2006/relationships" xmlns:p="http://schemas.openxmlformats.org/presentationml/2006/main">
   <p:cSld>
     <p:spTree>
@@ -7385,7 +7639,7 @@
 </p:sld>
 </file>
 
-<file path=ppt/slides/slide28.xml><?xml version="1.0" encoding="utf-8"?>
+<file path=ppt/slides/slide29.xml><?xml version="1.0" encoding="utf-8"?>
 <p:sld xmlns:a="http://schemas.openxmlformats.org/drawingml/2006/main" xmlns:r="http://schemas.openxmlformats.org/officeDocument/2006/relationships" xmlns:p="http://schemas.openxmlformats.org/presentationml/2006/main">
   <p:cSld>
     <p:spTree>
@@ -7809,250 +8063,6 @@
     <p:extLst>
       <p:ext uri="{BB962C8B-B14F-4D97-AF65-F5344CB8AC3E}">
         <p14:creationId xmlns:p14="http://schemas.microsoft.com/office/powerpoint/2010/main" val="3812644496"/>
-      </p:ext>
-    </p:extLst>
-  </p:cSld>
-  <p:clrMapOvr>
-    <a:masterClrMapping/>
-  </p:clrMapOvr>
-</p:sld>
-</file>
-
-<file path=ppt/slides/slide29.xml><?xml version="1.0" encoding="utf-8"?>
-<p:sld xmlns:a="http://schemas.openxmlformats.org/drawingml/2006/main" xmlns:r="http://schemas.openxmlformats.org/officeDocument/2006/relationships" xmlns:p="http://schemas.openxmlformats.org/presentationml/2006/main">
-  <p:cSld>
-    <p:spTree>
-      <p:nvGrpSpPr>
-        <p:cNvPr id="1" name=""/>
-        <p:cNvGrpSpPr/>
-        <p:nvPr/>
-      </p:nvGrpSpPr>
-      <p:grpSpPr>
-        <a:xfrm>
-          <a:off x="0" y="0"/>
-          <a:ext cx="0" cy="0"/>
-          <a:chOff x="0" y="0"/>
-          <a:chExt cx="0" cy="0"/>
-        </a:xfrm>
-      </p:grpSpPr>
-      <p:sp>
-        <p:nvSpPr>
-          <p:cNvPr id="5" name="Título 3"/>
-          <p:cNvSpPr txBox="1">
-            <a:spLocks/>
-          </p:cNvSpPr>
-          <p:nvPr/>
-        </p:nvSpPr>
-        <p:spPr>
-          <a:xfrm>
-            <a:off x="2123728" y="188640"/>
-            <a:ext cx="8797925" cy="922338"/>
-          </a:xfrm>
-          <a:prstGeom prst="rect">
-            <a:avLst/>
-          </a:prstGeom>
-        </p:spPr>
-        <p:txBody>
-          <a:bodyPr/>
-          <a:lstStyle>
-            <a:lvl1pPr algn="ctr" rtl="0" eaLnBrk="0" fontAlgn="base" hangingPunct="0">
-              <a:spcBef>
-                <a:spcPct val="0"/>
-              </a:spcBef>
-              <a:spcAft>
-                <a:spcPct val="0"/>
-              </a:spcAft>
-              <a:defRPr sz="4400" kern="1200">
-                <a:solidFill>
-                  <a:schemeClr val="tx1"/>
-                </a:solidFill>
-                <a:latin typeface="Verdana" pitchFamily="34" charset="0"/>
-                <a:ea typeface="Verdana" pitchFamily="34" charset="0"/>
-                <a:cs typeface="Verdana" pitchFamily="34" charset="0"/>
-              </a:defRPr>
-            </a:lvl1pPr>
-            <a:lvl2pPr algn="ctr" rtl="0" eaLnBrk="0" fontAlgn="base" hangingPunct="0">
-              <a:spcBef>
-                <a:spcPct val="0"/>
-              </a:spcBef>
-              <a:spcAft>
-                <a:spcPct val="0"/>
-              </a:spcAft>
-              <a:defRPr sz="4400">
-                <a:solidFill>
-                  <a:schemeClr val="tx1"/>
-                </a:solidFill>
-                <a:latin typeface="Verdana" pitchFamily="34" charset="0"/>
-                <a:ea typeface="Verdana" pitchFamily="34" charset="0"/>
-                <a:cs typeface="Verdana" pitchFamily="34" charset="0"/>
-              </a:defRPr>
-            </a:lvl2pPr>
-            <a:lvl3pPr algn="ctr" rtl="0" eaLnBrk="0" fontAlgn="base" hangingPunct="0">
-              <a:spcBef>
-                <a:spcPct val="0"/>
-              </a:spcBef>
-              <a:spcAft>
-                <a:spcPct val="0"/>
-              </a:spcAft>
-              <a:defRPr sz="4400">
-                <a:solidFill>
-                  <a:schemeClr val="tx1"/>
-                </a:solidFill>
-                <a:latin typeface="Verdana" pitchFamily="34" charset="0"/>
-                <a:ea typeface="Verdana" pitchFamily="34" charset="0"/>
-                <a:cs typeface="Verdana" pitchFamily="34" charset="0"/>
-              </a:defRPr>
-            </a:lvl3pPr>
-            <a:lvl4pPr algn="ctr" rtl="0" eaLnBrk="0" fontAlgn="base" hangingPunct="0">
-              <a:spcBef>
-                <a:spcPct val="0"/>
-              </a:spcBef>
-              <a:spcAft>
-                <a:spcPct val="0"/>
-              </a:spcAft>
-              <a:defRPr sz="4400">
-                <a:solidFill>
-                  <a:schemeClr val="tx1"/>
-                </a:solidFill>
-                <a:latin typeface="Verdana" pitchFamily="34" charset="0"/>
-                <a:ea typeface="Verdana" pitchFamily="34" charset="0"/>
-                <a:cs typeface="Verdana" pitchFamily="34" charset="0"/>
-              </a:defRPr>
-            </a:lvl4pPr>
-            <a:lvl5pPr algn="ctr" rtl="0" eaLnBrk="0" fontAlgn="base" hangingPunct="0">
-              <a:spcBef>
-                <a:spcPct val="0"/>
-              </a:spcBef>
-              <a:spcAft>
-                <a:spcPct val="0"/>
-              </a:spcAft>
-              <a:defRPr sz="4400">
-                <a:solidFill>
-                  <a:schemeClr val="tx1"/>
-                </a:solidFill>
-                <a:latin typeface="Verdana" pitchFamily="34" charset="0"/>
-                <a:ea typeface="Verdana" pitchFamily="34" charset="0"/>
-                <a:cs typeface="Verdana" pitchFamily="34" charset="0"/>
-              </a:defRPr>
-            </a:lvl5pPr>
-            <a:lvl6pPr marL="457200" algn="ctr" rtl="0" fontAlgn="base">
-              <a:spcBef>
-                <a:spcPct val="0"/>
-              </a:spcBef>
-              <a:spcAft>
-                <a:spcPct val="0"/>
-              </a:spcAft>
-              <a:defRPr sz="4400">
-                <a:solidFill>
-                  <a:schemeClr val="tx1"/>
-                </a:solidFill>
-                <a:latin typeface="Verdana" pitchFamily="34" charset="0"/>
-                <a:ea typeface="Verdana" pitchFamily="34" charset="0"/>
-                <a:cs typeface="Verdana" pitchFamily="34" charset="0"/>
-              </a:defRPr>
-            </a:lvl6pPr>
-            <a:lvl7pPr marL="914400" algn="ctr" rtl="0" fontAlgn="base">
-              <a:spcBef>
-                <a:spcPct val="0"/>
-              </a:spcBef>
-              <a:spcAft>
-                <a:spcPct val="0"/>
-              </a:spcAft>
-              <a:defRPr sz="4400">
-                <a:solidFill>
-                  <a:schemeClr val="tx1"/>
-                </a:solidFill>
-                <a:latin typeface="Verdana" pitchFamily="34" charset="0"/>
-                <a:ea typeface="Verdana" pitchFamily="34" charset="0"/>
-                <a:cs typeface="Verdana" pitchFamily="34" charset="0"/>
-              </a:defRPr>
-            </a:lvl7pPr>
-            <a:lvl8pPr marL="1371600" algn="ctr" rtl="0" fontAlgn="base">
-              <a:spcBef>
-                <a:spcPct val="0"/>
-              </a:spcBef>
-              <a:spcAft>
-                <a:spcPct val="0"/>
-              </a:spcAft>
-              <a:defRPr sz="4400">
-                <a:solidFill>
-                  <a:schemeClr val="tx1"/>
-                </a:solidFill>
-                <a:latin typeface="Verdana" pitchFamily="34" charset="0"/>
-                <a:ea typeface="Verdana" pitchFamily="34" charset="0"/>
-                <a:cs typeface="Verdana" pitchFamily="34" charset="0"/>
-              </a:defRPr>
-            </a:lvl8pPr>
-            <a:lvl9pPr marL="1828800" algn="ctr" rtl="0" fontAlgn="base">
-              <a:spcBef>
-                <a:spcPct val="0"/>
-              </a:spcBef>
-              <a:spcAft>
-                <a:spcPct val="0"/>
-              </a:spcAft>
-              <a:defRPr sz="4400">
-                <a:solidFill>
-                  <a:schemeClr val="tx1"/>
-                </a:solidFill>
-                <a:latin typeface="Verdana" pitchFamily="34" charset="0"/>
-                <a:ea typeface="Verdana" pitchFamily="34" charset="0"/>
-                <a:cs typeface="Verdana" pitchFamily="34" charset="0"/>
-              </a:defRPr>
-            </a:lvl9pPr>
-          </a:lstStyle>
-          <a:p>
-            <a:pPr eaLnBrk="1" hangingPunct="1">
-              <a:defRPr/>
-            </a:pPr>
-            <a:r>
-              <a:rPr lang="pt-BR" sz="3600" b="1" dirty="0">
-                <a:solidFill>
-                  <a:schemeClr val="accent1">
-                    <a:lumMod val="50000"/>
-                  </a:schemeClr>
-                </a:solidFill>
-                <a:latin typeface="Arial" pitchFamily="34" charset="0"/>
-                <a:cs typeface="Arial" pitchFamily="34" charset="0"/>
-              </a:rPr>
-              <a:t>MÓDULO FINANCEIRO</a:t>
-            </a:r>
-          </a:p>
-        </p:txBody>
-      </p:sp>
-      <p:pic>
-        <p:nvPicPr>
-          <p:cNvPr id="2" name="Imagem 1"/>
-          <p:cNvPicPr>
-            <a:picLocks noChangeAspect="1"/>
-          </p:cNvPicPr>
-          <p:nvPr/>
-        </p:nvPicPr>
-        <p:blipFill>
-          <a:blip r:embed="rId2">
-            <a:extLst>
-              <a:ext uri="{28A0092B-C50C-407E-A947-70E740481C1C}">
-                <a14:useLocalDpi xmlns:a14="http://schemas.microsoft.com/office/drawing/2010/main" val="0"/>
-              </a:ext>
-            </a:extLst>
-          </a:blip>
-          <a:stretch>
-            <a:fillRect/>
-          </a:stretch>
-        </p:blipFill>
-        <p:spPr>
-          <a:xfrm>
-            <a:off x="2123728" y="1225327"/>
-            <a:ext cx="4680520" cy="5661249"/>
-          </a:xfrm>
-          <a:prstGeom prst="rect">
-            <a:avLst/>
-          </a:prstGeom>
-        </p:spPr>
-      </p:pic>
-    </p:spTree>
-    <p:extLst>
-      <p:ext uri="{BB962C8B-B14F-4D97-AF65-F5344CB8AC3E}">
-        <p14:creationId xmlns:p14="http://schemas.microsoft.com/office/powerpoint/2010/main" val="1625217003"/>
       </p:ext>
     </p:extLst>
   </p:cSld>
@@ -8162,16 +8172,200 @@
           <a:chExt cx="0" cy="0"/>
         </a:xfrm>
       </p:grpSpPr>
+      <p:sp>
+        <p:nvSpPr>
+          <p:cNvPr id="5" name="Título 3"/>
+          <p:cNvSpPr txBox="1">
+            <a:spLocks/>
+          </p:cNvSpPr>
+          <p:nvPr/>
+        </p:nvSpPr>
+        <p:spPr>
+          <a:xfrm>
+            <a:off x="2123728" y="188640"/>
+            <a:ext cx="8797925" cy="922338"/>
+          </a:xfrm>
+          <a:prstGeom prst="rect">
+            <a:avLst/>
+          </a:prstGeom>
+        </p:spPr>
+        <p:txBody>
+          <a:bodyPr/>
+          <a:lstStyle>
+            <a:lvl1pPr algn="ctr" rtl="0" eaLnBrk="0" fontAlgn="base" hangingPunct="0">
+              <a:spcBef>
+                <a:spcPct val="0"/>
+              </a:spcBef>
+              <a:spcAft>
+                <a:spcPct val="0"/>
+              </a:spcAft>
+              <a:defRPr sz="4400" kern="1200">
+                <a:solidFill>
+                  <a:schemeClr val="tx1"/>
+                </a:solidFill>
+                <a:latin typeface="Verdana" pitchFamily="34" charset="0"/>
+                <a:ea typeface="Verdana" pitchFamily="34" charset="0"/>
+                <a:cs typeface="Verdana" pitchFamily="34" charset="0"/>
+              </a:defRPr>
+            </a:lvl1pPr>
+            <a:lvl2pPr algn="ctr" rtl="0" eaLnBrk="0" fontAlgn="base" hangingPunct="0">
+              <a:spcBef>
+                <a:spcPct val="0"/>
+              </a:spcBef>
+              <a:spcAft>
+                <a:spcPct val="0"/>
+              </a:spcAft>
+              <a:defRPr sz="4400">
+                <a:solidFill>
+                  <a:schemeClr val="tx1"/>
+                </a:solidFill>
+                <a:latin typeface="Verdana" pitchFamily="34" charset="0"/>
+                <a:ea typeface="Verdana" pitchFamily="34" charset="0"/>
+                <a:cs typeface="Verdana" pitchFamily="34" charset="0"/>
+              </a:defRPr>
+            </a:lvl2pPr>
+            <a:lvl3pPr algn="ctr" rtl="0" eaLnBrk="0" fontAlgn="base" hangingPunct="0">
+              <a:spcBef>
+                <a:spcPct val="0"/>
+              </a:spcBef>
+              <a:spcAft>
+                <a:spcPct val="0"/>
+              </a:spcAft>
+              <a:defRPr sz="4400">
+                <a:solidFill>
+                  <a:schemeClr val="tx1"/>
+                </a:solidFill>
+                <a:latin typeface="Verdana" pitchFamily="34" charset="0"/>
+                <a:ea typeface="Verdana" pitchFamily="34" charset="0"/>
+                <a:cs typeface="Verdana" pitchFamily="34" charset="0"/>
+              </a:defRPr>
+            </a:lvl3pPr>
+            <a:lvl4pPr algn="ctr" rtl="0" eaLnBrk="0" fontAlgn="base" hangingPunct="0">
+              <a:spcBef>
+                <a:spcPct val="0"/>
+              </a:spcBef>
+              <a:spcAft>
+                <a:spcPct val="0"/>
+              </a:spcAft>
+              <a:defRPr sz="4400">
+                <a:solidFill>
+                  <a:schemeClr val="tx1"/>
+                </a:solidFill>
+                <a:latin typeface="Verdana" pitchFamily="34" charset="0"/>
+                <a:ea typeface="Verdana" pitchFamily="34" charset="0"/>
+                <a:cs typeface="Verdana" pitchFamily="34" charset="0"/>
+              </a:defRPr>
+            </a:lvl4pPr>
+            <a:lvl5pPr algn="ctr" rtl="0" eaLnBrk="0" fontAlgn="base" hangingPunct="0">
+              <a:spcBef>
+                <a:spcPct val="0"/>
+              </a:spcBef>
+              <a:spcAft>
+                <a:spcPct val="0"/>
+              </a:spcAft>
+              <a:defRPr sz="4400">
+                <a:solidFill>
+                  <a:schemeClr val="tx1"/>
+                </a:solidFill>
+                <a:latin typeface="Verdana" pitchFamily="34" charset="0"/>
+                <a:ea typeface="Verdana" pitchFamily="34" charset="0"/>
+                <a:cs typeface="Verdana" pitchFamily="34" charset="0"/>
+              </a:defRPr>
+            </a:lvl5pPr>
+            <a:lvl6pPr marL="457200" algn="ctr" rtl="0" fontAlgn="base">
+              <a:spcBef>
+                <a:spcPct val="0"/>
+              </a:spcBef>
+              <a:spcAft>
+                <a:spcPct val="0"/>
+              </a:spcAft>
+              <a:defRPr sz="4400">
+                <a:solidFill>
+                  <a:schemeClr val="tx1"/>
+                </a:solidFill>
+                <a:latin typeface="Verdana" pitchFamily="34" charset="0"/>
+                <a:ea typeface="Verdana" pitchFamily="34" charset="0"/>
+                <a:cs typeface="Verdana" pitchFamily="34" charset="0"/>
+              </a:defRPr>
+            </a:lvl6pPr>
+            <a:lvl7pPr marL="914400" algn="ctr" rtl="0" fontAlgn="base">
+              <a:spcBef>
+                <a:spcPct val="0"/>
+              </a:spcBef>
+              <a:spcAft>
+                <a:spcPct val="0"/>
+              </a:spcAft>
+              <a:defRPr sz="4400">
+                <a:solidFill>
+                  <a:schemeClr val="tx1"/>
+                </a:solidFill>
+                <a:latin typeface="Verdana" pitchFamily="34" charset="0"/>
+                <a:ea typeface="Verdana" pitchFamily="34" charset="0"/>
+                <a:cs typeface="Verdana" pitchFamily="34" charset="0"/>
+              </a:defRPr>
+            </a:lvl7pPr>
+            <a:lvl8pPr marL="1371600" algn="ctr" rtl="0" fontAlgn="base">
+              <a:spcBef>
+                <a:spcPct val="0"/>
+              </a:spcBef>
+              <a:spcAft>
+                <a:spcPct val="0"/>
+              </a:spcAft>
+              <a:defRPr sz="4400">
+                <a:solidFill>
+                  <a:schemeClr val="tx1"/>
+                </a:solidFill>
+                <a:latin typeface="Verdana" pitchFamily="34" charset="0"/>
+                <a:ea typeface="Verdana" pitchFamily="34" charset="0"/>
+                <a:cs typeface="Verdana" pitchFamily="34" charset="0"/>
+              </a:defRPr>
+            </a:lvl8pPr>
+            <a:lvl9pPr marL="1828800" algn="ctr" rtl="0" fontAlgn="base">
+              <a:spcBef>
+                <a:spcPct val="0"/>
+              </a:spcBef>
+              <a:spcAft>
+                <a:spcPct val="0"/>
+              </a:spcAft>
+              <a:defRPr sz="4400">
+                <a:solidFill>
+                  <a:schemeClr val="tx1"/>
+                </a:solidFill>
+                <a:latin typeface="Verdana" pitchFamily="34" charset="0"/>
+                <a:ea typeface="Verdana" pitchFamily="34" charset="0"/>
+                <a:cs typeface="Verdana" pitchFamily="34" charset="0"/>
+              </a:defRPr>
+            </a:lvl9pPr>
+          </a:lstStyle>
+          <a:p>
+            <a:pPr eaLnBrk="1" hangingPunct="1">
+              <a:defRPr/>
+            </a:pPr>
+            <a:r>
+              <a:rPr lang="pt-BR" sz="3600" b="1" dirty="0">
+                <a:solidFill>
+                  <a:schemeClr val="accent1">
+                    <a:lumMod val="50000"/>
+                  </a:schemeClr>
+                </a:solidFill>
+                <a:latin typeface="Arial" pitchFamily="34" charset="0"/>
+                <a:cs typeface="Arial" pitchFamily="34" charset="0"/>
+              </a:rPr>
+              <a:t>MÓDULO FINANCEIRO</a:t>
+            </a:r>
+          </a:p>
+        </p:txBody>
+      </p:sp>
       <p:pic>
         <p:nvPicPr>
-          <p:cNvPr id="5" name="Imagem 4"/>
+          <p:cNvPr id="3" name="Imagem 2"/>
           <p:cNvPicPr>
             <a:picLocks noChangeAspect="1"/>
           </p:cNvPicPr>
           <p:nvPr/>
         </p:nvPicPr>
         <p:blipFill>
-          <a:blip r:embed="rId2" cstate="print">
+          <a:blip r:embed="rId2">
             <a:extLst>
               <a:ext uri="{28A0092B-C50C-407E-A947-70E740481C1C}">
                 <a14:useLocalDpi xmlns:a14="http://schemas.microsoft.com/office/drawing/2010/main" val="0"/>
@@ -8184,14 +8378,44 @@
         </p:blipFill>
         <p:spPr>
           <a:xfrm>
-            <a:off x="258594" y="1484784"/>
-            <a:ext cx="8878385" cy="4305265"/>
+            <a:off x="2770383" y="1199651"/>
+            <a:ext cx="3737303" cy="5616000"/>
           </a:xfrm>
           <a:prstGeom prst="rect">
             <a:avLst/>
           </a:prstGeom>
         </p:spPr>
       </p:pic>
+    </p:spTree>
+    <p:extLst>
+      <p:ext uri="{BB962C8B-B14F-4D97-AF65-F5344CB8AC3E}">
+        <p14:creationId xmlns:p14="http://schemas.microsoft.com/office/powerpoint/2010/main" val="1625217003"/>
+      </p:ext>
+    </p:extLst>
+  </p:cSld>
+  <p:clrMapOvr>
+    <a:masterClrMapping/>
+  </p:clrMapOvr>
+</p:sld>
+</file>
+
+<file path=ppt/slides/slide31.xml><?xml version="1.0" encoding="utf-8"?>
+<p:sld xmlns:a="http://schemas.openxmlformats.org/drawingml/2006/main" xmlns:r="http://schemas.openxmlformats.org/officeDocument/2006/relationships" xmlns:p="http://schemas.openxmlformats.org/presentationml/2006/main">
+  <p:cSld>
+    <p:spTree>
+      <p:nvGrpSpPr>
+        <p:cNvPr id="1" name=""/>
+        <p:cNvGrpSpPr/>
+        <p:nvPr/>
+      </p:nvGrpSpPr>
+      <p:grpSpPr>
+        <a:xfrm>
+          <a:off x="0" y="0"/>
+          <a:ext cx="0" cy="0"/>
+          <a:chOff x="0" y="0"/>
+          <a:chExt cx="0" cy="0"/>
+        </a:xfrm>
+      </p:grpSpPr>
       <p:sp>
         <p:nvSpPr>
           <p:cNvPr id="6" name="Título 3"/>
@@ -8376,6 +8600,36 @@
           </a:p>
         </p:txBody>
       </p:sp>
+      <p:pic>
+        <p:nvPicPr>
+          <p:cNvPr id="2" name="Imagem 1"/>
+          <p:cNvPicPr>
+            <a:picLocks noChangeAspect="1"/>
+          </p:cNvPicPr>
+          <p:nvPr/>
+        </p:nvPicPr>
+        <p:blipFill>
+          <a:blip r:embed="rId2">
+            <a:extLst>
+              <a:ext uri="{28A0092B-C50C-407E-A947-70E740481C1C}">
+                <a14:useLocalDpi xmlns:a14="http://schemas.microsoft.com/office/drawing/2010/main" val="0"/>
+              </a:ext>
+            </a:extLst>
+          </a:blip>
+          <a:stretch>
+            <a:fillRect/>
+          </a:stretch>
+        </p:blipFill>
+        <p:spPr>
+          <a:xfrm>
+            <a:off x="-11922" y="1527252"/>
+            <a:ext cx="9155922" cy="4227901"/>
+          </a:xfrm>
+          <a:prstGeom prst="rect">
+            <a:avLst/>
+          </a:prstGeom>
+        </p:spPr>
+      </p:pic>
     </p:spTree>
     <p:extLst>
       <p:ext uri="{BB962C8B-B14F-4D97-AF65-F5344CB8AC3E}">
@@ -8389,7 +8643,7 @@
 </p:sld>
 </file>
 
-<file path=ppt/slides/slide31.xml><?xml version="1.0" encoding="utf-8"?>
+<file path=ppt/slides/slide32.xml><?xml version="1.0" encoding="utf-8"?>
 <p:sld xmlns:a="http://schemas.openxmlformats.org/drawingml/2006/main" xmlns:r="http://schemas.openxmlformats.org/officeDocument/2006/relationships" xmlns:p="http://schemas.openxmlformats.org/presentationml/2006/main">
   <p:cSld>
     <p:spTree>
@@ -8592,14 +8846,14 @@
       </p:sp>
       <p:pic>
         <p:nvPicPr>
-          <p:cNvPr id="8" name="Imagem 7"/>
+          <p:cNvPr id="3" name="Imagem 2"/>
           <p:cNvPicPr>
             <a:picLocks noChangeAspect="1"/>
           </p:cNvPicPr>
           <p:nvPr/>
         </p:nvPicPr>
         <p:blipFill>
-          <a:blip r:embed="rId2" cstate="print">
+          <a:blip r:embed="rId2">
             <a:extLst>
               <a:ext uri="{28A0092B-C50C-407E-A947-70E740481C1C}">
                 <a14:useLocalDpi xmlns:a14="http://schemas.microsoft.com/office/drawing/2010/main" val="0"/>
@@ -8612,8 +8866,8 @@
         </p:blipFill>
         <p:spPr>
           <a:xfrm>
-            <a:off x="215899" y="1412776"/>
-            <a:ext cx="8892480" cy="4328545"/>
+            <a:off x="0" y="1700808"/>
+            <a:ext cx="9144000" cy="3756011"/>
           </a:xfrm>
           <a:prstGeom prst="rect">
             <a:avLst/>
@@ -8624,250 +8878,6 @@
     <p:extLst>
       <p:ext uri="{BB962C8B-B14F-4D97-AF65-F5344CB8AC3E}">
         <p14:creationId xmlns:p14="http://schemas.microsoft.com/office/powerpoint/2010/main" val="3402891464"/>
-      </p:ext>
-    </p:extLst>
-  </p:cSld>
-  <p:clrMapOvr>
-    <a:masterClrMapping/>
-  </p:clrMapOvr>
-</p:sld>
-</file>
-
-<file path=ppt/slides/slide32.xml><?xml version="1.0" encoding="utf-8"?>
-<p:sld xmlns:a="http://schemas.openxmlformats.org/drawingml/2006/main" xmlns:r="http://schemas.openxmlformats.org/officeDocument/2006/relationships" xmlns:p="http://schemas.openxmlformats.org/presentationml/2006/main">
-  <p:cSld>
-    <p:spTree>
-      <p:nvGrpSpPr>
-        <p:cNvPr id="1" name=""/>
-        <p:cNvGrpSpPr/>
-        <p:nvPr/>
-      </p:nvGrpSpPr>
-      <p:grpSpPr>
-        <a:xfrm>
-          <a:off x="0" y="0"/>
-          <a:ext cx="0" cy="0"/>
-          <a:chOff x="0" y="0"/>
-          <a:chExt cx="0" cy="0"/>
-        </a:xfrm>
-      </p:grpSpPr>
-      <p:sp>
-        <p:nvSpPr>
-          <p:cNvPr id="5" name="Título 3"/>
-          <p:cNvSpPr txBox="1">
-            <a:spLocks/>
-          </p:cNvSpPr>
-          <p:nvPr/>
-        </p:nvSpPr>
-        <p:spPr>
-          <a:xfrm>
-            <a:off x="2123728" y="188640"/>
-            <a:ext cx="8797925" cy="922338"/>
-          </a:xfrm>
-          <a:prstGeom prst="rect">
-            <a:avLst/>
-          </a:prstGeom>
-        </p:spPr>
-        <p:txBody>
-          <a:bodyPr/>
-          <a:lstStyle>
-            <a:lvl1pPr algn="ctr" rtl="0" eaLnBrk="0" fontAlgn="base" hangingPunct="0">
-              <a:spcBef>
-                <a:spcPct val="0"/>
-              </a:spcBef>
-              <a:spcAft>
-                <a:spcPct val="0"/>
-              </a:spcAft>
-              <a:defRPr sz="4400" kern="1200">
-                <a:solidFill>
-                  <a:schemeClr val="tx1"/>
-                </a:solidFill>
-                <a:latin typeface="Verdana" pitchFamily="34" charset="0"/>
-                <a:ea typeface="Verdana" pitchFamily="34" charset="0"/>
-                <a:cs typeface="Verdana" pitchFamily="34" charset="0"/>
-              </a:defRPr>
-            </a:lvl1pPr>
-            <a:lvl2pPr algn="ctr" rtl="0" eaLnBrk="0" fontAlgn="base" hangingPunct="0">
-              <a:spcBef>
-                <a:spcPct val="0"/>
-              </a:spcBef>
-              <a:spcAft>
-                <a:spcPct val="0"/>
-              </a:spcAft>
-              <a:defRPr sz="4400">
-                <a:solidFill>
-                  <a:schemeClr val="tx1"/>
-                </a:solidFill>
-                <a:latin typeface="Verdana" pitchFamily="34" charset="0"/>
-                <a:ea typeface="Verdana" pitchFamily="34" charset="0"/>
-                <a:cs typeface="Verdana" pitchFamily="34" charset="0"/>
-              </a:defRPr>
-            </a:lvl2pPr>
-            <a:lvl3pPr algn="ctr" rtl="0" eaLnBrk="0" fontAlgn="base" hangingPunct="0">
-              <a:spcBef>
-                <a:spcPct val="0"/>
-              </a:spcBef>
-              <a:spcAft>
-                <a:spcPct val="0"/>
-              </a:spcAft>
-              <a:defRPr sz="4400">
-                <a:solidFill>
-                  <a:schemeClr val="tx1"/>
-                </a:solidFill>
-                <a:latin typeface="Verdana" pitchFamily="34" charset="0"/>
-                <a:ea typeface="Verdana" pitchFamily="34" charset="0"/>
-                <a:cs typeface="Verdana" pitchFamily="34" charset="0"/>
-              </a:defRPr>
-            </a:lvl3pPr>
-            <a:lvl4pPr algn="ctr" rtl="0" eaLnBrk="0" fontAlgn="base" hangingPunct="0">
-              <a:spcBef>
-                <a:spcPct val="0"/>
-              </a:spcBef>
-              <a:spcAft>
-                <a:spcPct val="0"/>
-              </a:spcAft>
-              <a:defRPr sz="4400">
-                <a:solidFill>
-                  <a:schemeClr val="tx1"/>
-                </a:solidFill>
-                <a:latin typeface="Verdana" pitchFamily="34" charset="0"/>
-                <a:ea typeface="Verdana" pitchFamily="34" charset="0"/>
-                <a:cs typeface="Verdana" pitchFamily="34" charset="0"/>
-              </a:defRPr>
-            </a:lvl4pPr>
-            <a:lvl5pPr algn="ctr" rtl="0" eaLnBrk="0" fontAlgn="base" hangingPunct="0">
-              <a:spcBef>
-                <a:spcPct val="0"/>
-              </a:spcBef>
-              <a:spcAft>
-                <a:spcPct val="0"/>
-              </a:spcAft>
-              <a:defRPr sz="4400">
-                <a:solidFill>
-                  <a:schemeClr val="tx1"/>
-                </a:solidFill>
-                <a:latin typeface="Verdana" pitchFamily="34" charset="0"/>
-                <a:ea typeface="Verdana" pitchFamily="34" charset="0"/>
-                <a:cs typeface="Verdana" pitchFamily="34" charset="0"/>
-              </a:defRPr>
-            </a:lvl5pPr>
-            <a:lvl6pPr marL="457200" algn="ctr" rtl="0" fontAlgn="base">
-              <a:spcBef>
-                <a:spcPct val="0"/>
-              </a:spcBef>
-              <a:spcAft>
-                <a:spcPct val="0"/>
-              </a:spcAft>
-              <a:defRPr sz="4400">
-                <a:solidFill>
-                  <a:schemeClr val="tx1"/>
-                </a:solidFill>
-                <a:latin typeface="Verdana" pitchFamily="34" charset="0"/>
-                <a:ea typeface="Verdana" pitchFamily="34" charset="0"/>
-                <a:cs typeface="Verdana" pitchFamily="34" charset="0"/>
-              </a:defRPr>
-            </a:lvl6pPr>
-            <a:lvl7pPr marL="914400" algn="ctr" rtl="0" fontAlgn="base">
-              <a:spcBef>
-                <a:spcPct val="0"/>
-              </a:spcBef>
-              <a:spcAft>
-                <a:spcPct val="0"/>
-              </a:spcAft>
-              <a:defRPr sz="4400">
-                <a:solidFill>
-                  <a:schemeClr val="tx1"/>
-                </a:solidFill>
-                <a:latin typeface="Verdana" pitchFamily="34" charset="0"/>
-                <a:ea typeface="Verdana" pitchFamily="34" charset="0"/>
-                <a:cs typeface="Verdana" pitchFamily="34" charset="0"/>
-              </a:defRPr>
-            </a:lvl7pPr>
-            <a:lvl8pPr marL="1371600" algn="ctr" rtl="0" fontAlgn="base">
-              <a:spcBef>
-                <a:spcPct val="0"/>
-              </a:spcBef>
-              <a:spcAft>
-                <a:spcPct val="0"/>
-              </a:spcAft>
-              <a:defRPr sz="4400">
-                <a:solidFill>
-                  <a:schemeClr val="tx1"/>
-                </a:solidFill>
-                <a:latin typeface="Verdana" pitchFamily="34" charset="0"/>
-                <a:ea typeface="Verdana" pitchFamily="34" charset="0"/>
-                <a:cs typeface="Verdana" pitchFamily="34" charset="0"/>
-              </a:defRPr>
-            </a:lvl8pPr>
-            <a:lvl9pPr marL="1828800" algn="ctr" rtl="0" fontAlgn="base">
-              <a:spcBef>
-                <a:spcPct val="0"/>
-              </a:spcBef>
-              <a:spcAft>
-                <a:spcPct val="0"/>
-              </a:spcAft>
-              <a:defRPr sz="4400">
-                <a:solidFill>
-                  <a:schemeClr val="tx1"/>
-                </a:solidFill>
-                <a:latin typeface="Verdana" pitchFamily="34" charset="0"/>
-                <a:ea typeface="Verdana" pitchFamily="34" charset="0"/>
-                <a:cs typeface="Verdana" pitchFamily="34" charset="0"/>
-              </a:defRPr>
-            </a:lvl9pPr>
-          </a:lstStyle>
-          <a:p>
-            <a:pPr eaLnBrk="1" hangingPunct="1">
-              <a:defRPr/>
-            </a:pPr>
-            <a:r>
-              <a:rPr lang="pt-BR" sz="3600" b="1" dirty="0">
-                <a:solidFill>
-                  <a:schemeClr val="accent1">
-                    <a:lumMod val="50000"/>
-                  </a:schemeClr>
-                </a:solidFill>
-                <a:latin typeface="Arial" pitchFamily="34" charset="0"/>
-                <a:cs typeface="Arial" pitchFamily="34" charset="0"/>
-              </a:rPr>
-              <a:t>MÓDULO FINANCEIRO</a:t>
-            </a:r>
-          </a:p>
-        </p:txBody>
-      </p:sp>
-      <p:pic>
-        <p:nvPicPr>
-          <p:cNvPr id="6" name="Imagem 5"/>
-          <p:cNvPicPr>
-            <a:picLocks noChangeAspect="1"/>
-          </p:cNvPicPr>
-          <p:nvPr/>
-        </p:nvPicPr>
-        <p:blipFill>
-          <a:blip r:embed="rId2" cstate="print">
-            <a:extLst>
-              <a:ext uri="{28A0092B-C50C-407E-A947-70E740481C1C}">
-                <a14:useLocalDpi xmlns:a14="http://schemas.microsoft.com/office/drawing/2010/main" val="0"/>
-              </a:ext>
-            </a:extLst>
-          </a:blip>
-          <a:stretch>
-            <a:fillRect/>
-          </a:stretch>
-        </p:blipFill>
-        <p:spPr>
-          <a:xfrm>
-            <a:off x="0" y="1216958"/>
-            <a:ext cx="9144000" cy="4424083"/>
-          </a:xfrm>
-          <a:prstGeom prst="rect">
-            <a:avLst/>
-          </a:prstGeom>
-        </p:spPr>
-      </p:pic>
-    </p:spTree>
-    <p:extLst>
-      <p:ext uri="{BB962C8B-B14F-4D97-AF65-F5344CB8AC3E}">
-        <p14:creationId xmlns:p14="http://schemas.microsoft.com/office/powerpoint/2010/main" val="2843391693"/>
       </p:ext>
     </p:extLst>
   </p:cSld>
@@ -9080,14 +9090,14 @@
       </p:sp>
       <p:pic>
         <p:nvPicPr>
-          <p:cNvPr id="6" name="Imagem 5"/>
+          <p:cNvPr id="2" name="Imagem 1"/>
           <p:cNvPicPr>
             <a:picLocks noChangeAspect="1"/>
           </p:cNvPicPr>
           <p:nvPr/>
         </p:nvPicPr>
         <p:blipFill>
-          <a:blip r:embed="rId2" cstate="print">
+          <a:blip r:embed="rId2">
             <a:extLst>
               <a:ext uri="{28A0092B-C50C-407E-A947-70E740481C1C}">
                 <a14:useLocalDpi xmlns:a14="http://schemas.microsoft.com/office/drawing/2010/main" val="0"/>
@@ -9100,8 +9110,8 @@
         </p:blipFill>
         <p:spPr>
           <a:xfrm>
-            <a:off x="1187624" y="1268760"/>
-            <a:ext cx="6613996" cy="5436404"/>
+            <a:off x="107505" y="1260216"/>
+            <a:ext cx="9036495" cy="5625168"/>
           </a:xfrm>
           <a:prstGeom prst="rect">
             <a:avLst/>
@@ -9111,7 +9121,7 @@
     </p:spTree>
     <p:extLst>
       <p:ext uri="{BB962C8B-B14F-4D97-AF65-F5344CB8AC3E}">
-        <p14:creationId xmlns:p14="http://schemas.microsoft.com/office/powerpoint/2010/main" val="3776007642"/>
+        <p14:creationId xmlns:p14="http://schemas.microsoft.com/office/powerpoint/2010/main" val="2843391693"/>
       </p:ext>
     </p:extLst>
   </p:cSld>
@@ -9324,14 +9334,14 @@
       </p:sp>
       <p:pic>
         <p:nvPicPr>
-          <p:cNvPr id="6" name="Imagem 5"/>
+          <p:cNvPr id="2" name="Imagem 1"/>
           <p:cNvPicPr>
             <a:picLocks noChangeAspect="1"/>
           </p:cNvPicPr>
           <p:nvPr/>
         </p:nvPicPr>
         <p:blipFill>
-          <a:blip r:embed="rId2" cstate="print">
+          <a:blip r:embed="rId2">
             <a:extLst>
               <a:ext uri="{28A0092B-C50C-407E-A947-70E740481C1C}">
                 <a14:useLocalDpi xmlns:a14="http://schemas.microsoft.com/office/drawing/2010/main" val="0"/>
@@ -9344,8 +9354,8 @@
         </p:blipFill>
         <p:spPr>
           <a:xfrm>
-            <a:off x="0" y="1824371"/>
-            <a:ext cx="9144000" cy="3209258"/>
+            <a:off x="0" y="2060848"/>
+            <a:ext cx="9144000" cy="3552816"/>
           </a:xfrm>
           <a:prstGeom prst="rect">
             <a:avLst/>
@@ -9355,7 +9365,7 @@
     </p:spTree>
     <p:extLst>
       <p:ext uri="{BB962C8B-B14F-4D97-AF65-F5344CB8AC3E}">
-        <p14:creationId xmlns:p14="http://schemas.microsoft.com/office/powerpoint/2010/main" val="295618873"/>
+        <p14:creationId xmlns:p14="http://schemas.microsoft.com/office/powerpoint/2010/main" val="3776007642"/>
       </p:ext>
     </p:extLst>
   </p:cSld>
@@ -10606,7 +10616,7 @@
       </p:sp>
       <p:pic>
         <p:nvPicPr>
-          <p:cNvPr id="3" name="Imagem 2"/>
+          <p:cNvPr id="6" name="Imagem 5"/>
           <p:cNvPicPr>
             <a:picLocks noChangeAspect="1"/>
           </p:cNvPicPr>
@@ -10620,8 +10630,8 @@
         </p:blipFill>
         <p:spPr>
           <a:xfrm>
-            <a:off x="322213" y="1359554"/>
-            <a:ext cx="8644086" cy="5485845"/>
+            <a:off x="539552" y="1279538"/>
+            <a:ext cx="7885931" cy="5464187"/>
           </a:xfrm>
           <a:prstGeom prst="rect">
             <a:avLst/>

</xml_diff>

<commit_message>
Atualiz Liçoes Aprend. e Trabalhos Fut.
</commit_message>
<xml_diff>
--- a/TCC/5º Encontro/2017-Apresentacao Psystem.pptx
+++ b/TCC/5º Encontro/2017-Apresentacao Psystem.pptx
@@ -49,8 +49,8 @@
     <p:sldId id="310" r:id="rId40"/>
     <p:sldId id="326" r:id="rId41"/>
     <p:sldId id="327" r:id="rId42"/>
-    <p:sldId id="279" r:id="rId43"/>
-    <p:sldId id="280" r:id="rId44"/>
+    <p:sldId id="280" r:id="rId43"/>
+    <p:sldId id="279" r:id="rId44"/>
     <p:sldId id="323" r:id="rId45"/>
   </p:sldIdLst>
   <p:sldSz cx="9144000" cy="6858000" type="screen4x3"/>
@@ -182,7 +182,7 @@
   </p:defaultTextStyle>
   <p:extLst>
     <p:ext uri="{EFAFB233-063F-42B5-8137-9DF3F51BA10A}">
-      <p15:sldGuideLst xmlns:p15="http://schemas.microsoft.com/office/powerpoint/2012/main">
+      <p15:sldGuideLst xmlns:p15="http://schemas.microsoft.com/office/powerpoint/2012/main" xmlns="">
         <p15:guide id="1" orient="horz" pos="2160">
           <p15:clr>
             <a:srgbClr val="A4A3A4"/>
@@ -286,7 +286,7 @@
             <a:fld id="{C0D5B206-56B5-433E-8333-9415E6A460B9}" type="datetimeFigureOut">
               <a:rPr lang="pt-BR" smtClean="0"/>
               <a:pPr/>
-              <a:t>15/09/2017</a:t>
+              <a:t>26/09/2017</a:t>
             </a:fld>
             <a:endParaRPr lang="pt-BR"/>
           </a:p>
@@ -454,7 +454,7 @@
     </p:spTree>
     <p:extLst>
       <p:ext uri="{BB962C8B-B14F-4D97-AF65-F5344CB8AC3E}">
-        <p14:creationId xmlns:p14="http://schemas.microsoft.com/office/powerpoint/2010/main" val="671299352"/>
+        <p14:creationId xmlns:p14="http://schemas.microsoft.com/office/powerpoint/2010/main" xmlns="" val="671299352"/>
       </p:ext>
     </p:extLst>
   </p:cSld>
@@ -664,7 +664,7 @@
     </p:spTree>
     <p:extLst>
       <p:ext uri="{BB962C8B-B14F-4D97-AF65-F5344CB8AC3E}">
-        <p14:creationId xmlns:p14="http://schemas.microsoft.com/office/powerpoint/2010/main" val="3274854824"/>
+        <p14:creationId xmlns:p14="http://schemas.microsoft.com/office/powerpoint/2010/main" xmlns="" val="3274854824"/>
       </p:ext>
     </p:extLst>
   </p:cSld>
@@ -759,7 +759,7 @@
     </p:spTree>
     <p:extLst>
       <p:ext uri="{BB962C8B-B14F-4D97-AF65-F5344CB8AC3E}">
-        <p14:creationId xmlns:p14="http://schemas.microsoft.com/office/powerpoint/2010/main" val="2786033099"/>
+        <p14:creationId xmlns:p14="http://schemas.microsoft.com/office/powerpoint/2010/main" xmlns="" val="2786033099"/>
       </p:ext>
     </p:extLst>
   </p:cSld>
@@ -852,7 +852,7 @@
     </p:spTree>
     <p:extLst>
       <p:ext uri="{BB962C8B-B14F-4D97-AF65-F5344CB8AC3E}">
-        <p14:creationId xmlns:p14="http://schemas.microsoft.com/office/powerpoint/2010/main" val="1775795487"/>
+        <p14:creationId xmlns:p14="http://schemas.microsoft.com/office/powerpoint/2010/main" xmlns="" val="1775795487"/>
       </p:ext>
     </p:extLst>
   </p:cSld>
@@ -968,7 +968,7 @@
     </p:spTree>
     <p:extLst>
       <p:ext uri="{BB962C8B-B14F-4D97-AF65-F5344CB8AC3E}">
-        <p14:creationId xmlns:p14="http://schemas.microsoft.com/office/powerpoint/2010/main" val="3951886733"/>
+        <p14:creationId xmlns:p14="http://schemas.microsoft.com/office/powerpoint/2010/main" xmlns="" val="3951886733"/>
       </p:ext>
     </p:extLst>
   </p:cSld>
@@ -1259,7 +1259,7 @@
     </p:spTree>
     <p:extLst>
       <p:ext uri="{BB962C8B-B14F-4D97-AF65-F5344CB8AC3E}">
-        <p14:creationId xmlns:p14="http://schemas.microsoft.com/office/powerpoint/2010/main" val="1588299535"/>
+        <p14:creationId xmlns:p14="http://schemas.microsoft.com/office/powerpoint/2010/main" xmlns="" val="1588299535"/>
       </p:ext>
     </p:extLst>
   </p:cSld>
@@ -1308,14 +1308,14 @@
           </a:ln>
           <a:extLst>
             <a:ext uri="{909E8E84-426E-40DD-AFC4-6F175D3DCCD1}">
-              <a14:hiddenFill xmlns:a14="http://schemas.microsoft.com/office/drawing/2010/main">
+              <a14:hiddenFill xmlns:a14="http://schemas.microsoft.com/office/drawing/2010/main" xmlns="">
                 <a:solidFill>
                   <a:srgbClr val="FFFFFF"/>
                 </a:solidFill>
               </a14:hiddenFill>
             </a:ext>
             <a:ext uri="{91240B29-F687-4F45-9708-019B960494DF}">
-              <a14:hiddenLine xmlns:a14="http://schemas.microsoft.com/office/drawing/2010/main" w="9525">
+              <a14:hiddenLine xmlns:a14="http://schemas.microsoft.com/office/drawing/2010/main" xmlns="" w="9525">
                 <a:solidFill>
                   <a:srgbClr val="000000"/>
                 </a:solidFill>
@@ -1731,7 +1731,7 @@
     </p:spTree>
     <p:extLst>
       <p:ext uri="{BB962C8B-B14F-4D97-AF65-F5344CB8AC3E}">
-        <p14:creationId xmlns:p14="http://schemas.microsoft.com/office/powerpoint/2010/main" val="3359836669"/>
+        <p14:creationId xmlns:p14="http://schemas.microsoft.com/office/powerpoint/2010/main" xmlns="" val="3359836669"/>
       </p:ext>
     </p:extLst>
   </p:cSld>
@@ -1761,7 +1761,7 @@
     </p:spTree>
     <p:extLst>
       <p:ext uri="{BB962C8B-B14F-4D97-AF65-F5344CB8AC3E}">
-        <p14:creationId xmlns:p14="http://schemas.microsoft.com/office/powerpoint/2010/main" val="413836109"/>
+        <p14:creationId xmlns:p14="http://schemas.microsoft.com/office/powerpoint/2010/main" xmlns="" val="413836109"/>
       </p:ext>
     </p:extLst>
   </p:cSld>
@@ -1861,7 +1861,7 @@
           <a:blip r:embed="rId2" cstate="print">
             <a:extLst>
               <a:ext uri="{28A0092B-C50C-407E-A947-70E740481C1C}">
-                <a14:useLocalDpi xmlns:a14="http://schemas.microsoft.com/office/drawing/2010/main" val="0"/>
+                <a14:useLocalDpi xmlns:a14="http://schemas.microsoft.com/office/drawing/2010/main" xmlns="" val="0"/>
               </a:ext>
             </a:extLst>
           </a:blip>
@@ -1884,14 +1884,14 @@
           </a:ln>
           <a:extLst>
             <a:ext uri="{909E8E84-426E-40DD-AFC4-6F175D3DCCD1}">
-              <a14:hiddenFill xmlns:a14="http://schemas.microsoft.com/office/drawing/2010/main">
+              <a14:hiddenFill xmlns:a14="http://schemas.microsoft.com/office/drawing/2010/main" xmlns="">
                 <a:solidFill>
                   <a:srgbClr val="FFFFFF"/>
                 </a:solidFill>
               </a14:hiddenFill>
             </a:ext>
             <a:ext uri="{91240B29-F687-4F45-9708-019B960494DF}">
-              <a14:hiddenLine xmlns:a14="http://schemas.microsoft.com/office/drawing/2010/main" w="9525">
+              <a14:hiddenLine xmlns:a14="http://schemas.microsoft.com/office/drawing/2010/main" xmlns="" w="9525">
                 <a:solidFill>
                   <a:srgbClr val="000000"/>
                 </a:solidFill>
@@ -1955,7 +1955,7 @@
     </p:spTree>
     <p:extLst>
       <p:ext uri="{BB962C8B-B14F-4D97-AF65-F5344CB8AC3E}">
-        <p14:creationId xmlns:p14="http://schemas.microsoft.com/office/powerpoint/2010/main" val="2156181659"/>
+        <p14:creationId xmlns:p14="http://schemas.microsoft.com/office/powerpoint/2010/main" xmlns="" val="2156181659"/>
       </p:ext>
     </p:extLst>
   </p:cSld>
@@ -2122,7 +2122,7 @@
     </p:spTree>
     <p:extLst>
       <p:ext uri="{BB962C8B-B14F-4D97-AF65-F5344CB8AC3E}">
-        <p14:creationId xmlns:p14="http://schemas.microsoft.com/office/powerpoint/2010/main" val="83598666"/>
+        <p14:creationId xmlns:p14="http://schemas.microsoft.com/office/powerpoint/2010/main" xmlns="" val="83598666"/>
       </p:ext>
     </p:extLst>
   </p:cSld>
@@ -2166,7 +2166,7 @@
           <a:blip r:embed="rId8" cstate="print">
             <a:extLst>
               <a:ext uri="{28A0092B-C50C-407E-A947-70E740481C1C}">
-                <a14:useLocalDpi xmlns:a14="http://schemas.microsoft.com/office/drawing/2010/main" val="0"/>
+                <a14:useLocalDpi xmlns:a14="http://schemas.microsoft.com/office/drawing/2010/main" xmlns="" val="0"/>
               </a:ext>
             </a:extLst>
           </a:blip>
@@ -2189,14 +2189,14 @@
           </a:ln>
           <a:extLst>
             <a:ext uri="{909E8E84-426E-40DD-AFC4-6F175D3DCCD1}">
-              <a14:hiddenFill xmlns:a14="http://schemas.microsoft.com/office/drawing/2010/main">
+              <a14:hiddenFill xmlns:a14="http://schemas.microsoft.com/office/drawing/2010/main" xmlns="">
                 <a:solidFill>
                   <a:srgbClr val="FFFFFF"/>
                 </a:solidFill>
               </a14:hiddenFill>
             </a:ext>
             <a:ext uri="{91240B29-F687-4F45-9708-019B960494DF}">
-              <a14:hiddenLine xmlns:a14="http://schemas.microsoft.com/office/drawing/2010/main" w="9525">
+              <a14:hiddenLine xmlns:a14="http://schemas.microsoft.com/office/drawing/2010/main" xmlns="" w="9525">
                 <a:solidFill>
                   <a:srgbClr val="000000"/>
                 </a:solidFill>
@@ -2269,7 +2269,7 @@
           <a:blip r:embed="rId9" cstate="print">
             <a:extLst>
               <a:ext uri="{28A0092B-C50C-407E-A947-70E740481C1C}">
-                <a14:useLocalDpi xmlns:a14="http://schemas.microsoft.com/office/drawing/2010/main" val="0"/>
+                <a14:useLocalDpi xmlns:a14="http://schemas.microsoft.com/office/drawing/2010/main" xmlns="" val="0"/>
               </a:ext>
             </a:extLst>
           </a:blip>
@@ -2292,14 +2292,14 @@
           </a:ln>
           <a:extLst>
             <a:ext uri="{909E8E84-426E-40DD-AFC4-6F175D3DCCD1}">
-              <a14:hiddenFill xmlns:a14="http://schemas.microsoft.com/office/drawing/2010/main">
+              <a14:hiddenFill xmlns:a14="http://schemas.microsoft.com/office/drawing/2010/main" xmlns="">
                 <a:solidFill>
                   <a:srgbClr val="FFFFFF"/>
                 </a:solidFill>
               </a14:hiddenFill>
             </a:ext>
             <a:ext uri="{91240B29-F687-4F45-9708-019B960494DF}">
-              <a14:hiddenLine xmlns:a14="http://schemas.microsoft.com/office/drawing/2010/main" w="9525">
+              <a14:hiddenLine xmlns:a14="http://schemas.microsoft.com/office/drawing/2010/main" xmlns="" w="9525">
                 <a:solidFill>
                   <a:srgbClr val="000000"/>
                 </a:solidFill>
@@ -2865,14 +2865,14 @@
             </a:ln>
             <a:extLst>
               <a:ext uri="{909E8E84-426E-40DD-AFC4-6F175D3DCCD1}">
-                <a14:hiddenFill xmlns:a14="http://schemas.microsoft.com/office/drawing/2010/main">
+                <a14:hiddenFill xmlns:a14="http://schemas.microsoft.com/office/drawing/2010/main" xmlns="">
                   <a:solidFill>
                     <a:srgbClr val="FFFFFF"/>
                   </a:solidFill>
                 </a14:hiddenFill>
               </a:ext>
               <a:ext uri="{91240B29-F687-4F45-9708-019B960494DF}">
-                <a14:hiddenLine xmlns:a14="http://schemas.microsoft.com/office/drawing/2010/main" w="9525">
+                <a14:hiddenLine xmlns:a14="http://schemas.microsoft.com/office/drawing/2010/main" xmlns="" w="9525">
                   <a:solidFill>
                     <a:srgbClr val="000000"/>
                   </a:solidFill>
@@ -3022,14 +3022,14 @@
             </a:ln>
             <a:extLst>
               <a:ext uri="{909E8E84-426E-40DD-AFC4-6F175D3DCCD1}">
-                <a14:hiddenFill xmlns:a14="http://schemas.microsoft.com/office/drawing/2010/main">
+                <a14:hiddenFill xmlns:a14="http://schemas.microsoft.com/office/drawing/2010/main" xmlns="">
                   <a:solidFill>
                     <a:srgbClr val="FFFFFF"/>
                   </a:solidFill>
                 </a14:hiddenFill>
               </a:ext>
               <a:ext uri="{91240B29-F687-4F45-9708-019B960494DF}">
-                <a14:hiddenLine xmlns:a14="http://schemas.microsoft.com/office/drawing/2010/main" w="9525">
+                <a14:hiddenLine xmlns:a14="http://schemas.microsoft.com/office/drawing/2010/main" xmlns="" w="9525">
                   <a:solidFill>
                     <a:srgbClr val="000000"/>
                   </a:solidFill>
@@ -3406,10 +3406,10 @@
           <p:nvPr/>
         </p:nvPicPr>
         <p:blipFill>
-          <a:blip r:embed="rId2">
+          <a:blip r:embed="rId2" cstate="print">
             <a:extLst>
               <a:ext uri="{28A0092B-C50C-407E-A947-70E740481C1C}">
-                <a14:useLocalDpi xmlns:a14="http://schemas.microsoft.com/office/drawing/2010/main" val="0"/>
+                <a14:useLocalDpi xmlns:a14="http://schemas.microsoft.com/office/drawing/2010/main" xmlns="" val="0"/>
               </a:ext>
             </a:extLst>
           </a:blip>
@@ -3564,10 +3564,10 @@
           <p:nvPr/>
         </p:nvPicPr>
         <p:blipFill>
-          <a:blip r:embed="rId2">
+          <a:blip r:embed="rId2" cstate="print">
             <a:extLst>
               <a:ext uri="{28A0092B-C50C-407E-A947-70E740481C1C}">
-                <a14:useLocalDpi xmlns:a14="http://schemas.microsoft.com/office/drawing/2010/main" val="0"/>
+                <a14:useLocalDpi xmlns:a14="http://schemas.microsoft.com/office/drawing/2010/main" xmlns="" val="0"/>
               </a:ext>
             </a:extLst>
           </a:blip>
@@ -3690,14 +3690,14 @@
             </a:ln>
             <a:extLst>
               <a:ext uri="{909E8E84-426E-40DD-AFC4-6F175D3DCCD1}">
-                <a14:hiddenFill xmlns:a14="http://schemas.microsoft.com/office/drawing/2010/main">
+                <a14:hiddenFill xmlns:a14="http://schemas.microsoft.com/office/drawing/2010/main" xmlns="">
                   <a:solidFill>
                     <a:srgbClr val="FFFFFF"/>
                   </a:solidFill>
                 </a14:hiddenFill>
               </a:ext>
               <a:ext uri="{91240B29-F687-4F45-9708-019B960494DF}">
-                <a14:hiddenLine xmlns:a14="http://schemas.microsoft.com/office/drawing/2010/main" w="9525">
+                <a14:hiddenLine xmlns:a14="http://schemas.microsoft.com/office/drawing/2010/main" xmlns="" w="9525">
                   <a:solidFill>
                     <a:srgbClr val="000000"/>
                   </a:solidFill>
@@ -3847,14 +3847,14 @@
             </a:ln>
             <a:extLst>
               <a:ext uri="{909E8E84-426E-40DD-AFC4-6F175D3DCCD1}">
-                <a14:hiddenFill xmlns:a14="http://schemas.microsoft.com/office/drawing/2010/main">
+                <a14:hiddenFill xmlns:a14="http://schemas.microsoft.com/office/drawing/2010/main" xmlns="">
                   <a:solidFill>
                     <a:srgbClr val="FFFFFF"/>
                   </a:solidFill>
                 </a14:hiddenFill>
               </a:ext>
               <a:ext uri="{91240B29-F687-4F45-9708-019B960494DF}">
-                <a14:hiddenLine xmlns:a14="http://schemas.microsoft.com/office/drawing/2010/main" w="9525">
+                <a14:hiddenLine xmlns:a14="http://schemas.microsoft.com/office/drawing/2010/main" xmlns="" w="9525">
                   <a:solidFill>
                     <a:srgbClr val="000000"/>
                   </a:solidFill>
@@ -4118,7 +4118,7 @@
     </p:spTree>
     <p:extLst>
       <p:ext uri="{BB962C8B-B14F-4D97-AF65-F5344CB8AC3E}">
-        <p14:creationId xmlns:p14="http://schemas.microsoft.com/office/powerpoint/2010/main" val="2461302196"/>
+        <p14:creationId xmlns:p14="http://schemas.microsoft.com/office/powerpoint/2010/main" xmlns="" val="2461302196"/>
       </p:ext>
     </p:extLst>
   </p:cSld>
@@ -4197,14 +4197,14 @@
           </a:xfrm>
           <a:extLst>
             <a:ext uri="{909E8E84-426E-40DD-AFC4-6F175D3DCCD1}">
-              <a14:hiddenFill xmlns:a14="http://schemas.microsoft.com/office/drawing/2010/main">
+              <a14:hiddenFill xmlns:a14="http://schemas.microsoft.com/office/drawing/2010/main" xmlns="">
                 <a:solidFill>
                   <a:srgbClr val="FFFFFF"/>
                 </a:solidFill>
               </a14:hiddenFill>
             </a:ext>
             <a:ext uri="{91240B29-F687-4F45-9708-019B960494DF}">
-              <a14:hiddenLine xmlns:a14="http://schemas.microsoft.com/office/drawing/2010/main" w="9525">
+              <a14:hiddenLine xmlns:a14="http://schemas.microsoft.com/office/drawing/2010/main" xmlns="" w="9525">
                 <a:solidFill>
                   <a:srgbClr val="000000"/>
                 </a:solidFill>
@@ -4371,7 +4371,7 @@
     </p:spTree>
     <p:extLst>
       <p:ext uri="{BB962C8B-B14F-4D97-AF65-F5344CB8AC3E}">
-        <p14:creationId xmlns:p14="http://schemas.microsoft.com/office/powerpoint/2010/main" val="1166103754"/>
+        <p14:creationId xmlns:p14="http://schemas.microsoft.com/office/powerpoint/2010/main" xmlns="" val="1166103754"/>
       </p:ext>
     </p:extLst>
   </p:cSld>
@@ -4439,10 +4439,10 @@
           <p:nvPr/>
         </p:nvPicPr>
         <p:blipFill>
-          <a:blip r:embed="rId2">
+          <a:blip r:embed="rId2" cstate="print">
             <a:extLst>
               <a:ext uri="{28A0092B-C50C-407E-A947-70E740481C1C}">
-                <a14:useLocalDpi xmlns:a14="http://schemas.microsoft.com/office/drawing/2010/main" val="0"/>
+                <a14:useLocalDpi xmlns:a14="http://schemas.microsoft.com/office/drawing/2010/main" xmlns="" val="0"/>
               </a:ext>
             </a:extLst>
           </a:blip>
@@ -4463,7 +4463,7 @@
     </p:spTree>
     <p:extLst>
       <p:ext uri="{BB962C8B-B14F-4D97-AF65-F5344CB8AC3E}">
-        <p14:creationId xmlns:p14="http://schemas.microsoft.com/office/powerpoint/2010/main" val="4100715659"/>
+        <p14:creationId xmlns:p14="http://schemas.microsoft.com/office/powerpoint/2010/main" xmlns="" val="4100715659"/>
       </p:ext>
     </p:extLst>
   </p:cSld>
@@ -4539,14 +4539,14 @@
           </a:xfrm>
           <a:extLst>
             <a:ext uri="{909E8E84-426E-40DD-AFC4-6F175D3DCCD1}">
-              <a14:hiddenFill xmlns:a14="http://schemas.microsoft.com/office/drawing/2010/main">
+              <a14:hiddenFill xmlns:a14="http://schemas.microsoft.com/office/drawing/2010/main" xmlns="">
                 <a:solidFill>
                   <a:srgbClr val="FFFFFF"/>
                 </a:solidFill>
               </a14:hiddenFill>
             </a:ext>
             <a:ext uri="{91240B29-F687-4F45-9708-019B960494DF}">
-              <a14:hiddenLine xmlns:a14="http://schemas.microsoft.com/office/drawing/2010/main" w="9525">
+              <a14:hiddenLine xmlns:a14="http://schemas.microsoft.com/office/drawing/2010/main" xmlns="" w="9525">
                 <a:solidFill>
                   <a:srgbClr val="000000"/>
                 </a:solidFill>
@@ -4587,7 +4587,7 @@
           <p:cNvPr id="2" name="Picture 1">
             <a:extLst>
               <a:ext uri="{FF2B5EF4-FFF2-40B4-BE49-F238E27FC236}">
-                <a16:creationId xmlns="" xmlns:a16="http://schemas.microsoft.com/office/drawing/2014/main" id="{F5A00150-EB0A-4F28-911C-141811EBFBD4}"/>
+                <a16:creationId xmlns:a16="http://schemas.microsoft.com/office/drawing/2014/main" xmlns="" id="{F5A00150-EB0A-4F28-911C-141811EBFBD4}"/>
               </a:ext>
             </a:extLst>
           </p:cNvPr>
@@ -4597,7 +4597,7 @@
           <p:nvPr/>
         </p:nvPicPr>
         <p:blipFill rotWithShape="1">
-          <a:blip r:embed="rId2"/>
+          <a:blip r:embed="rId2" cstate="print"/>
           <a:srcRect b="5494"/>
           <a:stretch/>
         </p:blipFill>
@@ -4614,7 +4614,7 @@
     </p:spTree>
     <p:extLst>
       <p:ext uri="{BB962C8B-B14F-4D97-AF65-F5344CB8AC3E}">
-        <p14:creationId xmlns:p14="http://schemas.microsoft.com/office/powerpoint/2010/main" val="4234705847"/>
+        <p14:creationId xmlns:p14="http://schemas.microsoft.com/office/powerpoint/2010/main" xmlns="" val="4234705847"/>
       </p:ext>
     </p:extLst>
   </p:cSld>
@@ -4693,14 +4693,14 @@
           </a:xfrm>
           <a:extLst>
             <a:ext uri="{909E8E84-426E-40DD-AFC4-6F175D3DCCD1}">
-              <a14:hiddenFill xmlns:a14="http://schemas.microsoft.com/office/drawing/2010/main">
+              <a14:hiddenFill xmlns:a14="http://schemas.microsoft.com/office/drawing/2010/main" xmlns="">
                 <a:solidFill>
                   <a:srgbClr val="FFFFFF"/>
                 </a:solidFill>
               </a14:hiddenFill>
             </a:ext>
             <a:ext uri="{91240B29-F687-4F45-9708-019B960494DF}">
-              <a14:hiddenLine xmlns:a14="http://schemas.microsoft.com/office/drawing/2010/main" w="9525">
+              <a14:hiddenLine xmlns:a14="http://schemas.microsoft.com/office/drawing/2010/main" xmlns="" w="9525">
                 <a:solidFill>
                   <a:srgbClr val="000000"/>
                 </a:solidFill>
@@ -4741,7 +4741,7 @@
           <p:cNvPr id="3" name="Picture 2">
             <a:extLst>
               <a:ext uri="{FF2B5EF4-FFF2-40B4-BE49-F238E27FC236}">
-                <a16:creationId xmlns="" xmlns:a16="http://schemas.microsoft.com/office/drawing/2014/main" id="{2B1A4BC2-7DE1-4299-98E4-7ED739A14DCC}"/>
+                <a16:creationId xmlns:a16="http://schemas.microsoft.com/office/drawing/2014/main" xmlns="" id="{2B1A4BC2-7DE1-4299-98E4-7ED739A14DCC}"/>
               </a:ext>
             </a:extLst>
           </p:cNvPr>
@@ -4751,7 +4751,7 @@
           <p:nvPr/>
         </p:nvPicPr>
         <p:blipFill>
-          <a:blip r:embed="rId2"/>
+          <a:blip r:embed="rId2" cstate="print"/>
           <a:stretch>
             <a:fillRect/>
           </a:stretch>
@@ -4769,7 +4769,7 @@
     </p:spTree>
     <p:extLst>
       <p:ext uri="{BB962C8B-B14F-4D97-AF65-F5344CB8AC3E}">
-        <p14:creationId xmlns:p14="http://schemas.microsoft.com/office/powerpoint/2010/main" val="324456396"/>
+        <p14:creationId xmlns:p14="http://schemas.microsoft.com/office/powerpoint/2010/main" xmlns="" val="324456396"/>
       </p:ext>
     </p:extLst>
   </p:cSld>
@@ -4848,14 +4848,14 @@
           </a:xfrm>
           <a:extLst>
             <a:ext uri="{909E8E84-426E-40DD-AFC4-6F175D3DCCD1}">
-              <a14:hiddenFill xmlns:a14="http://schemas.microsoft.com/office/drawing/2010/main">
+              <a14:hiddenFill xmlns:a14="http://schemas.microsoft.com/office/drawing/2010/main" xmlns="">
                 <a:solidFill>
                   <a:srgbClr val="FFFFFF"/>
                 </a:solidFill>
               </a14:hiddenFill>
             </a:ext>
             <a:ext uri="{91240B29-F687-4F45-9708-019B960494DF}">
-              <a14:hiddenLine xmlns:a14="http://schemas.microsoft.com/office/drawing/2010/main" w="9525">
+              <a14:hiddenLine xmlns:a14="http://schemas.microsoft.com/office/drawing/2010/main" xmlns="" w="9525">
                 <a:solidFill>
                   <a:srgbClr val="000000"/>
                 </a:solidFill>
@@ -4896,7 +4896,7 @@
           <p:cNvPr id="2" name="Picture 1">
             <a:extLst>
               <a:ext uri="{FF2B5EF4-FFF2-40B4-BE49-F238E27FC236}">
-                <a16:creationId xmlns="" xmlns:a16="http://schemas.microsoft.com/office/drawing/2014/main" id="{21DDFF5F-FFF6-4DB6-AD4E-6794E13280AB}"/>
+                <a16:creationId xmlns:a16="http://schemas.microsoft.com/office/drawing/2014/main" xmlns="" id="{21DDFF5F-FFF6-4DB6-AD4E-6794E13280AB}"/>
               </a:ext>
             </a:extLst>
           </p:cNvPr>
@@ -4906,7 +4906,7 @@
           <p:nvPr/>
         </p:nvPicPr>
         <p:blipFill>
-          <a:blip r:embed="rId2"/>
+          <a:blip r:embed="rId2" cstate="print"/>
           <a:stretch>
             <a:fillRect/>
           </a:stretch>
@@ -4924,7 +4924,7 @@
     </p:spTree>
     <p:extLst>
       <p:ext uri="{BB962C8B-B14F-4D97-AF65-F5344CB8AC3E}">
-        <p14:creationId xmlns:p14="http://schemas.microsoft.com/office/powerpoint/2010/main" val="3523015254"/>
+        <p14:creationId xmlns:p14="http://schemas.microsoft.com/office/powerpoint/2010/main" xmlns="" val="3523015254"/>
       </p:ext>
     </p:extLst>
   </p:cSld>
@@ -5003,14 +5003,14 @@
           </a:xfrm>
           <a:extLst>
             <a:ext uri="{909E8E84-426E-40DD-AFC4-6F175D3DCCD1}">
-              <a14:hiddenFill xmlns:a14="http://schemas.microsoft.com/office/drawing/2010/main">
+              <a14:hiddenFill xmlns:a14="http://schemas.microsoft.com/office/drawing/2010/main" xmlns="">
                 <a:solidFill>
                   <a:srgbClr val="FFFFFF"/>
                 </a:solidFill>
               </a14:hiddenFill>
             </a:ext>
             <a:ext uri="{91240B29-F687-4F45-9708-019B960494DF}">
-              <a14:hiddenLine xmlns:a14="http://schemas.microsoft.com/office/drawing/2010/main" w="9525">
+              <a14:hiddenLine xmlns:a14="http://schemas.microsoft.com/office/drawing/2010/main" xmlns="" w="9525">
                 <a:solidFill>
                   <a:srgbClr val="000000"/>
                 </a:solidFill>
@@ -5051,7 +5051,7 @@
           <p:cNvPr id="3" name="Picture 2">
             <a:extLst>
               <a:ext uri="{FF2B5EF4-FFF2-40B4-BE49-F238E27FC236}">
-                <a16:creationId xmlns="" xmlns:a16="http://schemas.microsoft.com/office/drawing/2014/main" id="{69168DE8-9710-4C4D-825A-7E6F62278493}"/>
+                <a16:creationId xmlns:a16="http://schemas.microsoft.com/office/drawing/2014/main" xmlns="" id="{69168DE8-9710-4C4D-825A-7E6F62278493}"/>
               </a:ext>
             </a:extLst>
           </p:cNvPr>
@@ -5061,7 +5061,7 @@
           <p:nvPr/>
         </p:nvPicPr>
         <p:blipFill>
-          <a:blip r:embed="rId2"/>
+          <a:blip r:embed="rId2" cstate="print"/>
           <a:stretch>
             <a:fillRect/>
           </a:stretch>
@@ -5079,7 +5079,7 @@
     </p:spTree>
     <p:extLst>
       <p:ext uri="{BB962C8B-B14F-4D97-AF65-F5344CB8AC3E}">
-        <p14:creationId xmlns:p14="http://schemas.microsoft.com/office/powerpoint/2010/main" val="3817239344"/>
+        <p14:creationId xmlns:p14="http://schemas.microsoft.com/office/powerpoint/2010/main" xmlns="" val="3817239344"/>
       </p:ext>
     </p:extLst>
   </p:cSld>
@@ -5158,14 +5158,14 @@
           </a:xfrm>
           <a:extLst>
             <a:ext uri="{909E8E84-426E-40DD-AFC4-6F175D3DCCD1}">
-              <a14:hiddenFill xmlns:a14="http://schemas.microsoft.com/office/drawing/2010/main">
+              <a14:hiddenFill xmlns:a14="http://schemas.microsoft.com/office/drawing/2010/main" xmlns="">
                 <a:solidFill>
                   <a:srgbClr val="FFFFFF"/>
                 </a:solidFill>
               </a14:hiddenFill>
             </a:ext>
             <a:ext uri="{91240B29-F687-4F45-9708-019B960494DF}">
-              <a14:hiddenLine xmlns:a14="http://schemas.microsoft.com/office/drawing/2010/main" w="9525">
+              <a14:hiddenLine xmlns:a14="http://schemas.microsoft.com/office/drawing/2010/main" xmlns="" w="9525">
                 <a:solidFill>
                   <a:srgbClr val="000000"/>
                 </a:solidFill>
@@ -5206,7 +5206,7 @@
           <p:cNvPr id="2" name="Picture 1">
             <a:extLst>
               <a:ext uri="{FF2B5EF4-FFF2-40B4-BE49-F238E27FC236}">
-                <a16:creationId xmlns="" xmlns:a16="http://schemas.microsoft.com/office/drawing/2014/main" id="{B6A781C1-AA15-45C9-BF02-66987FF55897}"/>
+                <a16:creationId xmlns:a16="http://schemas.microsoft.com/office/drawing/2014/main" xmlns="" id="{B6A781C1-AA15-45C9-BF02-66987FF55897}"/>
               </a:ext>
             </a:extLst>
           </p:cNvPr>
@@ -5216,7 +5216,7 @@
           <p:nvPr/>
         </p:nvPicPr>
         <p:blipFill>
-          <a:blip r:embed="rId2"/>
+          <a:blip r:embed="rId2" cstate="print"/>
           <a:stretch>
             <a:fillRect/>
           </a:stretch>
@@ -5234,7 +5234,7 @@
     </p:spTree>
     <p:extLst>
       <p:ext uri="{BB962C8B-B14F-4D97-AF65-F5344CB8AC3E}">
-        <p14:creationId xmlns:p14="http://schemas.microsoft.com/office/powerpoint/2010/main" val="1697811339"/>
+        <p14:creationId xmlns:p14="http://schemas.microsoft.com/office/powerpoint/2010/main" xmlns="" val="1697811339"/>
       </p:ext>
     </p:extLst>
   </p:cSld>
@@ -5349,7 +5349,7 @@
           <p:nvPr/>
         </p:nvPicPr>
         <p:blipFill>
-          <a:blip r:embed="rId3"/>
+          <a:blip r:embed="rId3" cstate="print"/>
           <a:stretch>
             <a:fillRect/>
           </a:stretch>
@@ -5465,14 +5465,14 @@
             </a:ln>
             <a:extLst>
               <a:ext uri="{909E8E84-426E-40DD-AFC4-6F175D3DCCD1}">
-                <a14:hiddenFill xmlns:a14="http://schemas.microsoft.com/office/drawing/2010/main">
+                <a14:hiddenFill xmlns:a14="http://schemas.microsoft.com/office/drawing/2010/main" xmlns="">
                   <a:solidFill>
                     <a:srgbClr val="FFFFFF"/>
                   </a:solidFill>
                 </a14:hiddenFill>
               </a:ext>
               <a:ext uri="{91240B29-F687-4F45-9708-019B960494DF}">
-                <a14:hiddenLine xmlns:a14="http://schemas.microsoft.com/office/drawing/2010/main" w="9525">
+                <a14:hiddenLine xmlns:a14="http://schemas.microsoft.com/office/drawing/2010/main" xmlns="" w="9525">
                   <a:solidFill>
                     <a:srgbClr val="000000"/>
                   </a:solidFill>
@@ -5622,14 +5622,14 @@
             </a:ln>
             <a:extLst>
               <a:ext uri="{909E8E84-426E-40DD-AFC4-6F175D3DCCD1}">
-                <a14:hiddenFill xmlns:a14="http://schemas.microsoft.com/office/drawing/2010/main">
+                <a14:hiddenFill xmlns:a14="http://schemas.microsoft.com/office/drawing/2010/main" xmlns="">
                   <a:solidFill>
                     <a:srgbClr val="FFFFFF"/>
                   </a:solidFill>
                 </a14:hiddenFill>
               </a:ext>
               <a:ext uri="{91240B29-F687-4F45-9708-019B960494DF}">
-                <a14:hiddenLine xmlns:a14="http://schemas.microsoft.com/office/drawing/2010/main" w="9525">
+                <a14:hiddenLine xmlns:a14="http://schemas.microsoft.com/office/drawing/2010/main" xmlns="" w="9525">
                   <a:solidFill>
                     <a:srgbClr val="000000"/>
                   </a:solidFill>
@@ -5874,7 +5874,7 @@
     </p:spTree>
     <p:extLst>
       <p:ext uri="{BB962C8B-B14F-4D97-AF65-F5344CB8AC3E}">
-        <p14:creationId xmlns:p14="http://schemas.microsoft.com/office/powerpoint/2010/main" val="681014556"/>
+        <p14:creationId xmlns:p14="http://schemas.microsoft.com/office/powerpoint/2010/main" xmlns="" val="681014556"/>
       </p:ext>
     </p:extLst>
   </p:cSld>
@@ -6389,7 +6389,7 @@
     </p:spTree>
     <p:extLst>
       <p:ext uri="{BB962C8B-B14F-4D97-AF65-F5344CB8AC3E}">
-        <p14:creationId xmlns:p14="http://schemas.microsoft.com/office/powerpoint/2010/main" val="3812644496"/>
+        <p14:creationId xmlns:p14="http://schemas.microsoft.com/office/powerpoint/2010/main" xmlns="" val="3812644496"/>
       </p:ext>
     </p:extLst>
   </p:cSld>
@@ -6616,10 +6616,10 @@
           <p:nvPr/>
         </p:nvPicPr>
         <p:blipFill>
-          <a:blip r:embed="rId2">
+          <a:blip r:embed="rId2" cstate="print">
             <a:extLst>
               <a:ext uri="{28A0092B-C50C-407E-A947-70E740481C1C}">
-                <a14:useLocalDpi xmlns:a14="http://schemas.microsoft.com/office/drawing/2010/main" val="0"/>
+                <a14:useLocalDpi xmlns:a14="http://schemas.microsoft.com/office/drawing/2010/main" xmlns="" val="0"/>
               </a:ext>
             </a:extLst>
           </a:blip>
@@ -6640,7 +6640,7 @@
     </p:spTree>
     <p:extLst>
       <p:ext uri="{BB962C8B-B14F-4D97-AF65-F5344CB8AC3E}">
-        <p14:creationId xmlns:p14="http://schemas.microsoft.com/office/powerpoint/2010/main" val="1625217003"/>
+        <p14:creationId xmlns:p14="http://schemas.microsoft.com/office/powerpoint/2010/main" xmlns="" val="1625217003"/>
       </p:ext>
     </p:extLst>
   </p:cSld>
@@ -6867,10 +6867,10 @@
           <p:nvPr/>
         </p:nvPicPr>
         <p:blipFill>
-          <a:blip r:embed="rId2">
+          <a:blip r:embed="rId2" cstate="print">
             <a:extLst>
               <a:ext uri="{28A0092B-C50C-407E-A947-70E740481C1C}">
-                <a14:useLocalDpi xmlns:a14="http://schemas.microsoft.com/office/drawing/2010/main" val="0"/>
+                <a14:useLocalDpi xmlns:a14="http://schemas.microsoft.com/office/drawing/2010/main" xmlns="" val="0"/>
               </a:ext>
             </a:extLst>
           </a:blip>
@@ -6891,7 +6891,7 @@
     </p:spTree>
     <p:extLst>
       <p:ext uri="{BB962C8B-B14F-4D97-AF65-F5344CB8AC3E}">
-        <p14:creationId xmlns:p14="http://schemas.microsoft.com/office/powerpoint/2010/main" val="1256551592"/>
+        <p14:creationId xmlns:p14="http://schemas.microsoft.com/office/powerpoint/2010/main" xmlns="" val="1256551592"/>
       </p:ext>
     </p:extLst>
   </p:cSld>
@@ -7118,10 +7118,10 @@
           <p:nvPr/>
         </p:nvPicPr>
         <p:blipFill>
-          <a:blip r:embed="rId2">
+          <a:blip r:embed="rId2" cstate="print">
             <a:extLst>
               <a:ext uri="{28A0092B-C50C-407E-A947-70E740481C1C}">
-                <a14:useLocalDpi xmlns:a14="http://schemas.microsoft.com/office/drawing/2010/main" val="0"/>
+                <a14:useLocalDpi xmlns:a14="http://schemas.microsoft.com/office/drawing/2010/main" xmlns="" val="0"/>
               </a:ext>
             </a:extLst>
           </a:blip>
@@ -7142,7 +7142,7 @@
     </p:spTree>
     <p:extLst>
       <p:ext uri="{BB962C8B-B14F-4D97-AF65-F5344CB8AC3E}">
-        <p14:creationId xmlns:p14="http://schemas.microsoft.com/office/powerpoint/2010/main" val="3402891464"/>
+        <p14:creationId xmlns:p14="http://schemas.microsoft.com/office/powerpoint/2010/main" xmlns="" val="3402891464"/>
       </p:ext>
     </p:extLst>
   </p:cSld>
@@ -7362,10 +7362,10 @@
           <p:nvPr/>
         </p:nvPicPr>
         <p:blipFill>
-          <a:blip r:embed="rId2">
+          <a:blip r:embed="rId2" cstate="print">
             <a:extLst>
               <a:ext uri="{28A0092B-C50C-407E-A947-70E740481C1C}">
-                <a14:useLocalDpi xmlns:a14="http://schemas.microsoft.com/office/drawing/2010/main" val="0"/>
+                <a14:useLocalDpi xmlns:a14="http://schemas.microsoft.com/office/drawing/2010/main" xmlns="" val="0"/>
               </a:ext>
             </a:extLst>
           </a:blip>
@@ -7386,7 +7386,7 @@
     </p:spTree>
     <p:extLst>
       <p:ext uri="{BB962C8B-B14F-4D97-AF65-F5344CB8AC3E}">
-        <p14:creationId xmlns:p14="http://schemas.microsoft.com/office/powerpoint/2010/main" val="2843391693"/>
+        <p14:creationId xmlns:p14="http://schemas.microsoft.com/office/powerpoint/2010/main" xmlns="" val="2843391693"/>
       </p:ext>
     </p:extLst>
   </p:cSld>
@@ -7606,10 +7606,10 @@
           <p:nvPr/>
         </p:nvPicPr>
         <p:blipFill>
-          <a:blip r:embed="rId2">
+          <a:blip r:embed="rId2" cstate="print">
             <a:extLst>
               <a:ext uri="{28A0092B-C50C-407E-A947-70E740481C1C}">
-                <a14:useLocalDpi xmlns:a14="http://schemas.microsoft.com/office/drawing/2010/main" val="0"/>
+                <a14:useLocalDpi xmlns:a14="http://schemas.microsoft.com/office/drawing/2010/main" xmlns="" val="0"/>
               </a:ext>
             </a:extLst>
           </a:blip>
@@ -7630,7 +7630,7 @@
     </p:spTree>
     <p:extLst>
       <p:ext uri="{BB962C8B-B14F-4D97-AF65-F5344CB8AC3E}">
-        <p14:creationId xmlns:p14="http://schemas.microsoft.com/office/powerpoint/2010/main" val="3776007642"/>
+        <p14:creationId xmlns:p14="http://schemas.microsoft.com/office/powerpoint/2010/main" xmlns="" val="3776007642"/>
       </p:ext>
     </p:extLst>
   </p:cSld>
@@ -7730,14 +7730,14 @@
             </a:ln>
             <a:extLst>
               <a:ext uri="{909E8E84-426E-40DD-AFC4-6F175D3DCCD1}">
-                <a14:hiddenFill xmlns:a14="http://schemas.microsoft.com/office/drawing/2010/main">
+                <a14:hiddenFill xmlns:a14="http://schemas.microsoft.com/office/drawing/2010/main" xmlns="">
                   <a:solidFill>
                     <a:srgbClr val="FFFFFF"/>
                   </a:solidFill>
                 </a14:hiddenFill>
               </a:ext>
               <a:ext uri="{91240B29-F687-4F45-9708-019B960494DF}">
-                <a14:hiddenLine xmlns:a14="http://schemas.microsoft.com/office/drawing/2010/main" w="9525">
+                <a14:hiddenLine xmlns:a14="http://schemas.microsoft.com/office/drawing/2010/main" xmlns="" w="9525">
                   <a:solidFill>
                     <a:srgbClr val="000000"/>
                   </a:solidFill>
@@ -7887,14 +7887,14 @@
             </a:ln>
             <a:extLst>
               <a:ext uri="{909E8E84-426E-40DD-AFC4-6F175D3DCCD1}">
-                <a14:hiddenFill xmlns:a14="http://schemas.microsoft.com/office/drawing/2010/main">
+                <a14:hiddenFill xmlns:a14="http://schemas.microsoft.com/office/drawing/2010/main" xmlns="">
                   <a:solidFill>
                     <a:srgbClr val="FFFFFF"/>
                   </a:solidFill>
                 </a14:hiddenFill>
               </a:ext>
               <a:ext uri="{91240B29-F687-4F45-9708-019B960494DF}">
-                <a14:hiddenLine xmlns:a14="http://schemas.microsoft.com/office/drawing/2010/main" w="9525">
+                <a14:hiddenLine xmlns:a14="http://schemas.microsoft.com/office/drawing/2010/main" xmlns="" w="9525">
                   <a:solidFill>
                     <a:srgbClr val="000000"/>
                   </a:solidFill>
@@ -8523,7 +8523,7 @@
     </p:spTree>
     <p:extLst>
       <p:ext uri="{BB962C8B-B14F-4D97-AF65-F5344CB8AC3E}">
-        <p14:creationId xmlns:p14="http://schemas.microsoft.com/office/powerpoint/2010/main" val="2886033736"/>
+        <p14:creationId xmlns:p14="http://schemas.microsoft.com/office/powerpoint/2010/main" xmlns="" val="2886033736"/>
       </p:ext>
     </p:extLst>
   </p:cSld>
@@ -8583,7 +8583,7 @@
           <p:cNvPr id="3" name="Picture 2">
             <a:extLst>
               <a:ext uri="{FF2B5EF4-FFF2-40B4-BE49-F238E27FC236}">
-                <a16:creationId xmlns="" xmlns:a16="http://schemas.microsoft.com/office/drawing/2014/main" id="{1488CEA1-615B-4D4C-A130-F1FD32F916CA}"/>
+                <a16:creationId xmlns:a16="http://schemas.microsoft.com/office/drawing/2014/main" xmlns="" id="{1488CEA1-615B-4D4C-A130-F1FD32F916CA}"/>
               </a:ext>
             </a:extLst>
           </p:cNvPr>
@@ -8596,7 +8596,7 @@
           <a:blip r:embed="rId2" cstate="print">
             <a:extLst>
               <a:ext uri="{28A0092B-C50C-407E-A947-70E740481C1C}">
-                <a14:useLocalDpi xmlns:a14="http://schemas.microsoft.com/office/drawing/2010/main" val="0"/>
+                <a14:useLocalDpi xmlns:a14="http://schemas.microsoft.com/office/drawing/2010/main" xmlns="" val="0"/>
               </a:ext>
             </a:extLst>
           </a:blip>
@@ -8676,10 +8676,10 @@
           <p:nvPr/>
         </p:nvPicPr>
         <p:blipFill>
-          <a:blip r:embed="rId3">
+          <a:blip r:embed="rId3" cstate="print">
             <a:extLst>
               <a:ext uri="{28A0092B-C50C-407E-A947-70E740481C1C}">
-                <a14:useLocalDpi xmlns:a14="http://schemas.microsoft.com/office/drawing/2010/main" val="0"/>
+                <a14:useLocalDpi xmlns:a14="http://schemas.microsoft.com/office/drawing/2010/main" xmlns="" val="0"/>
               </a:ext>
             </a:extLst>
           </a:blip>
@@ -8762,7 +8762,7 @@
           <p:cNvPr id="1026" name="Picture 2">
             <a:extLst>
               <a:ext uri="{FF2B5EF4-FFF2-40B4-BE49-F238E27FC236}">
-                <a16:creationId xmlns="" xmlns:a16="http://schemas.microsoft.com/office/drawing/2014/main" id="{680D742B-523C-43D4-9E8B-E4709EAE39EB}"/>
+                <a16:creationId xmlns:a16="http://schemas.microsoft.com/office/drawing/2014/main" xmlns="" id="{680D742B-523C-43D4-9E8B-E4709EAE39EB}"/>
               </a:ext>
             </a:extLst>
           </p:cNvPr>
@@ -8772,10 +8772,10 @@
           <p:nvPr/>
         </p:nvPicPr>
         <p:blipFill>
-          <a:blip r:embed="rId2">
+          <a:blip r:embed="rId2" cstate="print">
             <a:extLst>
               <a:ext uri="{28A0092B-C50C-407E-A947-70E740481C1C}">
-                <a14:useLocalDpi xmlns:a14="http://schemas.microsoft.com/office/drawing/2010/main" val="0"/>
+                <a14:useLocalDpi xmlns:a14="http://schemas.microsoft.com/office/drawing/2010/main" xmlns="" val="0"/>
               </a:ext>
             </a:extLst>
           </a:blip>
@@ -8798,14 +8798,14 @@
           </a:ln>
           <a:extLst>
             <a:ext uri="{909E8E84-426E-40DD-AFC4-6F175D3DCCD1}">
-              <a14:hiddenFill xmlns:a14="http://schemas.microsoft.com/office/drawing/2010/main">
+              <a14:hiddenFill xmlns:a14="http://schemas.microsoft.com/office/drawing/2010/main" xmlns="">
                 <a:solidFill>
                   <a:srgbClr val="FFFFFF"/>
                 </a:solidFill>
               </a14:hiddenFill>
             </a:ext>
             <a:ext uri="{91240B29-F687-4F45-9708-019B960494DF}">
-              <a14:hiddenLine xmlns:a14="http://schemas.microsoft.com/office/drawing/2010/main" w="9525">
+              <a14:hiddenLine xmlns:a14="http://schemas.microsoft.com/office/drawing/2010/main" xmlns="" w="9525">
                 <a:solidFill>
                   <a:srgbClr val="000000"/>
                 </a:solidFill>
@@ -8820,7 +8820,7 @@
     </p:spTree>
     <p:extLst>
       <p:ext uri="{BB962C8B-B14F-4D97-AF65-F5344CB8AC3E}">
-        <p14:creationId xmlns:p14="http://schemas.microsoft.com/office/powerpoint/2010/main" val="1781569390"/>
+        <p14:creationId xmlns:p14="http://schemas.microsoft.com/office/powerpoint/2010/main" xmlns="" val="1781569390"/>
       </p:ext>
     </p:extLst>
   </p:cSld>
@@ -8855,7 +8855,7 @@
           <p:cNvPr id="4" name="Título 3">
             <a:extLst>
               <a:ext uri="{FF2B5EF4-FFF2-40B4-BE49-F238E27FC236}">
-                <a16:creationId xmlns="" xmlns:a16="http://schemas.microsoft.com/office/drawing/2014/main" id="{26BCFAA2-D859-44BC-AFEE-2D5119DC4C72}"/>
+                <a16:creationId xmlns:a16="http://schemas.microsoft.com/office/drawing/2014/main" xmlns="" id="{26BCFAA2-D859-44BC-AFEE-2D5119DC4C72}"/>
               </a:ext>
             </a:extLst>
           </p:cNvPr>
@@ -8891,7 +8891,7 @@
           <p:cNvPr id="3" name="Picture 2">
             <a:extLst>
               <a:ext uri="{FF2B5EF4-FFF2-40B4-BE49-F238E27FC236}">
-                <a16:creationId xmlns="" xmlns:a16="http://schemas.microsoft.com/office/drawing/2014/main" id="{697244E8-4C32-432B-82C5-5F541E652E84}"/>
+                <a16:creationId xmlns:a16="http://schemas.microsoft.com/office/drawing/2014/main" xmlns="" id="{697244E8-4C32-432B-82C5-5F541E652E84}"/>
               </a:ext>
             </a:extLst>
           </p:cNvPr>
@@ -8901,7 +8901,7 @@
           <p:nvPr/>
         </p:nvPicPr>
         <p:blipFill>
-          <a:blip r:embed="rId2"/>
+          <a:blip r:embed="rId2" cstate="print"/>
           <a:stretch>
             <a:fillRect/>
           </a:stretch>
@@ -8949,7 +8949,7 @@
           <p:cNvPr id="2" name="Rectangle 1">
             <a:extLst>
               <a:ext uri="{FF2B5EF4-FFF2-40B4-BE49-F238E27FC236}">
-                <a16:creationId xmlns="" xmlns:a16="http://schemas.microsoft.com/office/drawing/2014/main" id="{9B84690F-C0BA-45DE-B1F4-7C1D7425D6FC}"/>
+                <a16:creationId xmlns:a16="http://schemas.microsoft.com/office/drawing/2014/main" xmlns="" id="{9B84690F-C0BA-45DE-B1F4-7C1D7425D6FC}"/>
               </a:ext>
             </a:extLst>
           </p:cNvPr>
@@ -9003,7 +9003,7 @@
           <p:cNvPr id="4" name="Picture 3">
             <a:extLst>
               <a:ext uri="{FF2B5EF4-FFF2-40B4-BE49-F238E27FC236}">
-                <a16:creationId xmlns="" xmlns:a16="http://schemas.microsoft.com/office/drawing/2014/main" id="{FF33F444-5274-47FB-9AB9-B9E9F701C115}"/>
+                <a16:creationId xmlns:a16="http://schemas.microsoft.com/office/drawing/2014/main" xmlns="" id="{FF33F444-5274-47FB-9AB9-B9E9F701C115}"/>
               </a:ext>
             </a:extLst>
           </p:cNvPr>
@@ -9013,7 +9013,7 @@
           <p:nvPr/>
         </p:nvPicPr>
         <p:blipFill>
-          <a:blip r:embed="rId2"/>
+          <a:blip r:embed="rId2" cstate="print"/>
           <a:stretch>
             <a:fillRect/>
           </a:stretch>
@@ -9031,7 +9031,7 @@
     </p:spTree>
     <p:extLst>
       <p:ext uri="{BB962C8B-B14F-4D97-AF65-F5344CB8AC3E}">
-        <p14:creationId xmlns:p14="http://schemas.microsoft.com/office/powerpoint/2010/main" val="2886251363"/>
+        <p14:creationId xmlns:p14="http://schemas.microsoft.com/office/powerpoint/2010/main" xmlns="" val="2886251363"/>
       </p:ext>
     </p:extLst>
   </p:cSld>
@@ -9088,7 +9088,7 @@
           <p:cNvPr id="5" name="Rectangle 4">
             <a:extLst>
               <a:ext uri="{FF2B5EF4-FFF2-40B4-BE49-F238E27FC236}">
-                <a16:creationId xmlns="" xmlns:a16="http://schemas.microsoft.com/office/drawing/2014/main" id="{E268ED25-8F1E-4CB1-BEC7-9279730C430D}"/>
+                <a16:creationId xmlns:a16="http://schemas.microsoft.com/office/drawing/2014/main" xmlns="" id="{E268ED25-8F1E-4CB1-BEC7-9279730C430D}"/>
               </a:ext>
             </a:extLst>
           </p:cNvPr>
@@ -9142,7 +9142,7 @@
           <p:cNvPr id="2" name="Picture 1">
             <a:extLst>
               <a:ext uri="{FF2B5EF4-FFF2-40B4-BE49-F238E27FC236}">
-                <a16:creationId xmlns="" xmlns:a16="http://schemas.microsoft.com/office/drawing/2014/main" id="{AC3F4872-BBD0-4C85-AF1B-EECA98565237}"/>
+                <a16:creationId xmlns:a16="http://schemas.microsoft.com/office/drawing/2014/main" xmlns="" id="{AC3F4872-BBD0-4C85-AF1B-EECA98565237}"/>
               </a:ext>
             </a:extLst>
           </p:cNvPr>
@@ -9152,7 +9152,7 @@
           <p:nvPr/>
         </p:nvPicPr>
         <p:blipFill>
-          <a:blip r:embed="rId2"/>
+          <a:blip r:embed="rId2" cstate="print"/>
           <a:stretch>
             <a:fillRect/>
           </a:stretch>
@@ -9170,7 +9170,7 @@
     </p:spTree>
     <p:extLst>
       <p:ext uri="{BB962C8B-B14F-4D97-AF65-F5344CB8AC3E}">
-        <p14:creationId xmlns:p14="http://schemas.microsoft.com/office/powerpoint/2010/main" val="395963370"/>
+        <p14:creationId xmlns:p14="http://schemas.microsoft.com/office/powerpoint/2010/main" xmlns="" val="395963370"/>
       </p:ext>
     </p:extLst>
   </p:cSld>
@@ -9273,14 +9273,14 @@
             </a:ln>
             <a:extLst>
               <a:ext uri="{909E8E84-426E-40DD-AFC4-6F175D3DCCD1}">
-                <a14:hiddenFill xmlns:a14="http://schemas.microsoft.com/office/drawing/2010/main">
+                <a14:hiddenFill xmlns:a14="http://schemas.microsoft.com/office/drawing/2010/main" xmlns="">
                   <a:solidFill>
                     <a:srgbClr val="FFFFFF"/>
                   </a:solidFill>
                 </a14:hiddenFill>
               </a:ext>
               <a:ext uri="{91240B29-F687-4F45-9708-019B960494DF}">
-                <a14:hiddenLine xmlns:a14="http://schemas.microsoft.com/office/drawing/2010/main" w="9525">
+                <a14:hiddenLine xmlns:a14="http://schemas.microsoft.com/office/drawing/2010/main" xmlns="" w="9525">
                   <a:solidFill>
                     <a:srgbClr val="000000"/>
                   </a:solidFill>
@@ -9430,14 +9430,14 @@
             </a:ln>
             <a:extLst>
               <a:ext uri="{909E8E84-426E-40DD-AFC4-6F175D3DCCD1}">
-                <a14:hiddenFill xmlns:a14="http://schemas.microsoft.com/office/drawing/2010/main">
+                <a14:hiddenFill xmlns:a14="http://schemas.microsoft.com/office/drawing/2010/main" xmlns="">
                   <a:solidFill>
                     <a:srgbClr val="FFFFFF"/>
                   </a:solidFill>
                 </a14:hiddenFill>
               </a:ext>
               <a:ext uri="{91240B29-F687-4F45-9708-019B960494DF}">
-                <a14:hiddenLine xmlns:a14="http://schemas.microsoft.com/office/drawing/2010/main" w="9525">
+                <a14:hiddenLine xmlns:a14="http://schemas.microsoft.com/office/drawing/2010/main" xmlns="" w="9525">
                   <a:solidFill>
                     <a:srgbClr val="000000"/>
                   </a:solidFill>
@@ -9682,7 +9682,7 @@
     </p:spTree>
     <p:extLst>
       <p:ext uri="{BB962C8B-B14F-4D97-AF65-F5344CB8AC3E}">
-        <p14:creationId xmlns:p14="http://schemas.microsoft.com/office/powerpoint/2010/main" val="3409322625"/>
+        <p14:creationId xmlns:p14="http://schemas.microsoft.com/office/powerpoint/2010/main" xmlns="" val="3409322625"/>
       </p:ext>
     </p:extLst>
   </p:cSld>
@@ -9717,7 +9717,7 @@
           <p:cNvPr id="2" name="Título 1">
             <a:extLst>
               <a:ext uri="{FF2B5EF4-FFF2-40B4-BE49-F238E27FC236}">
-                <a16:creationId xmlns="" xmlns:a16="http://schemas.microsoft.com/office/drawing/2014/main" id="{4420E5F6-C592-489E-8742-39113C67F28C}"/>
+                <a16:creationId xmlns:a16="http://schemas.microsoft.com/office/drawing/2014/main" xmlns="" id="{4420E5F6-C592-489E-8742-39113C67F28C}"/>
               </a:ext>
             </a:extLst>
           </p:cNvPr>
@@ -9757,7 +9757,7 @@
           <p:cNvPr id="3" name="Espaço Reservado para Conteúdo 2">
             <a:extLst>
               <a:ext uri="{FF2B5EF4-FFF2-40B4-BE49-F238E27FC236}">
-                <a16:creationId xmlns="" xmlns:a16="http://schemas.microsoft.com/office/drawing/2014/main" id="{FB12D05B-E47F-4BA3-B1A7-F1DCD4D8F90E}"/>
+                <a16:creationId xmlns:a16="http://schemas.microsoft.com/office/drawing/2014/main" xmlns="" id="{FB12D05B-E47F-4BA3-B1A7-F1DCD4D8F90E}"/>
               </a:ext>
             </a:extLst>
           </p:cNvPr>
@@ -9987,7 +9987,7 @@
     </p:spTree>
     <p:extLst>
       <p:ext uri="{BB962C8B-B14F-4D97-AF65-F5344CB8AC3E}">
-        <p14:creationId xmlns:p14="http://schemas.microsoft.com/office/powerpoint/2010/main" val="732095642"/>
+        <p14:creationId xmlns:p14="http://schemas.microsoft.com/office/powerpoint/2010/main" xmlns="" val="732095642"/>
       </p:ext>
     </p:extLst>
   </p:cSld>
@@ -10019,7 +10019,7 @@
           <p:cNvPr id="5" name="Título 1">
             <a:extLst>
               <a:ext uri="{FF2B5EF4-FFF2-40B4-BE49-F238E27FC236}">
-                <a16:creationId xmlns="" xmlns:a16="http://schemas.microsoft.com/office/drawing/2014/main" id="{4420E5F6-C592-489E-8742-39113C67F28C}"/>
+                <a16:creationId xmlns:a16="http://schemas.microsoft.com/office/drawing/2014/main" xmlns="" id="{4420E5F6-C592-489E-8742-39113C67F28C}"/>
               </a:ext>
             </a:extLst>
           </p:cNvPr>
@@ -10208,7 +10208,7 @@
           <p:cNvPr id="3" name="Picture 2">
             <a:extLst>
               <a:ext uri="{FF2B5EF4-FFF2-40B4-BE49-F238E27FC236}">
-                <a16:creationId xmlns="" xmlns:a16="http://schemas.microsoft.com/office/drawing/2014/main" id="{8F573B82-A720-4E7D-88E3-7ABD98571312}"/>
+                <a16:creationId xmlns:a16="http://schemas.microsoft.com/office/drawing/2014/main" xmlns="" id="{8F573B82-A720-4E7D-88E3-7ABD98571312}"/>
               </a:ext>
             </a:extLst>
           </p:cNvPr>
@@ -10218,10 +10218,10 @@
           <p:nvPr/>
         </p:nvPicPr>
         <p:blipFill>
-          <a:blip r:embed="rId2">
+          <a:blip r:embed="rId2" cstate="print">
             <a:extLst>
               <a:ext uri="{28A0092B-C50C-407E-A947-70E740481C1C}">
-                <a14:useLocalDpi xmlns:a14="http://schemas.microsoft.com/office/drawing/2010/main" val="0"/>
+                <a14:useLocalDpi xmlns:a14="http://schemas.microsoft.com/office/drawing/2010/main" xmlns="" val="0"/>
               </a:ext>
             </a:extLst>
           </a:blip>
@@ -10242,7 +10242,7 @@
     </p:spTree>
     <p:extLst>
       <p:ext uri="{BB962C8B-B14F-4D97-AF65-F5344CB8AC3E}">
-        <p14:creationId xmlns:p14="http://schemas.microsoft.com/office/powerpoint/2010/main" val="1528951847"/>
+        <p14:creationId xmlns:p14="http://schemas.microsoft.com/office/powerpoint/2010/main" xmlns="" val="1528951847"/>
       </p:ext>
     </p:extLst>
   </p:cSld>
@@ -10274,7 +10274,7 @@
           <p:cNvPr id="6" name="Título 1">
             <a:extLst>
               <a:ext uri="{FF2B5EF4-FFF2-40B4-BE49-F238E27FC236}">
-                <a16:creationId xmlns="" xmlns:a16="http://schemas.microsoft.com/office/drawing/2014/main" id="{4420E5F6-C592-489E-8742-39113C67F28C}"/>
+                <a16:creationId xmlns:a16="http://schemas.microsoft.com/office/drawing/2014/main" xmlns="" id="{4420E5F6-C592-489E-8742-39113C67F28C}"/>
               </a:ext>
             </a:extLst>
           </p:cNvPr>
@@ -10314,7 +10314,7 @@
           <p:cNvPr id="8" name="Picture 7">
             <a:extLst>
               <a:ext uri="{FF2B5EF4-FFF2-40B4-BE49-F238E27FC236}">
-                <a16:creationId xmlns="" xmlns:a16="http://schemas.microsoft.com/office/drawing/2014/main" id="{AC1CFE5D-EA64-4455-B011-2E471DBEC948}"/>
+                <a16:creationId xmlns:a16="http://schemas.microsoft.com/office/drawing/2014/main" xmlns="" id="{AC1CFE5D-EA64-4455-B011-2E471DBEC948}"/>
               </a:ext>
             </a:extLst>
           </p:cNvPr>
@@ -10324,7 +10324,7 @@
           <p:nvPr/>
         </p:nvPicPr>
         <p:blipFill>
-          <a:blip r:embed="rId2"/>
+          <a:blip r:embed="rId2" cstate="print"/>
           <a:stretch>
             <a:fillRect/>
           </a:stretch>
@@ -10342,7 +10342,7 @@
     </p:spTree>
     <p:extLst>
       <p:ext uri="{BB962C8B-B14F-4D97-AF65-F5344CB8AC3E}">
-        <p14:creationId xmlns:p14="http://schemas.microsoft.com/office/powerpoint/2010/main" val="3460844110"/>
+        <p14:creationId xmlns:p14="http://schemas.microsoft.com/office/powerpoint/2010/main" xmlns="" val="3460844110"/>
       </p:ext>
     </p:extLst>
   </p:cSld>
@@ -10374,7 +10374,7 @@
           <p:cNvPr id="6" name="Título 1">
             <a:extLst>
               <a:ext uri="{FF2B5EF4-FFF2-40B4-BE49-F238E27FC236}">
-                <a16:creationId xmlns="" xmlns:a16="http://schemas.microsoft.com/office/drawing/2014/main" id="{4420E5F6-C592-489E-8742-39113C67F28C}"/>
+                <a16:creationId xmlns:a16="http://schemas.microsoft.com/office/drawing/2014/main" xmlns="" id="{4420E5F6-C592-489E-8742-39113C67F28C}"/>
               </a:ext>
             </a:extLst>
           </p:cNvPr>
@@ -10414,7 +10414,7 @@
           <p:cNvPr id="8" name="Rectangle 7">
             <a:extLst>
               <a:ext uri="{FF2B5EF4-FFF2-40B4-BE49-F238E27FC236}">
-                <a16:creationId xmlns="" xmlns:a16="http://schemas.microsoft.com/office/drawing/2014/main" id="{F316C0A6-AC98-4AAE-B87A-547E57B86D5F}"/>
+                <a16:creationId xmlns:a16="http://schemas.microsoft.com/office/drawing/2014/main" xmlns="" id="{F316C0A6-AC98-4AAE-B87A-547E57B86D5F}"/>
               </a:ext>
             </a:extLst>
           </p:cNvPr>
@@ -10468,7 +10468,7 @@
           <p:cNvPr id="9" name="Picture 8">
             <a:extLst>
               <a:ext uri="{FF2B5EF4-FFF2-40B4-BE49-F238E27FC236}">
-                <a16:creationId xmlns="" xmlns:a16="http://schemas.microsoft.com/office/drawing/2014/main" id="{F5F42E5F-1DEC-47B5-8651-247D9AF6FADE}"/>
+                <a16:creationId xmlns:a16="http://schemas.microsoft.com/office/drawing/2014/main" xmlns="" id="{F5F42E5F-1DEC-47B5-8651-247D9AF6FADE}"/>
               </a:ext>
             </a:extLst>
           </p:cNvPr>
@@ -10478,10 +10478,10 @@
           <p:nvPr/>
         </p:nvPicPr>
         <p:blipFill>
-          <a:blip r:embed="rId2">
+          <a:blip r:embed="rId2" cstate="print">
             <a:extLst>
               <a:ext uri="{28A0092B-C50C-407E-A947-70E740481C1C}">
-                <a14:useLocalDpi xmlns:a14="http://schemas.microsoft.com/office/drawing/2010/main" val="0"/>
+                <a14:useLocalDpi xmlns:a14="http://schemas.microsoft.com/office/drawing/2010/main" xmlns="" val="0"/>
               </a:ext>
             </a:extLst>
           </a:blip>
@@ -10502,7 +10502,7 @@
     </p:spTree>
     <p:extLst>
       <p:ext uri="{BB962C8B-B14F-4D97-AF65-F5344CB8AC3E}">
-        <p14:creationId xmlns:p14="http://schemas.microsoft.com/office/powerpoint/2010/main" val="255138212"/>
+        <p14:creationId xmlns:p14="http://schemas.microsoft.com/office/powerpoint/2010/main" xmlns="" val="255138212"/>
       </p:ext>
     </p:extLst>
   </p:cSld>
@@ -10534,7 +10534,7 @@
           <p:cNvPr id="6" name="Título 1">
             <a:extLst>
               <a:ext uri="{FF2B5EF4-FFF2-40B4-BE49-F238E27FC236}">
-                <a16:creationId xmlns="" xmlns:a16="http://schemas.microsoft.com/office/drawing/2014/main" id="{4420E5F6-C592-489E-8742-39113C67F28C}"/>
+                <a16:creationId xmlns:a16="http://schemas.microsoft.com/office/drawing/2014/main" xmlns="" id="{4420E5F6-C592-489E-8742-39113C67F28C}"/>
               </a:ext>
             </a:extLst>
           </p:cNvPr>
@@ -10574,7 +10574,7 @@
           <p:cNvPr id="8" name="Rectangle 7">
             <a:extLst>
               <a:ext uri="{FF2B5EF4-FFF2-40B4-BE49-F238E27FC236}">
-                <a16:creationId xmlns="" xmlns:a16="http://schemas.microsoft.com/office/drawing/2014/main" id="{EF4C9CB5-998F-4DAB-AD54-72FA9E925DA9}"/>
+                <a16:creationId xmlns:a16="http://schemas.microsoft.com/office/drawing/2014/main" xmlns="" id="{EF4C9CB5-998F-4DAB-AD54-72FA9E925DA9}"/>
               </a:ext>
             </a:extLst>
           </p:cNvPr>
@@ -10628,7 +10628,7 @@
           <p:cNvPr id="10" name="Picture 9">
             <a:extLst>
               <a:ext uri="{FF2B5EF4-FFF2-40B4-BE49-F238E27FC236}">
-                <a16:creationId xmlns="" xmlns:a16="http://schemas.microsoft.com/office/drawing/2014/main" id="{86E4D953-118F-46F7-809C-802C59C8CF9B}"/>
+                <a16:creationId xmlns:a16="http://schemas.microsoft.com/office/drawing/2014/main" xmlns="" id="{86E4D953-118F-46F7-809C-802C59C8CF9B}"/>
               </a:ext>
             </a:extLst>
           </p:cNvPr>
@@ -10638,10 +10638,10 @@
           <p:nvPr/>
         </p:nvPicPr>
         <p:blipFill>
-          <a:blip r:embed="rId2">
+          <a:blip r:embed="rId2" cstate="print">
             <a:extLst>
               <a:ext uri="{28A0092B-C50C-407E-A947-70E740481C1C}">
-                <a14:useLocalDpi xmlns:a14="http://schemas.microsoft.com/office/drawing/2010/main" val="0"/>
+                <a14:useLocalDpi xmlns:a14="http://schemas.microsoft.com/office/drawing/2010/main" xmlns="" val="0"/>
               </a:ext>
             </a:extLst>
           </a:blip>
@@ -10662,7 +10662,7 @@
     </p:spTree>
     <p:extLst>
       <p:ext uri="{BB962C8B-B14F-4D97-AF65-F5344CB8AC3E}">
-        <p14:creationId xmlns:p14="http://schemas.microsoft.com/office/powerpoint/2010/main" val="2944428277"/>
+        <p14:creationId xmlns:p14="http://schemas.microsoft.com/office/powerpoint/2010/main" xmlns="" val="2944428277"/>
       </p:ext>
     </p:extLst>
   </p:cSld>
@@ -10723,10 +10723,10 @@
           <p:nvPr/>
         </p:nvPicPr>
         <p:blipFill>
-          <a:blip r:embed="rId3">
+          <a:blip r:embed="rId3" cstate="print">
             <a:extLst>
               <a:ext uri="{28A0092B-C50C-407E-A947-70E740481C1C}">
-                <a14:useLocalDpi xmlns:a14="http://schemas.microsoft.com/office/drawing/2010/main" val="0"/>
+                <a14:useLocalDpi xmlns:a14="http://schemas.microsoft.com/office/drawing/2010/main" xmlns="" val="0"/>
               </a:ext>
             </a:extLst>
           </a:blip>
@@ -10784,7 +10784,7 @@
           <p:cNvPr id="6" name="Título 1">
             <a:extLst>
               <a:ext uri="{FF2B5EF4-FFF2-40B4-BE49-F238E27FC236}">
-                <a16:creationId xmlns="" xmlns:a16="http://schemas.microsoft.com/office/drawing/2014/main" id="{4420E5F6-C592-489E-8742-39113C67F28C}"/>
+                <a16:creationId xmlns:a16="http://schemas.microsoft.com/office/drawing/2014/main" xmlns="" id="{4420E5F6-C592-489E-8742-39113C67F28C}"/>
               </a:ext>
             </a:extLst>
           </p:cNvPr>
@@ -10824,7 +10824,7 @@
           <p:cNvPr id="8" name="Rectangle 7">
             <a:extLst>
               <a:ext uri="{FF2B5EF4-FFF2-40B4-BE49-F238E27FC236}">
-                <a16:creationId xmlns="" xmlns:a16="http://schemas.microsoft.com/office/drawing/2014/main" id="{EF4C9CB5-998F-4DAB-AD54-72FA9E925DA9}"/>
+                <a16:creationId xmlns:a16="http://schemas.microsoft.com/office/drawing/2014/main" xmlns="" id="{EF4C9CB5-998F-4DAB-AD54-72FA9E925DA9}"/>
               </a:ext>
             </a:extLst>
           </p:cNvPr>
@@ -10878,7 +10878,7 @@
           <p:cNvPr id="3" name="Picture 2">
             <a:extLst>
               <a:ext uri="{FF2B5EF4-FFF2-40B4-BE49-F238E27FC236}">
-                <a16:creationId xmlns="" xmlns:a16="http://schemas.microsoft.com/office/drawing/2014/main" id="{F1FA4B04-B183-46B7-8891-15526F3F8963}"/>
+                <a16:creationId xmlns:a16="http://schemas.microsoft.com/office/drawing/2014/main" xmlns="" id="{F1FA4B04-B183-46B7-8891-15526F3F8963}"/>
               </a:ext>
             </a:extLst>
           </p:cNvPr>
@@ -10888,10 +10888,10 @@
           <p:nvPr/>
         </p:nvPicPr>
         <p:blipFill rotWithShape="1">
-          <a:blip r:embed="rId2">
+          <a:blip r:embed="rId2" cstate="print">
             <a:extLst>
               <a:ext uri="{28A0092B-C50C-407E-A947-70E740481C1C}">
-                <a14:useLocalDpi xmlns:a14="http://schemas.microsoft.com/office/drawing/2010/main" val="0"/>
+                <a14:useLocalDpi xmlns:a14="http://schemas.microsoft.com/office/drawing/2010/main" xmlns="" val="0"/>
               </a:ext>
             </a:extLst>
           </a:blip>
@@ -10911,7 +10911,7 @@
     </p:spTree>
     <p:extLst>
       <p:ext uri="{BB962C8B-B14F-4D97-AF65-F5344CB8AC3E}">
-        <p14:creationId xmlns:p14="http://schemas.microsoft.com/office/powerpoint/2010/main" val="398228404"/>
+        <p14:creationId xmlns:p14="http://schemas.microsoft.com/office/powerpoint/2010/main" xmlns="" val="398228404"/>
       </p:ext>
     </p:extLst>
   </p:cSld>
@@ -10943,7 +10943,7 @@
           <p:cNvPr id="6" name="Título 1">
             <a:extLst>
               <a:ext uri="{FF2B5EF4-FFF2-40B4-BE49-F238E27FC236}">
-                <a16:creationId xmlns="" xmlns:a16="http://schemas.microsoft.com/office/drawing/2014/main" id="{4420E5F6-C592-489E-8742-39113C67F28C}"/>
+                <a16:creationId xmlns:a16="http://schemas.microsoft.com/office/drawing/2014/main" xmlns="" id="{4420E5F6-C592-489E-8742-39113C67F28C}"/>
               </a:ext>
             </a:extLst>
           </p:cNvPr>
@@ -10983,7 +10983,7 @@
           <p:cNvPr id="8" name="Rectangle 7">
             <a:extLst>
               <a:ext uri="{FF2B5EF4-FFF2-40B4-BE49-F238E27FC236}">
-                <a16:creationId xmlns="" xmlns:a16="http://schemas.microsoft.com/office/drawing/2014/main" id="{EF4C9CB5-998F-4DAB-AD54-72FA9E925DA9}"/>
+                <a16:creationId xmlns:a16="http://schemas.microsoft.com/office/drawing/2014/main" xmlns="" id="{EF4C9CB5-998F-4DAB-AD54-72FA9E925DA9}"/>
               </a:ext>
             </a:extLst>
           </p:cNvPr>
@@ -11037,7 +11037,7 @@
           <p:cNvPr id="4" name="Picture 3">
             <a:extLst>
               <a:ext uri="{FF2B5EF4-FFF2-40B4-BE49-F238E27FC236}">
-                <a16:creationId xmlns="" xmlns:a16="http://schemas.microsoft.com/office/drawing/2014/main" id="{9E45BBDA-7E5F-49C6-9ACE-8F5A7A5E8FAA}"/>
+                <a16:creationId xmlns:a16="http://schemas.microsoft.com/office/drawing/2014/main" xmlns="" id="{9E45BBDA-7E5F-49C6-9ACE-8F5A7A5E8FAA}"/>
               </a:ext>
             </a:extLst>
           </p:cNvPr>
@@ -11047,7 +11047,7 @@
           <p:nvPr/>
         </p:nvPicPr>
         <p:blipFill rotWithShape="1">
-          <a:blip r:embed="rId2"/>
+          <a:blip r:embed="rId2" cstate="print"/>
           <a:srcRect l="-968" t="12350" r="968" b="154"/>
           <a:stretch/>
         </p:blipFill>
@@ -11064,7 +11064,7 @@
     </p:spTree>
     <p:extLst>
       <p:ext uri="{BB962C8B-B14F-4D97-AF65-F5344CB8AC3E}">
-        <p14:creationId xmlns:p14="http://schemas.microsoft.com/office/powerpoint/2010/main" val="3663591352"/>
+        <p14:creationId xmlns:p14="http://schemas.microsoft.com/office/powerpoint/2010/main" xmlns="" val="3663591352"/>
       </p:ext>
     </p:extLst>
   </p:cSld>
@@ -11111,7 +11111,7 @@
             </a:pPr>
             <a:r>
               <a:rPr lang="pt-BR" dirty="0"/>
-              <a:t>Próximos passos</a:t>
+              <a:t>Lições Aprendidas</a:t>
             </a:r>
           </a:p>
         </p:txBody>
@@ -11128,8 +11128,8 @@
         </p:nvSpPr>
         <p:spPr>
           <a:xfrm>
-            <a:off x="4355976" y="1512243"/>
-            <a:ext cx="5616748" cy="2663626"/>
+            <a:off x="-9103" y="1359247"/>
+            <a:ext cx="4364682" cy="5424141"/>
           </a:xfrm>
         </p:spPr>
         <p:txBody>
@@ -11137,68 +11137,66 @@
           <a:lstStyle/>
           <a:p>
             <a:r>
-              <a:rPr lang="pt-BR" dirty="0"/>
-              <a:t>Implementar o sistema.</a:t>
-            </a:r>
+              <a:rPr lang="pt-BR" sz="2400" dirty="0" smtClean="0"/>
+              <a:t>Para a realização de uma especificação de software a participação do cliente é essencial, ainda que o analista tenha boa experiência de mercado</a:t>
+            </a:r>
+          </a:p>
+          <a:p>
+            <a:endParaRPr lang="pt-BR" sz="2400" dirty="0" smtClean="0"/>
+          </a:p>
+          <a:p>
+            <a:r>
+              <a:rPr lang="pt-BR" sz="2400" dirty="0" smtClean="0"/>
+              <a:t>Manter-se atento ao escopo inicial do projeto para que não sejam desenvolvidas funcionalidades que não </a:t>
+            </a:r>
+            <a:r>
+              <a:rPr lang="pt-BR" sz="2400" dirty="0" smtClean="0"/>
+              <a:t>foram solicitadas</a:t>
+            </a:r>
+            <a:endParaRPr lang="pt-BR" sz="2400" dirty="0" smtClean="0"/>
+          </a:p>
+          <a:p>
+            <a:endParaRPr lang="pt-BR" sz="2400" dirty="0" smtClean="0"/>
           </a:p>
           <a:p>
             <a:pPr marL="0" indent="0">
               <a:buNone/>
             </a:pPr>
-            <a:endParaRPr lang="pt-BR" dirty="0"/>
-          </a:p>
-          <a:p>
-            <a:r>
-              <a:rPr lang="pt-BR" dirty="0"/>
-              <a:t>Testar o sistema pronto.</a:t>
-            </a:r>
+            <a:endParaRPr lang="pt-BR" sz="2400" dirty="0" smtClean="0"/>
           </a:p>
           <a:p>
             <a:pPr marL="0" indent="0">
               <a:buNone/>
             </a:pPr>
-            <a:endParaRPr lang="pt-BR" dirty="0"/>
-          </a:p>
-          <a:p>
-            <a:r>
-              <a:rPr lang="pt-BR" dirty="0"/>
-              <a:t>Implantar o sistema.</a:t>
-            </a:r>
-          </a:p>
-          <a:p>
-            <a:endParaRPr lang="pt-BR" dirty="0"/>
-          </a:p>
-          <a:p>
-            <a:r>
-              <a:rPr lang="pt-BR" dirty="0"/>
-              <a:t>Avaliar pós implantação do sistema.</a:t>
-            </a:r>
+            <a:endParaRPr lang="pt-BR" sz="2400" dirty="0"/>
           </a:p>
         </p:txBody>
       </p:sp>
       <p:pic>
         <p:nvPicPr>
-          <p:cNvPr id="1026" name="Picture 2" descr="https://proximospassoschapa1.files.wordpress.com/2012/11/proximos-passos6.jpg"/>
+          <p:cNvPr id="2052" name="Picture 4" descr="Resultado de imagem para imagem lições aprendidas"/>
           <p:cNvPicPr>
             <a:picLocks noChangeAspect="1" noChangeArrowheads="1"/>
           </p:cNvPicPr>
           <p:nvPr/>
         </p:nvPicPr>
-        <p:blipFill rotWithShape="1">
-          <a:blip r:embed="rId2">
+        <p:blipFill>
+          <a:blip r:embed="rId2" cstate="print">
             <a:extLst>
               <a:ext uri="{28A0092B-C50C-407E-A947-70E740481C1C}">
-                <a14:useLocalDpi xmlns:a14="http://schemas.microsoft.com/office/drawing/2010/main" val="0"/>
+                <a14:useLocalDpi xmlns:a14="http://schemas.microsoft.com/office/drawing/2010/main" xmlns="" val="0"/>
               </a:ext>
             </a:extLst>
           </a:blip>
-          <a:srcRect l="2182" t="1845" r="3316" b="1995"/>
-          <a:stretch/>
+          <a:srcRect/>
+          <a:stretch>
+            <a:fillRect/>
+          </a:stretch>
         </p:blipFill>
         <p:spPr bwMode="auto">
           <a:xfrm>
-            <a:off x="30857" y="1484784"/>
-            <a:ext cx="4109096" cy="4181186"/>
+            <a:off x="4427984" y="1844824"/>
+            <a:ext cx="4728929" cy="3888432"/>
           </a:xfrm>
           <a:prstGeom prst="rect">
             <a:avLst/>
@@ -11206,7 +11204,7 @@
           <a:noFill/>
           <a:extLst>
             <a:ext uri="{909E8E84-426E-40DD-AFC4-6F175D3DCCD1}">
-              <a14:hiddenFill xmlns:a14="http://schemas.microsoft.com/office/drawing/2010/main">
+              <a14:hiddenFill xmlns:a14="http://schemas.microsoft.com/office/drawing/2010/main" xmlns="">
                 <a:solidFill>
                   <a:srgbClr val="FFFFFF"/>
                 </a:solidFill>
@@ -11263,7 +11261,7 @@
             </a:pPr>
             <a:r>
               <a:rPr lang="pt-BR" dirty="0"/>
-              <a:t>Lições Aprendidas</a:t>
+              <a:t>Próximos passos</a:t>
             </a:r>
           </a:p>
         </p:txBody>
@@ -11280,8 +11278,8 @@
         </p:nvSpPr>
         <p:spPr>
           <a:xfrm>
-            <a:off x="-9103" y="1359247"/>
-            <a:ext cx="4364682" cy="5424141"/>
+            <a:off x="4355976" y="1512243"/>
+            <a:ext cx="5616748" cy="2663626"/>
           </a:xfrm>
         </p:spPr>
         <p:txBody>
@@ -11289,49 +11287,73 @@
           <a:lstStyle/>
           <a:p>
             <a:r>
-              <a:rPr lang="pt-BR" sz="2400" dirty="0"/>
-              <a:t>Manter-se atento ao escopo inicial do projeto para que não sejam desenvolvidas funcionalidades que não terão utilidade ao negócio</a:t>
+              <a:rPr lang="pt-BR" dirty="0" smtClean="0"/>
+              <a:t>Codificar </a:t>
+            </a:r>
+            <a:r>
+              <a:rPr lang="pt-BR" dirty="0"/>
+              <a:t>o sistema.</a:t>
             </a:r>
           </a:p>
           <a:p>
             <a:pPr marL="0" indent="0">
               <a:buNone/>
             </a:pPr>
-            <a:endParaRPr lang="pt-BR" sz="2400" dirty="0"/>
-          </a:p>
-          <a:p>
-            <a:r>
-              <a:rPr lang="pt-BR" sz="2400" dirty="0"/>
-              <a:t>Realizar as primeiras entregas somente com o que é essencial e trás valor ao negócio do cliente.</a:t>
+            <a:endParaRPr lang="pt-BR" dirty="0"/>
+          </a:p>
+          <a:p>
+            <a:r>
+              <a:rPr lang="pt-BR" dirty="0" smtClean="0"/>
+              <a:t>Testar o sistema pronto.</a:t>
+            </a:r>
+            <a:endParaRPr lang="pt-BR" dirty="0"/>
+          </a:p>
+          <a:p>
+            <a:pPr marL="0" indent="0">
+              <a:buNone/>
+            </a:pPr>
+            <a:endParaRPr lang="pt-BR" dirty="0"/>
+          </a:p>
+          <a:p>
+            <a:r>
+              <a:rPr lang="pt-BR" dirty="0"/>
+              <a:t>Implantar o sistema.</a:t>
+            </a:r>
+          </a:p>
+          <a:p>
+            <a:endParaRPr lang="pt-BR" dirty="0"/>
+          </a:p>
+          <a:p>
+            <a:r>
+              <a:rPr lang="pt-BR" dirty="0"/>
+              <a:t>Avaliar pós implantação do sistema.</a:t>
             </a:r>
           </a:p>
         </p:txBody>
       </p:sp>
       <p:pic>
         <p:nvPicPr>
-          <p:cNvPr id="2052" name="Picture 4" descr="Resultado de imagem para imagem lições aprendidas"/>
+          <p:cNvPr id="1026" name="Picture 2" descr="https://proximospassoschapa1.files.wordpress.com/2012/11/proximos-passos6.jpg"/>
           <p:cNvPicPr>
             <a:picLocks noChangeAspect="1" noChangeArrowheads="1"/>
           </p:cNvPicPr>
           <p:nvPr/>
         </p:nvPicPr>
-        <p:blipFill>
-          <a:blip r:embed="rId2">
+        <p:blipFill rotWithShape="1">
+          <a:blip r:embed="rId2" cstate="print">
             <a:extLst>
               <a:ext uri="{28A0092B-C50C-407E-A947-70E740481C1C}">
-                <a14:useLocalDpi xmlns:a14="http://schemas.microsoft.com/office/drawing/2010/main" val="0"/>
+                <a14:useLocalDpi xmlns:a14="http://schemas.microsoft.com/office/drawing/2010/main" xmlns="" val="0"/>
               </a:ext>
             </a:extLst>
           </a:blip>
-          <a:srcRect/>
-          <a:stretch>
-            <a:fillRect/>
-          </a:stretch>
+          <a:srcRect l="2182" t="1845" r="3316" b="1995"/>
+          <a:stretch/>
         </p:blipFill>
         <p:spPr bwMode="auto">
           <a:xfrm>
-            <a:off x="4427984" y="1844824"/>
-            <a:ext cx="4728929" cy="3888432"/>
+            <a:off x="30857" y="1484784"/>
+            <a:ext cx="4109096" cy="4181186"/>
           </a:xfrm>
           <a:prstGeom prst="rect">
             <a:avLst/>
@@ -11339,7 +11361,7 @@
           <a:noFill/>
           <a:extLst>
             <a:ext uri="{909E8E84-426E-40DD-AFC4-6F175D3DCCD1}">
-              <a14:hiddenFill xmlns:a14="http://schemas.microsoft.com/office/drawing/2010/main">
+              <a14:hiddenFill xmlns:a14="http://schemas.microsoft.com/office/drawing/2010/main" xmlns="">
                 <a:solidFill>
                   <a:srgbClr val="FFFFFF"/>
                 </a:solidFill>
@@ -11409,7 +11431,7 @@
     </p:spTree>
     <p:extLst>
       <p:ext uri="{BB962C8B-B14F-4D97-AF65-F5344CB8AC3E}">
-        <p14:creationId xmlns:p14="http://schemas.microsoft.com/office/powerpoint/2010/main" val="1990385622"/>
+        <p14:creationId xmlns:p14="http://schemas.microsoft.com/office/powerpoint/2010/main" xmlns="" val="1990385622"/>
       </p:ext>
     </p:extLst>
   </p:cSld>
@@ -11512,14 +11534,14 @@
             </a:ln>
             <a:extLst>
               <a:ext uri="{909E8E84-426E-40DD-AFC4-6F175D3DCCD1}">
-                <a14:hiddenFill xmlns:a14="http://schemas.microsoft.com/office/drawing/2010/main">
+                <a14:hiddenFill xmlns:a14="http://schemas.microsoft.com/office/drawing/2010/main" xmlns="">
                   <a:solidFill>
                     <a:srgbClr val="FFFFFF"/>
                   </a:solidFill>
                 </a14:hiddenFill>
               </a:ext>
               <a:ext uri="{91240B29-F687-4F45-9708-019B960494DF}">
-                <a14:hiddenLine xmlns:a14="http://schemas.microsoft.com/office/drawing/2010/main" w="9525">
+                <a14:hiddenLine xmlns:a14="http://schemas.microsoft.com/office/drawing/2010/main" xmlns="" w="9525">
                   <a:solidFill>
                     <a:srgbClr val="000000"/>
                   </a:solidFill>
@@ -11669,14 +11691,14 @@
             </a:ln>
             <a:extLst>
               <a:ext uri="{909E8E84-426E-40DD-AFC4-6F175D3DCCD1}">
-                <a14:hiddenFill xmlns:a14="http://schemas.microsoft.com/office/drawing/2010/main">
+                <a14:hiddenFill xmlns:a14="http://schemas.microsoft.com/office/drawing/2010/main" xmlns="">
                   <a:solidFill>
                     <a:srgbClr val="FFFFFF"/>
                   </a:solidFill>
                 </a14:hiddenFill>
               </a:ext>
               <a:ext uri="{91240B29-F687-4F45-9708-019B960494DF}">
-                <a14:hiddenLine xmlns:a14="http://schemas.microsoft.com/office/drawing/2010/main" w="9525">
+                <a14:hiddenLine xmlns:a14="http://schemas.microsoft.com/office/drawing/2010/main" xmlns="" w="9525">
                   <a:solidFill>
                     <a:srgbClr val="000000"/>
                   </a:solidFill>
@@ -11940,7 +11962,7 @@
     </p:spTree>
     <p:extLst>
       <p:ext uri="{BB962C8B-B14F-4D97-AF65-F5344CB8AC3E}">
-        <p14:creationId xmlns:p14="http://schemas.microsoft.com/office/powerpoint/2010/main" val="2005090747"/>
+        <p14:creationId xmlns:p14="http://schemas.microsoft.com/office/powerpoint/2010/main" xmlns="" val="2005090747"/>
       </p:ext>
     </p:extLst>
   </p:cSld>
@@ -12019,14 +12041,14 @@
           </a:xfrm>
           <a:extLst>
             <a:ext uri="{909E8E84-426E-40DD-AFC4-6F175D3DCCD1}">
-              <a14:hiddenFill xmlns:a14="http://schemas.microsoft.com/office/drawing/2010/main">
+              <a14:hiddenFill xmlns:a14="http://schemas.microsoft.com/office/drawing/2010/main" xmlns="">
                 <a:solidFill>
                   <a:srgbClr val="FFFFFF"/>
                 </a:solidFill>
               </a14:hiddenFill>
             </a:ext>
             <a:ext uri="{91240B29-F687-4F45-9708-019B960494DF}">
-              <a14:hiddenLine xmlns:a14="http://schemas.microsoft.com/office/drawing/2010/main" w="9525">
+              <a14:hiddenLine xmlns:a14="http://schemas.microsoft.com/office/drawing/2010/main" xmlns="" w="9525">
                 <a:solidFill>
                   <a:srgbClr val="000000"/>
                 </a:solidFill>
@@ -12359,10 +12381,10 @@
           <p:nvPr/>
         </p:nvPicPr>
         <p:blipFill>
-          <a:blip r:embed="rId2">
+          <a:blip r:embed="rId2" cstate="print">
             <a:extLst>
               <a:ext uri="{28A0092B-C50C-407E-A947-70E740481C1C}">
-                <a14:useLocalDpi xmlns:a14="http://schemas.microsoft.com/office/drawing/2010/main" val="0"/>
+                <a14:useLocalDpi xmlns:a14="http://schemas.microsoft.com/office/drawing/2010/main" xmlns="" val="0"/>
               </a:ext>
             </a:extLst>
           </a:blip>
@@ -12451,10 +12473,10 @@
           <p:nvPr/>
         </p:nvPicPr>
         <p:blipFill>
-          <a:blip r:embed="rId2">
+          <a:blip r:embed="rId2" cstate="print">
             <a:extLst>
               <a:ext uri="{28A0092B-C50C-407E-A947-70E740481C1C}">
-                <a14:useLocalDpi xmlns:a14="http://schemas.microsoft.com/office/drawing/2010/main" val="0"/>
+                <a14:useLocalDpi xmlns:a14="http://schemas.microsoft.com/office/drawing/2010/main" xmlns="" val="0"/>
               </a:ext>
             </a:extLst>
           </a:blip>
@@ -12543,10 +12565,10 @@
           <p:nvPr/>
         </p:nvPicPr>
         <p:blipFill>
-          <a:blip r:embed="rId2">
+          <a:blip r:embed="rId2" cstate="print">
             <a:extLst>
               <a:ext uri="{28A0092B-C50C-407E-A947-70E740481C1C}">
-                <a14:useLocalDpi xmlns:a14="http://schemas.microsoft.com/office/drawing/2010/main" val="0"/>
+                <a14:useLocalDpi xmlns:a14="http://schemas.microsoft.com/office/drawing/2010/main" xmlns="" val="0"/>
               </a:ext>
             </a:extLst>
           </a:blip>
@@ -13174,7 +13196,7 @@
   <a:extraClrSchemeLst/>
   <a:extLst>
     <a:ext uri="{05A4C25C-085E-4340-85A3-A5531E510DB2}">
-      <thm15:themeFamily xmlns:thm15="http://schemas.microsoft.com/office/thememl/2012/main" name="Office Theme" id="{62F939B6-93AF-4DB8-9C6B-D6C7DFDC589F}" vid="{4A3C46E8-61CC-4603-A589-7422A47A8E4A}"/>
+      <thm15:themeFamily xmlns:thm15="http://schemas.microsoft.com/office/thememl/2012/main" xmlns="" name="Office Theme" id="{62F939B6-93AF-4DB8-9C6B-D6C7DFDC589F}" vid="{4A3C46E8-61CC-4603-A589-7422A47A8E4A}"/>
     </a:ext>
   </a:extLst>
 </a:theme>

</xml_diff>

<commit_message>
Atualiz. imagens mód. Contr. Acesso
</commit_message>
<xml_diff>
--- a/TCC/5º Encontro/2017-Apresentacao Psystem.pptx
+++ b/TCC/5º Encontro/2017-Apresentacao Psystem.pptx
@@ -182,7 +182,7 @@
   </p:defaultTextStyle>
   <p:extLst>
     <p:ext uri="{EFAFB233-063F-42B5-8137-9DF3F51BA10A}">
-      <p15:sldGuideLst xmlns:p15="http://schemas.microsoft.com/office/powerpoint/2012/main" xmlns="">
+      <p15:sldGuideLst xmlns="" xmlns:p15="http://schemas.microsoft.com/office/powerpoint/2012/main">
         <p15:guide id="1" orient="horz" pos="2160">
           <p15:clr>
             <a:srgbClr val="A4A3A4"/>
@@ -286,7 +286,7 @@
             <a:fld id="{C0D5B206-56B5-433E-8333-9415E6A460B9}" type="datetimeFigureOut">
               <a:rPr lang="pt-BR" smtClean="0"/>
               <a:pPr/>
-              <a:t>26/09/2017</a:t>
+              <a:t>02/10/2017</a:t>
             </a:fld>
             <a:endParaRPr lang="pt-BR"/>
           </a:p>
@@ -454,7 +454,7 @@
     </p:spTree>
     <p:extLst>
       <p:ext uri="{BB962C8B-B14F-4D97-AF65-F5344CB8AC3E}">
-        <p14:creationId xmlns:p14="http://schemas.microsoft.com/office/powerpoint/2010/main" xmlns="" val="671299352"/>
+        <p14:creationId xmlns="" xmlns:p14="http://schemas.microsoft.com/office/powerpoint/2010/main" val="671299352"/>
       </p:ext>
     </p:extLst>
   </p:cSld>
@@ -664,7 +664,7 @@
     </p:spTree>
     <p:extLst>
       <p:ext uri="{BB962C8B-B14F-4D97-AF65-F5344CB8AC3E}">
-        <p14:creationId xmlns:p14="http://schemas.microsoft.com/office/powerpoint/2010/main" xmlns="" val="3274854824"/>
+        <p14:creationId xmlns="" xmlns:p14="http://schemas.microsoft.com/office/powerpoint/2010/main" val="3274854824"/>
       </p:ext>
     </p:extLst>
   </p:cSld>
@@ -759,7 +759,7 @@
     </p:spTree>
     <p:extLst>
       <p:ext uri="{BB962C8B-B14F-4D97-AF65-F5344CB8AC3E}">
-        <p14:creationId xmlns:p14="http://schemas.microsoft.com/office/powerpoint/2010/main" xmlns="" val="2786033099"/>
+        <p14:creationId xmlns="" xmlns:p14="http://schemas.microsoft.com/office/powerpoint/2010/main" val="2786033099"/>
       </p:ext>
     </p:extLst>
   </p:cSld>
@@ -852,7 +852,7 @@
     </p:spTree>
     <p:extLst>
       <p:ext uri="{BB962C8B-B14F-4D97-AF65-F5344CB8AC3E}">
-        <p14:creationId xmlns:p14="http://schemas.microsoft.com/office/powerpoint/2010/main" xmlns="" val="1775795487"/>
+        <p14:creationId xmlns="" xmlns:p14="http://schemas.microsoft.com/office/powerpoint/2010/main" val="1775795487"/>
       </p:ext>
     </p:extLst>
   </p:cSld>
@@ -968,7 +968,7 @@
     </p:spTree>
     <p:extLst>
       <p:ext uri="{BB962C8B-B14F-4D97-AF65-F5344CB8AC3E}">
-        <p14:creationId xmlns:p14="http://schemas.microsoft.com/office/powerpoint/2010/main" xmlns="" val="3951886733"/>
+        <p14:creationId xmlns="" xmlns:p14="http://schemas.microsoft.com/office/powerpoint/2010/main" val="3951886733"/>
       </p:ext>
     </p:extLst>
   </p:cSld>
@@ -1259,7 +1259,7 @@
     </p:spTree>
     <p:extLst>
       <p:ext uri="{BB962C8B-B14F-4D97-AF65-F5344CB8AC3E}">
-        <p14:creationId xmlns:p14="http://schemas.microsoft.com/office/powerpoint/2010/main" xmlns="" val="1588299535"/>
+        <p14:creationId xmlns="" xmlns:p14="http://schemas.microsoft.com/office/powerpoint/2010/main" val="1588299535"/>
       </p:ext>
     </p:extLst>
   </p:cSld>
@@ -1308,14 +1308,14 @@
           </a:ln>
           <a:extLst>
             <a:ext uri="{909E8E84-426E-40DD-AFC4-6F175D3DCCD1}">
-              <a14:hiddenFill xmlns:a14="http://schemas.microsoft.com/office/drawing/2010/main" xmlns="">
+              <a14:hiddenFill xmlns="" xmlns:a14="http://schemas.microsoft.com/office/drawing/2010/main">
                 <a:solidFill>
                   <a:srgbClr val="FFFFFF"/>
                 </a:solidFill>
               </a14:hiddenFill>
             </a:ext>
             <a:ext uri="{91240B29-F687-4F45-9708-019B960494DF}">
-              <a14:hiddenLine xmlns:a14="http://schemas.microsoft.com/office/drawing/2010/main" xmlns="" w="9525">
+              <a14:hiddenLine xmlns="" xmlns:a14="http://schemas.microsoft.com/office/drawing/2010/main" w="9525">
                 <a:solidFill>
                   <a:srgbClr val="000000"/>
                 </a:solidFill>
@@ -1731,7 +1731,7 @@
     </p:spTree>
     <p:extLst>
       <p:ext uri="{BB962C8B-B14F-4D97-AF65-F5344CB8AC3E}">
-        <p14:creationId xmlns:p14="http://schemas.microsoft.com/office/powerpoint/2010/main" xmlns="" val="3359836669"/>
+        <p14:creationId xmlns="" xmlns:p14="http://schemas.microsoft.com/office/powerpoint/2010/main" val="3359836669"/>
       </p:ext>
     </p:extLst>
   </p:cSld>
@@ -1761,7 +1761,7 @@
     </p:spTree>
     <p:extLst>
       <p:ext uri="{BB962C8B-B14F-4D97-AF65-F5344CB8AC3E}">
-        <p14:creationId xmlns:p14="http://schemas.microsoft.com/office/powerpoint/2010/main" xmlns="" val="413836109"/>
+        <p14:creationId xmlns="" xmlns:p14="http://schemas.microsoft.com/office/powerpoint/2010/main" val="413836109"/>
       </p:ext>
     </p:extLst>
   </p:cSld>
@@ -1861,7 +1861,7 @@
           <a:blip r:embed="rId2" cstate="print">
             <a:extLst>
               <a:ext uri="{28A0092B-C50C-407E-A947-70E740481C1C}">
-                <a14:useLocalDpi xmlns:a14="http://schemas.microsoft.com/office/drawing/2010/main" xmlns="" val="0"/>
+                <a14:useLocalDpi xmlns="" xmlns:a14="http://schemas.microsoft.com/office/drawing/2010/main" val="0"/>
               </a:ext>
             </a:extLst>
           </a:blip>
@@ -1884,14 +1884,14 @@
           </a:ln>
           <a:extLst>
             <a:ext uri="{909E8E84-426E-40DD-AFC4-6F175D3DCCD1}">
-              <a14:hiddenFill xmlns:a14="http://schemas.microsoft.com/office/drawing/2010/main" xmlns="">
+              <a14:hiddenFill xmlns="" xmlns:a14="http://schemas.microsoft.com/office/drawing/2010/main">
                 <a:solidFill>
                   <a:srgbClr val="FFFFFF"/>
                 </a:solidFill>
               </a14:hiddenFill>
             </a:ext>
             <a:ext uri="{91240B29-F687-4F45-9708-019B960494DF}">
-              <a14:hiddenLine xmlns:a14="http://schemas.microsoft.com/office/drawing/2010/main" xmlns="" w="9525">
+              <a14:hiddenLine xmlns="" xmlns:a14="http://schemas.microsoft.com/office/drawing/2010/main" w="9525">
                 <a:solidFill>
                   <a:srgbClr val="000000"/>
                 </a:solidFill>
@@ -1955,7 +1955,7 @@
     </p:spTree>
     <p:extLst>
       <p:ext uri="{BB962C8B-B14F-4D97-AF65-F5344CB8AC3E}">
-        <p14:creationId xmlns:p14="http://schemas.microsoft.com/office/powerpoint/2010/main" xmlns="" val="2156181659"/>
+        <p14:creationId xmlns="" xmlns:p14="http://schemas.microsoft.com/office/powerpoint/2010/main" val="2156181659"/>
       </p:ext>
     </p:extLst>
   </p:cSld>
@@ -2122,7 +2122,7 @@
     </p:spTree>
     <p:extLst>
       <p:ext uri="{BB962C8B-B14F-4D97-AF65-F5344CB8AC3E}">
-        <p14:creationId xmlns:p14="http://schemas.microsoft.com/office/powerpoint/2010/main" xmlns="" val="83598666"/>
+        <p14:creationId xmlns="" xmlns:p14="http://schemas.microsoft.com/office/powerpoint/2010/main" val="83598666"/>
       </p:ext>
     </p:extLst>
   </p:cSld>
@@ -2166,7 +2166,7 @@
           <a:blip r:embed="rId8" cstate="print">
             <a:extLst>
               <a:ext uri="{28A0092B-C50C-407E-A947-70E740481C1C}">
-                <a14:useLocalDpi xmlns:a14="http://schemas.microsoft.com/office/drawing/2010/main" xmlns="" val="0"/>
+                <a14:useLocalDpi xmlns="" xmlns:a14="http://schemas.microsoft.com/office/drawing/2010/main" val="0"/>
               </a:ext>
             </a:extLst>
           </a:blip>
@@ -2189,14 +2189,14 @@
           </a:ln>
           <a:extLst>
             <a:ext uri="{909E8E84-426E-40DD-AFC4-6F175D3DCCD1}">
-              <a14:hiddenFill xmlns:a14="http://schemas.microsoft.com/office/drawing/2010/main" xmlns="">
+              <a14:hiddenFill xmlns="" xmlns:a14="http://schemas.microsoft.com/office/drawing/2010/main">
                 <a:solidFill>
                   <a:srgbClr val="FFFFFF"/>
                 </a:solidFill>
               </a14:hiddenFill>
             </a:ext>
             <a:ext uri="{91240B29-F687-4F45-9708-019B960494DF}">
-              <a14:hiddenLine xmlns:a14="http://schemas.microsoft.com/office/drawing/2010/main" xmlns="" w="9525">
+              <a14:hiddenLine xmlns="" xmlns:a14="http://schemas.microsoft.com/office/drawing/2010/main" w="9525">
                 <a:solidFill>
                   <a:srgbClr val="000000"/>
                 </a:solidFill>
@@ -2269,7 +2269,7 @@
           <a:blip r:embed="rId9" cstate="print">
             <a:extLst>
               <a:ext uri="{28A0092B-C50C-407E-A947-70E740481C1C}">
-                <a14:useLocalDpi xmlns:a14="http://schemas.microsoft.com/office/drawing/2010/main" xmlns="" val="0"/>
+                <a14:useLocalDpi xmlns="" xmlns:a14="http://schemas.microsoft.com/office/drawing/2010/main" val="0"/>
               </a:ext>
             </a:extLst>
           </a:blip>
@@ -2292,14 +2292,14 @@
           </a:ln>
           <a:extLst>
             <a:ext uri="{909E8E84-426E-40DD-AFC4-6F175D3DCCD1}">
-              <a14:hiddenFill xmlns:a14="http://schemas.microsoft.com/office/drawing/2010/main" xmlns="">
+              <a14:hiddenFill xmlns="" xmlns:a14="http://schemas.microsoft.com/office/drawing/2010/main">
                 <a:solidFill>
                   <a:srgbClr val="FFFFFF"/>
                 </a:solidFill>
               </a14:hiddenFill>
             </a:ext>
             <a:ext uri="{91240B29-F687-4F45-9708-019B960494DF}">
-              <a14:hiddenLine xmlns:a14="http://schemas.microsoft.com/office/drawing/2010/main" xmlns="" w="9525">
+              <a14:hiddenLine xmlns="" xmlns:a14="http://schemas.microsoft.com/office/drawing/2010/main" w="9525">
                 <a:solidFill>
                   <a:srgbClr val="000000"/>
                 </a:solidFill>
@@ -2865,14 +2865,14 @@
             </a:ln>
             <a:extLst>
               <a:ext uri="{909E8E84-426E-40DD-AFC4-6F175D3DCCD1}">
-                <a14:hiddenFill xmlns:a14="http://schemas.microsoft.com/office/drawing/2010/main" xmlns="">
+                <a14:hiddenFill xmlns="" xmlns:a14="http://schemas.microsoft.com/office/drawing/2010/main">
                   <a:solidFill>
                     <a:srgbClr val="FFFFFF"/>
                   </a:solidFill>
                 </a14:hiddenFill>
               </a:ext>
               <a:ext uri="{91240B29-F687-4F45-9708-019B960494DF}">
-                <a14:hiddenLine xmlns:a14="http://schemas.microsoft.com/office/drawing/2010/main" xmlns="" w="9525">
+                <a14:hiddenLine xmlns="" xmlns:a14="http://schemas.microsoft.com/office/drawing/2010/main" w="9525">
                   <a:solidFill>
                     <a:srgbClr val="000000"/>
                   </a:solidFill>
@@ -3022,14 +3022,14 @@
             </a:ln>
             <a:extLst>
               <a:ext uri="{909E8E84-426E-40DD-AFC4-6F175D3DCCD1}">
-                <a14:hiddenFill xmlns:a14="http://schemas.microsoft.com/office/drawing/2010/main" xmlns="">
+                <a14:hiddenFill xmlns="" xmlns:a14="http://schemas.microsoft.com/office/drawing/2010/main">
                   <a:solidFill>
                     <a:srgbClr val="FFFFFF"/>
                   </a:solidFill>
                 </a14:hiddenFill>
               </a:ext>
               <a:ext uri="{91240B29-F687-4F45-9708-019B960494DF}">
-                <a14:hiddenLine xmlns:a14="http://schemas.microsoft.com/office/drawing/2010/main" xmlns="" w="9525">
+                <a14:hiddenLine xmlns="" xmlns:a14="http://schemas.microsoft.com/office/drawing/2010/main" w="9525">
                   <a:solidFill>
                     <a:srgbClr val="000000"/>
                   </a:solidFill>
@@ -3409,7 +3409,7 @@
           <a:blip r:embed="rId2" cstate="print">
             <a:extLst>
               <a:ext uri="{28A0092B-C50C-407E-A947-70E740481C1C}">
-                <a14:useLocalDpi xmlns:a14="http://schemas.microsoft.com/office/drawing/2010/main" xmlns="" val="0"/>
+                <a14:useLocalDpi xmlns="" xmlns:a14="http://schemas.microsoft.com/office/drawing/2010/main" val="0"/>
               </a:ext>
             </a:extLst>
           </a:blip>
@@ -3567,7 +3567,7 @@
           <a:blip r:embed="rId2" cstate="print">
             <a:extLst>
               <a:ext uri="{28A0092B-C50C-407E-A947-70E740481C1C}">
-                <a14:useLocalDpi xmlns:a14="http://schemas.microsoft.com/office/drawing/2010/main" xmlns="" val="0"/>
+                <a14:useLocalDpi xmlns="" xmlns:a14="http://schemas.microsoft.com/office/drawing/2010/main" val="0"/>
               </a:ext>
             </a:extLst>
           </a:blip>
@@ -3690,14 +3690,14 @@
             </a:ln>
             <a:extLst>
               <a:ext uri="{909E8E84-426E-40DD-AFC4-6F175D3DCCD1}">
-                <a14:hiddenFill xmlns:a14="http://schemas.microsoft.com/office/drawing/2010/main" xmlns="">
+                <a14:hiddenFill xmlns="" xmlns:a14="http://schemas.microsoft.com/office/drawing/2010/main">
                   <a:solidFill>
                     <a:srgbClr val="FFFFFF"/>
                   </a:solidFill>
                 </a14:hiddenFill>
               </a:ext>
               <a:ext uri="{91240B29-F687-4F45-9708-019B960494DF}">
-                <a14:hiddenLine xmlns:a14="http://schemas.microsoft.com/office/drawing/2010/main" xmlns="" w="9525">
+                <a14:hiddenLine xmlns="" xmlns:a14="http://schemas.microsoft.com/office/drawing/2010/main" w="9525">
                   <a:solidFill>
                     <a:srgbClr val="000000"/>
                   </a:solidFill>
@@ -3847,14 +3847,14 @@
             </a:ln>
             <a:extLst>
               <a:ext uri="{909E8E84-426E-40DD-AFC4-6F175D3DCCD1}">
-                <a14:hiddenFill xmlns:a14="http://schemas.microsoft.com/office/drawing/2010/main" xmlns="">
+                <a14:hiddenFill xmlns="" xmlns:a14="http://schemas.microsoft.com/office/drawing/2010/main">
                   <a:solidFill>
                     <a:srgbClr val="FFFFFF"/>
                   </a:solidFill>
                 </a14:hiddenFill>
               </a:ext>
               <a:ext uri="{91240B29-F687-4F45-9708-019B960494DF}">
-                <a14:hiddenLine xmlns:a14="http://schemas.microsoft.com/office/drawing/2010/main" xmlns="" w="9525">
+                <a14:hiddenLine xmlns="" xmlns:a14="http://schemas.microsoft.com/office/drawing/2010/main" w="9525">
                   <a:solidFill>
                     <a:srgbClr val="000000"/>
                   </a:solidFill>
@@ -4118,7 +4118,7 @@
     </p:spTree>
     <p:extLst>
       <p:ext uri="{BB962C8B-B14F-4D97-AF65-F5344CB8AC3E}">
-        <p14:creationId xmlns:p14="http://schemas.microsoft.com/office/powerpoint/2010/main" xmlns="" val="2461302196"/>
+        <p14:creationId xmlns="" xmlns:p14="http://schemas.microsoft.com/office/powerpoint/2010/main" val="2461302196"/>
       </p:ext>
     </p:extLst>
   </p:cSld>
@@ -4197,14 +4197,14 @@
           </a:xfrm>
           <a:extLst>
             <a:ext uri="{909E8E84-426E-40DD-AFC4-6F175D3DCCD1}">
-              <a14:hiddenFill xmlns:a14="http://schemas.microsoft.com/office/drawing/2010/main" xmlns="">
+              <a14:hiddenFill xmlns="" xmlns:a14="http://schemas.microsoft.com/office/drawing/2010/main">
                 <a:solidFill>
                   <a:srgbClr val="FFFFFF"/>
                 </a:solidFill>
               </a14:hiddenFill>
             </a:ext>
             <a:ext uri="{91240B29-F687-4F45-9708-019B960494DF}">
-              <a14:hiddenLine xmlns:a14="http://schemas.microsoft.com/office/drawing/2010/main" xmlns="" w="9525">
+              <a14:hiddenLine xmlns="" xmlns:a14="http://schemas.microsoft.com/office/drawing/2010/main" w="9525">
                 <a:solidFill>
                   <a:srgbClr val="000000"/>
                 </a:solidFill>
@@ -4371,7 +4371,7 @@
     </p:spTree>
     <p:extLst>
       <p:ext uri="{BB962C8B-B14F-4D97-AF65-F5344CB8AC3E}">
-        <p14:creationId xmlns:p14="http://schemas.microsoft.com/office/powerpoint/2010/main" xmlns="" val="1166103754"/>
+        <p14:creationId xmlns="" xmlns:p14="http://schemas.microsoft.com/office/powerpoint/2010/main" val="1166103754"/>
       </p:ext>
     </p:extLst>
   </p:cSld>
@@ -4442,7 +4442,7 @@
           <a:blip r:embed="rId2" cstate="print">
             <a:extLst>
               <a:ext uri="{28A0092B-C50C-407E-A947-70E740481C1C}">
-                <a14:useLocalDpi xmlns:a14="http://schemas.microsoft.com/office/drawing/2010/main" xmlns="" val="0"/>
+                <a14:useLocalDpi xmlns="" xmlns:a14="http://schemas.microsoft.com/office/drawing/2010/main" val="0"/>
               </a:ext>
             </a:extLst>
           </a:blip>
@@ -4463,7 +4463,7 @@
     </p:spTree>
     <p:extLst>
       <p:ext uri="{BB962C8B-B14F-4D97-AF65-F5344CB8AC3E}">
-        <p14:creationId xmlns:p14="http://schemas.microsoft.com/office/powerpoint/2010/main" xmlns="" val="4100715659"/>
+        <p14:creationId xmlns="" xmlns:p14="http://schemas.microsoft.com/office/powerpoint/2010/main" val="4100715659"/>
       </p:ext>
     </p:extLst>
   </p:cSld>
@@ -4539,14 +4539,14 @@
           </a:xfrm>
           <a:extLst>
             <a:ext uri="{909E8E84-426E-40DD-AFC4-6F175D3DCCD1}">
-              <a14:hiddenFill xmlns:a14="http://schemas.microsoft.com/office/drawing/2010/main" xmlns="">
+              <a14:hiddenFill xmlns="" xmlns:a14="http://schemas.microsoft.com/office/drawing/2010/main">
                 <a:solidFill>
                   <a:srgbClr val="FFFFFF"/>
                 </a:solidFill>
               </a14:hiddenFill>
             </a:ext>
             <a:ext uri="{91240B29-F687-4F45-9708-019B960494DF}">
-              <a14:hiddenLine xmlns:a14="http://schemas.microsoft.com/office/drawing/2010/main" xmlns="" w="9525">
+              <a14:hiddenLine xmlns="" xmlns:a14="http://schemas.microsoft.com/office/drawing/2010/main" w="9525">
                 <a:solidFill>
                   <a:srgbClr val="000000"/>
                 </a:solidFill>
@@ -4587,7 +4587,7 @@
           <p:cNvPr id="2" name="Picture 1">
             <a:extLst>
               <a:ext uri="{FF2B5EF4-FFF2-40B4-BE49-F238E27FC236}">
-                <a16:creationId xmlns:a16="http://schemas.microsoft.com/office/drawing/2014/main" xmlns="" id="{F5A00150-EB0A-4F28-911C-141811EBFBD4}"/>
+                <a16:creationId xmlns="" xmlns:a16="http://schemas.microsoft.com/office/drawing/2014/main" id="{F5A00150-EB0A-4F28-911C-141811EBFBD4}"/>
               </a:ext>
             </a:extLst>
           </p:cNvPr>
@@ -4614,7 +4614,7 @@
     </p:spTree>
     <p:extLst>
       <p:ext uri="{BB962C8B-B14F-4D97-AF65-F5344CB8AC3E}">
-        <p14:creationId xmlns:p14="http://schemas.microsoft.com/office/powerpoint/2010/main" xmlns="" val="4234705847"/>
+        <p14:creationId xmlns="" xmlns:p14="http://schemas.microsoft.com/office/powerpoint/2010/main" val="4234705847"/>
       </p:ext>
     </p:extLst>
   </p:cSld>
@@ -4693,14 +4693,14 @@
           </a:xfrm>
           <a:extLst>
             <a:ext uri="{909E8E84-426E-40DD-AFC4-6F175D3DCCD1}">
-              <a14:hiddenFill xmlns:a14="http://schemas.microsoft.com/office/drawing/2010/main" xmlns="">
+              <a14:hiddenFill xmlns="" xmlns:a14="http://schemas.microsoft.com/office/drawing/2010/main">
                 <a:solidFill>
                   <a:srgbClr val="FFFFFF"/>
                 </a:solidFill>
               </a14:hiddenFill>
             </a:ext>
             <a:ext uri="{91240B29-F687-4F45-9708-019B960494DF}">
-              <a14:hiddenLine xmlns:a14="http://schemas.microsoft.com/office/drawing/2010/main" xmlns="" w="9525">
+              <a14:hiddenLine xmlns="" xmlns:a14="http://schemas.microsoft.com/office/drawing/2010/main" w="9525">
                 <a:solidFill>
                   <a:srgbClr val="000000"/>
                 </a:solidFill>
@@ -4741,7 +4741,7 @@
           <p:cNvPr id="3" name="Picture 2">
             <a:extLst>
               <a:ext uri="{FF2B5EF4-FFF2-40B4-BE49-F238E27FC236}">
-                <a16:creationId xmlns:a16="http://schemas.microsoft.com/office/drawing/2014/main" xmlns="" id="{2B1A4BC2-7DE1-4299-98E4-7ED739A14DCC}"/>
+                <a16:creationId xmlns="" xmlns:a16="http://schemas.microsoft.com/office/drawing/2014/main" id="{2B1A4BC2-7DE1-4299-98E4-7ED739A14DCC}"/>
               </a:ext>
             </a:extLst>
           </p:cNvPr>
@@ -4769,7 +4769,7 @@
     </p:spTree>
     <p:extLst>
       <p:ext uri="{BB962C8B-B14F-4D97-AF65-F5344CB8AC3E}">
-        <p14:creationId xmlns:p14="http://schemas.microsoft.com/office/powerpoint/2010/main" xmlns="" val="324456396"/>
+        <p14:creationId xmlns="" xmlns:p14="http://schemas.microsoft.com/office/powerpoint/2010/main" val="324456396"/>
       </p:ext>
     </p:extLst>
   </p:cSld>
@@ -4848,14 +4848,14 @@
           </a:xfrm>
           <a:extLst>
             <a:ext uri="{909E8E84-426E-40DD-AFC4-6F175D3DCCD1}">
-              <a14:hiddenFill xmlns:a14="http://schemas.microsoft.com/office/drawing/2010/main" xmlns="">
+              <a14:hiddenFill xmlns="" xmlns:a14="http://schemas.microsoft.com/office/drawing/2010/main">
                 <a:solidFill>
                   <a:srgbClr val="FFFFFF"/>
                 </a:solidFill>
               </a14:hiddenFill>
             </a:ext>
             <a:ext uri="{91240B29-F687-4F45-9708-019B960494DF}">
-              <a14:hiddenLine xmlns:a14="http://schemas.microsoft.com/office/drawing/2010/main" xmlns="" w="9525">
+              <a14:hiddenLine xmlns="" xmlns:a14="http://schemas.microsoft.com/office/drawing/2010/main" w="9525">
                 <a:solidFill>
                   <a:srgbClr val="000000"/>
                 </a:solidFill>
@@ -4896,7 +4896,7 @@
           <p:cNvPr id="2" name="Picture 1">
             <a:extLst>
               <a:ext uri="{FF2B5EF4-FFF2-40B4-BE49-F238E27FC236}">
-                <a16:creationId xmlns:a16="http://schemas.microsoft.com/office/drawing/2014/main" xmlns="" id="{21DDFF5F-FFF6-4DB6-AD4E-6794E13280AB}"/>
+                <a16:creationId xmlns="" xmlns:a16="http://schemas.microsoft.com/office/drawing/2014/main" id="{21DDFF5F-FFF6-4DB6-AD4E-6794E13280AB}"/>
               </a:ext>
             </a:extLst>
           </p:cNvPr>
@@ -4924,7 +4924,7 @@
     </p:spTree>
     <p:extLst>
       <p:ext uri="{BB962C8B-B14F-4D97-AF65-F5344CB8AC3E}">
-        <p14:creationId xmlns:p14="http://schemas.microsoft.com/office/powerpoint/2010/main" xmlns="" val="3523015254"/>
+        <p14:creationId xmlns="" xmlns:p14="http://schemas.microsoft.com/office/powerpoint/2010/main" val="3523015254"/>
       </p:ext>
     </p:extLst>
   </p:cSld>
@@ -5003,14 +5003,14 @@
           </a:xfrm>
           <a:extLst>
             <a:ext uri="{909E8E84-426E-40DD-AFC4-6F175D3DCCD1}">
-              <a14:hiddenFill xmlns:a14="http://schemas.microsoft.com/office/drawing/2010/main" xmlns="">
+              <a14:hiddenFill xmlns="" xmlns:a14="http://schemas.microsoft.com/office/drawing/2010/main">
                 <a:solidFill>
                   <a:srgbClr val="FFFFFF"/>
                 </a:solidFill>
               </a14:hiddenFill>
             </a:ext>
             <a:ext uri="{91240B29-F687-4F45-9708-019B960494DF}">
-              <a14:hiddenLine xmlns:a14="http://schemas.microsoft.com/office/drawing/2010/main" xmlns="" w="9525">
+              <a14:hiddenLine xmlns="" xmlns:a14="http://schemas.microsoft.com/office/drawing/2010/main" w="9525">
                 <a:solidFill>
                   <a:srgbClr val="000000"/>
                 </a:solidFill>
@@ -5051,7 +5051,7 @@
           <p:cNvPr id="3" name="Picture 2">
             <a:extLst>
               <a:ext uri="{FF2B5EF4-FFF2-40B4-BE49-F238E27FC236}">
-                <a16:creationId xmlns:a16="http://schemas.microsoft.com/office/drawing/2014/main" xmlns="" id="{69168DE8-9710-4C4D-825A-7E6F62278493}"/>
+                <a16:creationId xmlns="" xmlns:a16="http://schemas.microsoft.com/office/drawing/2014/main" id="{69168DE8-9710-4C4D-825A-7E6F62278493}"/>
               </a:ext>
             </a:extLst>
           </p:cNvPr>
@@ -5079,7 +5079,7 @@
     </p:spTree>
     <p:extLst>
       <p:ext uri="{BB962C8B-B14F-4D97-AF65-F5344CB8AC3E}">
-        <p14:creationId xmlns:p14="http://schemas.microsoft.com/office/powerpoint/2010/main" xmlns="" val="3817239344"/>
+        <p14:creationId xmlns="" xmlns:p14="http://schemas.microsoft.com/office/powerpoint/2010/main" val="3817239344"/>
       </p:ext>
     </p:extLst>
   </p:cSld>
@@ -5158,14 +5158,14 @@
           </a:xfrm>
           <a:extLst>
             <a:ext uri="{909E8E84-426E-40DD-AFC4-6F175D3DCCD1}">
-              <a14:hiddenFill xmlns:a14="http://schemas.microsoft.com/office/drawing/2010/main" xmlns="">
+              <a14:hiddenFill xmlns="" xmlns:a14="http://schemas.microsoft.com/office/drawing/2010/main">
                 <a:solidFill>
                   <a:srgbClr val="FFFFFF"/>
                 </a:solidFill>
               </a14:hiddenFill>
             </a:ext>
             <a:ext uri="{91240B29-F687-4F45-9708-019B960494DF}">
-              <a14:hiddenLine xmlns:a14="http://schemas.microsoft.com/office/drawing/2010/main" xmlns="" w="9525">
+              <a14:hiddenLine xmlns="" xmlns:a14="http://schemas.microsoft.com/office/drawing/2010/main" w="9525">
                 <a:solidFill>
                   <a:srgbClr val="000000"/>
                 </a:solidFill>
@@ -5206,7 +5206,7 @@
           <p:cNvPr id="2" name="Picture 1">
             <a:extLst>
               <a:ext uri="{FF2B5EF4-FFF2-40B4-BE49-F238E27FC236}">
-                <a16:creationId xmlns:a16="http://schemas.microsoft.com/office/drawing/2014/main" xmlns="" id="{B6A781C1-AA15-45C9-BF02-66987FF55897}"/>
+                <a16:creationId xmlns="" xmlns:a16="http://schemas.microsoft.com/office/drawing/2014/main" id="{B6A781C1-AA15-45C9-BF02-66987FF55897}"/>
               </a:ext>
             </a:extLst>
           </p:cNvPr>
@@ -5234,7 +5234,7 @@
     </p:spTree>
     <p:extLst>
       <p:ext uri="{BB962C8B-B14F-4D97-AF65-F5344CB8AC3E}">
-        <p14:creationId xmlns:p14="http://schemas.microsoft.com/office/powerpoint/2010/main" xmlns="" val="1697811339"/>
+        <p14:creationId xmlns="" xmlns:p14="http://schemas.microsoft.com/office/powerpoint/2010/main" val="1697811339"/>
       </p:ext>
     </p:extLst>
   </p:cSld>
@@ -5465,14 +5465,14 @@
             </a:ln>
             <a:extLst>
               <a:ext uri="{909E8E84-426E-40DD-AFC4-6F175D3DCCD1}">
-                <a14:hiddenFill xmlns:a14="http://schemas.microsoft.com/office/drawing/2010/main" xmlns="">
+                <a14:hiddenFill xmlns="" xmlns:a14="http://schemas.microsoft.com/office/drawing/2010/main">
                   <a:solidFill>
                     <a:srgbClr val="FFFFFF"/>
                   </a:solidFill>
                 </a14:hiddenFill>
               </a:ext>
               <a:ext uri="{91240B29-F687-4F45-9708-019B960494DF}">
-                <a14:hiddenLine xmlns:a14="http://schemas.microsoft.com/office/drawing/2010/main" xmlns="" w="9525">
+                <a14:hiddenLine xmlns="" xmlns:a14="http://schemas.microsoft.com/office/drawing/2010/main" w="9525">
                   <a:solidFill>
                     <a:srgbClr val="000000"/>
                   </a:solidFill>
@@ -5622,14 +5622,14 @@
             </a:ln>
             <a:extLst>
               <a:ext uri="{909E8E84-426E-40DD-AFC4-6F175D3DCCD1}">
-                <a14:hiddenFill xmlns:a14="http://schemas.microsoft.com/office/drawing/2010/main" xmlns="">
+                <a14:hiddenFill xmlns="" xmlns:a14="http://schemas.microsoft.com/office/drawing/2010/main">
                   <a:solidFill>
                     <a:srgbClr val="FFFFFF"/>
                   </a:solidFill>
                 </a14:hiddenFill>
               </a:ext>
               <a:ext uri="{91240B29-F687-4F45-9708-019B960494DF}">
-                <a14:hiddenLine xmlns:a14="http://schemas.microsoft.com/office/drawing/2010/main" xmlns="" w="9525">
+                <a14:hiddenLine xmlns="" xmlns:a14="http://schemas.microsoft.com/office/drawing/2010/main" w="9525">
                   <a:solidFill>
                     <a:srgbClr val="000000"/>
                   </a:solidFill>
@@ -5874,7 +5874,7 @@
     </p:spTree>
     <p:extLst>
       <p:ext uri="{BB962C8B-B14F-4D97-AF65-F5344CB8AC3E}">
-        <p14:creationId xmlns:p14="http://schemas.microsoft.com/office/powerpoint/2010/main" xmlns="" val="681014556"/>
+        <p14:creationId xmlns="" xmlns:p14="http://schemas.microsoft.com/office/powerpoint/2010/main" val="681014556"/>
       </p:ext>
     </p:extLst>
   </p:cSld>
@@ -6389,7 +6389,7 @@
     </p:spTree>
     <p:extLst>
       <p:ext uri="{BB962C8B-B14F-4D97-AF65-F5344CB8AC3E}">
-        <p14:creationId xmlns:p14="http://schemas.microsoft.com/office/powerpoint/2010/main" xmlns="" val="3812644496"/>
+        <p14:creationId xmlns="" xmlns:p14="http://schemas.microsoft.com/office/powerpoint/2010/main" val="3812644496"/>
       </p:ext>
     </p:extLst>
   </p:cSld>
@@ -6619,7 +6619,7 @@
           <a:blip r:embed="rId2" cstate="print">
             <a:extLst>
               <a:ext uri="{28A0092B-C50C-407E-A947-70E740481C1C}">
-                <a14:useLocalDpi xmlns:a14="http://schemas.microsoft.com/office/drawing/2010/main" xmlns="" val="0"/>
+                <a14:useLocalDpi xmlns="" xmlns:a14="http://schemas.microsoft.com/office/drawing/2010/main" val="0"/>
               </a:ext>
             </a:extLst>
           </a:blip>
@@ -6640,7 +6640,7 @@
     </p:spTree>
     <p:extLst>
       <p:ext uri="{BB962C8B-B14F-4D97-AF65-F5344CB8AC3E}">
-        <p14:creationId xmlns:p14="http://schemas.microsoft.com/office/powerpoint/2010/main" xmlns="" val="1625217003"/>
+        <p14:creationId xmlns="" xmlns:p14="http://schemas.microsoft.com/office/powerpoint/2010/main" val="1625217003"/>
       </p:ext>
     </p:extLst>
   </p:cSld>
@@ -6870,7 +6870,7 @@
           <a:blip r:embed="rId2" cstate="print">
             <a:extLst>
               <a:ext uri="{28A0092B-C50C-407E-A947-70E740481C1C}">
-                <a14:useLocalDpi xmlns:a14="http://schemas.microsoft.com/office/drawing/2010/main" xmlns="" val="0"/>
+                <a14:useLocalDpi xmlns="" xmlns:a14="http://schemas.microsoft.com/office/drawing/2010/main" val="0"/>
               </a:ext>
             </a:extLst>
           </a:blip>
@@ -6891,7 +6891,7 @@
     </p:spTree>
     <p:extLst>
       <p:ext uri="{BB962C8B-B14F-4D97-AF65-F5344CB8AC3E}">
-        <p14:creationId xmlns:p14="http://schemas.microsoft.com/office/powerpoint/2010/main" xmlns="" val="1256551592"/>
+        <p14:creationId xmlns="" xmlns:p14="http://schemas.microsoft.com/office/powerpoint/2010/main" val="1256551592"/>
       </p:ext>
     </p:extLst>
   </p:cSld>
@@ -7121,7 +7121,7 @@
           <a:blip r:embed="rId2" cstate="print">
             <a:extLst>
               <a:ext uri="{28A0092B-C50C-407E-A947-70E740481C1C}">
-                <a14:useLocalDpi xmlns:a14="http://schemas.microsoft.com/office/drawing/2010/main" xmlns="" val="0"/>
+                <a14:useLocalDpi xmlns="" xmlns:a14="http://schemas.microsoft.com/office/drawing/2010/main" val="0"/>
               </a:ext>
             </a:extLst>
           </a:blip>
@@ -7142,7 +7142,7 @@
     </p:spTree>
     <p:extLst>
       <p:ext uri="{BB962C8B-B14F-4D97-AF65-F5344CB8AC3E}">
-        <p14:creationId xmlns:p14="http://schemas.microsoft.com/office/powerpoint/2010/main" xmlns="" val="3402891464"/>
+        <p14:creationId xmlns="" xmlns:p14="http://schemas.microsoft.com/office/powerpoint/2010/main" val="3402891464"/>
       </p:ext>
     </p:extLst>
   </p:cSld>
@@ -7365,7 +7365,7 @@
           <a:blip r:embed="rId2" cstate="print">
             <a:extLst>
               <a:ext uri="{28A0092B-C50C-407E-A947-70E740481C1C}">
-                <a14:useLocalDpi xmlns:a14="http://schemas.microsoft.com/office/drawing/2010/main" xmlns="" val="0"/>
+                <a14:useLocalDpi xmlns="" xmlns:a14="http://schemas.microsoft.com/office/drawing/2010/main" val="0"/>
               </a:ext>
             </a:extLst>
           </a:blip>
@@ -7386,7 +7386,7 @@
     </p:spTree>
     <p:extLst>
       <p:ext uri="{BB962C8B-B14F-4D97-AF65-F5344CB8AC3E}">
-        <p14:creationId xmlns:p14="http://schemas.microsoft.com/office/powerpoint/2010/main" xmlns="" val="2843391693"/>
+        <p14:creationId xmlns="" xmlns:p14="http://schemas.microsoft.com/office/powerpoint/2010/main" val="2843391693"/>
       </p:ext>
     </p:extLst>
   </p:cSld>
@@ -7609,7 +7609,7 @@
           <a:blip r:embed="rId2" cstate="print">
             <a:extLst>
               <a:ext uri="{28A0092B-C50C-407E-A947-70E740481C1C}">
-                <a14:useLocalDpi xmlns:a14="http://schemas.microsoft.com/office/drawing/2010/main" xmlns="" val="0"/>
+                <a14:useLocalDpi xmlns="" xmlns:a14="http://schemas.microsoft.com/office/drawing/2010/main" val="0"/>
               </a:ext>
             </a:extLst>
           </a:blip>
@@ -7630,7 +7630,7 @@
     </p:spTree>
     <p:extLst>
       <p:ext uri="{BB962C8B-B14F-4D97-AF65-F5344CB8AC3E}">
-        <p14:creationId xmlns:p14="http://schemas.microsoft.com/office/powerpoint/2010/main" xmlns="" val="3776007642"/>
+        <p14:creationId xmlns="" xmlns:p14="http://schemas.microsoft.com/office/powerpoint/2010/main" val="3776007642"/>
       </p:ext>
     </p:extLst>
   </p:cSld>
@@ -7730,14 +7730,14 @@
             </a:ln>
             <a:extLst>
               <a:ext uri="{909E8E84-426E-40DD-AFC4-6F175D3DCCD1}">
-                <a14:hiddenFill xmlns:a14="http://schemas.microsoft.com/office/drawing/2010/main" xmlns="">
+                <a14:hiddenFill xmlns="" xmlns:a14="http://schemas.microsoft.com/office/drawing/2010/main">
                   <a:solidFill>
                     <a:srgbClr val="FFFFFF"/>
                   </a:solidFill>
                 </a14:hiddenFill>
               </a:ext>
               <a:ext uri="{91240B29-F687-4F45-9708-019B960494DF}">
-                <a14:hiddenLine xmlns:a14="http://schemas.microsoft.com/office/drawing/2010/main" xmlns="" w="9525">
+                <a14:hiddenLine xmlns="" xmlns:a14="http://schemas.microsoft.com/office/drawing/2010/main" w="9525">
                   <a:solidFill>
                     <a:srgbClr val="000000"/>
                   </a:solidFill>
@@ -7887,14 +7887,14 @@
             </a:ln>
             <a:extLst>
               <a:ext uri="{909E8E84-426E-40DD-AFC4-6F175D3DCCD1}">
-                <a14:hiddenFill xmlns:a14="http://schemas.microsoft.com/office/drawing/2010/main" xmlns="">
+                <a14:hiddenFill xmlns="" xmlns:a14="http://schemas.microsoft.com/office/drawing/2010/main">
                   <a:solidFill>
                     <a:srgbClr val="FFFFFF"/>
                   </a:solidFill>
                 </a14:hiddenFill>
               </a:ext>
               <a:ext uri="{91240B29-F687-4F45-9708-019B960494DF}">
-                <a14:hiddenLine xmlns:a14="http://schemas.microsoft.com/office/drawing/2010/main" xmlns="" w="9525">
+                <a14:hiddenLine xmlns="" xmlns:a14="http://schemas.microsoft.com/office/drawing/2010/main" w="9525">
                   <a:solidFill>
                     <a:srgbClr val="000000"/>
                   </a:solidFill>
@@ -8523,7 +8523,7 @@
     </p:spTree>
     <p:extLst>
       <p:ext uri="{BB962C8B-B14F-4D97-AF65-F5344CB8AC3E}">
-        <p14:creationId xmlns:p14="http://schemas.microsoft.com/office/powerpoint/2010/main" xmlns="" val="2886033736"/>
+        <p14:creationId xmlns="" xmlns:p14="http://schemas.microsoft.com/office/powerpoint/2010/main" val="2886033736"/>
       </p:ext>
     </p:extLst>
   </p:cSld>
@@ -8583,7 +8583,7 @@
           <p:cNvPr id="3" name="Picture 2">
             <a:extLst>
               <a:ext uri="{FF2B5EF4-FFF2-40B4-BE49-F238E27FC236}">
-                <a16:creationId xmlns:a16="http://schemas.microsoft.com/office/drawing/2014/main" xmlns="" id="{1488CEA1-615B-4D4C-A130-F1FD32F916CA}"/>
+                <a16:creationId xmlns="" xmlns:a16="http://schemas.microsoft.com/office/drawing/2014/main" id="{1488CEA1-615B-4D4C-A130-F1FD32F916CA}"/>
               </a:ext>
             </a:extLst>
           </p:cNvPr>
@@ -8596,7 +8596,7 @@
           <a:blip r:embed="rId2" cstate="print">
             <a:extLst>
               <a:ext uri="{28A0092B-C50C-407E-A947-70E740481C1C}">
-                <a14:useLocalDpi xmlns:a14="http://schemas.microsoft.com/office/drawing/2010/main" xmlns="" val="0"/>
+                <a14:useLocalDpi xmlns="" xmlns:a14="http://schemas.microsoft.com/office/drawing/2010/main" val="0"/>
               </a:ext>
             </a:extLst>
           </a:blip>
@@ -8679,7 +8679,7 @@
           <a:blip r:embed="rId3" cstate="print">
             <a:extLst>
               <a:ext uri="{28A0092B-C50C-407E-A947-70E740481C1C}">
-                <a14:useLocalDpi xmlns:a14="http://schemas.microsoft.com/office/drawing/2010/main" xmlns="" val="0"/>
+                <a14:useLocalDpi xmlns="" xmlns:a14="http://schemas.microsoft.com/office/drawing/2010/main" val="0"/>
               </a:ext>
             </a:extLst>
           </a:blip>
@@ -8762,7 +8762,7 @@
           <p:cNvPr id="1026" name="Picture 2">
             <a:extLst>
               <a:ext uri="{FF2B5EF4-FFF2-40B4-BE49-F238E27FC236}">
-                <a16:creationId xmlns:a16="http://schemas.microsoft.com/office/drawing/2014/main" xmlns="" id="{680D742B-523C-43D4-9E8B-E4709EAE39EB}"/>
+                <a16:creationId xmlns="" xmlns:a16="http://schemas.microsoft.com/office/drawing/2014/main" id="{680D742B-523C-43D4-9E8B-E4709EAE39EB}"/>
               </a:ext>
             </a:extLst>
           </p:cNvPr>
@@ -8775,7 +8775,7 @@
           <a:blip r:embed="rId2" cstate="print">
             <a:extLst>
               <a:ext uri="{28A0092B-C50C-407E-A947-70E740481C1C}">
-                <a14:useLocalDpi xmlns:a14="http://schemas.microsoft.com/office/drawing/2010/main" xmlns="" val="0"/>
+                <a14:useLocalDpi xmlns="" xmlns:a14="http://schemas.microsoft.com/office/drawing/2010/main" val="0"/>
               </a:ext>
             </a:extLst>
           </a:blip>
@@ -8798,14 +8798,14 @@
           </a:ln>
           <a:extLst>
             <a:ext uri="{909E8E84-426E-40DD-AFC4-6F175D3DCCD1}">
-              <a14:hiddenFill xmlns:a14="http://schemas.microsoft.com/office/drawing/2010/main" xmlns="">
+              <a14:hiddenFill xmlns="" xmlns:a14="http://schemas.microsoft.com/office/drawing/2010/main">
                 <a:solidFill>
                   <a:srgbClr val="FFFFFF"/>
                 </a:solidFill>
               </a14:hiddenFill>
             </a:ext>
             <a:ext uri="{91240B29-F687-4F45-9708-019B960494DF}">
-              <a14:hiddenLine xmlns:a14="http://schemas.microsoft.com/office/drawing/2010/main" xmlns="" w="9525">
+              <a14:hiddenLine xmlns="" xmlns:a14="http://schemas.microsoft.com/office/drawing/2010/main" w="9525">
                 <a:solidFill>
                   <a:srgbClr val="000000"/>
                 </a:solidFill>
@@ -8820,7 +8820,7 @@
     </p:spTree>
     <p:extLst>
       <p:ext uri="{BB962C8B-B14F-4D97-AF65-F5344CB8AC3E}">
-        <p14:creationId xmlns:p14="http://schemas.microsoft.com/office/powerpoint/2010/main" xmlns="" val="1781569390"/>
+        <p14:creationId xmlns="" xmlns:p14="http://schemas.microsoft.com/office/powerpoint/2010/main" val="1781569390"/>
       </p:ext>
     </p:extLst>
   </p:cSld>
@@ -8855,7 +8855,7 @@
           <p:cNvPr id="4" name="Título 3">
             <a:extLst>
               <a:ext uri="{FF2B5EF4-FFF2-40B4-BE49-F238E27FC236}">
-                <a16:creationId xmlns:a16="http://schemas.microsoft.com/office/drawing/2014/main" xmlns="" id="{26BCFAA2-D859-44BC-AFEE-2D5119DC4C72}"/>
+                <a16:creationId xmlns="" xmlns:a16="http://schemas.microsoft.com/office/drawing/2014/main" id="{26BCFAA2-D859-44BC-AFEE-2D5119DC4C72}"/>
               </a:ext>
             </a:extLst>
           </p:cNvPr>
@@ -8891,7 +8891,7 @@
           <p:cNvPr id="3" name="Picture 2">
             <a:extLst>
               <a:ext uri="{FF2B5EF4-FFF2-40B4-BE49-F238E27FC236}">
-                <a16:creationId xmlns:a16="http://schemas.microsoft.com/office/drawing/2014/main" xmlns="" id="{697244E8-4C32-432B-82C5-5F541E652E84}"/>
+                <a16:creationId xmlns="" xmlns:a16="http://schemas.microsoft.com/office/drawing/2014/main" id="{697244E8-4C32-432B-82C5-5F541E652E84}"/>
               </a:ext>
             </a:extLst>
           </p:cNvPr>
@@ -8949,7 +8949,7 @@
           <p:cNvPr id="2" name="Rectangle 1">
             <a:extLst>
               <a:ext uri="{FF2B5EF4-FFF2-40B4-BE49-F238E27FC236}">
-                <a16:creationId xmlns:a16="http://schemas.microsoft.com/office/drawing/2014/main" xmlns="" id="{9B84690F-C0BA-45DE-B1F4-7C1D7425D6FC}"/>
+                <a16:creationId xmlns="" xmlns:a16="http://schemas.microsoft.com/office/drawing/2014/main" id="{9B84690F-C0BA-45DE-B1F4-7C1D7425D6FC}"/>
               </a:ext>
             </a:extLst>
           </p:cNvPr>
@@ -9003,7 +9003,7 @@
           <p:cNvPr id="4" name="Picture 3">
             <a:extLst>
               <a:ext uri="{FF2B5EF4-FFF2-40B4-BE49-F238E27FC236}">
-                <a16:creationId xmlns:a16="http://schemas.microsoft.com/office/drawing/2014/main" xmlns="" id="{FF33F444-5274-47FB-9AB9-B9E9F701C115}"/>
+                <a16:creationId xmlns="" xmlns:a16="http://schemas.microsoft.com/office/drawing/2014/main" id="{FF33F444-5274-47FB-9AB9-B9E9F701C115}"/>
               </a:ext>
             </a:extLst>
           </p:cNvPr>
@@ -9031,7 +9031,7 @@
     </p:spTree>
     <p:extLst>
       <p:ext uri="{BB962C8B-B14F-4D97-AF65-F5344CB8AC3E}">
-        <p14:creationId xmlns:p14="http://schemas.microsoft.com/office/powerpoint/2010/main" xmlns="" val="2886251363"/>
+        <p14:creationId xmlns="" xmlns:p14="http://schemas.microsoft.com/office/powerpoint/2010/main" val="2886251363"/>
       </p:ext>
     </p:extLst>
   </p:cSld>
@@ -9088,7 +9088,7 @@
           <p:cNvPr id="5" name="Rectangle 4">
             <a:extLst>
               <a:ext uri="{FF2B5EF4-FFF2-40B4-BE49-F238E27FC236}">
-                <a16:creationId xmlns:a16="http://schemas.microsoft.com/office/drawing/2014/main" xmlns="" id="{E268ED25-8F1E-4CB1-BEC7-9279730C430D}"/>
+                <a16:creationId xmlns="" xmlns:a16="http://schemas.microsoft.com/office/drawing/2014/main" id="{E268ED25-8F1E-4CB1-BEC7-9279730C430D}"/>
               </a:ext>
             </a:extLst>
           </p:cNvPr>
@@ -9142,7 +9142,7 @@
           <p:cNvPr id="2" name="Picture 1">
             <a:extLst>
               <a:ext uri="{FF2B5EF4-FFF2-40B4-BE49-F238E27FC236}">
-                <a16:creationId xmlns:a16="http://schemas.microsoft.com/office/drawing/2014/main" xmlns="" id="{AC3F4872-BBD0-4C85-AF1B-EECA98565237}"/>
+                <a16:creationId xmlns="" xmlns:a16="http://schemas.microsoft.com/office/drawing/2014/main" id="{AC3F4872-BBD0-4C85-AF1B-EECA98565237}"/>
               </a:ext>
             </a:extLst>
           </p:cNvPr>
@@ -9170,7 +9170,7 @@
     </p:spTree>
     <p:extLst>
       <p:ext uri="{BB962C8B-B14F-4D97-AF65-F5344CB8AC3E}">
-        <p14:creationId xmlns:p14="http://schemas.microsoft.com/office/powerpoint/2010/main" xmlns="" val="395963370"/>
+        <p14:creationId xmlns="" xmlns:p14="http://schemas.microsoft.com/office/powerpoint/2010/main" val="395963370"/>
       </p:ext>
     </p:extLst>
   </p:cSld>
@@ -9273,14 +9273,14 @@
             </a:ln>
             <a:extLst>
               <a:ext uri="{909E8E84-426E-40DD-AFC4-6F175D3DCCD1}">
-                <a14:hiddenFill xmlns:a14="http://schemas.microsoft.com/office/drawing/2010/main" xmlns="">
+                <a14:hiddenFill xmlns="" xmlns:a14="http://schemas.microsoft.com/office/drawing/2010/main">
                   <a:solidFill>
                     <a:srgbClr val="FFFFFF"/>
                   </a:solidFill>
                 </a14:hiddenFill>
               </a:ext>
               <a:ext uri="{91240B29-F687-4F45-9708-019B960494DF}">
-                <a14:hiddenLine xmlns:a14="http://schemas.microsoft.com/office/drawing/2010/main" xmlns="" w="9525">
+                <a14:hiddenLine xmlns="" xmlns:a14="http://schemas.microsoft.com/office/drawing/2010/main" w="9525">
                   <a:solidFill>
                     <a:srgbClr val="000000"/>
                   </a:solidFill>
@@ -9430,14 +9430,14 @@
             </a:ln>
             <a:extLst>
               <a:ext uri="{909E8E84-426E-40DD-AFC4-6F175D3DCCD1}">
-                <a14:hiddenFill xmlns:a14="http://schemas.microsoft.com/office/drawing/2010/main" xmlns="">
+                <a14:hiddenFill xmlns="" xmlns:a14="http://schemas.microsoft.com/office/drawing/2010/main">
                   <a:solidFill>
                     <a:srgbClr val="FFFFFF"/>
                   </a:solidFill>
                 </a14:hiddenFill>
               </a:ext>
               <a:ext uri="{91240B29-F687-4F45-9708-019B960494DF}">
-                <a14:hiddenLine xmlns:a14="http://schemas.microsoft.com/office/drawing/2010/main" xmlns="" w="9525">
+                <a14:hiddenLine xmlns="" xmlns:a14="http://schemas.microsoft.com/office/drawing/2010/main" w="9525">
                   <a:solidFill>
                     <a:srgbClr val="000000"/>
                   </a:solidFill>
@@ -9682,7 +9682,7 @@
     </p:spTree>
     <p:extLst>
       <p:ext uri="{BB962C8B-B14F-4D97-AF65-F5344CB8AC3E}">
-        <p14:creationId xmlns:p14="http://schemas.microsoft.com/office/powerpoint/2010/main" xmlns="" val="3409322625"/>
+        <p14:creationId xmlns="" xmlns:p14="http://schemas.microsoft.com/office/powerpoint/2010/main" val="3409322625"/>
       </p:ext>
     </p:extLst>
   </p:cSld>
@@ -9717,7 +9717,7 @@
           <p:cNvPr id="2" name="Título 1">
             <a:extLst>
               <a:ext uri="{FF2B5EF4-FFF2-40B4-BE49-F238E27FC236}">
-                <a16:creationId xmlns:a16="http://schemas.microsoft.com/office/drawing/2014/main" xmlns="" id="{4420E5F6-C592-489E-8742-39113C67F28C}"/>
+                <a16:creationId xmlns="" xmlns:a16="http://schemas.microsoft.com/office/drawing/2014/main" id="{4420E5F6-C592-489E-8742-39113C67F28C}"/>
               </a:ext>
             </a:extLst>
           </p:cNvPr>
@@ -9757,7 +9757,7 @@
           <p:cNvPr id="3" name="Espaço Reservado para Conteúdo 2">
             <a:extLst>
               <a:ext uri="{FF2B5EF4-FFF2-40B4-BE49-F238E27FC236}">
-                <a16:creationId xmlns:a16="http://schemas.microsoft.com/office/drawing/2014/main" xmlns="" id="{FB12D05B-E47F-4BA3-B1A7-F1DCD4D8F90E}"/>
+                <a16:creationId xmlns="" xmlns:a16="http://schemas.microsoft.com/office/drawing/2014/main" id="{FB12D05B-E47F-4BA3-B1A7-F1DCD4D8F90E}"/>
               </a:ext>
             </a:extLst>
           </p:cNvPr>
@@ -9987,7 +9987,7 @@
     </p:spTree>
     <p:extLst>
       <p:ext uri="{BB962C8B-B14F-4D97-AF65-F5344CB8AC3E}">
-        <p14:creationId xmlns:p14="http://schemas.microsoft.com/office/powerpoint/2010/main" xmlns="" val="732095642"/>
+        <p14:creationId xmlns="" xmlns:p14="http://schemas.microsoft.com/office/powerpoint/2010/main" val="732095642"/>
       </p:ext>
     </p:extLst>
   </p:cSld>
@@ -10019,7 +10019,7 @@
           <p:cNvPr id="5" name="Título 1">
             <a:extLst>
               <a:ext uri="{FF2B5EF4-FFF2-40B4-BE49-F238E27FC236}">
-                <a16:creationId xmlns:a16="http://schemas.microsoft.com/office/drawing/2014/main" xmlns="" id="{4420E5F6-C592-489E-8742-39113C67F28C}"/>
+                <a16:creationId xmlns="" xmlns:a16="http://schemas.microsoft.com/office/drawing/2014/main" id="{4420E5F6-C592-489E-8742-39113C67F28C}"/>
               </a:ext>
             </a:extLst>
           </p:cNvPr>
@@ -10208,7 +10208,7 @@
           <p:cNvPr id="3" name="Picture 2">
             <a:extLst>
               <a:ext uri="{FF2B5EF4-FFF2-40B4-BE49-F238E27FC236}">
-                <a16:creationId xmlns:a16="http://schemas.microsoft.com/office/drawing/2014/main" xmlns="" id="{8F573B82-A720-4E7D-88E3-7ABD98571312}"/>
+                <a16:creationId xmlns="" xmlns:a16="http://schemas.microsoft.com/office/drawing/2014/main" id="{8F573B82-A720-4E7D-88E3-7ABD98571312}"/>
               </a:ext>
             </a:extLst>
           </p:cNvPr>
@@ -10221,7 +10221,7 @@
           <a:blip r:embed="rId2" cstate="print">
             <a:extLst>
               <a:ext uri="{28A0092B-C50C-407E-A947-70E740481C1C}">
-                <a14:useLocalDpi xmlns:a14="http://schemas.microsoft.com/office/drawing/2010/main" xmlns="" val="0"/>
+                <a14:useLocalDpi xmlns="" xmlns:a14="http://schemas.microsoft.com/office/drawing/2010/main" val="0"/>
               </a:ext>
             </a:extLst>
           </a:blip>
@@ -10242,7 +10242,7 @@
     </p:spTree>
     <p:extLst>
       <p:ext uri="{BB962C8B-B14F-4D97-AF65-F5344CB8AC3E}">
-        <p14:creationId xmlns:p14="http://schemas.microsoft.com/office/powerpoint/2010/main" xmlns="" val="1528951847"/>
+        <p14:creationId xmlns="" xmlns:p14="http://schemas.microsoft.com/office/powerpoint/2010/main" val="1528951847"/>
       </p:ext>
     </p:extLst>
   </p:cSld>
@@ -10274,7 +10274,7 @@
           <p:cNvPr id="6" name="Título 1">
             <a:extLst>
               <a:ext uri="{FF2B5EF4-FFF2-40B4-BE49-F238E27FC236}">
-                <a16:creationId xmlns:a16="http://schemas.microsoft.com/office/drawing/2014/main" xmlns="" id="{4420E5F6-C592-489E-8742-39113C67F28C}"/>
+                <a16:creationId xmlns="" xmlns:a16="http://schemas.microsoft.com/office/drawing/2014/main" id="{4420E5F6-C592-489E-8742-39113C67F28C}"/>
               </a:ext>
             </a:extLst>
           </p:cNvPr>
@@ -10314,7 +10314,7 @@
           <p:cNvPr id="8" name="Picture 7">
             <a:extLst>
               <a:ext uri="{FF2B5EF4-FFF2-40B4-BE49-F238E27FC236}">
-                <a16:creationId xmlns:a16="http://schemas.microsoft.com/office/drawing/2014/main" xmlns="" id="{AC1CFE5D-EA64-4455-B011-2E471DBEC948}"/>
+                <a16:creationId xmlns="" xmlns:a16="http://schemas.microsoft.com/office/drawing/2014/main" id="{AC1CFE5D-EA64-4455-B011-2E471DBEC948}"/>
               </a:ext>
             </a:extLst>
           </p:cNvPr>
@@ -10342,7 +10342,7 @@
     </p:spTree>
     <p:extLst>
       <p:ext uri="{BB962C8B-B14F-4D97-AF65-F5344CB8AC3E}">
-        <p14:creationId xmlns:p14="http://schemas.microsoft.com/office/powerpoint/2010/main" xmlns="" val="3460844110"/>
+        <p14:creationId xmlns="" xmlns:p14="http://schemas.microsoft.com/office/powerpoint/2010/main" val="3460844110"/>
       </p:ext>
     </p:extLst>
   </p:cSld>
@@ -10374,7 +10374,7 @@
           <p:cNvPr id="6" name="Título 1">
             <a:extLst>
               <a:ext uri="{FF2B5EF4-FFF2-40B4-BE49-F238E27FC236}">
-                <a16:creationId xmlns:a16="http://schemas.microsoft.com/office/drawing/2014/main" xmlns="" id="{4420E5F6-C592-489E-8742-39113C67F28C}"/>
+                <a16:creationId xmlns="" xmlns:a16="http://schemas.microsoft.com/office/drawing/2014/main" id="{4420E5F6-C592-489E-8742-39113C67F28C}"/>
               </a:ext>
             </a:extLst>
           </p:cNvPr>
@@ -10414,7 +10414,7 @@
           <p:cNvPr id="8" name="Rectangle 7">
             <a:extLst>
               <a:ext uri="{FF2B5EF4-FFF2-40B4-BE49-F238E27FC236}">
-                <a16:creationId xmlns:a16="http://schemas.microsoft.com/office/drawing/2014/main" xmlns="" id="{F316C0A6-AC98-4AAE-B87A-547E57B86D5F}"/>
+                <a16:creationId xmlns="" xmlns:a16="http://schemas.microsoft.com/office/drawing/2014/main" id="{F316C0A6-AC98-4AAE-B87A-547E57B86D5F}"/>
               </a:ext>
             </a:extLst>
           </p:cNvPr>
@@ -10465,44 +10465,34 @@
       </p:sp>
       <p:pic>
         <p:nvPicPr>
-          <p:cNvPr id="9" name="Picture 8">
-            <a:extLst>
-              <a:ext uri="{FF2B5EF4-FFF2-40B4-BE49-F238E27FC236}">
-                <a16:creationId xmlns:a16="http://schemas.microsoft.com/office/drawing/2014/main" xmlns="" id="{F5F42E5F-1DEC-47B5-8651-247D9AF6FADE}"/>
-              </a:ext>
-            </a:extLst>
-          </p:cNvPr>
+          <p:cNvPr id="1026" name="Picture 2" descr="C:\Users\alexandre\Pictures\ConfigPerfil1.png"/>
           <p:cNvPicPr>
-            <a:picLocks noChangeAspect="1"/>
+            <a:picLocks noChangeAspect="1" noChangeArrowheads="1"/>
           </p:cNvPicPr>
           <p:nvPr/>
         </p:nvPicPr>
         <p:blipFill>
-          <a:blip r:embed="rId2" cstate="print">
-            <a:extLst>
-              <a:ext uri="{28A0092B-C50C-407E-A947-70E740481C1C}">
-                <a14:useLocalDpi xmlns:a14="http://schemas.microsoft.com/office/drawing/2010/main" xmlns="" val="0"/>
-              </a:ext>
-            </a:extLst>
-          </a:blip>
+          <a:blip r:embed="rId2" cstate="print"/>
+          <a:srcRect/>
           <a:stretch>
             <a:fillRect/>
           </a:stretch>
         </p:blipFill>
-        <p:spPr>
+        <p:spPr bwMode="auto">
           <a:xfrm>
-            <a:off x="0" y="1340768"/>
-            <a:ext cx="9033417" cy="5112568"/>
+            <a:off x="0" y="1268760"/>
+            <a:ext cx="8892480" cy="5080479"/>
           </a:xfrm>
           <a:prstGeom prst="rect">
             <a:avLst/>
           </a:prstGeom>
+          <a:noFill/>
         </p:spPr>
       </p:pic>
     </p:spTree>
     <p:extLst>
       <p:ext uri="{BB962C8B-B14F-4D97-AF65-F5344CB8AC3E}">
-        <p14:creationId xmlns:p14="http://schemas.microsoft.com/office/powerpoint/2010/main" xmlns="" val="255138212"/>
+        <p14:creationId xmlns="" xmlns:p14="http://schemas.microsoft.com/office/powerpoint/2010/main" val="255138212"/>
       </p:ext>
     </p:extLst>
   </p:cSld>
@@ -10534,7 +10524,7 @@
           <p:cNvPr id="6" name="Título 1">
             <a:extLst>
               <a:ext uri="{FF2B5EF4-FFF2-40B4-BE49-F238E27FC236}">
-                <a16:creationId xmlns:a16="http://schemas.microsoft.com/office/drawing/2014/main" xmlns="" id="{4420E5F6-C592-489E-8742-39113C67F28C}"/>
+                <a16:creationId xmlns="" xmlns:a16="http://schemas.microsoft.com/office/drawing/2014/main" id="{4420E5F6-C592-489E-8742-39113C67F28C}"/>
               </a:ext>
             </a:extLst>
           </p:cNvPr>
@@ -10569,100 +10559,36 @@
           </a:p>
         </p:txBody>
       </p:sp>
-      <p:sp>
-        <p:nvSpPr>
-          <p:cNvPr id="8" name="Rectangle 7">
-            <a:extLst>
-              <a:ext uri="{FF2B5EF4-FFF2-40B4-BE49-F238E27FC236}">
-                <a16:creationId xmlns:a16="http://schemas.microsoft.com/office/drawing/2014/main" xmlns="" id="{EF4C9CB5-998F-4DAB-AD54-72FA9E925DA9}"/>
-              </a:ext>
-            </a:extLst>
-          </p:cNvPr>
-          <p:cNvSpPr/>
+      <p:pic>
+        <p:nvPicPr>
+          <p:cNvPr id="2051" name="Picture 3" descr="C:\Users\alexandre\Pictures\ConfigPerfil2.png"/>
+          <p:cNvPicPr>
+            <a:picLocks noChangeAspect="1" noChangeArrowheads="1"/>
+          </p:cNvPicPr>
           <p:nvPr/>
-        </p:nvSpPr>
-        <p:spPr>
+        </p:nvPicPr>
+        <p:blipFill>
+          <a:blip r:embed="rId2" cstate="print"/>
+          <a:srcRect/>
+          <a:stretch>
+            <a:fillRect/>
+          </a:stretch>
+        </p:blipFill>
+        <p:spPr bwMode="auto">
           <a:xfrm>
-            <a:off x="0" y="1340768"/>
-            <a:ext cx="9144000" cy="5517232"/>
+            <a:off x="251520" y="1412776"/>
+            <a:ext cx="8734691" cy="5040560"/>
           </a:xfrm>
           <a:prstGeom prst="rect">
             <a:avLst/>
           </a:prstGeom>
-          <a:solidFill>
-            <a:schemeClr val="bg1"/>
-          </a:solidFill>
-          <a:ln>
-            <a:solidFill>
-              <a:schemeClr val="bg1"/>
-            </a:solidFill>
-          </a:ln>
-        </p:spPr>
-        <p:style>
-          <a:lnRef idx="2">
-            <a:schemeClr val="accent1">
-              <a:shade val="50000"/>
-            </a:schemeClr>
-          </a:lnRef>
-          <a:fillRef idx="1">
-            <a:schemeClr val="accent1"/>
-          </a:fillRef>
-          <a:effectRef idx="0">
-            <a:schemeClr val="accent1"/>
-          </a:effectRef>
-          <a:fontRef idx="minor">
-            <a:schemeClr val="lt1"/>
-          </a:fontRef>
-        </p:style>
-        <p:txBody>
-          <a:bodyPr rtlCol="0" anchor="ctr"/>
-          <a:lstStyle/>
-          <a:p>
-            <a:pPr algn="ctr"/>
-            <a:endParaRPr lang="pt-BR"/>
-          </a:p>
-        </p:txBody>
-      </p:sp>
-      <p:pic>
-        <p:nvPicPr>
-          <p:cNvPr id="10" name="Picture 9">
-            <a:extLst>
-              <a:ext uri="{FF2B5EF4-FFF2-40B4-BE49-F238E27FC236}">
-                <a16:creationId xmlns:a16="http://schemas.microsoft.com/office/drawing/2014/main" xmlns="" id="{86E4D953-118F-46F7-809C-802C59C8CF9B}"/>
-              </a:ext>
-            </a:extLst>
-          </p:cNvPr>
-          <p:cNvPicPr>
-            <a:picLocks noChangeAspect="1"/>
-          </p:cNvPicPr>
-          <p:nvPr/>
-        </p:nvPicPr>
-        <p:blipFill>
-          <a:blip r:embed="rId2" cstate="print">
-            <a:extLst>
-              <a:ext uri="{28A0092B-C50C-407E-A947-70E740481C1C}">
-                <a14:useLocalDpi xmlns:a14="http://schemas.microsoft.com/office/drawing/2010/main" xmlns="" val="0"/>
-              </a:ext>
-            </a:extLst>
-          </a:blip>
-          <a:stretch>
-            <a:fillRect/>
-          </a:stretch>
-        </p:blipFill>
-        <p:spPr>
-          <a:xfrm>
-            <a:off x="-1" y="1358546"/>
-            <a:ext cx="9144001" cy="5054473"/>
-          </a:xfrm>
-          <a:prstGeom prst="rect">
-            <a:avLst/>
-          </a:prstGeom>
+          <a:noFill/>
         </p:spPr>
       </p:pic>
     </p:spTree>
     <p:extLst>
       <p:ext uri="{BB962C8B-B14F-4D97-AF65-F5344CB8AC3E}">
-        <p14:creationId xmlns:p14="http://schemas.microsoft.com/office/powerpoint/2010/main" xmlns="" val="2944428277"/>
+        <p14:creationId xmlns="" xmlns:p14="http://schemas.microsoft.com/office/powerpoint/2010/main" val="2944428277"/>
       </p:ext>
     </p:extLst>
   </p:cSld>
@@ -10726,7 +10652,7 @@
           <a:blip r:embed="rId3" cstate="print">
             <a:extLst>
               <a:ext uri="{28A0092B-C50C-407E-A947-70E740481C1C}">
-                <a14:useLocalDpi xmlns:a14="http://schemas.microsoft.com/office/drawing/2010/main" xmlns="" val="0"/>
+                <a14:useLocalDpi xmlns="" xmlns:a14="http://schemas.microsoft.com/office/drawing/2010/main" val="0"/>
               </a:ext>
             </a:extLst>
           </a:blip>
@@ -10784,7 +10710,7 @@
           <p:cNvPr id="6" name="Título 1">
             <a:extLst>
               <a:ext uri="{FF2B5EF4-FFF2-40B4-BE49-F238E27FC236}">
-                <a16:creationId xmlns:a16="http://schemas.microsoft.com/office/drawing/2014/main" xmlns="" id="{4420E5F6-C592-489E-8742-39113C67F28C}"/>
+                <a16:creationId xmlns="" xmlns:a16="http://schemas.microsoft.com/office/drawing/2014/main" id="{4420E5F6-C592-489E-8742-39113C67F28C}"/>
               </a:ext>
             </a:extLst>
           </p:cNvPr>
@@ -10819,99 +10745,36 @@
           </a:p>
         </p:txBody>
       </p:sp>
-      <p:sp>
-        <p:nvSpPr>
-          <p:cNvPr id="8" name="Rectangle 7">
-            <a:extLst>
-              <a:ext uri="{FF2B5EF4-FFF2-40B4-BE49-F238E27FC236}">
-                <a16:creationId xmlns:a16="http://schemas.microsoft.com/office/drawing/2014/main" xmlns="" id="{EF4C9CB5-998F-4DAB-AD54-72FA9E925DA9}"/>
-              </a:ext>
-            </a:extLst>
-          </p:cNvPr>
-          <p:cNvSpPr/>
+      <p:pic>
+        <p:nvPicPr>
+          <p:cNvPr id="3074" name="Picture 2" descr="C:\Users\alexandre\Pictures\ConfigPerfil3.png"/>
+          <p:cNvPicPr>
+            <a:picLocks noChangeAspect="1" noChangeArrowheads="1"/>
+          </p:cNvPicPr>
           <p:nvPr/>
-        </p:nvSpPr>
-        <p:spPr>
+        </p:nvPicPr>
+        <p:blipFill>
+          <a:blip r:embed="rId2" cstate="print"/>
+          <a:srcRect/>
+          <a:stretch>
+            <a:fillRect/>
+          </a:stretch>
+        </p:blipFill>
+        <p:spPr bwMode="auto">
           <a:xfrm>
-            <a:off x="0" y="1340768"/>
-            <a:ext cx="9144000" cy="5517232"/>
+            <a:off x="0" y="980728"/>
+            <a:ext cx="8882810" cy="5517232"/>
           </a:xfrm>
           <a:prstGeom prst="rect">
             <a:avLst/>
           </a:prstGeom>
-          <a:solidFill>
-            <a:schemeClr val="bg1"/>
-          </a:solidFill>
-          <a:ln>
-            <a:solidFill>
-              <a:schemeClr val="bg1"/>
-            </a:solidFill>
-          </a:ln>
-        </p:spPr>
-        <p:style>
-          <a:lnRef idx="2">
-            <a:schemeClr val="accent1">
-              <a:shade val="50000"/>
-            </a:schemeClr>
-          </a:lnRef>
-          <a:fillRef idx="1">
-            <a:schemeClr val="accent1"/>
-          </a:fillRef>
-          <a:effectRef idx="0">
-            <a:schemeClr val="accent1"/>
-          </a:effectRef>
-          <a:fontRef idx="minor">
-            <a:schemeClr val="lt1"/>
-          </a:fontRef>
-        </p:style>
-        <p:txBody>
-          <a:bodyPr rtlCol="0" anchor="ctr"/>
-          <a:lstStyle/>
-          <a:p>
-            <a:pPr algn="ctr"/>
-            <a:endParaRPr lang="pt-BR"/>
-          </a:p>
-        </p:txBody>
-      </p:sp>
-      <p:pic>
-        <p:nvPicPr>
-          <p:cNvPr id="3" name="Picture 2">
-            <a:extLst>
-              <a:ext uri="{FF2B5EF4-FFF2-40B4-BE49-F238E27FC236}">
-                <a16:creationId xmlns:a16="http://schemas.microsoft.com/office/drawing/2014/main" xmlns="" id="{F1FA4B04-B183-46B7-8891-15526F3F8963}"/>
-              </a:ext>
-            </a:extLst>
-          </p:cNvPr>
-          <p:cNvPicPr>
-            <a:picLocks noChangeAspect="1"/>
-          </p:cNvPicPr>
-          <p:nvPr/>
-        </p:nvPicPr>
-        <p:blipFill rotWithShape="1">
-          <a:blip r:embed="rId2" cstate="print">
-            <a:extLst>
-              <a:ext uri="{28A0092B-C50C-407E-A947-70E740481C1C}">
-                <a14:useLocalDpi xmlns:a14="http://schemas.microsoft.com/office/drawing/2010/main" xmlns="" val="0"/>
-              </a:ext>
-            </a:extLst>
-          </a:blip>
-          <a:srcRect t="2667"/>
-          <a:stretch/>
-        </p:blipFill>
-        <p:spPr>
-          <a:xfrm>
-            <a:off x="-20786" y="1312606"/>
-            <a:ext cx="9142462" cy="5116955"/>
-          </a:xfrm>
-          <a:prstGeom prst="rect">
-            <a:avLst/>
-          </a:prstGeom>
+          <a:noFill/>
         </p:spPr>
       </p:pic>
     </p:spTree>
     <p:extLst>
       <p:ext uri="{BB962C8B-B14F-4D97-AF65-F5344CB8AC3E}">
-        <p14:creationId xmlns:p14="http://schemas.microsoft.com/office/powerpoint/2010/main" xmlns="" val="398228404"/>
+        <p14:creationId xmlns="" xmlns:p14="http://schemas.microsoft.com/office/powerpoint/2010/main" val="398228404"/>
       </p:ext>
     </p:extLst>
   </p:cSld>
@@ -10943,7 +10806,7 @@
           <p:cNvPr id="6" name="Título 1">
             <a:extLst>
               <a:ext uri="{FF2B5EF4-FFF2-40B4-BE49-F238E27FC236}">
-                <a16:creationId xmlns:a16="http://schemas.microsoft.com/office/drawing/2014/main" xmlns="" id="{4420E5F6-C592-489E-8742-39113C67F28C}"/>
+                <a16:creationId xmlns="" xmlns:a16="http://schemas.microsoft.com/office/drawing/2014/main" id="{4420E5F6-C592-489E-8742-39113C67F28C}"/>
               </a:ext>
             </a:extLst>
           </p:cNvPr>
@@ -10978,93 +10841,36 @@
           </a:p>
         </p:txBody>
       </p:sp>
-      <p:sp>
-        <p:nvSpPr>
-          <p:cNvPr id="8" name="Rectangle 7">
-            <a:extLst>
-              <a:ext uri="{FF2B5EF4-FFF2-40B4-BE49-F238E27FC236}">
-                <a16:creationId xmlns:a16="http://schemas.microsoft.com/office/drawing/2014/main" xmlns="" id="{EF4C9CB5-998F-4DAB-AD54-72FA9E925DA9}"/>
-              </a:ext>
-            </a:extLst>
-          </p:cNvPr>
-          <p:cNvSpPr/>
+      <p:pic>
+        <p:nvPicPr>
+          <p:cNvPr id="4098" name="Picture 2" descr="C:\Users\alexandre\Pictures\ConfigPerfil4.png"/>
+          <p:cNvPicPr>
+            <a:picLocks noChangeAspect="1" noChangeArrowheads="1"/>
+          </p:cNvPicPr>
           <p:nvPr/>
-        </p:nvSpPr>
-        <p:spPr>
+        </p:nvPicPr>
+        <p:blipFill>
+          <a:blip r:embed="rId2" cstate="print"/>
+          <a:srcRect/>
+          <a:stretch>
+            <a:fillRect/>
+          </a:stretch>
+        </p:blipFill>
+        <p:spPr bwMode="auto">
           <a:xfrm>
-            <a:off x="0" y="1340768"/>
-            <a:ext cx="9144000" cy="5517232"/>
+            <a:off x="-1" y="1340768"/>
+            <a:ext cx="9043637" cy="4968552"/>
           </a:xfrm>
           <a:prstGeom prst="rect">
             <a:avLst/>
           </a:prstGeom>
-          <a:solidFill>
-            <a:schemeClr val="bg1"/>
-          </a:solidFill>
-          <a:ln>
-            <a:solidFill>
-              <a:schemeClr val="bg1"/>
-            </a:solidFill>
-          </a:ln>
-        </p:spPr>
-        <p:style>
-          <a:lnRef idx="2">
-            <a:schemeClr val="accent1">
-              <a:shade val="50000"/>
-            </a:schemeClr>
-          </a:lnRef>
-          <a:fillRef idx="1">
-            <a:schemeClr val="accent1"/>
-          </a:fillRef>
-          <a:effectRef idx="0">
-            <a:schemeClr val="accent1"/>
-          </a:effectRef>
-          <a:fontRef idx="minor">
-            <a:schemeClr val="lt1"/>
-          </a:fontRef>
-        </p:style>
-        <p:txBody>
-          <a:bodyPr rtlCol="0" anchor="ctr"/>
-          <a:lstStyle/>
-          <a:p>
-            <a:pPr algn="ctr"/>
-            <a:endParaRPr lang="pt-BR"/>
-          </a:p>
-        </p:txBody>
-      </p:sp>
-      <p:pic>
-        <p:nvPicPr>
-          <p:cNvPr id="4" name="Picture 3">
-            <a:extLst>
-              <a:ext uri="{FF2B5EF4-FFF2-40B4-BE49-F238E27FC236}">
-                <a16:creationId xmlns:a16="http://schemas.microsoft.com/office/drawing/2014/main" xmlns="" id="{9E45BBDA-7E5F-49C6-9ACE-8F5A7A5E8FAA}"/>
-              </a:ext>
-            </a:extLst>
-          </p:cNvPr>
-          <p:cNvPicPr>
-            <a:picLocks noChangeAspect="1"/>
-          </p:cNvPicPr>
-          <p:nvPr/>
-        </p:nvPicPr>
-        <p:blipFill rotWithShape="1">
-          <a:blip r:embed="rId2" cstate="print"/>
-          <a:srcRect l="-968" t="12350" r="968" b="154"/>
-          <a:stretch/>
-        </p:blipFill>
-        <p:spPr>
-          <a:xfrm>
-            <a:off x="-72010" y="1285618"/>
-            <a:ext cx="9324530" cy="5455750"/>
-          </a:xfrm>
-          <a:prstGeom prst="rect">
-            <a:avLst/>
-          </a:prstGeom>
+          <a:noFill/>
         </p:spPr>
       </p:pic>
     </p:spTree>
     <p:extLst>
       <p:ext uri="{BB962C8B-B14F-4D97-AF65-F5344CB8AC3E}">
-        <p14:creationId xmlns:p14="http://schemas.microsoft.com/office/powerpoint/2010/main" xmlns="" val="3663591352"/>
+        <p14:creationId xmlns="" xmlns:p14="http://schemas.microsoft.com/office/powerpoint/2010/main" val="3663591352"/>
       </p:ext>
     </p:extLst>
   </p:cSld>
@@ -11147,13 +10953,8 @@
           <a:p>
             <a:r>
               <a:rPr lang="pt-BR" sz="2400" dirty="0" smtClean="0"/>
-              <a:t>Manter-se atento ao escopo inicial do projeto para que não sejam desenvolvidas funcionalidades que não </a:t>
-            </a:r>
-            <a:r>
-              <a:rPr lang="pt-BR" sz="2400" dirty="0" smtClean="0"/>
-              <a:t>foram solicitadas</a:t>
-            </a:r>
-            <a:endParaRPr lang="pt-BR" sz="2400" dirty="0" smtClean="0"/>
+              <a:t>Manter-se atento ao escopo inicial do projeto para que não sejam desenvolvidas funcionalidades que não foram solicitadas</a:t>
+            </a:r>
           </a:p>
           <a:p>
             <a:endParaRPr lang="pt-BR" sz="2400" dirty="0" smtClean="0"/>
@@ -11184,7 +10985,7 @@
           <a:blip r:embed="rId2" cstate="print">
             <a:extLst>
               <a:ext uri="{28A0092B-C50C-407E-A947-70E740481C1C}">
-                <a14:useLocalDpi xmlns:a14="http://schemas.microsoft.com/office/drawing/2010/main" xmlns="" val="0"/>
+                <a14:useLocalDpi xmlns="" xmlns:a14="http://schemas.microsoft.com/office/drawing/2010/main" val="0"/>
               </a:ext>
             </a:extLst>
           </a:blip>
@@ -11204,7 +11005,7 @@
           <a:noFill/>
           <a:extLst>
             <a:ext uri="{909E8E84-426E-40DD-AFC4-6F175D3DCCD1}">
-              <a14:hiddenFill xmlns:a14="http://schemas.microsoft.com/office/drawing/2010/main" xmlns="">
+              <a14:hiddenFill xmlns="" xmlns:a14="http://schemas.microsoft.com/office/drawing/2010/main">
                 <a:solidFill>
                   <a:srgbClr val="FFFFFF"/>
                 </a:solidFill>
@@ -11343,7 +11144,7 @@
           <a:blip r:embed="rId2" cstate="print">
             <a:extLst>
               <a:ext uri="{28A0092B-C50C-407E-A947-70E740481C1C}">
-                <a14:useLocalDpi xmlns:a14="http://schemas.microsoft.com/office/drawing/2010/main" xmlns="" val="0"/>
+                <a14:useLocalDpi xmlns="" xmlns:a14="http://schemas.microsoft.com/office/drawing/2010/main" val="0"/>
               </a:ext>
             </a:extLst>
           </a:blip>
@@ -11361,7 +11162,7 @@
           <a:noFill/>
           <a:extLst>
             <a:ext uri="{909E8E84-426E-40DD-AFC4-6F175D3DCCD1}">
-              <a14:hiddenFill xmlns:a14="http://schemas.microsoft.com/office/drawing/2010/main" xmlns="">
+              <a14:hiddenFill xmlns="" xmlns:a14="http://schemas.microsoft.com/office/drawing/2010/main">
                 <a:solidFill>
                   <a:srgbClr val="FFFFFF"/>
                 </a:solidFill>
@@ -11431,7 +11232,7 @@
     </p:spTree>
     <p:extLst>
       <p:ext uri="{BB962C8B-B14F-4D97-AF65-F5344CB8AC3E}">
-        <p14:creationId xmlns:p14="http://schemas.microsoft.com/office/powerpoint/2010/main" xmlns="" val="1990385622"/>
+        <p14:creationId xmlns="" xmlns:p14="http://schemas.microsoft.com/office/powerpoint/2010/main" val="1990385622"/>
       </p:ext>
     </p:extLst>
   </p:cSld>
@@ -11534,14 +11335,14 @@
             </a:ln>
             <a:extLst>
               <a:ext uri="{909E8E84-426E-40DD-AFC4-6F175D3DCCD1}">
-                <a14:hiddenFill xmlns:a14="http://schemas.microsoft.com/office/drawing/2010/main" xmlns="">
+                <a14:hiddenFill xmlns="" xmlns:a14="http://schemas.microsoft.com/office/drawing/2010/main">
                   <a:solidFill>
                     <a:srgbClr val="FFFFFF"/>
                   </a:solidFill>
                 </a14:hiddenFill>
               </a:ext>
               <a:ext uri="{91240B29-F687-4F45-9708-019B960494DF}">
-                <a14:hiddenLine xmlns:a14="http://schemas.microsoft.com/office/drawing/2010/main" xmlns="" w="9525">
+                <a14:hiddenLine xmlns="" xmlns:a14="http://schemas.microsoft.com/office/drawing/2010/main" w="9525">
                   <a:solidFill>
                     <a:srgbClr val="000000"/>
                   </a:solidFill>
@@ -11691,14 +11492,14 @@
             </a:ln>
             <a:extLst>
               <a:ext uri="{909E8E84-426E-40DD-AFC4-6F175D3DCCD1}">
-                <a14:hiddenFill xmlns:a14="http://schemas.microsoft.com/office/drawing/2010/main" xmlns="">
+                <a14:hiddenFill xmlns="" xmlns:a14="http://schemas.microsoft.com/office/drawing/2010/main">
                   <a:solidFill>
                     <a:srgbClr val="FFFFFF"/>
                   </a:solidFill>
                 </a14:hiddenFill>
               </a:ext>
               <a:ext uri="{91240B29-F687-4F45-9708-019B960494DF}">
-                <a14:hiddenLine xmlns:a14="http://schemas.microsoft.com/office/drawing/2010/main" xmlns="" w="9525">
+                <a14:hiddenLine xmlns="" xmlns:a14="http://schemas.microsoft.com/office/drawing/2010/main" w="9525">
                   <a:solidFill>
                     <a:srgbClr val="000000"/>
                   </a:solidFill>
@@ -11962,7 +11763,7 @@
     </p:spTree>
     <p:extLst>
       <p:ext uri="{BB962C8B-B14F-4D97-AF65-F5344CB8AC3E}">
-        <p14:creationId xmlns:p14="http://schemas.microsoft.com/office/powerpoint/2010/main" xmlns="" val="2005090747"/>
+        <p14:creationId xmlns="" xmlns:p14="http://schemas.microsoft.com/office/powerpoint/2010/main" val="2005090747"/>
       </p:ext>
     </p:extLst>
   </p:cSld>
@@ -12041,14 +11842,14 @@
           </a:xfrm>
           <a:extLst>
             <a:ext uri="{909E8E84-426E-40DD-AFC4-6F175D3DCCD1}">
-              <a14:hiddenFill xmlns:a14="http://schemas.microsoft.com/office/drawing/2010/main" xmlns="">
+              <a14:hiddenFill xmlns="" xmlns:a14="http://schemas.microsoft.com/office/drawing/2010/main">
                 <a:solidFill>
                   <a:srgbClr val="FFFFFF"/>
                 </a:solidFill>
               </a14:hiddenFill>
             </a:ext>
             <a:ext uri="{91240B29-F687-4F45-9708-019B960494DF}">
-              <a14:hiddenLine xmlns:a14="http://schemas.microsoft.com/office/drawing/2010/main" xmlns="" w="9525">
+              <a14:hiddenLine xmlns="" xmlns:a14="http://schemas.microsoft.com/office/drawing/2010/main" w="9525">
                 <a:solidFill>
                   <a:srgbClr val="000000"/>
                 </a:solidFill>
@@ -12384,7 +12185,7 @@
           <a:blip r:embed="rId2" cstate="print">
             <a:extLst>
               <a:ext uri="{28A0092B-C50C-407E-A947-70E740481C1C}">
-                <a14:useLocalDpi xmlns:a14="http://schemas.microsoft.com/office/drawing/2010/main" xmlns="" val="0"/>
+                <a14:useLocalDpi xmlns="" xmlns:a14="http://schemas.microsoft.com/office/drawing/2010/main" val="0"/>
               </a:ext>
             </a:extLst>
           </a:blip>
@@ -12476,7 +12277,7 @@
           <a:blip r:embed="rId2" cstate="print">
             <a:extLst>
               <a:ext uri="{28A0092B-C50C-407E-A947-70E740481C1C}">
-                <a14:useLocalDpi xmlns:a14="http://schemas.microsoft.com/office/drawing/2010/main" xmlns="" val="0"/>
+                <a14:useLocalDpi xmlns="" xmlns:a14="http://schemas.microsoft.com/office/drawing/2010/main" val="0"/>
               </a:ext>
             </a:extLst>
           </a:blip>
@@ -12568,7 +12369,7 @@
           <a:blip r:embed="rId2" cstate="print">
             <a:extLst>
               <a:ext uri="{28A0092B-C50C-407E-A947-70E740481C1C}">
-                <a14:useLocalDpi xmlns:a14="http://schemas.microsoft.com/office/drawing/2010/main" xmlns="" val="0"/>
+                <a14:useLocalDpi xmlns="" xmlns:a14="http://schemas.microsoft.com/office/drawing/2010/main" val="0"/>
               </a:ext>
             </a:extLst>
           </a:blip>
@@ -13196,7 +12997,7 @@
   <a:extraClrSchemeLst/>
   <a:extLst>
     <a:ext uri="{05A4C25C-085E-4340-85A3-A5531E510DB2}">
-      <thm15:themeFamily xmlns:thm15="http://schemas.microsoft.com/office/thememl/2012/main" xmlns="" name="Office Theme" id="{62F939B6-93AF-4DB8-9C6B-D6C7DFDC589F}" vid="{4A3C46E8-61CC-4603-A589-7422A47A8E4A}"/>
+      <thm15:themeFamily xmlns="" xmlns:thm15="http://schemas.microsoft.com/office/thememl/2012/main" name="Office Theme" id="{62F939B6-93AF-4DB8-9C6B-D6C7DFDC589F}" vid="{4A3C46E8-61CC-4603-A589-7422A47A8E4A}"/>
     </a:ext>
   </a:extLst>
 </a:theme>

</xml_diff>

<commit_message>
Troca telas Contr. Acesso - Ajuste Lições aprendid
</commit_message>
<xml_diff>
--- a/TCC/5º Encontro/2017-Apresentacao Psystem.pptx
+++ b/TCC/5º Encontro/2017-Apresentacao Psystem.pptx
@@ -182,7 +182,7 @@
   </p:defaultTextStyle>
   <p:extLst>
     <p:ext uri="{EFAFB233-063F-42B5-8137-9DF3F51BA10A}">
-      <p15:sldGuideLst xmlns="" xmlns:p15="http://schemas.microsoft.com/office/powerpoint/2012/main">
+      <p15:sldGuideLst xmlns:p15="http://schemas.microsoft.com/office/powerpoint/2012/main" xmlns="">
         <p15:guide id="1" orient="horz" pos="2160">
           <p15:clr>
             <a:srgbClr val="A4A3A4"/>
@@ -286,7 +286,7 @@
             <a:fld id="{C0D5B206-56B5-433E-8333-9415E6A460B9}" type="datetimeFigureOut">
               <a:rPr lang="pt-BR" smtClean="0"/>
               <a:pPr/>
-              <a:t>02/10/2017</a:t>
+              <a:t>14/11/2017</a:t>
             </a:fld>
             <a:endParaRPr lang="pt-BR"/>
           </a:p>
@@ -454,7 +454,7 @@
     </p:spTree>
     <p:extLst>
       <p:ext uri="{BB962C8B-B14F-4D97-AF65-F5344CB8AC3E}">
-        <p14:creationId xmlns="" xmlns:p14="http://schemas.microsoft.com/office/powerpoint/2010/main" val="671299352"/>
+        <p14:creationId xmlns:p14="http://schemas.microsoft.com/office/powerpoint/2010/main" xmlns="" val="671299352"/>
       </p:ext>
     </p:extLst>
   </p:cSld>
@@ -664,7 +664,7 @@
     </p:spTree>
     <p:extLst>
       <p:ext uri="{BB962C8B-B14F-4D97-AF65-F5344CB8AC3E}">
-        <p14:creationId xmlns="" xmlns:p14="http://schemas.microsoft.com/office/powerpoint/2010/main" val="3274854824"/>
+        <p14:creationId xmlns:p14="http://schemas.microsoft.com/office/powerpoint/2010/main" xmlns="" val="3274854824"/>
       </p:ext>
     </p:extLst>
   </p:cSld>
@@ -759,7 +759,7 @@
     </p:spTree>
     <p:extLst>
       <p:ext uri="{BB962C8B-B14F-4D97-AF65-F5344CB8AC3E}">
-        <p14:creationId xmlns="" xmlns:p14="http://schemas.microsoft.com/office/powerpoint/2010/main" val="2786033099"/>
+        <p14:creationId xmlns:p14="http://schemas.microsoft.com/office/powerpoint/2010/main" xmlns="" val="2786033099"/>
       </p:ext>
     </p:extLst>
   </p:cSld>
@@ -852,7 +852,7 @@
     </p:spTree>
     <p:extLst>
       <p:ext uri="{BB962C8B-B14F-4D97-AF65-F5344CB8AC3E}">
-        <p14:creationId xmlns="" xmlns:p14="http://schemas.microsoft.com/office/powerpoint/2010/main" val="1775795487"/>
+        <p14:creationId xmlns:p14="http://schemas.microsoft.com/office/powerpoint/2010/main" xmlns="" val="1775795487"/>
       </p:ext>
     </p:extLst>
   </p:cSld>
@@ -968,7 +968,7 @@
     </p:spTree>
     <p:extLst>
       <p:ext uri="{BB962C8B-B14F-4D97-AF65-F5344CB8AC3E}">
-        <p14:creationId xmlns="" xmlns:p14="http://schemas.microsoft.com/office/powerpoint/2010/main" val="3951886733"/>
+        <p14:creationId xmlns:p14="http://schemas.microsoft.com/office/powerpoint/2010/main" xmlns="" val="3951886733"/>
       </p:ext>
     </p:extLst>
   </p:cSld>
@@ -1259,7 +1259,7 @@
     </p:spTree>
     <p:extLst>
       <p:ext uri="{BB962C8B-B14F-4D97-AF65-F5344CB8AC3E}">
-        <p14:creationId xmlns="" xmlns:p14="http://schemas.microsoft.com/office/powerpoint/2010/main" val="1588299535"/>
+        <p14:creationId xmlns:p14="http://schemas.microsoft.com/office/powerpoint/2010/main" xmlns="" val="1588299535"/>
       </p:ext>
     </p:extLst>
   </p:cSld>
@@ -1308,14 +1308,14 @@
           </a:ln>
           <a:extLst>
             <a:ext uri="{909E8E84-426E-40DD-AFC4-6F175D3DCCD1}">
-              <a14:hiddenFill xmlns="" xmlns:a14="http://schemas.microsoft.com/office/drawing/2010/main">
+              <a14:hiddenFill xmlns:a14="http://schemas.microsoft.com/office/drawing/2010/main" xmlns="">
                 <a:solidFill>
                   <a:srgbClr val="FFFFFF"/>
                 </a:solidFill>
               </a14:hiddenFill>
             </a:ext>
             <a:ext uri="{91240B29-F687-4F45-9708-019B960494DF}">
-              <a14:hiddenLine xmlns="" xmlns:a14="http://schemas.microsoft.com/office/drawing/2010/main" w="9525">
+              <a14:hiddenLine xmlns:a14="http://schemas.microsoft.com/office/drawing/2010/main" xmlns="" w="9525">
                 <a:solidFill>
                   <a:srgbClr val="000000"/>
                 </a:solidFill>
@@ -1731,7 +1731,7 @@
     </p:spTree>
     <p:extLst>
       <p:ext uri="{BB962C8B-B14F-4D97-AF65-F5344CB8AC3E}">
-        <p14:creationId xmlns="" xmlns:p14="http://schemas.microsoft.com/office/powerpoint/2010/main" val="3359836669"/>
+        <p14:creationId xmlns:p14="http://schemas.microsoft.com/office/powerpoint/2010/main" xmlns="" val="3359836669"/>
       </p:ext>
     </p:extLst>
   </p:cSld>
@@ -1761,7 +1761,7 @@
     </p:spTree>
     <p:extLst>
       <p:ext uri="{BB962C8B-B14F-4D97-AF65-F5344CB8AC3E}">
-        <p14:creationId xmlns="" xmlns:p14="http://schemas.microsoft.com/office/powerpoint/2010/main" val="413836109"/>
+        <p14:creationId xmlns:p14="http://schemas.microsoft.com/office/powerpoint/2010/main" xmlns="" val="413836109"/>
       </p:ext>
     </p:extLst>
   </p:cSld>
@@ -1861,7 +1861,7 @@
           <a:blip r:embed="rId2" cstate="print">
             <a:extLst>
               <a:ext uri="{28A0092B-C50C-407E-A947-70E740481C1C}">
-                <a14:useLocalDpi xmlns="" xmlns:a14="http://schemas.microsoft.com/office/drawing/2010/main" val="0"/>
+                <a14:useLocalDpi xmlns:a14="http://schemas.microsoft.com/office/drawing/2010/main" xmlns="" val="0"/>
               </a:ext>
             </a:extLst>
           </a:blip>
@@ -1884,14 +1884,14 @@
           </a:ln>
           <a:extLst>
             <a:ext uri="{909E8E84-426E-40DD-AFC4-6F175D3DCCD1}">
-              <a14:hiddenFill xmlns="" xmlns:a14="http://schemas.microsoft.com/office/drawing/2010/main">
+              <a14:hiddenFill xmlns:a14="http://schemas.microsoft.com/office/drawing/2010/main" xmlns="">
                 <a:solidFill>
                   <a:srgbClr val="FFFFFF"/>
                 </a:solidFill>
               </a14:hiddenFill>
             </a:ext>
             <a:ext uri="{91240B29-F687-4F45-9708-019B960494DF}">
-              <a14:hiddenLine xmlns="" xmlns:a14="http://schemas.microsoft.com/office/drawing/2010/main" w="9525">
+              <a14:hiddenLine xmlns:a14="http://schemas.microsoft.com/office/drawing/2010/main" xmlns="" w="9525">
                 <a:solidFill>
                   <a:srgbClr val="000000"/>
                 </a:solidFill>
@@ -1955,7 +1955,7 @@
     </p:spTree>
     <p:extLst>
       <p:ext uri="{BB962C8B-B14F-4D97-AF65-F5344CB8AC3E}">
-        <p14:creationId xmlns="" xmlns:p14="http://schemas.microsoft.com/office/powerpoint/2010/main" val="2156181659"/>
+        <p14:creationId xmlns:p14="http://schemas.microsoft.com/office/powerpoint/2010/main" xmlns="" val="2156181659"/>
       </p:ext>
     </p:extLst>
   </p:cSld>
@@ -2122,7 +2122,7 @@
     </p:spTree>
     <p:extLst>
       <p:ext uri="{BB962C8B-B14F-4D97-AF65-F5344CB8AC3E}">
-        <p14:creationId xmlns="" xmlns:p14="http://schemas.microsoft.com/office/powerpoint/2010/main" val="83598666"/>
+        <p14:creationId xmlns:p14="http://schemas.microsoft.com/office/powerpoint/2010/main" xmlns="" val="83598666"/>
       </p:ext>
     </p:extLst>
   </p:cSld>
@@ -2166,7 +2166,7 @@
           <a:blip r:embed="rId8" cstate="print">
             <a:extLst>
               <a:ext uri="{28A0092B-C50C-407E-A947-70E740481C1C}">
-                <a14:useLocalDpi xmlns="" xmlns:a14="http://schemas.microsoft.com/office/drawing/2010/main" val="0"/>
+                <a14:useLocalDpi xmlns:a14="http://schemas.microsoft.com/office/drawing/2010/main" xmlns="" val="0"/>
               </a:ext>
             </a:extLst>
           </a:blip>
@@ -2189,14 +2189,14 @@
           </a:ln>
           <a:extLst>
             <a:ext uri="{909E8E84-426E-40DD-AFC4-6F175D3DCCD1}">
-              <a14:hiddenFill xmlns="" xmlns:a14="http://schemas.microsoft.com/office/drawing/2010/main">
+              <a14:hiddenFill xmlns:a14="http://schemas.microsoft.com/office/drawing/2010/main" xmlns="">
                 <a:solidFill>
                   <a:srgbClr val="FFFFFF"/>
                 </a:solidFill>
               </a14:hiddenFill>
             </a:ext>
             <a:ext uri="{91240B29-F687-4F45-9708-019B960494DF}">
-              <a14:hiddenLine xmlns="" xmlns:a14="http://schemas.microsoft.com/office/drawing/2010/main" w="9525">
+              <a14:hiddenLine xmlns:a14="http://schemas.microsoft.com/office/drawing/2010/main" xmlns="" w="9525">
                 <a:solidFill>
                   <a:srgbClr val="000000"/>
                 </a:solidFill>
@@ -2269,7 +2269,7 @@
           <a:blip r:embed="rId9" cstate="print">
             <a:extLst>
               <a:ext uri="{28A0092B-C50C-407E-A947-70E740481C1C}">
-                <a14:useLocalDpi xmlns="" xmlns:a14="http://schemas.microsoft.com/office/drawing/2010/main" val="0"/>
+                <a14:useLocalDpi xmlns:a14="http://schemas.microsoft.com/office/drawing/2010/main" xmlns="" val="0"/>
               </a:ext>
             </a:extLst>
           </a:blip>
@@ -2292,14 +2292,14 @@
           </a:ln>
           <a:extLst>
             <a:ext uri="{909E8E84-426E-40DD-AFC4-6F175D3DCCD1}">
-              <a14:hiddenFill xmlns="" xmlns:a14="http://schemas.microsoft.com/office/drawing/2010/main">
+              <a14:hiddenFill xmlns:a14="http://schemas.microsoft.com/office/drawing/2010/main" xmlns="">
                 <a:solidFill>
                   <a:srgbClr val="FFFFFF"/>
                 </a:solidFill>
               </a14:hiddenFill>
             </a:ext>
             <a:ext uri="{91240B29-F687-4F45-9708-019B960494DF}">
-              <a14:hiddenLine xmlns="" xmlns:a14="http://schemas.microsoft.com/office/drawing/2010/main" w="9525">
+              <a14:hiddenLine xmlns:a14="http://schemas.microsoft.com/office/drawing/2010/main" xmlns="" w="9525">
                 <a:solidFill>
                   <a:srgbClr val="000000"/>
                 </a:solidFill>
@@ -2865,14 +2865,14 @@
             </a:ln>
             <a:extLst>
               <a:ext uri="{909E8E84-426E-40DD-AFC4-6F175D3DCCD1}">
-                <a14:hiddenFill xmlns="" xmlns:a14="http://schemas.microsoft.com/office/drawing/2010/main">
+                <a14:hiddenFill xmlns:a14="http://schemas.microsoft.com/office/drawing/2010/main" xmlns="">
                   <a:solidFill>
                     <a:srgbClr val="FFFFFF"/>
                   </a:solidFill>
                 </a14:hiddenFill>
               </a:ext>
               <a:ext uri="{91240B29-F687-4F45-9708-019B960494DF}">
-                <a14:hiddenLine xmlns="" xmlns:a14="http://schemas.microsoft.com/office/drawing/2010/main" w="9525">
+                <a14:hiddenLine xmlns:a14="http://schemas.microsoft.com/office/drawing/2010/main" xmlns="" w="9525">
                   <a:solidFill>
                     <a:srgbClr val="000000"/>
                   </a:solidFill>
@@ -3022,14 +3022,14 @@
             </a:ln>
             <a:extLst>
               <a:ext uri="{909E8E84-426E-40DD-AFC4-6F175D3DCCD1}">
-                <a14:hiddenFill xmlns="" xmlns:a14="http://schemas.microsoft.com/office/drawing/2010/main">
+                <a14:hiddenFill xmlns:a14="http://schemas.microsoft.com/office/drawing/2010/main" xmlns="">
                   <a:solidFill>
                     <a:srgbClr val="FFFFFF"/>
                   </a:solidFill>
                 </a14:hiddenFill>
               </a:ext>
               <a:ext uri="{91240B29-F687-4F45-9708-019B960494DF}">
-                <a14:hiddenLine xmlns="" xmlns:a14="http://schemas.microsoft.com/office/drawing/2010/main" w="9525">
+                <a14:hiddenLine xmlns:a14="http://schemas.microsoft.com/office/drawing/2010/main" xmlns="" w="9525">
                   <a:solidFill>
                     <a:srgbClr val="000000"/>
                   </a:solidFill>
@@ -3409,7 +3409,7 @@
           <a:blip r:embed="rId2" cstate="print">
             <a:extLst>
               <a:ext uri="{28A0092B-C50C-407E-A947-70E740481C1C}">
-                <a14:useLocalDpi xmlns="" xmlns:a14="http://schemas.microsoft.com/office/drawing/2010/main" val="0"/>
+                <a14:useLocalDpi xmlns:a14="http://schemas.microsoft.com/office/drawing/2010/main" xmlns="" val="0"/>
               </a:ext>
             </a:extLst>
           </a:blip>
@@ -3567,7 +3567,7 @@
           <a:blip r:embed="rId2" cstate="print">
             <a:extLst>
               <a:ext uri="{28A0092B-C50C-407E-A947-70E740481C1C}">
-                <a14:useLocalDpi xmlns="" xmlns:a14="http://schemas.microsoft.com/office/drawing/2010/main" val="0"/>
+                <a14:useLocalDpi xmlns:a14="http://schemas.microsoft.com/office/drawing/2010/main" xmlns="" val="0"/>
               </a:ext>
             </a:extLst>
           </a:blip>
@@ -3690,14 +3690,14 @@
             </a:ln>
             <a:extLst>
               <a:ext uri="{909E8E84-426E-40DD-AFC4-6F175D3DCCD1}">
-                <a14:hiddenFill xmlns="" xmlns:a14="http://schemas.microsoft.com/office/drawing/2010/main">
+                <a14:hiddenFill xmlns:a14="http://schemas.microsoft.com/office/drawing/2010/main" xmlns="">
                   <a:solidFill>
                     <a:srgbClr val="FFFFFF"/>
                   </a:solidFill>
                 </a14:hiddenFill>
               </a:ext>
               <a:ext uri="{91240B29-F687-4F45-9708-019B960494DF}">
-                <a14:hiddenLine xmlns="" xmlns:a14="http://schemas.microsoft.com/office/drawing/2010/main" w="9525">
+                <a14:hiddenLine xmlns:a14="http://schemas.microsoft.com/office/drawing/2010/main" xmlns="" w="9525">
                   <a:solidFill>
                     <a:srgbClr val="000000"/>
                   </a:solidFill>
@@ -3847,14 +3847,14 @@
             </a:ln>
             <a:extLst>
               <a:ext uri="{909E8E84-426E-40DD-AFC4-6F175D3DCCD1}">
-                <a14:hiddenFill xmlns="" xmlns:a14="http://schemas.microsoft.com/office/drawing/2010/main">
+                <a14:hiddenFill xmlns:a14="http://schemas.microsoft.com/office/drawing/2010/main" xmlns="">
                   <a:solidFill>
                     <a:srgbClr val="FFFFFF"/>
                   </a:solidFill>
                 </a14:hiddenFill>
               </a:ext>
               <a:ext uri="{91240B29-F687-4F45-9708-019B960494DF}">
-                <a14:hiddenLine xmlns="" xmlns:a14="http://schemas.microsoft.com/office/drawing/2010/main" w="9525">
+                <a14:hiddenLine xmlns:a14="http://schemas.microsoft.com/office/drawing/2010/main" xmlns="" w="9525">
                   <a:solidFill>
                     <a:srgbClr val="000000"/>
                   </a:solidFill>
@@ -4118,7 +4118,7 @@
     </p:spTree>
     <p:extLst>
       <p:ext uri="{BB962C8B-B14F-4D97-AF65-F5344CB8AC3E}">
-        <p14:creationId xmlns="" xmlns:p14="http://schemas.microsoft.com/office/powerpoint/2010/main" val="2461302196"/>
+        <p14:creationId xmlns:p14="http://schemas.microsoft.com/office/powerpoint/2010/main" xmlns="" val="2461302196"/>
       </p:ext>
     </p:extLst>
   </p:cSld>
@@ -4197,14 +4197,14 @@
           </a:xfrm>
           <a:extLst>
             <a:ext uri="{909E8E84-426E-40DD-AFC4-6F175D3DCCD1}">
-              <a14:hiddenFill xmlns="" xmlns:a14="http://schemas.microsoft.com/office/drawing/2010/main">
+              <a14:hiddenFill xmlns:a14="http://schemas.microsoft.com/office/drawing/2010/main" xmlns="">
                 <a:solidFill>
                   <a:srgbClr val="FFFFFF"/>
                 </a:solidFill>
               </a14:hiddenFill>
             </a:ext>
             <a:ext uri="{91240B29-F687-4F45-9708-019B960494DF}">
-              <a14:hiddenLine xmlns="" xmlns:a14="http://schemas.microsoft.com/office/drawing/2010/main" w="9525">
+              <a14:hiddenLine xmlns:a14="http://schemas.microsoft.com/office/drawing/2010/main" xmlns="" w="9525">
                 <a:solidFill>
                   <a:srgbClr val="000000"/>
                 </a:solidFill>
@@ -4371,7 +4371,7 @@
     </p:spTree>
     <p:extLst>
       <p:ext uri="{BB962C8B-B14F-4D97-AF65-F5344CB8AC3E}">
-        <p14:creationId xmlns="" xmlns:p14="http://schemas.microsoft.com/office/powerpoint/2010/main" val="1166103754"/>
+        <p14:creationId xmlns:p14="http://schemas.microsoft.com/office/powerpoint/2010/main" xmlns="" val="1166103754"/>
       </p:ext>
     </p:extLst>
   </p:cSld>
@@ -4442,7 +4442,7 @@
           <a:blip r:embed="rId2" cstate="print">
             <a:extLst>
               <a:ext uri="{28A0092B-C50C-407E-A947-70E740481C1C}">
-                <a14:useLocalDpi xmlns="" xmlns:a14="http://schemas.microsoft.com/office/drawing/2010/main" val="0"/>
+                <a14:useLocalDpi xmlns:a14="http://schemas.microsoft.com/office/drawing/2010/main" xmlns="" val="0"/>
               </a:ext>
             </a:extLst>
           </a:blip>
@@ -4463,7 +4463,7 @@
     </p:spTree>
     <p:extLst>
       <p:ext uri="{BB962C8B-B14F-4D97-AF65-F5344CB8AC3E}">
-        <p14:creationId xmlns="" xmlns:p14="http://schemas.microsoft.com/office/powerpoint/2010/main" val="4100715659"/>
+        <p14:creationId xmlns:p14="http://schemas.microsoft.com/office/powerpoint/2010/main" xmlns="" val="4100715659"/>
       </p:ext>
     </p:extLst>
   </p:cSld>
@@ -4539,14 +4539,14 @@
           </a:xfrm>
           <a:extLst>
             <a:ext uri="{909E8E84-426E-40DD-AFC4-6F175D3DCCD1}">
-              <a14:hiddenFill xmlns="" xmlns:a14="http://schemas.microsoft.com/office/drawing/2010/main">
+              <a14:hiddenFill xmlns:a14="http://schemas.microsoft.com/office/drawing/2010/main" xmlns="">
                 <a:solidFill>
                   <a:srgbClr val="FFFFFF"/>
                 </a:solidFill>
               </a14:hiddenFill>
             </a:ext>
             <a:ext uri="{91240B29-F687-4F45-9708-019B960494DF}">
-              <a14:hiddenLine xmlns="" xmlns:a14="http://schemas.microsoft.com/office/drawing/2010/main" w="9525">
+              <a14:hiddenLine xmlns:a14="http://schemas.microsoft.com/office/drawing/2010/main" xmlns="" w="9525">
                 <a:solidFill>
                   <a:srgbClr val="000000"/>
                 </a:solidFill>
@@ -4587,7 +4587,7 @@
           <p:cNvPr id="2" name="Picture 1">
             <a:extLst>
               <a:ext uri="{FF2B5EF4-FFF2-40B4-BE49-F238E27FC236}">
-                <a16:creationId xmlns="" xmlns:a16="http://schemas.microsoft.com/office/drawing/2014/main" id="{F5A00150-EB0A-4F28-911C-141811EBFBD4}"/>
+                <a16:creationId xmlns:a16="http://schemas.microsoft.com/office/drawing/2014/main" xmlns="" id="{F5A00150-EB0A-4F28-911C-141811EBFBD4}"/>
               </a:ext>
             </a:extLst>
           </p:cNvPr>
@@ -4614,7 +4614,7 @@
     </p:spTree>
     <p:extLst>
       <p:ext uri="{BB962C8B-B14F-4D97-AF65-F5344CB8AC3E}">
-        <p14:creationId xmlns="" xmlns:p14="http://schemas.microsoft.com/office/powerpoint/2010/main" val="4234705847"/>
+        <p14:creationId xmlns:p14="http://schemas.microsoft.com/office/powerpoint/2010/main" xmlns="" val="4234705847"/>
       </p:ext>
     </p:extLst>
   </p:cSld>
@@ -4693,14 +4693,14 @@
           </a:xfrm>
           <a:extLst>
             <a:ext uri="{909E8E84-426E-40DD-AFC4-6F175D3DCCD1}">
-              <a14:hiddenFill xmlns="" xmlns:a14="http://schemas.microsoft.com/office/drawing/2010/main">
+              <a14:hiddenFill xmlns:a14="http://schemas.microsoft.com/office/drawing/2010/main" xmlns="">
                 <a:solidFill>
                   <a:srgbClr val="FFFFFF"/>
                 </a:solidFill>
               </a14:hiddenFill>
             </a:ext>
             <a:ext uri="{91240B29-F687-4F45-9708-019B960494DF}">
-              <a14:hiddenLine xmlns="" xmlns:a14="http://schemas.microsoft.com/office/drawing/2010/main" w="9525">
+              <a14:hiddenLine xmlns:a14="http://schemas.microsoft.com/office/drawing/2010/main" xmlns="" w="9525">
                 <a:solidFill>
                   <a:srgbClr val="000000"/>
                 </a:solidFill>
@@ -4741,7 +4741,7 @@
           <p:cNvPr id="3" name="Picture 2">
             <a:extLst>
               <a:ext uri="{FF2B5EF4-FFF2-40B4-BE49-F238E27FC236}">
-                <a16:creationId xmlns="" xmlns:a16="http://schemas.microsoft.com/office/drawing/2014/main" id="{2B1A4BC2-7DE1-4299-98E4-7ED739A14DCC}"/>
+                <a16:creationId xmlns:a16="http://schemas.microsoft.com/office/drawing/2014/main" xmlns="" id="{2B1A4BC2-7DE1-4299-98E4-7ED739A14DCC}"/>
               </a:ext>
             </a:extLst>
           </p:cNvPr>
@@ -4769,7 +4769,7 @@
     </p:spTree>
     <p:extLst>
       <p:ext uri="{BB962C8B-B14F-4D97-AF65-F5344CB8AC3E}">
-        <p14:creationId xmlns="" xmlns:p14="http://schemas.microsoft.com/office/powerpoint/2010/main" val="324456396"/>
+        <p14:creationId xmlns:p14="http://schemas.microsoft.com/office/powerpoint/2010/main" xmlns="" val="324456396"/>
       </p:ext>
     </p:extLst>
   </p:cSld>
@@ -4848,14 +4848,14 @@
           </a:xfrm>
           <a:extLst>
             <a:ext uri="{909E8E84-426E-40DD-AFC4-6F175D3DCCD1}">
-              <a14:hiddenFill xmlns="" xmlns:a14="http://schemas.microsoft.com/office/drawing/2010/main">
+              <a14:hiddenFill xmlns:a14="http://schemas.microsoft.com/office/drawing/2010/main" xmlns="">
                 <a:solidFill>
                   <a:srgbClr val="FFFFFF"/>
                 </a:solidFill>
               </a14:hiddenFill>
             </a:ext>
             <a:ext uri="{91240B29-F687-4F45-9708-019B960494DF}">
-              <a14:hiddenLine xmlns="" xmlns:a14="http://schemas.microsoft.com/office/drawing/2010/main" w="9525">
+              <a14:hiddenLine xmlns:a14="http://schemas.microsoft.com/office/drawing/2010/main" xmlns="" w="9525">
                 <a:solidFill>
                   <a:srgbClr val="000000"/>
                 </a:solidFill>
@@ -4896,7 +4896,7 @@
           <p:cNvPr id="2" name="Picture 1">
             <a:extLst>
               <a:ext uri="{FF2B5EF4-FFF2-40B4-BE49-F238E27FC236}">
-                <a16:creationId xmlns="" xmlns:a16="http://schemas.microsoft.com/office/drawing/2014/main" id="{21DDFF5F-FFF6-4DB6-AD4E-6794E13280AB}"/>
+                <a16:creationId xmlns:a16="http://schemas.microsoft.com/office/drawing/2014/main" xmlns="" id="{21DDFF5F-FFF6-4DB6-AD4E-6794E13280AB}"/>
               </a:ext>
             </a:extLst>
           </p:cNvPr>
@@ -4924,7 +4924,7 @@
     </p:spTree>
     <p:extLst>
       <p:ext uri="{BB962C8B-B14F-4D97-AF65-F5344CB8AC3E}">
-        <p14:creationId xmlns="" xmlns:p14="http://schemas.microsoft.com/office/powerpoint/2010/main" val="3523015254"/>
+        <p14:creationId xmlns:p14="http://schemas.microsoft.com/office/powerpoint/2010/main" xmlns="" val="3523015254"/>
       </p:ext>
     </p:extLst>
   </p:cSld>
@@ -5003,14 +5003,14 @@
           </a:xfrm>
           <a:extLst>
             <a:ext uri="{909E8E84-426E-40DD-AFC4-6F175D3DCCD1}">
-              <a14:hiddenFill xmlns="" xmlns:a14="http://schemas.microsoft.com/office/drawing/2010/main">
+              <a14:hiddenFill xmlns:a14="http://schemas.microsoft.com/office/drawing/2010/main" xmlns="">
                 <a:solidFill>
                   <a:srgbClr val="FFFFFF"/>
                 </a:solidFill>
               </a14:hiddenFill>
             </a:ext>
             <a:ext uri="{91240B29-F687-4F45-9708-019B960494DF}">
-              <a14:hiddenLine xmlns="" xmlns:a14="http://schemas.microsoft.com/office/drawing/2010/main" w="9525">
+              <a14:hiddenLine xmlns:a14="http://schemas.microsoft.com/office/drawing/2010/main" xmlns="" w="9525">
                 <a:solidFill>
                   <a:srgbClr val="000000"/>
                 </a:solidFill>
@@ -5051,7 +5051,7 @@
           <p:cNvPr id="3" name="Picture 2">
             <a:extLst>
               <a:ext uri="{FF2B5EF4-FFF2-40B4-BE49-F238E27FC236}">
-                <a16:creationId xmlns="" xmlns:a16="http://schemas.microsoft.com/office/drawing/2014/main" id="{69168DE8-9710-4C4D-825A-7E6F62278493}"/>
+                <a16:creationId xmlns:a16="http://schemas.microsoft.com/office/drawing/2014/main" xmlns="" id="{69168DE8-9710-4C4D-825A-7E6F62278493}"/>
               </a:ext>
             </a:extLst>
           </p:cNvPr>
@@ -5079,7 +5079,7 @@
     </p:spTree>
     <p:extLst>
       <p:ext uri="{BB962C8B-B14F-4D97-AF65-F5344CB8AC3E}">
-        <p14:creationId xmlns="" xmlns:p14="http://schemas.microsoft.com/office/powerpoint/2010/main" val="3817239344"/>
+        <p14:creationId xmlns:p14="http://schemas.microsoft.com/office/powerpoint/2010/main" xmlns="" val="3817239344"/>
       </p:ext>
     </p:extLst>
   </p:cSld>
@@ -5158,14 +5158,14 @@
           </a:xfrm>
           <a:extLst>
             <a:ext uri="{909E8E84-426E-40DD-AFC4-6F175D3DCCD1}">
-              <a14:hiddenFill xmlns="" xmlns:a14="http://schemas.microsoft.com/office/drawing/2010/main">
+              <a14:hiddenFill xmlns:a14="http://schemas.microsoft.com/office/drawing/2010/main" xmlns="">
                 <a:solidFill>
                   <a:srgbClr val="FFFFFF"/>
                 </a:solidFill>
               </a14:hiddenFill>
             </a:ext>
             <a:ext uri="{91240B29-F687-4F45-9708-019B960494DF}">
-              <a14:hiddenLine xmlns="" xmlns:a14="http://schemas.microsoft.com/office/drawing/2010/main" w="9525">
+              <a14:hiddenLine xmlns:a14="http://schemas.microsoft.com/office/drawing/2010/main" xmlns="" w="9525">
                 <a:solidFill>
                   <a:srgbClr val="000000"/>
                 </a:solidFill>
@@ -5206,7 +5206,7 @@
           <p:cNvPr id="2" name="Picture 1">
             <a:extLst>
               <a:ext uri="{FF2B5EF4-FFF2-40B4-BE49-F238E27FC236}">
-                <a16:creationId xmlns="" xmlns:a16="http://schemas.microsoft.com/office/drawing/2014/main" id="{B6A781C1-AA15-45C9-BF02-66987FF55897}"/>
+                <a16:creationId xmlns:a16="http://schemas.microsoft.com/office/drawing/2014/main" xmlns="" id="{B6A781C1-AA15-45C9-BF02-66987FF55897}"/>
               </a:ext>
             </a:extLst>
           </p:cNvPr>
@@ -5234,7 +5234,7 @@
     </p:spTree>
     <p:extLst>
       <p:ext uri="{BB962C8B-B14F-4D97-AF65-F5344CB8AC3E}">
-        <p14:creationId xmlns="" xmlns:p14="http://schemas.microsoft.com/office/powerpoint/2010/main" val="1697811339"/>
+        <p14:creationId xmlns:p14="http://schemas.microsoft.com/office/powerpoint/2010/main" xmlns="" val="1697811339"/>
       </p:ext>
     </p:extLst>
   </p:cSld>
@@ -5465,14 +5465,14 @@
             </a:ln>
             <a:extLst>
               <a:ext uri="{909E8E84-426E-40DD-AFC4-6F175D3DCCD1}">
-                <a14:hiddenFill xmlns="" xmlns:a14="http://schemas.microsoft.com/office/drawing/2010/main">
+                <a14:hiddenFill xmlns:a14="http://schemas.microsoft.com/office/drawing/2010/main" xmlns="">
                   <a:solidFill>
                     <a:srgbClr val="FFFFFF"/>
                   </a:solidFill>
                 </a14:hiddenFill>
               </a:ext>
               <a:ext uri="{91240B29-F687-4F45-9708-019B960494DF}">
-                <a14:hiddenLine xmlns="" xmlns:a14="http://schemas.microsoft.com/office/drawing/2010/main" w="9525">
+                <a14:hiddenLine xmlns:a14="http://schemas.microsoft.com/office/drawing/2010/main" xmlns="" w="9525">
                   <a:solidFill>
                     <a:srgbClr val="000000"/>
                   </a:solidFill>
@@ -5622,14 +5622,14 @@
             </a:ln>
             <a:extLst>
               <a:ext uri="{909E8E84-426E-40DD-AFC4-6F175D3DCCD1}">
-                <a14:hiddenFill xmlns="" xmlns:a14="http://schemas.microsoft.com/office/drawing/2010/main">
+                <a14:hiddenFill xmlns:a14="http://schemas.microsoft.com/office/drawing/2010/main" xmlns="">
                   <a:solidFill>
                     <a:srgbClr val="FFFFFF"/>
                   </a:solidFill>
                 </a14:hiddenFill>
               </a:ext>
               <a:ext uri="{91240B29-F687-4F45-9708-019B960494DF}">
-                <a14:hiddenLine xmlns="" xmlns:a14="http://schemas.microsoft.com/office/drawing/2010/main" w="9525">
+                <a14:hiddenLine xmlns:a14="http://schemas.microsoft.com/office/drawing/2010/main" xmlns="" w="9525">
                   <a:solidFill>
                     <a:srgbClr val="000000"/>
                   </a:solidFill>
@@ -5874,7 +5874,7 @@
     </p:spTree>
     <p:extLst>
       <p:ext uri="{BB962C8B-B14F-4D97-AF65-F5344CB8AC3E}">
-        <p14:creationId xmlns="" xmlns:p14="http://schemas.microsoft.com/office/powerpoint/2010/main" val="681014556"/>
+        <p14:creationId xmlns:p14="http://schemas.microsoft.com/office/powerpoint/2010/main" xmlns="" val="681014556"/>
       </p:ext>
     </p:extLst>
   </p:cSld>
@@ -6389,7 +6389,7 @@
     </p:spTree>
     <p:extLst>
       <p:ext uri="{BB962C8B-B14F-4D97-AF65-F5344CB8AC3E}">
-        <p14:creationId xmlns="" xmlns:p14="http://schemas.microsoft.com/office/powerpoint/2010/main" val="3812644496"/>
+        <p14:creationId xmlns:p14="http://schemas.microsoft.com/office/powerpoint/2010/main" xmlns="" val="3812644496"/>
       </p:ext>
     </p:extLst>
   </p:cSld>
@@ -6619,7 +6619,7 @@
           <a:blip r:embed="rId2" cstate="print">
             <a:extLst>
               <a:ext uri="{28A0092B-C50C-407E-A947-70E740481C1C}">
-                <a14:useLocalDpi xmlns="" xmlns:a14="http://schemas.microsoft.com/office/drawing/2010/main" val="0"/>
+                <a14:useLocalDpi xmlns:a14="http://schemas.microsoft.com/office/drawing/2010/main" xmlns="" val="0"/>
               </a:ext>
             </a:extLst>
           </a:blip>
@@ -6640,7 +6640,7 @@
     </p:spTree>
     <p:extLst>
       <p:ext uri="{BB962C8B-B14F-4D97-AF65-F5344CB8AC3E}">
-        <p14:creationId xmlns="" xmlns:p14="http://schemas.microsoft.com/office/powerpoint/2010/main" val="1625217003"/>
+        <p14:creationId xmlns:p14="http://schemas.microsoft.com/office/powerpoint/2010/main" xmlns="" val="1625217003"/>
       </p:ext>
     </p:extLst>
   </p:cSld>
@@ -6870,7 +6870,7 @@
           <a:blip r:embed="rId2" cstate="print">
             <a:extLst>
               <a:ext uri="{28A0092B-C50C-407E-A947-70E740481C1C}">
-                <a14:useLocalDpi xmlns="" xmlns:a14="http://schemas.microsoft.com/office/drawing/2010/main" val="0"/>
+                <a14:useLocalDpi xmlns:a14="http://schemas.microsoft.com/office/drawing/2010/main" xmlns="" val="0"/>
               </a:ext>
             </a:extLst>
           </a:blip>
@@ -6891,7 +6891,7 @@
     </p:spTree>
     <p:extLst>
       <p:ext uri="{BB962C8B-B14F-4D97-AF65-F5344CB8AC3E}">
-        <p14:creationId xmlns="" xmlns:p14="http://schemas.microsoft.com/office/powerpoint/2010/main" val="1256551592"/>
+        <p14:creationId xmlns:p14="http://schemas.microsoft.com/office/powerpoint/2010/main" xmlns="" val="1256551592"/>
       </p:ext>
     </p:extLst>
   </p:cSld>
@@ -7121,7 +7121,7 @@
           <a:blip r:embed="rId2" cstate="print">
             <a:extLst>
               <a:ext uri="{28A0092B-C50C-407E-A947-70E740481C1C}">
-                <a14:useLocalDpi xmlns="" xmlns:a14="http://schemas.microsoft.com/office/drawing/2010/main" val="0"/>
+                <a14:useLocalDpi xmlns:a14="http://schemas.microsoft.com/office/drawing/2010/main" xmlns="" val="0"/>
               </a:ext>
             </a:extLst>
           </a:blip>
@@ -7142,7 +7142,7 @@
     </p:spTree>
     <p:extLst>
       <p:ext uri="{BB962C8B-B14F-4D97-AF65-F5344CB8AC3E}">
-        <p14:creationId xmlns="" xmlns:p14="http://schemas.microsoft.com/office/powerpoint/2010/main" val="3402891464"/>
+        <p14:creationId xmlns:p14="http://schemas.microsoft.com/office/powerpoint/2010/main" xmlns="" val="3402891464"/>
       </p:ext>
     </p:extLst>
   </p:cSld>
@@ -7365,7 +7365,7 @@
           <a:blip r:embed="rId2" cstate="print">
             <a:extLst>
               <a:ext uri="{28A0092B-C50C-407E-A947-70E740481C1C}">
-                <a14:useLocalDpi xmlns="" xmlns:a14="http://schemas.microsoft.com/office/drawing/2010/main" val="0"/>
+                <a14:useLocalDpi xmlns:a14="http://schemas.microsoft.com/office/drawing/2010/main" xmlns="" val="0"/>
               </a:ext>
             </a:extLst>
           </a:blip>
@@ -7386,7 +7386,7 @@
     </p:spTree>
     <p:extLst>
       <p:ext uri="{BB962C8B-B14F-4D97-AF65-F5344CB8AC3E}">
-        <p14:creationId xmlns="" xmlns:p14="http://schemas.microsoft.com/office/powerpoint/2010/main" val="2843391693"/>
+        <p14:creationId xmlns:p14="http://schemas.microsoft.com/office/powerpoint/2010/main" xmlns="" val="2843391693"/>
       </p:ext>
     </p:extLst>
   </p:cSld>
@@ -7609,7 +7609,7 @@
           <a:blip r:embed="rId2" cstate="print">
             <a:extLst>
               <a:ext uri="{28A0092B-C50C-407E-A947-70E740481C1C}">
-                <a14:useLocalDpi xmlns="" xmlns:a14="http://schemas.microsoft.com/office/drawing/2010/main" val="0"/>
+                <a14:useLocalDpi xmlns:a14="http://schemas.microsoft.com/office/drawing/2010/main" xmlns="" val="0"/>
               </a:ext>
             </a:extLst>
           </a:blip>
@@ -7630,7 +7630,7 @@
     </p:spTree>
     <p:extLst>
       <p:ext uri="{BB962C8B-B14F-4D97-AF65-F5344CB8AC3E}">
-        <p14:creationId xmlns="" xmlns:p14="http://schemas.microsoft.com/office/powerpoint/2010/main" val="3776007642"/>
+        <p14:creationId xmlns:p14="http://schemas.microsoft.com/office/powerpoint/2010/main" xmlns="" val="3776007642"/>
       </p:ext>
     </p:extLst>
   </p:cSld>
@@ -7730,14 +7730,14 @@
             </a:ln>
             <a:extLst>
               <a:ext uri="{909E8E84-426E-40DD-AFC4-6F175D3DCCD1}">
-                <a14:hiddenFill xmlns="" xmlns:a14="http://schemas.microsoft.com/office/drawing/2010/main">
+                <a14:hiddenFill xmlns:a14="http://schemas.microsoft.com/office/drawing/2010/main" xmlns="">
                   <a:solidFill>
                     <a:srgbClr val="FFFFFF"/>
                   </a:solidFill>
                 </a14:hiddenFill>
               </a:ext>
               <a:ext uri="{91240B29-F687-4F45-9708-019B960494DF}">
-                <a14:hiddenLine xmlns="" xmlns:a14="http://schemas.microsoft.com/office/drawing/2010/main" w="9525">
+                <a14:hiddenLine xmlns:a14="http://schemas.microsoft.com/office/drawing/2010/main" xmlns="" w="9525">
                   <a:solidFill>
                     <a:srgbClr val="000000"/>
                   </a:solidFill>
@@ -7887,14 +7887,14 @@
             </a:ln>
             <a:extLst>
               <a:ext uri="{909E8E84-426E-40DD-AFC4-6F175D3DCCD1}">
-                <a14:hiddenFill xmlns="" xmlns:a14="http://schemas.microsoft.com/office/drawing/2010/main">
+                <a14:hiddenFill xmlns:a14="http://schemas.microsoft.com/office/drawing/2010/main" xmlns="">
                   <a:solidFill>
                     <a:srgbClr val="FFFFFF"/>
                   </a:solidFill>
                 </a14:hiddenFill>
               </a:ext>
               <a:ext uri="{91240B29-F687-4F45-9708-019B960494DF}">
-                <a14:hiddenLine xmlns="" xmlns:a14="http://schemas.microsoft.com/office/drawing/2010/main" w="9525">
+                <a14:hiddenLine xmlns:a14="http://schemas.microsoft.com/office/drawing/2010/main" xmlns="" w="9525">
                   <a:solidFill>
                     <a:srgbClr val="000000"/>
                   </a:solidFill>
@@ -8523,7 +8523,7 @@
     </p:spTree>
     <p:extLst>
       <p:ext uri="{BB962C8B-B14F-4D97-AF65-F5344CB8AC3E}">
-        <p14:creationId xmlns="" xmlns:p14="http://schemas.microsoft.com/office/powerpoint/2010/main" val="2886033736"/>
+        <p14:creationId xmlns:p14="http://schemas.microsoft.com/office/powerpoint/2010/main" xmlns="" val="2886033736"/>
       </p:ext>
     </p:extLst>
   </p:cSld>
@@ -8583,7 +8583,7 @@
           <p:cNvPr id="3" name="Picture 2">
             <a:extLst>
               <a:ext uri="{FF2B5EF4-FFF2-40B4-BE49-F238E27FC236}">
-                <a16:creationId xmlns="" xmlns:a16="http://schemas.microsoft.com/office/drawing/2014/main" id="{1488CEA1-615B-4D4C-A130-F1FD32F916CA}"/>
+                <a16:creationId xmlns:a16="http://schemas.microsoft.com/office/drawing/2014/main" xmlns="" id="{1488CEA1-615B-4D4C-A130-F1FD32F916CA}"/>
               </a:ext>
             </a:extLst>
           </p:cNvPr>
@@ -8596,7 +8596,7 @@
           <a:blip r:embed="rId2" cstate="print">
             <a:extLst>
               <a:ext uri="{28A0092B-C50C-407E-A947-70E740481C1C}">
-                <a14:useLocalDpi xmlns="" xmlns:a14="http://schemas.microsoft.com/office/drawing/2010/main" val="0"/>
+                <a14:useLocalDpi xmlns:a14="http://schemas.microsoft.com/office/drawing/2010/main" xmlns="" val="0"/>
               </a:ext>
             </a:extLst>
           </a:blip>
@@ -8679,7 +8679,7 @@
           <a:blip r:embed="rId3" cstate="print">
             <a:extLst>
               <a:ext uri="{28A0092B-C50C-407E-A947-70E740481C1C}">
-                <a14:useLocalDpi xmlns="" xmlns:a14="http://schemas.microsoft.com/office/drawing/2010/main" val="0"/>
+                <a14:useLocalDpi xmlns:a14="http://schemas.microsoft.com/office/drawing/2010/main" xmlns="" val="0"/>
               </a:ext>
             </a:extLst>
           </a:blip>
@@ -8762,7 +8762,7 @@
           <p:cNvPr id="1026" name="Picture 2">
             <a:extLst>
               <a:ext uri="{FF2B5EF4-FFF2-40B4-BE49-F238E27FC236}">
-                <a16:creationId xmlns="" xmlns:a16="http://schemas.microsoft.com/office/drawing/2014/main" id="{680D742B-523C-43D4-9E8B-E4709EAE39EB}"/>
+                <a16:creationId xmlns:a16="http://schemas.microsoft.com/office/drawing/2014/main" xmlns="" id="{680D742B-523C-43D4-9E8B-E4709EAE39EB}"/>
               </a:ext>
             </a:extLst>
           </p:cNvPr>
@@ -8775,7 +8775,7 @@
           <a:blip r:embed="rId2" cstate="print">
             <a:extLst>
               <a:ext uri="{28A0092B-C50C-407E-A947-70E740481C1C}">
-                <a14:useLocalDpi xmlns="" xmlns:a14="http://schemas.microsoft.com/office/drawing/2010/main" val="0"/>
+                <a14:useLocalDpi xmlns:a14="http://schemas.microsoft.com/office/drawing/2010/main" xmlns="" val="0"/>
               </a:ext>
             </a:extLst>
           </a:blip>
@@ -8798,14 +8798,14 @@
           </a:ln>
           <a:extLst>
             <a:ext uri="{909E8E84-426E-40DD-AFC4-6F175D3DCCD1}">
-              <a14:hiddenFill xmlns="" xmlns:a14="http://schemas.microsoft.com/office/drawing/2010/main">
+              <a14:hiddenFill xmlns:a14="http://schemas.microsoft.com/office/drawing/2010/main" xmlns="">
                 <a:solidFill>
                   <a:srgbClr val="FFFFFF"/>
                 </a:solidFill>
               </a14:hiddenFill>
             </a:ext>
             <a:ext uri="{91240B29-F687-4F45-9708-019B960494DF}">
-              <a14:hiddenLine xmlns="" xmlns:a14="http://schemas.microsoft.com/office/drawing/2010/main" w="9525">
+              <a14:hiddenLine xmlns:a14="http://schemas.microsoft.com/office/drawing/2010/main" xmlns="" w="9525">
                 <a:solidFill>
                   <a:srgbClr val="000000"/>
                 </a:solidFill>
@@ -8820,7 +8820,7 @@
     </p:spTree>
     <p:extLst>
       <p:ext uri="{BB962C8B-B14F-4D97-AF65-F5344CB8AC3E}">
-        <p14:creationId xmlns="" xmlns:p14="http://schemas.microsoft.com/office/powerpoint/2010/main" val="1781569390"/>
+        <p14:creationId xmlns:p14="http://schemas.microsoft.com/office/powerpoint/2010/main" xmlns="" val="1781569390"/>
       </p:ext>
     </p:extLst>
   </p:cSld>
@@ -8855,7 +8855,7 @@
           <p:cNvPr id="4" name="Título 3">
             <a:extLst>
               <a:ext uri="{FF2B5EF4-FFF2-40B4-BE49-F238E27FC236}">
-                <a16:creationId xmlns="" xmlns:a16="http://schemas.microsoft.com/office/drawing/2014/main" id="{26BCFAA2-D859-44BC-AFEE-2D5119DC4C72}"/>
+                <a16:creationId xmlns:a16="http://schemas.microsoft.com/office/drawing/2014/main" xmlns="" id="{26BCFAA2-D859-44BC-AFEE-2D5119DC4C72}"/>
               </a:ext>
             </a:extLst>
           </p:cNvPr>
@@ -8891,7 +8891,7 @@
           <p:cNvPr id="3" name="Picture 2">
             <a:extLst>
               <a:ext uri="{FF2B5EF4-FFF2-40B4-BE49-F238E27FC236}">
-                <a16:creationId xmlns="" xmlns:a16="http://schemas.microsoft.com/office/drawing/2014/main" id="{697244E8-4C32-432B-82C5-5F541E652E84}"/>
+                <a16:creationId xmlns:a16="http://schemas.microsoft.com/office/drawing/2014/main" xmlns="" id="{697244E8-4C32-432B-82C5-5F541E652E84}"/>
               </a:ext>
             </a:extLst>
           </p:cNvPr>
@@ -8949,7 +8949,7 @@
           <p:cNvPr id="2" name="Rectangle 1">
             <a:extLst>
               <a:ext uri="{FF2B5EF4-FFF2-40B4-BE49-F238E27FC236}">
-                <a16:creationId xmlns="" xmlns:a16="http://schemas.microsoft.com/office/drawing/2014/main" id="{9B84690F-C0BA-45DE-B1F4-7C1D7425D6FC}"/>
+                <a16:creationId xmlns:a16="http://schemas.microsoft.com/office/drawing/2014/main" xmlns="" id="{9B84690F-C0BA-45DE-B1F4-7C1D7425D6FC}"/>
               </a:ext>
             </a:extLst>
           </p:cNvPr>
@@ -9003,7 +9003,7 @@
           <p:cNvPr id="4" name="Picture 3">
             <a:extLst>
               <a:ext uri="{FF2B5EF4-FFF2-40B4-BE49-F238E27FC236}">
-                <a16:creationId xmlns="" xmlns:a16="http://schemas.microsoft.com/office/drawing/2014/main" id="{FF33F444-5274-47FB-9AB9-B9E9F701C115}"/>
+                <a16:creationId xmlns:a16="http://schemas.microsoft.com/office/drawing/2014/main" xmlns="" id="{FF33F444-5274-47FB-9AB9-B9E9F701C115}"/>
               </a:ext>
             </a:extLst>
           </p:cNvPr>
@@ -9031,7 +9031,7 @@
     </p:spTree>
     <p:extLst>
       <p:ext uri="{BB962C8B-B14F-4D97-AF65-F5344CB8AC3E}">
-        <p14:creationId xmlns="" xmlns:p14="http://schemas.microsoft.com/office/powerpoint/2010/main" val="2886251363"/>
+        <p14:creationId xmlns:p14="http://schemas.microsoft.com/office/powerpoint/2010/main" xmlns="" val="2886251363"/>
       </p:ext>
     </p:extLst>
   </p:cSld>
@@ -9088,7 +9088,7 @@
           <p:cNvPr id="5" name="Rectangle 4">
             <a:extLst>
               <a:ext uri="{FF2B5EF4-FFF2-40B4-BE49-F238E27FC236}">
-                <a16:creationId xmlns="" xmlns:a16="http://schemas.microsoft.com/office/drawing/2014/main" id="{E268ED25-8F1E-4CB1-BEC7-9279730C430D}"/>
+                <a16:creationId xmlns:a16="http://schemas.microsoft.com/office/drawing/2014/main" xmlns="" id="{E268ED25-8F1E-4CB1-BEC7-9279730C430D}"/>
               </a:ext>
             </a:extLst>
           </p:cNvPr>
@@ -9142,7 +9142,7 @@
           <p:cNvPr id="2" name="Picture 1">
             <a:extLst>
               <a:ext uri="{FF2B5EF4-FFF2-40B4-BE49-F238E27FC236}">
-                <a16:creationId xmlns="" xmlns:a16="http://schemas.microsoft.com/office/drawing/2014/main" id="{AC3F4872-BBD0-4C85-AF1B-EECA98565237}"/>
+                <a16:creationId xmlns:a16="http://schemas.microsoft.com/office/drawing/2014/main" xmlns="" id="{AC3F4872-BBD0-4C85-AF1B-EECA98565237}"/>
               </a:ext>
             </a:extLst>
           </p:cNvPr>
@@ -9170,7 +9170,7 @@
     </p:spTree>
     <p:extLst>
       <p:ext uri="{BB962C8B-B14F-4D97-AF65-F5344CB8AC3E}">
-        <p14:creationId xmlns="" xmlns:p14="http://schemas.microsoft.com/office/powerpoint/2010/main" val="395963370"/>
+        <p14:creationId xmlns:p14="http://schemas.microsoft.com/office/powerpoint/2010/main" xmlns="" val="395963370"/>
       </p:ext>
     </p:extLst>
   </p:cSld>
@@ -9273,14 +9273,14 @@
             </a:ln>
             <a:extLst>
               <a:ext uri="{909E8E84-426E-40DD-AFC4-6F175D3DCCD1}">
-                <a14:hiddenFill xmlns="" xmlns:a14="http://schemas.microsoft.com/office/drawing/2010/main">
+                <a14:hiddenFill xmlns:a14="http://schemas.microsoft.com/office/drawing/2010/main" xmlns="">
                   <a:solidFill>
                     <a:srgbClr val="FFFFFF"/>
                   </a:solidFill>
                 </a14:hiddenFill>
               </a:ext>
               <a:ext uri="{91240B29-F687-4F45-9708-019B960494DF}">
-                <a14:hiddenLine xmlns="" xmlns:a14="http://schemas.microsoft.com/office/drawing/2010/main" w="9525">
+                <a14:hiddenLine xmlns:a14="http://schemas.microsoft.com/office/drawing/2010/main" xmlns="" w="9525">
                   <a:solidFill>
                     <a:srgbClr val="000000"/>
                   </a:solidFill>
@@ -9430,14 +9430,14 @@
             </a:ln>
             <a:extLst>
               <a:ext uri="{909E8E84-426E-40DD-AFC4-6F175D3DCCD1}">
-                <a14:hiddenFill xmlns="" xmlns:a14="http://schemas.microsoft.com/office/drawing/2010/main">
+                <a14:hiddenFill xmlns:a14="http://schemas.microsoft.com/office/drawing/2010/main" xmlns="">
                   <a:solidFill>
                     <a:srgbClr val="FFFFFF"/>
                   </a:solidFill>
                 </a14:hiddenFill>
               </a:ext>
               <a:ext uri="{91240B29-F687-4F45-9708-019B960494DF}">
-                <a14:hiddenLine xmlns="" xmlns:a14="http://schemas.microsoft.com/office/drawing/2010/main" w="9525">
+                <a14:hiddenLine xmlns:a14="http://schemas.microsoft.com/office/drawing/2010/main" xmlns="" w="9525">
                   <a:solidFill>
                     <a:srgbClr val="000000"/>
                   </a:solidFill>
@@ -9682,7 +9682,7 @@
     </p:spTree>
     <p:extLst>
       <p:ext uri="{BB962C8B-B14F-4D97-AF65-F5344CB8AC3E}">
-        <p14:creationId xmlns="" xmlns:p14="http://schemas.microsoft.com/office/powerpoint/2010/main" val="3409322625"/>
+        <p14:creationId xmlns:p14="http://schemas.microsoft.com/office/powerpoint/2010/main" xmlns="" val="3409322625"/>
       </p:ext>
     </p:extLst>
   </p:cSld>
@@ -9717,7 +9717,7 @@
           <p:cNvPr id="2" name="Título 1">
             <a:extLst>
               <a:ext uri="{FF2B5EF4-FFF2-40B4-BE49-F238E27FC236}">
-                <a16:creationId xmlns="" xmlns:a16="http://schemas.microsoft.com/office/drawing/2014/main" id="{4420E5F6-C592-489E-8742-39113C67F28C}"/>
+                <a16:creationId xmlns:a16="http://schemas.microsoft.com/office/drawing/2014/main" xmlns="" id="{4420E5F6-C592-489E-8742-39113C67F28C}"/>
               </a:ext>
             </a:extLst>
           </p:cNvPr>
@@ -9757,7 +9757,7 @@
           <p:cNvPr id="3" name="Espaço Reservado para Conteúdo 2">
             <a:extLst>
               <a:ext uri="{FF2B5EF4-FFF2-40B4-BE49-F238E27FC236}">
-                <a16:creationId xmlns="" xmlns:a16="http://schemas.microsoft.com/office/drawing/2014/main" id="{FB12D05B-E47F-4BA3-B1A7-F1DCD4D8F90E}"/>
+                <a16:creationId xmlns:a16="http://schemas.microsoft.com/office/drawing/2014/main" xmlns="" id="{FB12D05B-E47F-4BA3-B1A7-F1DCD4D8F90E}"/>
               </a:ext>
             </a:extLst>
           </p:cNvPr>
@@ -9987,7 +9987,7 @@
     </p:spTree>
     <p:extLst>
       <p:ext uri="{BB962C8B-B14F-4D97-AF65-F5344CB8AC3E}">
-        <p14:creationId xmlns="" xmlns:p14="http://schemas.microsoft.com/office/powerpoint/2010/main" val="732095642"/>
+        <p14:creationId xmlns:p14="http://schemas.microsoft.com/office/powerpoint/2010/main" xmlns="" val="732095642"/>
       </p:ext>
     </p:extLst>
   </p:cSld>
@@ -10019,7 +10019,7 @@
           <p:cNvPr id="5" name="Título 1">
             <a:extLst>
               <a:ext uri="{FF2B5EF4-FFF2-40B4-BE49-F238E27FC236}">
-                <a16:creationId xmlns="" xmlns:a16="http://schemas.microsoft.com/office/drawing/2014/main" id="{4420E5F6-C592-489E-8742-39113C67F28C}"/>
+                <a16:creationId xmlns:a16="http://schemas.microsoft.com/office/drawing/2014/main" xmlns="" id="{4420E5F6-C592-489E-8742-39113C67F28C}"/>
               </a:ext>
             </a:extLst>
           </p:cNvPr>
@@ -10208,7 +10208,7 @@
           <p:cNvPr id="3" name="Picture 2">
             <a:extLst>
               <a:ext uri="{FF2B5EF4-FFF2-40B4-BE49-F238E27FC236}">
-                <a16:creationId xmlns="" xmlns:a16="http://schemas.microsoft.com/office/drawing/2014/main" id="{8F573B82-A720-4E7D-88E3-7ABD98571312}"/>
+                <a16:creationId xmlns:a16="http://schemas.microsoft.com/office/drawing/2014/main" xmlns="" id="{8F573B82-A720-4E7D-88E3-7ABD98571312}"/>
               </a:ext>
             </a:extLst>
           </p:cNvPr>
@@ -10221,7 +10221,7 @@
           <a:blip r:embed="rId2" cstate="print">
             <a:extLst>
               <a:ext uri="{28A0092B-C50C-407E-A947-70E740481C1C}">
-                <a14:useLocalDpi xmlns="" xmlns:a14="http://schemas.microsoft.com/office/drawing/2010/main" val="0"/>
+                <a14:useLocalDpi xmlns:a14="http://schemas.microsoft.com/office/drawing/2010/main" xmlns="" val="0"/>
               </a:ext>
             </a:extLst>
           </a:blip>
@@ -10242,7 +10242,7 @@
     </p:spTree>
     <p:extLst>
       <p:ext uri="{BB962C8B-B14F-4D97-AF65-F5344CB8AC3E}">
-        <p14:creationId xmlns="" xmlns:p14="http://schemas.microsoft.com/office/powerpoint/2010/main" val="1528951847"/>
+        <p14:creationId xmlns:p14="http://schemas.microsoft.com/office/powerpoint/2010/main" xmlns="" val="1528951847"/>
       </p:ext>
     </p:extLst>
   </p:cSld>
@@ -10274,7 +10274,7 @@
           <p:cNvPr id="6" name="Título 1">
             <a:extLst>
               <a:ext uri="{FF2B5EF4-FFF2-40B4-BE49-F238E27FC236}">
-                <a16:creationId xmlns="" xmlns:a16="http://schemas.microsoft.com/office/drawing/2014/main" id="{4420E5F6-C592-489E-8742-39113C67F28C}"/>
+                <a16:creationId xmlns:a16="http://schemas.microsoft.com/office/drawing/2014/main" xmlns="" id="{4420E5F6-C592-489E-8742-39113C67F28C}"/>
               </a:ext>
             </a:extLst>
           </p:cNvPr>
@@ -10314,7 +10314,7 @@
           <p:cNvPr id="8" name="Picture 7">
             <a:extLst>
               <a:ext uri="{FF2B5EF4-FFF2-40B4-BE49-F238E27FC236}">
-                <a16:creationId xmlns="" xmlns:a16="http://schemas.microsoft.com/office/drawing/2014/main" id="{AC1CFE5D-EA64-4455-B011-2E471DBEC948}"/>
+                <a16:creationId xmlns:a16="http://schemas.microsoft.com/office/drawing/2014/main" xmlns="" id="{AC1CFE5D-EA64-4455-B011-2E471DBEC948}"/>
               </a:ext>
             </a:extLst>
           </p:cNvPr>
@@ -10342,7 +10342,7 @@
     </p:spTree>
     <p:extLst>
       <p:ext uri="{BB962C8B-B14F-4D97-AF65-F5344CB8AC3E}">
-        <p14:creationId xmlns="" xmlns:p14="http://schemas.microsoft.com/office/powerpoint/2010/main" val="3460844110"/>
+        <p14:creationId xmlns:p14="http://schemas.microsoft.com/office/powerpoint/2010/main" xmlns="" val="3460844110"/>
       </p:ext>
     </p:extLst>
   </p:cSld>
@@ -10374,7 +10374,7 @@
           <p:cNvPr id="6" name="Título 1">
             <a:extLst>
               <a:ext uri="{FF2B5EF4-FFF2-40B4-BE49-F238E27FC236}">
-                <a16:creationId xmlns="" xmlns:a16="http://schemas.microsoft.com/office/drawing/2014/main" id="{4420E5F6-C592-489E-8742-39113C67F28C}"/>
+                <a16:creationId xmlns:a16="http://schemas.microsoft.com/office/drawing/2014/main" xmlns="" id="{4420E5F6-C592-489E-8742-39113C67F28C}"/>
               </a:ext>
             </a:extLst>
           </p:cNvPr>
@@ -10409,63 +10409,9 @@
           </a:p>
         </p:txBody>
       </p:sp>
-      <p:sp>
-        <p:nvSpPr>
-          <p:cNvPr id="8" name="Rectangle 7">
-            <a:extLst>
-              <a:ext uri="{FF2B5EF4-FFF2-40B4-BE49-F238E27FC236}">
-                <a16:creationId xmlns="" xmlns:a16="http://schemas.microsoft.com/office/drawing/2014/main" id="{F316C0A6-AC98-4AAE-B87A-547E57B86D5F}"/>
-              </a:ext>
-            </a:extLst>
-          </p:cNvPr>
-          <p:cNvSpPr/>
-          <p:nvPr/>
-        </p:nvSpPr>
-        <p:spPr>
-          <a:xfrm>
-            <a:off x="0" y="1340768"/>
-            <a:ext cx="9144000" cy="5517232"/>
-          </a:xfrm>
-          <a:prstGeom prst="rect">
-            <a:avLst/>
-          </a:prstGeom>
-          <a:solidFill>
-            <a:schemeClr val="bg1"/>
-          </a:solidFill>
-          <a:ln>
-            <a:solidFill>
-              <a:schemeClr val="bg1"/>
-            </a:solidFill>
-          </a:ln>
-        </p:spPr>
-        <p:style>
-          <a:lnRef idx="2">
-            <a:schemeClr val="accent1">
-              <a:shade val="50000"/>
-            </a:schemeClr>
-          </a:lnRef>
-          <a:fillRef idx="1">
-            <a:schemeClr val="accent1"/>
-          </a:fillRef>
-          <a:effectRef idx="0">
-            <a:schemeClr val="accent1"/>
-          </a:effectRef>
-          <a:fontRef idx="minor">
-            <a:schemeClr val="lt1"/>
-          </a:fontRef>
-        </p:style>
-        <p:txBody>
-          <a:bodyPr rtlCol="0" anchor="ctr"/>
-          <a:lstStyle/>
-          <a:p>
-            <a:pPr algn="ctr"/>
-            <a:endParaRPr lang="pt-BR"/>
-          </a:p>
-        </p:txBody>
-      </p:sp>
       <p:pic>
         <p:nvPicPr>
-          <p:cNvPr id="1026" name="Picture 2" descr="C:\Users\alexandre\Pictures\ConfigPerfil1.png"/>
+          <p:cNvPr id="2" name="Picture 2" descr="C:\Users\alexandre\Pictures\ConfigPerfil1.png"/>
           <p:cNvPicPr>
             <a:picLocks noChangeAspect="1" noChangeArrowheads="1"/>
           </p:cNvPicPr>
@@ -10481,7 +10427,7 @@
         <p:spPr bwMode="auto">
           <a:xfrm>
             <a:off x="0" y="1268760"/>
-            <a:ext cx="8892480" cy="5080479"/>
+            <a:ext cx="9010002" cy="4536504"/>
           </a:xfrm>
           <a:prstGeom prst="rect">
             <a:avLst/>
@@ -10492,7 +10438,7 @@
     </p:spTree>
     <p:extLst>
       <p:ext uri="{BB962C8B-B14F-4D97-AF65-F5344CB8AC3E}">
-        <p14:creationId xmlns="" xmlns:p14="http://schemas.microsoft.com/office/powerpoint/2010/main" val="255138212"/>
+        <p14:creationId xmlns:p14="http://schemas.microsoft.com/office/powerpoint/2010/main" xmlns="" val="255138212"/>
       </p:ext>
     </p:extLst>
   </p:cSld>
@@ -10524,7 +10470,7 @@
           <p:cNvPr id="6" name="Título 1">
             <a:extLst>
               <a:ext uri="{FF2B5EF4-FFF2-40B4-BE49-F238E27FC236}">
-                <a16:creationId xmlns="" xmlns:a16="http://schemas.microsoft.com/office/drawing/2014/main" id="{4420E5F6-C592-489E-8742-39113C67F28C}"/>
+                <a16:creationId xmlns:a16="http://schemas.microsoft.com/office/drawing/2014/main" xmlns="" id="{4420E5F6-C592-489E-8742-39113C67F28C}"/>
               </a:ext>
             </a:extLst>
           </p:cNvPr>
@@ -10561,7 +10507,7 @@
       </p:sp>
       <p:pic>
         <p:nvPicPr>
-          <p:cNvPr id="2051" name="Picture 3" descr="C:\Users\alexandre\Pictures\ConfigPerfil2.png"/>
+          <p:cNvPr id="2050" name="Picture 2" descr="C:\Users\alexandre\Pictures\ConfigPerfil2.png"/>
           <p:cNvPicPr>
             <a:picLocks noChangeAspect="1" noChangeArrowheads="1"/>
           </p:cNvPicPr>
@@ -10576,8 +10522,8 @@
         </p:blipFill>
         <p:spPr bwMode="auto">
           <a:xfrm>
-            <a:off x="251520" y="1412776"/>
-            <a:ext cx="8734691" cy="5040560"/>
+            <a:off x="0" y="1340768"/>
+            <a:ext cx="9144000" cy="4757045"/>
           </a:xfrm>
           <a:prstGeom prst="rect">
             <a:avLst/>
@@ -10588,7 +10534,7 @@
     </p:spTree>
     <p:extLst>
       <p:ext uri="{BB962C8B-B14F-4D97-AF65-F5344CB8AC3E}">
-        <p14:creationId xmlns="" xmlns:p14="http://schemas.microsoft.com/office/powerpoint/2010/main" val="2944428277"/>
+        <p14:creationId xmlns:p14="http://schemas.microsoft.com/office/powerpoint/2010/main" xmlns="" val="2944428277"/>
       </p:ext>
     </p:extLst>
   </p:cSld>
@@ -10652,7 +10598,7 @@
           <a:blip r:embed="rId3" cstate="print">
             <a:extLst>
               <a:ext uri="{28A0092B-C50C-407E-A947-70E740481C1C}">
-                <a14:useLocalDpi xmlns="" xmlns:a14="http://schemas.microsoft.com/office/drawing/2010/main" val="0"/>
+                <a14:useLocalDpi xmlns:a14="http://schemas.microsoft.com/office/drawing/2010/main" xmlns="" val="0"/>
               </a:ext>
             </a:extLst>
           </a:blip>
@@ -10710,7 +10656,7 @@
           <p:cNvPr id="6" name="Título 1">
             <a:extLst>
               <a:ext uri="{FF2B5EF4-FFF2-40B4-BE49-F238E27FC236}">
-                <a16:creationId xmlns="" xmlns:a16="http://schemas.microsoft.com/office/drawing/2014/main" id="{4420E5F6-C592-489E-8742-39113C67F28C}"/>
+                <a16:creationId xmlns:a16="http://schemas.microsoft.com/office/drawing/2014/main" xmlns="" id="{4420E5F6-C592-489E-8742-39113C67F28C}"/>
               </a:ext>
             </a:extLst>
           </p:cNvPr>
@@ -10747,7 +10693,7 @@
       </p:sp>
       <p:pic>
         <p:nvPicPr>
-          <p:cNvPr id="3074" name="Picture 2" descr="C:\Users\alexandre\Pictures\ConfigPerfil3.png"/>
+          <p:cNvPr id="2" name="Picture 2" descr="C:\Users\alexandre\Pictures\ConfigPerfil3.png"/>
           <p:cNvPicPr>
             <a:picLocks noChangeAspect="1" noChangeArrowheads="1"/>
           </p:cNvPicPr>
@@ -10762,8 +10708,8 @@
         </p:blipFill>
         <p:spPr bwMode="auto">
           <a:xfrm>
-            <a:off x="0" y="980728"/>
-            <a:ext cx="8882810" cy="5517232"/>
+            <a:off x="179064" y="1556792"/>
+            <a:ext cx="8964936" cy="3960414"/>
           </a:xfrm>
           <a:prstGeom prst="rect">
             <a:avLst/>
@@ -10774,7 +10720,7 @@
     </p:spTree>
     <p:extLst>
       <p:ext uri="{BB962C8B-B14F-4D97-AF65-F5344CB8AC3E}">
-        <p14:creationId xmlns="" xmlns:p14="http://schemas.microsoft.com/office/powerpoint/2010/main" val="398228404"/>
+        <p14:creationId xmlns:p14="http://schemas.microsoft.com/office/powerpoint/2010/main" xmlns="" val="398228404"/>
       </p:ext>
     </p:extLst>
   </p:cSld>
@@ -10806,7 +10752,7 @@
           <p:cNvPr id="6" name="Título 1">
             <a:extLst>
               <a:ext uri="{FF2B5EF4-FFF2-40B4-BE49-F238E27FC236}">
-                <a16:creationId xmlns="" xmlns:a16="http://schemas.microsoft.com/office/drawing/2014/main" id="{4420E5F6-C592-489E-8742-39113C67F28C}"/>
+                <a16:creationId xmlns:a16="http://schemas.microsoft.com/office/drawing/2014/main" xmlns="" id="{4420E5F6-C592-489E-8742-39113C67F28C}"/>
               </a:ext>
             </a:extLst>
           </p:cNvPr>
@@ -10843,7 +10789,7 @@
       </p:sp>
       <p:pic>
         <p:nvPicPr>
-          <p:cNvPr id="4098" name="Picture 2" descr="C:\Users\alexandre\Pictures\ConfigPerfil4.png"/>
+          <p:cNvPr id="2" name="Picture 2" descr="C:\Users\alexandre\Pictures\ConfigPerfil4.png"/>
           <p:cNvPicPr>
             <a:picLocks noChangeAspect="1" noChangeArrowheads="1"/>
           </p:cNvPicPr>
@@ -10858,8 +10804,8 @@
         </p:blipFill>
         <p:spPr bwMode="auto">
           <a:xfrm>
-            <a:off x="-1" y="1340768"/>
-            <a:ext cx="9043637" cy="4968552"/>
+            <a:off x="52065" y="1412776"/>
+            <a:ext cx="9091935" cy="3942520"/>
           </a:xfrm>
           <a:prstGeom prst="rect">
             <a:avLst/>
@@ -10870,7 +10816,7 @@
     </p:spTree>
     <p:extLst>
       <p:ext uri="{BB962C8B-B14F-4D97-AF65-F5344CB8AC3E}">
-        <p14:creationId xmlns="" xmlns:p14="http://schemas.microsoft.com/office/powerpoint/2010/main" val="3663591352"/>
+        <p14:creationId xmlns:p14="http://schemas.microsoft.com/office/powerpoint/2010/main" xmlns="" val="3663591352"/>
       </p:ext>
     </p:extLst>
   </p:cSld>
@@ -10942,18 +10888,19 @@
           <a:bodyPr/>
           <a:lstStyle/>
           <a:p>
+            <a:endParaRPr lang="pt-BR" sz="2400" dirty="0" smtClean="0"/>
+          </a:p>
+          <a:p>
+            <a:endParaRPr lang="pt-BR" sz="2400" dirty="0" smtClean="0"/>
+          </a:p>
+          <a:p>
             <a:r>
               <a:rPr lang="pt-BR" sz="2400" dirty="0" smtClean="0"/>
-              <a:t>Para a realização de uma especificação de software a participação do cliente é essencial, ainda que o analista tenha boa experiência de mercado</a:t>
-            </a:r>
-          </a:p>
-          <a:p>
-            <a:endParaRPr lang="pt-BR" sz="2400" dirty="0" smtClean="0"/>
-          </a:p>
-          <a:p>
+              <a:t>Manter-se </a:t>
+            </a:r>
             <a:r>
               <a:rPr lang="pt-BR" sz="2400" dirty="0" smtClean="0"/>
-              <a:t>Manter-se atento ao escopo inicial do projeto para que não sejam desenvolvidas funcionalidades que não foram solicitadas</a:t>
+              <a:t>atento ao escopo inicial do projeto para que não sejam desenvolvidas funcionalidades que não foram solicitadas</a:t>
             </a:r>
           </a:p>
           <a:p>
@@ -10985,7 +10932,7 @@
           <a:blip r:embed="rId2" cstate="print">
             <a:extLst>
               <a:ext uri="{28A0092B-C50C-407E-A947-70E740481C1C}">
-                <a14:useLocalDpi xmlns="" xmlns:a14="http://schemas.microsoft.com/office/drawing/2010/main" val="0"/>
+                <a14:useLocalDpi xmlns:a14="http://schemas.microsoft.com/office/drawing/2010/main" xmlns="" val="0"/>
               </a:ext>
             </a:extLst>
           </a:blip>
@@ -11005,7 +10952,7 @@
           <a:noFill/>
           <a:extLst>
             <a:ext uri="{909E8E84-426E-40DD-AFC4-6F175D3DCCD1}">
-              <a14:hiddenFill xmlns="" xmlns:a14="http://schemas.microsoft.com/office/drawing/2010/main">
+              <a14:hiddenFill xmlns:a14="http://schemas.microsoft.com/office/drawing/2010/main" xmlns="">
                 <a:solidFill>
                   <a:srgbClr val="FFFFFF"/>
                 </a:solidFill>
@@ -11144,7 +11091,7 @@
           <a:blip r:embed="rId2" cstate="print">
             <a:extLst>
               <a:ext uri="{28A0092B-C50C-407E-A947-70E740481C1C}">
-                <a14:useLocalDpi xmlns="" xmlns:a14="http://schemas.microsoft.com/office/drawing/2010/main" val="0"/>
+                <a14:useLocalDpi xmlns:a14="http://schemas.microsoft.com/office/drawing/2010/main" xmlns="" val="0"/>
               </a:ext>
             </a:extLst>
           </a:blip>
@@ -11162,7 +11109,7 @@
           <a:noFill/>
           <a:extLst>
             <a:ext uri="{909E8E84-426E-40DD-AFC4-6F175D3DCCD1}">
-              <a14:hiddenFill xmlns="" xmlns:a14="http://schemas.microsoft.com/office/drawing/2010/main">
+              <a14:hiddenFill xmlns:a14="http://schemas.microsoft.com/office/drawing/2010/main" xmlns="">
                 <a:solidFill>
                   <a:srgbClr val="FFFFFF"/>
                 </a:solidFill>
@@ -11232,7 +11179,7 @@
     </p:spTree>
     <p:extLst>
       <p:ext uri="{BB962C8B-B14F-4D97-AF65-F5344CB8AC3E}">
-        <p14:creationId xmlns="" xmlns:p14="http://schemas.microsoft.com/office/powerpoint/2010/main" val="1990385622"/>
+        <p14:creationId xmlns:p14="http://schemas.microsoft.com/office/powerpoint/2010/main" xmlns="" val="1990385622"/>
       </p:ext>
     </p:extLst>
   </p:cSld>
@@ -11335,14 +11282,14 @@
             </a:ln>
             <a:extLst>
               <a:ext uri="{909E8E84-426E-40DD-AFC4-6F175D3DCCD1}">
-                <a14:hiddenFill xmlns="" xmlns:a14="http://schemas.microsoft.com/office/drawing/2010/main">
+                <a14:hiddenFill xmlns:a14="http://schemas.microsoft.com/office/drawing/2010/main" xmlns="">
                   <a:solidFill>
                     <a:srgbClr val="FFFFFF"/>
                   </a:solidFill>
                 </a14:hiddenFill>
               </a:ext>
               <a:ext uri="{91240B29-F687-4F45-9708-019B960494DF}">
-                <a14:hiddenLine xmlns="" xmlns:a14="http://schemas.microsoft.com/office/drawing/2010/main" w="9525">
+                <a14:hiddenLine xmlns:a14="http://schemas.microsoft.com/office/drawing/2010/main" xmlns="" w="9525">
                   <a:solidFill>
                     <a:srgbClr val="000000"/>
                   </a:solidFill>
@@ -11492,14 +11439,14 @@
             </a:ln>
             <a:extLst>
               <a:ext uri="{909E8E84-426E-40DD-AFC4-6F175D3DCCD1}">
-                <a14:hiddenFill xmlns="" xmlns:a14="http://schemas.microsoft.com/office/drawing/2010/main">
+                <a14:hiddenFill xmlns:a14="http://schemas.microsoft.com/office/drawing/2010/main" xmlns="">
                   <a:solidFill>
                     <a:srgbClr val="FFFFFF"/>
                   </a:solidFill>
                 </a14:hiddenFill>
               </a:ext>
               <a:ext uri="{91240B29-F687-4F45-9708-019B960494DF}">
-                <a14:hiddenLine xmlns="" xmlns:a14="http://schemas.microsoft.com/office/drawing/2010/main" w="9525">
+                <a14:hiddenLine xmlns:a14="http://schemas.microsoft.com/office/drawing/2010/main" xmlns="" w="9525">
                   <a:solidFill>
                     <a:srgbClr val="000000"/>
                   </a:solidFill>
@@ -11763,7 +11710,7 @@
     </p:spTree>
     <p:extLst>
       <p:ext uri="{BB962C8B-B14F-4D97-AF65-F5344CB8AC3E}">
-        <p14:creationId xmlns="" xmlns:p14="http://schemas.microsoft.com/office/powerpoint/2010/main" val="2005090747"/>
+        <p14:creationId xmlns:p14="http://schemas.microsoft.com/office/powerpoint/2010/main" xmlns="" val="2005090747"/>
       </p:ext>
     </p:extLst>
   </p:cSld>
@@ -11842,14 +11789,14 @@
           </a:xfrm>
           <a:extLst>
             <a:ext uri="{909E8E84-426E-40DD-AFC4-6F175D3DCCD1}">
-              <a14:hiddenFill xmlns="" xmlns:a14="http://schemas.microsoft.com/office/drawing/2010/main">
+              <a14:hiddenFill xmlns:a14="http://schemas.microsoft.com/office/drawing/2010/main" xmlns="">
                 <a:solidFill>
                   <a:srgbClr val="FFFFFF"/>
                 </a:solidFill>
               </a14:hiddenFill>
             </a:ext>
             <a:ext uri="{91240B29-F687-4F45-9708-019B960494DF}">
-              <a14:hiddenLine xmlns="" xmlns:a14="http://schemas.microsoft.com/office/drawing/2010/main" w="9525">
+              <a14:hiddenLine xmlns:a14="http://schemas.microsoft.com/office/drawing/2010/main" xmlns="" w="9525">
                 <a:solidFill>
                   <a:srgbClr val="000000"/>
                 </a:solidFill>
@@ -12185,7 +12132,7 @@
           <a:blip r:embed="rId2" cstate="print">
             <a:extLst>
               <a:ext uri="{28A0092B-C50C-407E-A947-70E740481C1C}">
-                <a14:useLocalDpi xmlns="" xmlns:a14="http://schemas.microsoft.com/office/drawing/2010/main" val="0"/>
+                <a14:useLocalDpi xmlns:a14="http://schemas.microsoft.com/office/drawing/2010/main" xmlns="" val="0"/>
               </a:ext>
             </a:extLst>
           </a:blip>
@@ -12277,7 +12224,7 @@
           <a:blip r:embed="rId2" cstate="print">
             <a:extLst>
               <a:ext uri="{28A0092B-C50C-407E-A947-70E740481C1C}">
-                <a14:useLocalDpi xmlns="" xmlns:a14="http://schemas.microsoft.com/office/drawing/2010/main" val="0"/>
+                <a14:useLocalDpi xmlns:a14="http://schemas.microsoft.com/office/drawing/2010/main" xmlns="" val="0"/>
               </a:ext>
             </a:extLst>
           </a:blip>
@@ -12369,7 +12316,7 @@
           <a:blip r:embed="rId2" cstate="print">
             <a:extLst>
               <a:ext uri="{28A0092B-C50C-407E-A947-70E740481C1C}">
-                <a14:useLocalDpi xmlns="" xmlns:a14="http://schemas.microsoft.com/office/drawing/2010/main" val="0"/>
+                <a14:useLocalDpi xmlns:a14="http://schemas.microsoft.com/office/drawing/2010/main" xmlns="" val="0"/>
               </a:ext>
             </a:extLst>
           </a:blip>
@@ -12997,7 +12944,7 @@
   <a:extraClrSchemeLst/>
   <a:extLst>
     <a:ext uri="{05A4C25C-085E-4340-85A3-A5531E510DB2}">
-      <thm15:themeFamily xmlns="" xmlns:thm15="http://schemas.microsoft.com/office/thememl/2012/main" name="Office Theme" id="{62F939B6-93AF-4DB8-9C6B-D6C7DFDC589F}" vid="{4A3C46E8-61CC-4603-A589-7422A47A8E4A}"/>
+      <thm15:themeFamily xmlns:thm15="http://schemas.microsoft.com/office/thememl/2012/main" xmlns="" name="Office Theme" id="{62F939B6-93AF-4DB8-9C6B-D6C7DFDC589F}" vid="{4A3C46E8-61CC-4603-A589-7422A47A8E4A}"/>
     </a:ext>
   </a:extLst>
 </a:theme>

</xml_diff>

<commit_message>
Correção slide 26 Paciente
</commit_message>
<xml_diff>
--- a/TCC/5º Encontro/2017-Apresentacao Psystem.pptx
+++ b/TCC/5º Encontro/2017-Apresentacao Psystem.pptx
@@ -284,7 +284,7 @@
             <a:fld id="{C0D5B206-56B5-433E-8333-9415E6A460B9}" type="datetimeFigureOut">
               <a:rPr lang="pt-BR" smtClean="0"/>
               <a:pPr/>
-              <a:t>17/11/2017</a:t>
+              <a:t>20/11/2017</a:t>
             </a:fld>
             <a:endParaRPr lang="pt-BR"/>
           </a:p>
@@ -3430,13 +3430,6 @@
   <p:clrMapOvr>
     <a:masterClrMapping/>
   </p:clrMapOvr>
-  <p:timing>
-    <p:tnLst>
-      <p:par>
-        <p:cTn id="1" dur="indefinite" restart="never" nodeType="tmRoot"/>
-      </p:par>
-    </p:tnLst>
-  </p:timing>
 </p:sld>
 </file>
 
@@ -3588,13 +3581,6 @@
   <p:clrMapOvr>
     <a:masterClrMapping/>
   </p:clrMapOvr>
-  <p:timing>
-    <p:tnLst>
-      <p:par>
-        <p:cTn id="1" dur="indefinite" restart="never" nodeType="tmRoot"/>
-      </p:par>
-    </p:tnLst>
-  </p:timing>
 </p:sld>
 </file>
 
@@ -4126,13 +4112,6 @@
   <p:transition spd="med">
     <p:fade/>
   </p:transition>
-  <p:timing>
-    <p:tnLst>
-      <p:par>
-        <p:cTn id="1" dur="indefinite" restart="never" nodeType="tmRoot"/>
-      </p:par>
-    </p:tnLst>
-  </p:timing>
 </p:sld>
 </file>
 
@@ -4379,13 +4358,6 @@
   <p:transition spd="med">
     <p:fade/>
   </p:transition>
-  <p:timing>
-    <p:tnLst>
-      <p:par>
-        <p:cTn id="1" dur="indefinite" restart="never" nodeType="tmRoot"/>
-      </p:par>
-    </p:tnLst>
-  </p:timing>
 </p:sld>
 </file>
 
@@ -4468,13 +4440,6 @@
   <p:clrMapOvr>
     <a:masterClrMapping/>
   </p:clrMapOvr>
-  <p:timing>
-    <p:tnLst>
-      <p:par>
-        <p:cTn id="1" dur="indefinite" restart="never" nodeType="tmRoot"/>
-      </p:par>
-    </p:tnLst>
-  </p:timing>
 </p:sld>
 </file>
 
@@ -4585,7 +4550,7 @@
           <p:cNvPr id="2" name="Picture 1">
             <a:extLst>
               <a:ext uri="{FF2B5EF4-FFF2-40B4-BE49-F238E27FC236}">
-                <a16:creationId xmlns="" xmlns:a16="http://schemas.microsoft.com/office/drawing/2014/main" id="{F5A00150-EB0A-4F28-911C-141811EBFBD4}"/>
+                <a16:creationId xmlns:a16="http://schemas.microsoft.com/office/drawing/2014/main" id="{F5A00150-EB0A-4F28-911C-141811EBFBD4}"/>
               </a:ext>
             </a:extLst>
           </p:cNvPr>
@@ -4622,13 +4587,6 @@
   <p:transition spd="med">
     <p:fade/>
   </p:transition>
-  <p:timing>
-    <p:tnLst>
-      <p:par>
-        <p:cTn id="1" dur="indefinite" restart="never" nodeType="tmRoot"/>
-      </p:par>
-    </p:tnLst>
-  </p:timing>
 </p:sld>
 </file>
 
@@ -4739,7 +4697,7 @@
           <p:cNvPr id="3" name="Picture 2">
             <a:extLst>
               <a:ext uri="{FF2B5EF4-FFF2-40B4-BE49-F238E27FC236}">
-                <a16:creationId xmlns="" xmlns:a16="http://schemas.microsoft.com/office/drawing/2014/main" id="{2B1A4BC2-7DE1-4299-98E4-7ED739A14DCC}"/>
+                <a16:creationId xmlns:a16="http://schemas.microsoft.com/office/drawing/2014/main" id="{2B1A4BC2-7DE1-4299-98E4-7ED739A14DCC}"/>
               </a:ext>
             </a:extLst>
           </p:cNvPr>
@@ -4777,13 +4735,6 @@
   <p:transition spd="med">
     <p:fade/>
   </p:transition>
-  <p:timing>
-    <p:tnLst>
-      <p:par>
-        <p:cTn id="1" dur="indefinite" restart="never" nodeType="tmRoot"/>
-      </p:par>
-    </p:tnLst>
-  </p:timing>
 </p:sld>
 </file>
 
@@ -4894,7 +4845,7 @@
           <p:cNvPr id="2" name="Picture 1">
             <a:extLst>
               <a:ext uri="{FF2B5EF4-FFF2-40B4-BE49-F238E27FC236}">
-                <a16:creationId xmlns="" xmlns:a16="http://schemas.microsoft.com/office/drawing/2014/main" id="{B6A781C1-AA15-45C9-BF02-66987FF55897}"/>
+                <a16:creationId xmlns:a16="http://schemas.microsoft.com/office/drawing/2014/main" id="{B6A781C1-AA15-45C9-BF02-66987FF55897}"/>
               </a:ext>
             </a:extLst>
           </p:cNvPr>
@@ -4932,13 +4883,6 @@
   <p:transition spd="med">
     <p:fade/>
   </p:transition>
-  <p:timing>
-    <p:tnLst>
-      <p:par>
-        <p:cTn id="1" dur="indefinite" restart="never" nodeType="tmRoot"/>
-      </p:par>
-    </p:tnLst>
-  </p:timing>
 </p:sld>
 </file>
 
@@ -5451,13 +5395,6 @@
   <p:transition spd="med">
     <p:fade/>
   </p:transition>
-  <p:timing>
-    <p:tnLst>
-      <p:par>
-        <p:cTn id="1" dur="indefinite" restart="never" nodeType="tmRoot"/>
-      </p:par>
-    </p:tnLst>
-  </p:timing>
 </p:sld>
 </file>
 
@@ -5557,7 +5494,7 @@
               <a:defRPr/>
             </a:pPr>
             <a:r>
-              <a:rPr lang="pt-BR" sz="2600" dirty="0" smtClean="0">
+              <a:rPr lang="pt-BR" sz="2600" dirty="0">
                 <a:solidFill>
                   <a:schemeClr val="tx2">
                     <a:lumMod val="75000"/>
@@ -5566,19 +5503,7 @@
                 <a:latin typeface="Calibri (Corpo)"/>
                 <a:cs typeface="Calibri" panose="020F0502020204030204" pitchFamily="34" charset="0"/>
               </a:rPr>
-              <a:t>Realizar </a:t>
-            </a:r>
-            <a:r>
-              <a:rPr lang="pt-BR" sz="2600" dirty="0">
-                <a:solidFill>
-                  <a:schemeClr val="tx2">
-                    <a:lumMod val="75000"/>
-                  </a:schemeClr>
-                </a:solidFill>
-                <a:latin typeface="Calibri (Corpo)"/>
-                <a:cs typeface="Calibri" panose="020F0502020204030204" pitchFamily="34" charset="0"/>
-              </a:rPr>
-              <a:t>Pagamento</a:t>
+              <a:t>Realizar Pagamento</a:t>
             </a:r>
           </a:p>
           <a:p>
@@ -5588,7 +5513,7 @@
               <a:defRPr/>
             </a:pPr>
             <a:r>
-              <a:rPr lang="pt-BR" sz="1850" dirty="0" smtClean="0">
+              <a:rPr lang="pt-BR" sz="1850" dirty="0">
                 <a:solidFill>
                   <a:schemeClr val="tx2">
                     <a:lumMod val="75000"/>
@@ -5598,20 +5523,7 @@
                 <a:ea typeface="+mn-ea"/>
                 <a:cs typeface="+mn-cs"/>
               </a:rPr>
-              <a:t>Realizar os </a:t>
-            </a:r>
-            <a:r>
-              <a:rPr lang="pt-BR" sz="1850" dirty="0">
-                <a:solidFill>
-                  <a:schemeClr val="tx2">
-                    <a:lumMod val="75000"/>
-                  </a:schemeClr>
-                </a:solidFill>
-                <a:latin typeface="+mn-lt"/>
-                <a:ea typeface="+mn-ea"/>
-                <a:cs typeface="+mn-cs"/>
-              </a:rPr>
-              <a:t>pagamentos dos clientes por serviços prestados pela clínica.</a:t>
+              <a:t>Realizar os pagamentos dos clientes por serviços prestados pela clínica.</a:t>
             </a:r>
           </a:p>
           <a:p>
@@ -5644,29 +5556,8 @@
                 <a:latin typeface="Calibri (Corpo)"/>
                 <a:cs typeface="Calibri" panose="020F0502020204030204" pitchFamily="34" charset="0"/>
               </a:rPr>
-              <a:t>Manter </a:t>
-            </a:r>
-            <a:r>
-              <a:rPr lang="pt-BR" sz="2600" dirty="0" smtClean="0">
-                <a:solidFill>
-                  <a:schemeClr val="tx2">
-                    <a:lumMod val="75000"/>
-                  </a:schemeClr>
-                </a:solidFill>
-                <a:latin typeface="Calibri (Corpo)"/>
-                <a:cs typeface="Calibri" panose="020F0502020204030204" pitchFamily="34" charset="0"/>
-              </a:rPr>
-              <a:t>Despesas</a:t>
-            </a:r>
-            <a:endParaRPr lang="pt-BR" sz="2600" dirty="0">
-              <a:solidFill>
-                <a:schemeClr val="tx2">
-                  <a:lumMod val="75000"/>
-                </a:schemeClr>
-              </a:solidFill>
-              <a:latin typeface="Calibri (Corpo)"/>
-              <a:cs typeface="Calibri" panose="020F0502020204030204" pitchFamily="34" charset="0"/>
-            </a:endParaRPr>
+              <a:t>Manter Despesas</a:t>
+            </a:r>
           </a:p>
           <a:p>
             <a:pPr lvl="1" algn="just" eaLnBrk="1" hangingPunct="1">
@@ -5685,33 +5576,7 @@
                 <a:ea typeface="+mn-ea"/>
                 <a:cs typeface="+mn-cs"/>
               </a:rPr>
-              <a:t>Permite a manutenção de </a:t>
-            </a:r>
-            <a:r>
-              <a:rPr lang="pt-BR" sz="1850" dirty="0" smtClean="0">
-                <a:solidFill>
-                  <a:schemeClr val="tx2">
-                    <a:lumMod val="75000"/>
-                  </a:schemeClr>
-                </a:solidFill>
-                <a:latin typeface="+mn-lt"/>
-                <a:ea typeface="+mn-ea"/>
-                <a:cs typeface="+mn-cs"/>
-              </a:rPr>
-              <a:t>despesas </a:t>
-            </a:r>
-            <a:r>
-              <a:rPr lang="pt-BR" sz="1850" dirty="0">
-                <a:solidFill>
-                  <a:schemeClr val="tx2">
-                    <a:lumMod val="75000"/>
-                  </a:schemeClr>
-                </a:solidFill>
-                <a:latin typeface="+mn-lt"/>
-                <a:ea typeface="+mn-ea"/>
-                <a:cs typeface="+mn-cs"/>
-              </a:rPr>
-              <a:t>da clínica.</a:t>
+              <a:t>Permite a manutenção de despesas da clínica.</a:t>
             </a:r>
           </a:p>
           <a:p>
@@ -5963,13 +5828,6 @@
   <p:clrMapOvr>
     <a:masterClrMapping/>
   </p:clrMapOvr>
-  <p:timing>
-    <p:tnLst>
-      <p:par>
-        <p:cTn id="1" dur="indefinite" restart="never" nodeType="tmRoot"/>
-      </p:par>
-    </p:tnLst>
-  </p:timing>
 </p:sld>
 </file>
 
@@ -6335,13 +6193,6 @@
   <p:clrMapOvr>
     <a:masterClrMapping/>
   </p:clrMapOvr>
-  <p:timing>
-    <p:tnLst>
-      <p:par>
-        <p:cTn id="1" dur="indefinite" restart="never" nodeType="tmRoot"/>
-      </p:par>
-    </p:tnLst>
-  </p:timing>
 </p:sld>
 </file>
 
@@ -6586,13 +6437,6 @@
   <p:clrMapOvr>
     <a:masterClrMapping/>
   </p:clrMapOvr>
-  <p:timing>
-    <p:tnLst>
-      <p:par>
-        <p:cTn id="1" dur="indefinite" restart="never" nodeType="tmRoot"/>
-      </p:par>
-    </p:tnLst>
-  </p:timing>
 </p:sld>
 </file>
 
@@ -8055,7 +7899,7 @@
               <a:defRPr/>
             </a:pPr>
             <a:r>
-              <a:rPr lang="pt-BR" sz="2600">
+              <a:rPr lang="pt-BR" sz="2600" dirty="0">
                 <a:solidFill>
                   <a:schemeClr val="tx2">
                     <a:lumMod val="75000"/>
@@ -8074,7 +7918,7 @@
               <a:defRPr/>
             </a:pPr>
             <a:r>
-              <a:rPr lang="pt-BR" sz="1850">
+              <a:rPr lang="pt-BR" sz="1850" dirty="0">
                 <a:solidFill>
                   <a:schemeClr val="tx2">
                     <a:lumMod val="75000"/>
@@ -8083,7 +7927,7 @@
               </a:rPr>
               <a:t>Permite a manutenção de paciente.</a:t>
             </a:r>
-            <a:endParaRPr lang="pt-BR" sz="1850">
+            <a:endParaRPr lang="pt-BR" sz="1850" dirty="0">
               <a:solidFill>
                 <a:schemeClr val="tx2">
                   <a:lumMod val="75000"/>
@@ -8096,7 +7940,7 @@
             <a:pPr marL="457200" lvl="1" indent="0" algn="just" eaLnBrk="1" hangingPunct="1">
               <a:defRPr/>
             </a:pPr>
-            <a:endParaRPr lang="pt-BR" sz="1800">
+            <a:endParaRPr lang="pt-BR" sz="1800" dirty="0">
               <a:solidFill>
                 <a:schemeClr val="tx2">
                   <a:lumMod val="75000"/>
@@ -8113,7 +7957,7 @@
               <a:defRPr/>
             </a:pPr>
             <a:r>
-              <a:rPr lang="pt-BR" sz="2600">
+              <a:rPr lang="pt-BR" sz="2600" dirty="0">
                 <a:solidFill>
                   <a:schemeClr val="tx2">
                     <a:lumMod val="75000"/>
@@ -8122,7 +7966,7 @@
                 <a:latin typeface="Calibri" panose="020F0502020204030204" pitchFamily="34" charset="0"/>
                 <a:cs typeface="Calibri" panose="020F0502020204030204" pitchFamily="34" charset="0"/>
               </a:rPr>
-              <a:t>Receber Prontuário</a:t>
+              <a:t>Manter Prontuário</a:t>
             </a:r>
           </a:p>
           <a:p>
@@ -8132,7 +7976,7 @@
               <a:defRPr/>
             </a:pPr>
             <a:r>
-              <a:rPr lang="pt-BR" sz="1850">
+              <a:rPr lang="pt-BR" sz="1850" dirty="0">
                 <a:solidFill>
                   <a:schemeClr val="tx2">
                     <a:lumMod val="75000"/>
@@ -8146,7 +7990,7 @@
             <a:pPr marL="457200" lvl="1" indent="0" algn="just" eaLnBrk="1" hangingPunct="1">
               <a:defRPr/>
             </a:pPr>
-            <a:endParaRPr lang="pt-BR" sz="1800">
+            <a:endParaRPr lang="pt-BR" sz="1800" dirty="0">
               <a:solidFill>
                 <a:schemeClr val="tx2">
                   <a:lumMod val="75000"/>
@@ -8163,7 +8007,7 @@
               <a:defRPr/>
             </a:pPr>
             <a:r>
-              <a:rPr lang="pt-BR" sz="2600">
+              <a:rPr lang="pt-BR" sz="2600" dirty="0">
                 <a:solidFill>
                   <a:schemeClr val="tx2">
                     <a:lumMod val="75000"/>
@@ -8182,7 +8026,7 @@
               <a:defRPr/>
             </a:pPr>
             <a:r>
-              <a:rPr lang="pt-BR" sz="1850">
+              <a:rPr lang="pt-BR" sz="1850" dirty="0">
                 <a:solidFill>
                   <a:schemeClr val="tx2">
                     <a:lumMod val="75000"/>
@@ -8271,7 +8115,7 @@
           <p:cNvPr id="3" name="Picture 2">
             <a:extLst>
               <a:ext uri="{FF2B5EF4-FFF2-40B4-BE49-F238E27FC236}">
-                <a16:creationId xmlns="" xmlns:a16="http://schemas.microsoft.com/office/drawing/2014/main" id="{1488CEA1-615B-4D4C-A130-F1FD32F916CA}"/>
+                <a16:creationId xmlns:a16="http://schemas.microsoft.com/office/drawing/2014/main" id="{1488CEA1-615B-4D4C-A130-F1FD32F916CA}"/>
               </a:ext>
             </a:extLst>
           </p:cNvPr>
@@ -8360,7 +8204,7 @@
           <p:cNvPr id="1026" name="Picture 2">
             <a:extLst>
               <a:ext uri="{FF2B5EF4-FFF2-40B4-BE49-F238E27FC236}">
-                <a16:creationId xmlns="" xmlns:a16="http://schemas.microsoft.com/office/drawing/2014/main" id="{680D742B-523C-43D4-9E8B-E4709EAE39EB}"/>
+                <a16:creationId xmlns:a16="http://schemas.microsoft.com/office/drawing/2014/main" id="{680D742B-523C-43D4-9E8B-E4709EAE39EB}"/>
               </a:ext>
             </a:extLst>
           </p:cNvPr>
@@ -8453,7 +8297,7 @@
           <p:cNvPr id="4" name="Título 3">
             <a:extLst>
               <a:ext uri="{FF2B5EF4-FFF2-40B4-BE49-F238E27FC236}">
-                <a16:creationId xmlns="" xmlns:a16="http://schemas.microsoft.com/office/drawing/2014/main" id="{26BCFAA2-D859-44BC-AFEE-2D5119DC4C72}"/>
+                <a16:creationId xmlns:a16="http://schemas.microsoft.com/office/drawing/2014/main" id="{26BCFAA2-D859-44BC-AFEE-2D5119DC4C72}"/>
               </a:ext>
             </a:extLst>
           </p:cNvPr>
@@ -8489,7 +8333,7 @@
           <p:cNvPr id="3" name="Picture 2">
             <a:extLst>
               <a:ext uri="{FF2B5EF4-FFF2-40B4-BE49-F238E27FC236}">
-                <a16:creationId xmlns="" xmlns:a16="http://schemas.microsoft.com/office/drawing/2014/main" id="{697244E8-4C32-432B-82C5-5F541E652E84}"/>
+                <a16:creationId xmlns:a16="http://schemas.microsoft.com/office/drawing/2014/main" id="{697244E8-4C32-432B-82C5-5F541E652E84}"/>
               </a:ext>
             </a:extLst>
           </p:cNvPr>
@@ -8605,13 +8449,6 @@
   <p:transition spd="med">
     <p:fade/>
   </p:transition>
-  <p:timing>
-    <p:tnLst>
-      <p:par>
-        <p:cTn id="1" dur="indefinite" restart="never" nodeType="tmRoot"/>
-      </p:par>
-    </p:tnLst>
-  </p:timing>
 </p:sld>
 </file>
 
@@ -8637,7 +8474,7 @@
           <p:cNvPr id="2" name="Rectangle 1">
             <a:extLst>
               <a:ext uri="{FF2B5EF4-FFF2-40B4-BE49-F238E27FC236}">
-                <a16:creationId xmlns="" xmlns:a16="http://schemas.microsoft.com/office/drawing/2014/main" id="{9B84690F-C0BA-45DE-B1F4-7C1D7425D6FC}"/>
+                <a16:creationId xmlns:a16="http://schemas.microsoft.com/office/drawing/2014/main" id="{9B84690F-C0BA-45DE-B1F4-7C1D7425D6FC}"/>
               </a:ext>
             </a:extLst>
           </p:cNvPr>
@@ -8691,7 +8528,7 @@
           <p:cNvPr id="4" name="Picture 3">
             <a:extLst>
               <a:ext uri="{FF2B5EF4-FFF2-40B4-BE49-F238E27FC236}">
-                <a16:creationId xmlns="" xmlns:a16="http://schemas.microsoft.com/office/drawing/2014/main" id="{FF33F444-5274-47FB-9AB9-B9E9F701C115}"/>
+                <a16:creationId xmlns:a16="http://schemas.microsoft.com/office/drawing/2014/main" id="{FF33F444-5274-47FB-9AB9-B9E9F701C115}"/>
               </a:ext>
             </a:extLst>
           </p:cNvPr>
@@ -8776,7 +8613,7 @@
           <p:cNvPr id="5" name="Rectangle 4">
             <a:extLst>
               <a:ext uri="{FF2B5EF4-FFF2-40B4-BE49-F238E27FC236}">
-                <a16:creationId xmlns="" xmlns:a16="http://schemas.microsoft.com/office/drawing/2014/main" id="{E268ED25-8F1E-4CB1-BEC7-9279730C430D}"/>
+                <a16:creationId xmlns:a16="http://schemas.microsoft.com/office/drawing/2014/main" id="{E268ED25-8F1E-4CB1-BEC7-9279730C430D}"/>
               </a:ext>
             </a:extLst>
           </p:cNvPr>
@@ -8830,7 +8667,7 @@
           <p:cNvPr id="2" name="Picture 1">
             <a:extLst>
               <a:ext uri="{FF2B5EF4-FFF2-40B4-BE49-F238E27FC236}">
-                <a16:creationId xmlns="" xmlns:a16="http://schemas.microsoft.com/office/drawing/2014/main" id="{AC3F4872-BBD0-4C85-AF1B-EECA98565237}"/>
+                <a16:creationId xmlns:a16="http://schemas.microsoft.com/office/drawing/2014/main" id="{AC3F4872-BBD0-4C85-AF1B-EECA98565237}"/>
               </a:ext>
             </a:extLst>
           </p:cNvPr>
@@ -9405,7 +9242,7 @@
           <p:cNvPr id="2" name="Título 1">
             <a:extLst>
               <a:ext uri="{FF2B5EF4-FFF2-40B4-BE49-F238E27FC236}">
-                <a16:creationId xmlns="" xmlns:a16="http://schemas.microsoft.com/office/drawing/2014/main" id="{4420E5F6-C592-489E-8742-39113C67F28C}"/>
+                <a16:creationId xmlns:a16="http://schemas.microsoft.com/office/drawing/2014/main" id="{4420E5F6-C592-489E-8742-39113C67F28C}"/>
               </a:ext>
             </a:extLst>
           </p:cNvPr>
@@ -9445,7 +9282,7 @@
           <p:cNvPr id="3" name="Espaço Reservado para Conteúdo 2">
             <a:extLst>
               <a:ext uri="{FF2B5EF4-FFF2-40B4-BE49-F238E27FC236}">
-                <a16:creationId xmlns="" xmlns:a16="http://schemas.microsoft.com/office/drawing/2014/main" id="{FB12D05B-E47F-4BA3-B1A7-F1DCD4D8F90E}"/>
+                <a16:creationId xmlns:a16="http://schemas.microsoft.com/office/drawing/2014/main" id="{FB12D05B-E47F-4BA3-B1A7-F1DCD4D8F90E}"/>
               </a:ext>
             </a:extLst>
           </p:cNvPr>
@@ -9707,7 +9544,7 @@
           <p:cNvPr id="5" name="Título 1">
             <a:extLst>
               <a:ext uri="{FF2B5EF4-FFF2-40B4-BE49-F238E27FC236}">
-                <a16:creationId xmlns="" xmlns:a16="http://schemas.microsoft.com/office/drawing/2014/main" id="{4420E5F6-C592-489E-8742-39113C67F28C}"/>
+                <a16:creationId xmlns:a16="http://schemas.microsoft.com/office/drawing/2014/main" id="{4420E5F6-C592-489E-8742-39113C67F28C}"/>
               </a:ext>
             </a:extLst>
           </p:cNvPr>
@@ -9896,7 +9733,7 @@
           <p:cNvPr id="3" name="Picture 2">
             <a:extLst>
               <a:ext uri="{FF2B5EF4-FFF2-40B4-BE49-F238E27FC236}">
-                <a16:creationId xmlns="" xmlns:a16="http://schemas.microsoft.com/office/drawing/2014/main" id="{8F573B82-A720-4E7D-88E3-7ABD98571312}"/>
+                <a16:creationId xmlns:a16="http://schemas.microsoft.com/office/drawing/2014/main" id="{8F573B82-A720-4E7D-88E3-7ABD98571312}"/>
               </a:ext>
             </a:extLst>
           </p:cNvPr>
@@ -9962,7 +9799,7 @@
           <p:cNvPr id="6" name="Título 1">
             <a:extLst>
               <a:ext uri="{FF2B5EF4-FFF2-40B4-BE49-F238E27FC236}">
-                <a16:creationId xmlns="" xmlns:a16="http://schemas.microsoft.com/office/drawing/2014/main" id="{4420E5F6-C592-489E-8742-39113C67F28C}"/>
+                <a16:creationId xmlns:a16="http://schemas.microsoft.com/office/drawing/2014/main" id="{4420E5F6-C592-489E-8742-39113C67F28C}"/>
               </a:ext>
             </a:extLst>
           </p:cNvPr>
@@ -10002,7 +9839,7 @@
           <p:cNvPr id="8" name="Picture 7">
             <a:extLst>
               <a:ext uri="{FF2B5EF4-FFF2-40B4-BE49-F238E27FC236}">
-                <a16:creationId xmlns="" xmlns:a16="http://schemas.microsoft.com/office/drawing/2014/main" id="{AC1CFE5D-EA64-4455-B011-2E471DBEC948}"/>
+                <a16:creationId xmlns:a16="http://schemas.microsoft.com/office/drawing/2014/main" id="{AC1CFE5D-EA64-4455-B011-2E471DBEC948}"/>
               </a:ext>
             </a:extLst>
           </p:cNvPr>
@@ -10062,7 +9899,7 @@
           <p:cNvPr id="6" name="Título 1">
             <a:extLst>
               <a:ext uri="{FF2B5EF4-FFF2-40B4-BE49-F238E27FC236}">
-                <a16:creationId xmlns="" xmlns:a16="http://schemas.microsoft.com/office/drawing/2014/main" id="{4420E5F6-C592-489E-8742-39113C67F28C}"/>
+                <a16:creationId xmlns:a16="http://schemas.microsoft.com/office/drawing/2014/main" id="{4420E5F6-C592-489E-8742-39113C67F28C}"/>
               </a:ext>
             </a:extLst>
           </p:cNvPr>
@@ -10158,7 +9995,7 @@
           <p:cNvPr id="6" name="Título 1">
             <a:extLst>
               <a:ext uri="{FF2B5EF4-FFF2-40B4-BE49-F238E27FC236}">
-                <a16:creationId xmlns="" xmlns:a16="http://schemas.microsoft.com/office/drawing/2014/main" id="{4420E5F6-C592-489E-8742-39113C67F28C}"/>
+                <a16:creationId xmlns:a16="http://schemas.microsoft.com/office/drawing/2014/main" id="{4420E5F6-C592-489E-8742-39113C67F28C}"/>
               </a:ext>
             </a:extLst>
           </p:cNvPr>
@@ -10254,7 +10091,7 @@
           <p:cNvPr id="6" name="Título 1">
             <a:extLst>
               <a:ext uri="{FF2B5EF4-FFF2-40B4-BE49-F238E27FC236}">
-                <a16:creationId xmlns="" xmlns:a16="http://schemas.microsoft.com/office/drawing/2014/main" id="{4420E5F6-C592-489E-8742-39113C67F28C}"/>
+                <a16:creationId xmlns:a16="http://schemas.microsoft.com/office/drawing/2014/main" id="{4420E5F6-C592-489E-8742-39113C67F28C}"/>
               </a:ext>
             </a:extLst>
           </p:cNvPr>
@@ -10350,7 +10187,7 @@
           <p:cNvPr id="6" name="Título 1">
             <a:extLst>
               <a:ext uri="{FF2B5EF4-FFF2-40B4-BE49-F238E27FC236}">
-                <a16:creationId xmlns="" xmlns:a16="http://schemas.microsoft.com/office/drawing/2014/main" id="{4420E5F6-C592-489E-8742-39113C67F28C}"/>
+                <a16:creationId xmlns:a16="http://schemas.microsoft.com/office/drawing/2014/main" id="{4420E5F6-C592-489E-8742-39113C67F28C}"/>
               </a:ext>
             </a:extLst>
           </p:cNvPr>
@@ -10504,13 +10341,6 @@
   <p:transition spd="med">
     <p:fade/>
   </p:transition>
-  <p:timing>
-    <p:tnLst>
-      <p:par>
-        <p:cTn id="1" dur="indefinite" restart="never" nodeType="tmRoot"/>
-      </p:par>
-    </p:tnLst>
-  </p:timing>
 </p:sld>
 </file>
 
@@ -10576,25 +10406,25 @@
           <a:bodyPr/>
           <a:lstStyle/>
           <a:p>
-            <a:endParaRPr lang="pt-BR" sz="2400" dirty="0" smtClean="0"/>
-          </a:p>
-          <a:p>
-            <a:endParaRPr lang="pt-BR" sz="2400" dirty="0" smtClean="0"/>
-          </a:p>
-          <a:p>
-            <a:r>
-              <a:rPr lang="pt-BR" sz="2400" dirty="0" smtClean="0"/>
+            <a:endParaRPr lang="pt-BR" sz="2400" dirty="0"/>
+          </a:p>
+          <a:p>
+            <a:endParaRPr lang="pt-BR" sz="2400" dirty="0"/>
+          </a:p>
+          <a:p>
+            <a:r>
+              <a:rPr lang="pt-BR" sz="2400" dirty="0"/>
               <a:t>Manter-se atento ao escopo inicial do projeto para que não sejam desenvolvidas funcionalidades que não foram solicitadas</a:t>
             </a:r>
           </a:p>
           <a:p>
-            <a:endParaRPr lang="pt-BR" sz="2400" dirty="0" smtClean="0"/>
+            <a:endParaRPr lang="pt-BR" sz="2400" dirty="0"/>
           </a:p>
           <a:p>
             <a:pPr marL="0" indent="0">
               <a:buNone/>
             </a:pPr>
-            <a:endParaRPr lang="pt-BR" sz="2400" dirty="0" smtClean="0"/>
+            <a:endParaRPr lang="pt-BR" sz="2400" dirty="0"/>
           </a:p>
           <a:p>
             <a:pPr marL="0" indent="0">
@@ -10719,12 +10549,8 @@
           <a:lstStyle/>
           <a:p>
             <a:r>
-              <a:rPr lang="pt-BR" dirty="0" smtClean="0"/>
-              <a:t>Codificar </a:t>
-            </a:r>
-            <a:r>
               <a:rPr lang="pt-BR" dirty="0"/>
-              <a:t>o sistema.</a:t>
+              <a:t>Codificar o sistema.</a:t>
             </a:r>
           </a:p>
           <a:p>
@@ -10735,10 +10561,9 @@
           </a:p>
           <a:p>
             <a:r>
-              <a:rPr lang="pt-BR" dirty="0" smtClean="0"/>
+              <a:rPr lang="pt-BR" dirty="0"/>
               <a:t>Testar o sistema pronto.</a:t>
             </a:r>
-            <a:endParaRPr lang="pt-BR" dirty="0"/>
           </a:p>
           <a:p>
             <a:pPr marL="0" indent="0">
@@ -11404,13 +11229,6 @@
   <p:transition spd="med">
     <p:fade/>
   </p:transition>
-  <p:timing>
-    <p:tnLst>
-      <p:par>
-        <p:cTn id="1" dur="indefinite" restart="never" nodeType="tmRoot"/>
-      </p:par>
-    </p:tnLst>
-  </p:timing>
 </p:sld>
 </file>
 
@@ -11747,13 +11565,6 @@
   <p:transition spd="med">
     <p:fade/>
   </p:transition>
-  <p:timing>
-    <p:tnLst>
-      <p:par>
-        <p:cTn id="1" dur="indefinite" restart="never" nodeType="tmRoot"/>
-      </p:par>
-    </p:tnLst>
-  </p:timing>
 </p:sld>
 </file>
 
@@ -11839,13 +11650,6 @@
   <p:clrMapOvr>
     <a:masterClrMapping/>
   </p:clrMapOvr>
-  <p:timing>
-    <p:tnLst>
-      <p:par>
-        <p:cTn id="1" dur="indefinite" restart="never" nodeType="tmRoot"/>
-      </p:par>
-    </p:tnLst>
-  </p:timing>
 </p:sld>
 </file>
 
@@ -11931,13 +11735,6 @@
   <p:clrMapOvr>
     <a:masterClrMapping/>
   </p:clrMapOvr>
-  <p:timing>
-    <p:tnLst>
-      <p:par>
-        <p:cTn id="1" dur="indefinite" restart="never" nodeType="tmRoot"/>
-      </p:par>
-    </p:tnLst>
-  </p:timing>
 </p:sld>
 </file>
 
@@ -12023,13 +11820,6 @@
   <p:clrMapOvr>
     <a:masterClrMapping/>
   </p:clrMapOvr>
-  <p:timing>
-    <p:tnLst>
-      <p:par>
-        <p:cTn id="1" dur="indefinite" restart="never" nodeType="tmRoot"/>
-      </p:par>
-    </p:tnLst>
-  </p:timing>
 </p:sld>
 </file>
 

</xml_diff>